<commit_message>
Three slides; motivate problem
</commit_message>
<xml_diff>
--- a/drmt.pptx
+++ b/drmt.pptx
@@ -4,8 +4,13 @@
   <p:sldMasterIdLst>
     <p:sldMasterId id="2147483648" r:id="rId1"/>
   </p:sldMasterIdLst>
+  <p:notesMasterIdLst>
+    <p:notesMasterId r:id="rId5"/>
+  </p:notesMasterIdLst>
   <p:sldIdLst>
     <p:sldId id="256" r:id="rId2"/>
+    <p:sldId id="257" r:id="rId3"/>
+    <p:sldId id="258" r:id="rId4"/>
   </p:sldIdLst>
   <p:sldSz cx="12192000" cy="6858000"/>
   <p:notesSz cx="6858000" cy="9144000"/>
@@ -110,6 +115,448 @@
     </p:ext>
   </p:extLst>
 </p:presentation>
+</file>
+
+<file path=ppt/notesMasters/notesMaster1.xml><?xml version="1.0" encoding="utf-8"?>
+<p:notesMaster xmlns:a="http://schemas.openxmlformats.org/drawingml/2006/main" xmlns:r="http://schemas.openxmlformats.org/officeDocument/2006/relationships" xmlns:p="http://schemas.openxmlformats.org/presentationml/2006/main">
+  <p:cSld>
+    <p:bg>
+      <p:bgRef idx="1001">
+        <a:schemeClr val="bg1"/>
+      </p:bgRef>
+    </p:bg>
+    <p:spTree>
+      <p:nvGrpSpPr>
+        <p:cNvPr id="1" name=""/>
+        <p:cNvGrpSpPr/>
+        <p:nvPr/>
+      </p:nvGrpSpPr>
+      <p:grpSpPr>
+        <a:xfrm>
+          <a:off x="0" y="0"/>
+          <a:ext cx="0" cy="0"/>
+          <a:chOff x="0" y="0"/>
+          <a:chExt cx="0" cy="0"/>
+        </a:xfrm>
+      </p:grpSpPr>
+      <p:sp>
+        <p:nvSpPr>
+          <p:cNvPr id="2" name="Header Placeholder 1"/>
+          <p:cNvSpPr>
+            <a:spLocks noGrp="1"/>
+          </p:cNvSpPr>
+          <p:nvPr>
+            <p:ph type="hdr" sz="quarter"/>
+          </p:nvPr>
+        </p:nvSpPr>
+        <p:spPr>
+          <a:xfrm>
+            <a:off x="0" y="0"/>
+            <a:ext cx="2971800" cy="458788"/>
+          </a:xfrm>
+          <a:prstGeom prst="rect">
+            <a:avLst/>
+          </a:prstGeom>
+        </p:spPr>
+        <p:txBody>
+          <a:bodyPr vert="horz" lIns="91440" tIns="45720" rIns="91440" bIns="45720" rtlCol="0"/>
+          <a:lstStyle>
+            <a:lvl1pPr algn="l">
+              <a:defRPr sz="1200"/>
+            </a:lvl1pPr>
+          </a:lstStyle>
+          <a:p>
+            <a:endParaRPr lang="en-US"/>
+          </a:p>
+        </p:txBody>
+      </p:sp>
+      <p:sp>
+        <p:nvSpPr>
+          <p:cNvPr id="3" name="Date Placeholder 2"/>
+          <p:cNvSpPr>
+            <a:spLocks noGrp="1"/>
+          </p:cNvSpPr>
+          <p:nvPr>
+            <p:ph type="dt" idx="1"/>
+          </p:nvPr>
+        </p:nvSpPr>
+        <p:spPr>
+          <a:xfrm>
+            <a:off x="3884613" y="0"/>
+            <a:ext cx="2971800" cy="458788"/>
+          </a:xfrm>
+          <a:prstGeom prst="rect">
+            <a:avLst/>
+          </a:prstGeom>
+        </p:spPr>
+        <p:txBody>
+          <a:bodyPr vert="horz" lIns="91440" tIns="45720" rIns="91440" bIns="45720" rtlCol="0"/>
+          <a:lstStyle>
+            <a:lvl1pPr algn="r">
+              <a:defRPr sz="1200"/>
+            </a:lvl1pPr>
+          </a:lstStyle>
+          <a:p>
+            <a:fld id="{B4870BCF-C2C3-8A46-80CF-328A9426670B}" type="datetimeFigureOut">
+              <a:rPr lang="en-US" smtClean="0"/>
+              <a:t>5/13/17</a:t>
+            </a:fld>
+            <a:endParaRPr lang="en-US"/>
+          </a:p>
+        </p:txBody>
+      </p:sp>
+      <p:sp>
+        <p:nvSpPr>
+          <p:cNvPr id="4" name="Slide Image Placeholder 3"/>
+          <p:cNvSpPr>
+            <a:spLocks noGrp="1" noRot="1" noChangeAspect="1"/>
+          </p:cNvSpPr>
+          <p:nvPr>
+            <p:ph type="sldImg" idx="2"/>
+          </p:nvPr>
+        </p:nvSpPr>
+        <p:spPr>
+          <a:xfrm>
+            <a:off x="685800" y="1143000"/>
+            <a:ext cx="5486400" cy="3086100"/>
+          </a:xfrm>
+          <a:prstGeom prst="rect">
+            <a:avLst/>
+          </a:prstGeom>
+          <a:noFill/>
+          <a:ln w="12700">
+            <a:solidFill>
+              <a:prstClr val="black"/>
+            </a:solidFill>
+          </a:ln>
+        </p:spPr>
+        <p:txBody>
+          <a:bodyPr vert="horz" lIns="91440" tIns="45720" rIns="91440" bIns="45720" rtlCol="0" anchor="ctr"/>
+          <a:lstStyle/>
+          <a:p>
+            <a:endParaRPr lang="en-US"/>
+          </a:p>
+        </p:txBody>
+      </p:sp>
+      <p:sp>
+        <p:nvSpPr>
+          <p:cNvPr id="5" name="Notes Placeholder 4"/>
+          <p:cNvSpPr>
+            <a:spLocks noGrp="1"/>
+          </p:cNvSpPr>
+          <p:nvPr>
+            <p:ph type="body" sz="quarter" idx="3"/>
+          </p:nvPr>
+        </p:nvSpPr>
+        <p:spPr>
+          <a:xfrm>
+            <a:off x="685800" y="4400550"/>
+            <a:ext cx="5486400" cy="3600450"/>
+          </a:xfrm>
+          <a:prstGeom prst="rect">
+            <a:avLst/>
+          </a:prstGeom>
+        </p:spPr>
+        <p:txBody>
+          <a:bodyPr vert="horz" lIns="91440" tIns="45720" rIns="91440" bIns="45720" rtlCol="0"/>
+          <a:lstStyle/>
+          <a:p>
+            <a:pPr lvl="0"/>
+            <a:r>
+              <a:rPr lang="en-US" smtClean="0"/>
+              <a:t>Click to edit Master text styles</a:t>
+            </a:r>
+          </a:p>
+          <a:p>
+            <a:pPr lvl="1"/>
+            <a:r>
+              <a:rPr lang="en-US" smtClean="0"/>
+              <a:t>Second level</a:t>
+            </a:r>
+          </a:p>
+          <a:p>
+            <a:pPr lvl="2"/>
+            <a:r>
+              <a:rPr lang="en-US" smtClean="0"/>
+              <a:t>Third level</a:t>
+            </a:r>
+          </a:p>
+          <a:p>
+            <a:pPr lvl="3"/>
+            <a:r>
+              <a:rPr lang="en-US" smtClean="0"/>
+              <a:t>Fourth level</a:t>
+            </a:r>
+          </a:p>
+          <a:p>
+            <a:pPr lvl="4"/>
+            <a:r>
+              <a:rPr lang="en-US" smtClean="0"/>
+              <a:t>Fifth level</a:t>
+            </a:r>
+            <a:endParaRPr lang="en-US"/>
+          </a:p>
+        </p:txBody>
+      </p:sp>
+      <p:sp>
+        <p:nvSpPr>
+          <p:cNvPr id="6" name="Footer Placeholder 5"/>
+          <p:cNvSpPr>
+            <a:spLocks noGrp="1"/>
+          </p:cNvSpPr>
+          <p:nvPr>
+            <p:ph type="ftr" sz="quarter" idx="4"/>
+          </p:nvPr>
+        </p:nvSpPr>
+        <p:spPr>
+          <a:xfrm>
+            <a:off x="0" y="8685213"/>
+            <a:ext cx="2971800" cy="458787"/>
+          </a:xfrm>
+          <a:prstGeom prst="rect">
+            <a:avLst/>
+          </a:prstGeom>
+        </p:spPr>
+        <p:txBody>
+          <a:bodyPr vert="horz" lIns="91440" tIns="45720" rIns="91440" bIns="45720" rtlCol="0" anchor="b"/>
+          <a:lstStyle>
+            <a:lvl1pPr algn="l">
+              <a:defRPr sz="1200"/>
+            </a:lvl1pPr>
+          </a:lstStyle>
+          <a:p>
+            <a:endParaRPr lang="en-US"/>
+          </a:p>
+        </p:txBody>
+      </p:sp>
+      <p:sp>
+        <p:nvSpPr>
+          <p:cNvPr id="7" name="Slide Number Placeholder 6"/>
+          <p:cNvSpPr>
+            <a:spLocks noGrp="1"/>
+          </p:cNvSpPr>
+          <p:nvPr>
+            <p:ph type="sldNum" sz="quarter" idx="5"/>
+          </p:nvPr>
+        </p:nvSpPr>
+        <p:spPr>
+          <a:xfrm>
+            <a:off x="3884613" y="8685213"/>
+            <a:ext cx="2971800" cy="458787"/>
+          </a:xfrm>
+          <a:prstGeom prst="rect">
+            <a:avLst/>
+          </a:prstGeom>
+        </p:spPr>
+        <p:txBody>
+          <a:bodyPr vert="horz" lIns="91440" tIns="45720" rIns="91440" bIns="45720" rtlCol="0" anchor="b"/>
+          <a:lstStyle>
+            <a:lvl1pPr algn="r">
+              <a:defRPr sz="1200"/>
+            </a:lvl1pPr>
+          </a:lstStyle>
+          <a:p>
+            <a:fld id="{4B72050E-C83F-DC4E-B064-9A7B7E00D2A3}" type="slidenum">
+              <a:rPr lang="en-US" smtClean="0"/>
+              <a:t>‹#›</a:t>
+            </a:fld>
+            <a:endParaRPr lang="en-US"/>
+          </a:p>
+        </p:txBody>
+      </p:sp>
+    </p:spTree>
+    <p:extLst>
+      <p:ext uri="{BB962C8B-B14F-4D97-AF65-F5344CB8AC3E}">
+        <p14:creationId xmlns:p14="http://schemas.microsoft.com/office/powerpoint/2010/main" val="1628959122"/>
+      </p:ext>
+    </p:extLst>
+  </p:cSld>
+  <p:clrMap bg1="lt1" tx1="dk1" bg2="lt2" tx2="dk2" accent1="accent1" accent2="accent2" accent3="accent3" accent4="accent4" accent5="accent5" accent6="accent6" hlink="hlink" folHlink="folHlink"/>
+  <p:notesStyle>
+    <a:lvl1pPr marL="0" algn="l" defTabSz="914400" rtl="0" eaLnBrk="1" latinLnBrk="0" hangingPunct="1">
+      <a:defRPr sz="1200" kern="1200">
+        <a:solidFill>
+          <a:schemeClr val="tx1"/>
+        </a:solidFill>
+        <a:latin typeface="+mn-lt"/>
+        <a:ea typeface="+mn-ea"/>
+        <a:cs typeface="+mn-cs"/>
+      </a:defRPr>
+    </a:lvl1pPr>
+    <a:lvl2pPr marL="457200" algn="l" defTabSz="914400" rtl="0" eaLnBrk="1" latinLnBrk="0" hangingPunct="1">
+      <a:defRPr sz="1200" kern="1200">
+        <a:solidFill>
+          <a:schemeClr val="tx1"/>
+        </a:solidFill>
+        <a:latin typeface="+mn-lt"/>
+        <a:ea typeface="+mn-ea"/>
+        <a:cs typeface="+mn-cs"/>
+      </a:defRPr>
+    </a:lvl2pPr>
+    <a:lvl3pPr marL="914400" algn="l" defTabSz="914400" rtl="0" eaLnBrk="1" latinLnBrk="0" hangingPunct="1">
+      <a:defRPr sz="1200" kern="1200">
+        <a:solidFill>
+          <a:schemeClr val="tx1"/>
+        </a:solidFill>
+        <a:latin typeface="+mn-lt"/>
+        <a:ea typeface="+mn-ea"/>
+        <a:cs typeface="+mn-cs"/>
+      </a:defRPr>
+    </a:lvl3pPr>
+    <a:lvl4pPr marL="1371600" algn="l" defTabSz="914400" rtl="0" eaLnBrk="1" latinLnBrk="0" hangingPunct="1">
+      <a:defRPr sz="1200" kern="1200">
+        <a:solidFill>
+          <a:schemeClr val="tx1"/>
+        </a:solidFill>
+        <a:latin typeface="+mn-lt"/>
+        <a:ea typeface="+mn-ea"/>
+        <a:cs typeface="+mn-cs"/>
+      </a:defRPr>
+    </a:lvl4pPr>
+    <a:lvl5pPr marL="1828800" algn="l" defTabSz="914400" rtl="0" eaLnBrk="1" latinLnBrk="0" hangingPunct="1">
+      <a:defRPr sz="1200" kern="1200">
+        <a:solidFill>
+          <a:schemeClr val="tx1"/>
+        </a:solidFill>
+        <a:latin typeface="+mn-lt"/>
+        <a:ea typeface="+mn-ea"/>
+        <a:cs typeface="+mn-cs"/>
+      </a:defRPr>
+    </a:lvl5pPr>
+    <a:lvl6pPr marL="2286000" algn="l" defTabSz="914400" rtl="0" eaLnBrk="1" latinLnBrk="0" hangingPunct="1">
+      <a:defRPr sz="1200" kern="1200">
+        <a:solidFill>
+          <a:schemeClr val="tx1"/>
+        </a:solidFill>
+        <a:latin typeface="+mn-lt"/>
+        <a:ea typeface="+mn-ea"/>
+        <a:cs typeface="+mn-cs"/>
+      </a:defRPr>
+    </a:lvl6pPr>
+    <a:lvl7pPr marL="2743200" algn="l" defTabSz="914400" rtl="0" eaLnBrk="1" latinLnBrk="0" hangingPunct="1">
+      <a:defRPr sz="1200" kern="1200">
+        <a:solidFill>
+          <a:schemeClr val="tx1"/>
+        </a:solidFill>
+        <a:latin typeface="+mn-lt"/>
+        <a:ea typeface="+mn-ea"/>
+        <a:cs typeface="+mn-cs"/>
+      </a:defRPr>
+    </a:lvl7pPr>
+    <a:lvl8pPr marL="3200400" algn="l" defTabSz="914400" rtl="0" eaLnBrk="1" latinLnBrk="0" hangingPunct="1">
+      <a:defRPr sz="1200" kern="1200">
+        <a:solidFill>
+          <a:schemeClr val="tx1"/>
+        </a:solidFill>
+        <a:latin typeface="+mn-lt"/>
+        <a:ea typeface="+mn-ea"/>
+        <a:cs typeface="+mn-cs"/>
+      </a:defRPr>
+    </a:lvl8pPr>
+    <a:lvl9pPr marL="3657600" algn="l" defTabSz="914400" rtl="0" eaLnBrk="1" latinLnBrk="0" hangingPunct="1">
+      <a:defRPr sz="1200" kern="1200">
+        <a:solidFill>
+          <a:schemeClr val="tx1"/>
+        </a:solidFill>
+        <a:latin typeface="+mn-lt"/>
+        <a:ea typeface="+mn-ea"/>
+        <a:cs typeface="+mn-cs"/>
+      </a:defRPr>
+    </a:lvl9pPr>
+  </p:notesStyle>
+</p:notesMaster>
+</file>
+
+<file path=ppt/notesSlides/notesSlide1.xml><?xml version="1.0" encoding="utf-8"?>
+<p:notes xmlns:a="http://schemas.openxmlformats.org/drawingml/2006/main" xmlns:r="http://schemas.openxmlformats.org/officeDocument/2006/relationships" xmlns:p="http://schemas.openxmlformats.org/presentationml/2006/main">
+  <p:cSld>
+    <p:spTree>
+      <p:nvGrpSpPr>
+        <p:cNvPr id="1" name=""/>
+        <p:cNvGrpSpPr/>
+        <p:nvPr/>
+      </p:nvGrpSpPr>
+      <p:grpSpPr>
+        <a:xfrm>
+          <a:off x="0" y="0"/>
+          <a:ext cx="0" cy="0"/>
+          <a:chOff x="0" y="0"/>
+          <a:chExt cx="0" cy="0"/>
+        </a:xfrm>
+      </p:grpSpPr>
+      <p:sp>
+        <p:nvSpPr>
+          <p:cNvPr id="2" name="Slide Image Placeholder 1"/>
+          <p:cNvSpPr>
+            <a:spLocks noGrp="1" noRot="1" noChangeAspect="1"/>
+          </p:cNvSpPr>
+          <p:nvPr>
+            <p:ph type="sldImg"/>
+          </p:nvPr>
+        </p:nvSpPr>
+        <p:spPr/>
+      </p:sp>
+      <p:sp>
+        <p:nvSpPr>
+          <p:cNvPr id="3" name="Notes Placeholder 2"/>
+          <p:cNvSpPr>
+            <a:spLocks noGrp="1"/>
+          </p:cNvSpPr>
+          <p:nvPr>
+            <p:ph type="body" idx="1"/>
+          </p:nvPr>
+        </p:nvSpPr>
+        <p:spPr/>
+        <p:txBody>
+          <a:bodyPr/>
+          <a:lstStyle/>
+          <a:p>
+            <a:r>
+              <a:rPr lang="en-US" smtClean="0"/>
+              <a:t>TODO: Need </a:t>
+            </a:r>
+            <a:r>
+              <a:rPr lang="en-US" dirty="0" smtClean="0"/>
+              <a:t>figures</a:t>
+            </a:r>
+            <a:endParaRPr lang="en-US" dirty="0"/>
+          </a:p>
+        </p:txBody>
+      </p:sp>
+      <p:sp>
+        <p:nvSpPr>
+          <p:cNvPr id="4" name="Slide Number Placeholder 3"/>
+          <p:cNvSpPr>
+            <a:spLocks noGrp="1"/>
+          </p:cNvSpPr>
+          <p:nvPr>
+            <p:ph type="sldNum" sz="quarter" idx="10"/>
+          </p:nvPr>
+        </p:nvSpPr>
+        <p:spPr/>
+        <p:txBody>
+          <a:bodyPr/>
+          <a:lstStyle/>
+          <a:p>
+            <a:fld id="{4B72050E-C83F-DC4E-B064-9A7B7E00D2A3}" type="slidenum">
+              <a:rPr lang="en-US" smtClean="0"/>
+              <a:t>3</a:t>
+            </a:fld>
+            <a:endParaRPr lang="en-US"/>
+          </a:p>
+        </p:txBody>
+      </p:sp>
+    </p:spTree>
+    <p:extLst>
+      <p:ext uri="{BB962C8B-B14F-4D97-AF65-F5344CB8AC3E}">
+        <p14:creationId xmlns:p14="http://schemas.microsoft.com/office/powerpoint/2010/main" val="1794431498"/>
+      </p:ext>
+    </p:extLst>
+  </p:cSld>
+  <p:clrMapOvr>
+    <a:masterClrMapping/>
+  </p:clrMapOvr>
+</p:notes>
 </file>
 
 <file path=ppt/slideLayouts/slideLayout1.xml><?xml version="1.0" encoding="utf-8"?>
@@ -2996,7 +3443,6 @@
               <a:rPr lang="en-US" dirty="0"/>
               <a:t>: Disaggregated Programmable Switching</a:t>
             </a:r>
-            <a:endParaRPr lang="en-US" dirty="0"/>
           </a:p>
         </p:txBody>
       </p:sp>
@@ -3164,8 +3610,8 @@
         </p:blipFill>
         <p:spPr>
           <a:xfrm>
-            <a:off x="903250" y="5271818"/>
-            <a:ext cx="2869482" cy="1515088"/>
+            <a:off x="1081668" y="5322705"/>
+            <a:ext cx="2709745" cy="1430747"/>
           </a:xfrm>
           <a:prstGeom prst="rect">
             <a:avLst/>
@@ -3194,8 +3640,8 @@
         </p:blipFill>
         <p:spPr>
           <a:xfrm>
-            <a:off x="4259214" y="5400442"/>
-            <a:ext cx="3609474" cy="1457558"/>
+            <a:off x="4560296" y="5403938"/>
+            <a:ext cx="3435128" cy="1387155"/>
           </a:xfrm>
           <a:prstGeom prst="rect">
             <a:avLst/>
@@ -3206,6 +3652,1660 @@
     <p:extLst>
       <p:ext uri="{BB962C8B-B14F-4D97-AF65-F5344CB8AC3E}">
         <p14:creationId xmlns:p14="http://schemas.microsoft.com/office/powerpoint/2010/main" val="1896394133"/>
+      </p:ext>
+    </p:extLst>
+  </p:cSld>
+  <p:clrMapOvr>
+    <a:masterClrMapping/>
+  </p:clrMapOvr>
+</p:sld>
+</file>
+
+<file path=ppt/slides/slide2.xml><?xml version="1.0" encoding="utf-8"?>
+<p:sld xmlns:a="http://schemas.openxmlformats.org/drawingml/2006/main" xmlns:r="http://schemas.openxmlformats.org/officeDocument/2006/relationships" xmlns:p="http://schemas.openxmlformats.org/presentationml/2006/main">
+  <p:cSld>
+    <p:spTree>
+      <p:nvGrpSpPr>
+        <p:cNvPr id="1" name=""/>
+        <p:cNvGrpSpPr/>
+        <p:nvPr/>
+      </p:nvGrpSpPr>
+      <p:grpSpPr>
+        <a:xfrm>
+          <a:off x="0" y="0"/>
+          <a:ext cx="0" cy="0"/>
+          <a:chOff x="0" y="0"/>
+          <a:chExt cx="0" cy="0"/>
+        </a:xfrm>
+      </p:grpSpPr>
+      <p:sp>
+        <p:nvSpPr>
+          <p:cNvPr id="2" name="Title 1"/>
+          <p:cNvSpPr>
+            <a:spLocks noGrp="1"/>
+          </p:cNvSpPr>
+          <p:nvPr>
+            <p:ph type="title"/>
+          </p:nvPr>
+        </p:nvSpPr>
+        <p:spPr/>
+        <p:txBody>
+          <a:bodyPr/>
+          <a:lstStyle/>
+          <a:p>
+            <a:r>
+              <a:rPr lang="en-US" dirty="0" smtClean="0"/>
+              <a:t>Programmable Switches Today</a:t>
+            </a:r>
+            <a:endParaRPr lang="en-US" dirty="0"/>
+          </a:p>
+        </p:txBody>
+      </p:sp>
+      <p:grpSp>
+        <p:nvGrpSpPr>
+          <p:cNvPr id="57" name="Group 56"/>
+          <p:cNvGrpSpPr/>
+          <p:nvPr/>
+        </p:nvGrpSpPr>
+        <p:grpSpPr>
+          <a:xfrm>
+            <a:off x="8917646" y="1681877"/>
+            <a:ext cx="3056021" cy="3031958"/>
+            <a:chOff x="9977016" y="2748677"/>
+            <a:chExt cx="3056021" cy="3031958"/>
+          </a:xfrm>
+        </p:grpSpPr>
+        <p:sp>
+          <p:nvSpPr>
+            <p:cNvPr id="47" name="Rounded Rectangle 46"/>
+            <p:cNvSpPr/>
+            <p:nvPr/>
+          </p:nvSpPr>
+          <p:spPr>
+            <a:xfrm>
+              <a:off x="10329746" y="3471746"/>
+              <a:ext cx="892098" cy="591014"/>
+            </a:xfrm>
+            <a:prstGeom prst="roundRect">
+              <a:avLst/>
+            </a:prstGeom>
+            <a:noFill/>
+            <a:ln w="63500">
+              <a:solidFill>
+                <a:srgbClr val="002060"/>
+              </a:solidFill>
+            </a:ln>
+          </p:spPr>
+          <p:style>
+            <a:lnRef idx="2">
+              <a:schemeClr val="accent1">
+                <a:shade val="50000"/>
+              </a:schemeClr>
+            </a:lnRef>
+            <a:fillRef idx="1">
+              <a:schemeClr val="accent1"/>
+            </a:fillRef>
+            <a:effectRef idx="0">
+              <a:schemeClr val="accent1"/>
+            </a:effectRef>
+            <a:fontRef idx="minor">
+              <a:schemeClr val="lt1"/>
+            </a:fontRef>
+          </p:style>
+          <p:txBody>
+            <a:bodyPr rtlCol="0" anchor="ctr"/>
+            <a:lstStyle/>
+            <a:p>
+              <a:pPr algn="ctr"/>
+              <a:endParaRPr lang="en-US"/>
+            </a:p>
+          </p:txBody>
+        </p:sp>
+        <p:sp>
+          <p:nvSpPr>
+            <p:cNvPr id="48" name="Rounded Rectangle 47"/>
+            <p:cNvSpPr/>
+            <p:nvPr/>
+          </p:nvSpPr>
+          <p:spPr>
+            <a:xfrm>
+              <a:off x="9977016" y="2748677"/>
+              <a:ext cx="3056021" cy="3031958"/>
+            </a:xfrm>
+            <a:prstGeom prst="roundRect">
+              <a:avLst/>
+            </a:prstGeom>
+            <a:noFill/>
+            <a:ln w="63500">
+              <a:solidFill>
+                <a:schemeClr val="tx1"/>
+              </a:solidFill>
+            </a:ln>
+          </p:spPr>
+          <p:style>
+            <a:lnRef idx="2">
+              <a:schemeClr val="accent1">
+                <a:shade val="50000"/>
+              </a:schemeClr>
+            </a:lnRef>
+            <a:fillRef idx="1">
+              <a:schemeClr val="accent1"/>
+            </a:fillRef>
+            <a:effectRef idx="0">
+              <a:schemeClr val="accent1"/>
+            </a:effectRef>
+            <a:fontRef idx="minor">
+              <a:schemeClr val="lt1"/>
+            </a:fontRef>
+          </p:style>
+          <p:txBody>
+            <a:bodyPr rtlCol="0" anchor="ctr"/>
+            <a:lstStyle/>
+            <a:p>
+              <a:pPr algn="ctr"/>
+              <a:endParaRPr lang="en-US"/>
+            </a:p>
+          </p:txBody>
+        </p:sp>
+        <p:sp>
+          <p:nvSpPr>
+            <p:cNvPr id="49" name="TextBox 48"/>
+            <p:cNvSpPr txBox="1"/>
+            <p:nvPr/>
+          </p:nvSpPr>
+          <p:spPr>
+            <a:xfrm>
+              <a:off x="10385504" y="3572106"/>
+              <a:ext cx="784189" cy="369332"/>
+            </a:xfrm>
+            <a:prstGeom prst="rect">
+              <a:avLst/>
+            </a:prstGeom>
+            <a:noFill/>
+          </p:spPr>
+          <p:txBody>
+            <a:bodyPr wrap="none" rtlCol="0">
+              <a:spAutoFit/>
+            </a:bodyPr>
+            <a:lstStyle/>
+            <a:p>
+              <a:r>
+                <a:rPr lang="en-US" dirty="0" smtClean="0"/>
+                <a:t>Match</a:t>
+              </a:r>
+              <a:endParaRPr lang="en-US" dirty="0"/>
+            </a:p>
+          </p:txBody>
+        </p:sp>
+        <p:sp>
+          <p:nvSpPr>
+            <p:cNvPr id="50" name="TextBox 49"/>
+            <p:cNvSpPr txBox="1"/>
+            <p:nvPr/>
+          </p:nvSpPr>
+          <p:spPr>
+            <a:xfrm>
+              <a:off x="11809143" y="3568389"/>
+              <a:ext cx="788999" cy="369332"/>
+            </a:xfrm>
+            <a:prstGeom prst="rect">
+              <a:avLst/>
+            </a:prstGeom>
+            <a:noFill/>
+          </p:spPr>
+          <p:txBody>
+            <a:bodyPr wrap="none" rtlCol="0">
+              <a:spAutoFit/>
+            </a:bodyPr>
+            <a:lstStyle/>
+            <a:p>
+              <a:r>
+                <a:rPr lang="en-US" dirty="0" smtClean="0"/>
+                <a:t>Action</a:t>
+              </a:r>
+              <a:endParaRPr lang="en-US" dirty="0"/>
+            </a:p>
+          </p:txBody>
+        </p:sp>
+        <p:cxnSp>
+          <p:nvCxnSpPr>
+            <p:cNvPr id="51" name="Straight Arrow Connector 50"/>
+            <p:cNvCxnSpPr/>
+            <p:nvPr/>
+          </p:nvCxnSpPr>
+          <p:spPr>
+            <a:xfrm>
+              <a:off x="11304027" y="3765802"/>
+              <a:ext cx="412596" cy="0"/>
+            </a:xfrm>
+            <a:prstGeom prst="straightConnector1">
+              <a:avLst/>
+            </a:prstGeom>
+            <a:ln w="63500">
+              <a:solidFill>
+                <a:schemeClr val="tx1"/>
+              </a:solidFill>
+              <a:tailEnd type="triangle"/>
+            </a:ln>
+          </p:spPr>
+          <p:style>
+            <a:lnRef idx="1">
+              <a:schemeClr val="accent1"/>
+            </a:lnRef>
+            <a:fillRef idx="0">
+              <a:schemeClr val="accent1"/>
+            </a:fillRef>
+            <a:effectRef idx="0">
+              <a:schemeClr val="accent1"/>
+            </a:effectRef>
+            <a:fontRef idx="minor">
+              <a:schemeClr val="tx1"/>
+            </a:fontRef>
+          </p:style>
+        </p:cxnSp>
+        <p:sp>
+          <p:nvSpPr>
+            <p:cNvPr id="52" name="TextBox 51"/>
+            <p:cNvSpPr txBox="1"/>
+            <p:nvPr/>
+          </p:nvSpPr>
+          <p:spPr>
+            <a:xfrm>
+              <a:off x="10762201" y="4708410"/>
+              <a:ext cx="1453019" cy="369332"/>
+            </a:xfrm>
+            <a:prstGeom prst="rect">
+              <a:avLst/>
+            </a:prstGeom>
+            <a:noFill/>
+          </p:spPr>
+          <p:txBody>
+            <a:bodyPr wrap="square" rtlCol="0">
+              <a:spAutoFit/>
+            </a:bodyPr>
+            <a:lstStyle/>
+            <a:p>
+              <a:r>
+                <a:rPr lang="en-US" smtClean="0"/>
+                <a:t>SRAM/ TCAM</a:t>
+              </a:r>
+              <a:endParaRPr lang="en-US" dirty="0"/>
+            </a:p>
+          </p:txBody>
+        </p:sp>
+        <p:sp>
+          <p:nvSpPr>
+            <p:cNvPr id="53" name="Rounded Rectangle 52"/>
+            <p:cNvSpPr/>
+            <p:nvPr/>
+          </p:nvSpPr>
+          <p:spPr>
+            <a:xfrm>
+              <a:off x="11772327" y="3461308"/>
+              <a:ext cx="892098" cy="591014"/>
+            </a:xfrm>
+            <a:prstGeom prst="roundRect">
+              <a:avLst/>
+            </a:prstGeom>
+            <a:noFill/>
+            <a:ln w="63500">
+              <a:solidFill>
+                <a:srgbClr val="00B050"/>
+              </a:solidFill>
+            </a:ln>
+          </p:spPr>
+          <p:style>
+            <a:lnRef idx="2">
+              <a:schemeClr val="accent1">
+                <a:shade val="50000"/>
+              </a:schemeClr>
+            </a:lnRef>
+            <a:fillRef idx="1">
+              <a:schemeClr val="accent1"/>
+            </a:fillRef>
+            <a:effectRef idx="0">
+              <a:schemeClr val="accent1"/>
+            </a:effectRef>
+            <a:fontRef idx="minor">
+              <a:schemeClr val="lt1"/>
+            </a:fontRef>
+          </p:style>
+          <p:txBody>
+            <a:bodyPr rtlCol="0" anchor="ctr"/>
+            <a:lstStyle/>
+            <a:p>
+              <a:pPr algn="ctr"/>
+              <a:endParaRPr lang="en-US"/>
+            </a:p>
+          </p:txBody>
+        </p:sp>
+        <p:sp>
+          <p:nvSpPr>
+            <p:cNvPr id="54" name="Rounded Rectangle 53"/>
+            <p:cNvSpPr/>
+            <p:nvPr/>
+          </p:nvSpPr>
+          <p:spPr>
+            <a:xfrm>
+              <a:off x="10649467" y="4615790"/>
+              <a:ext cx="1578280" cy="591014"/>
+            </a:xfrm>
+            <a:prstGeom prst="roundRect">
+              <a:avLst/>
+            </a:prstGeom>
+            <a:noFill/>
+            <a:ln w="63500">
+              <a:solidFill>
+                <a:srgbClr val="FF0000"/>
+              </a:solidFill>
+            </a:ln>
+          </p:spPr>
+          <p:style>
+            <a:lnRef idx="2">
+              <a:schemeClr val="accent1">
+                <a:shade val="50000"/>
+              </a:schemeClr>
+            </a:lnRef>
+            <a:fillRef idx="1">
+              <a:schemeClr val="accent1"/>
+            </a:fillRef>
+            <a:effectRef idx="0">
+              <a:schemeClr val="accent1"/>
+            </a:effectRef>
+            <a:fontRef idx="minor">
+              <a:schemeClr val="lt1"/>
+            </a:fontRef>
+          </p:style>
+          <p:txBody>
+            <a:bodyPr rtlCol="0" anchor="ctr"/>
+            <a:lstStyle/>
+            <a:p>
+              <a:pPr algn="ctr"/>
+              <a:endParaRPr lang="en-US"/>
+            </a:p>
+          </p:txBody>
+        </p:sp>
+        <p:cxnSp>
+          <p:nvCxnSpPr>
+            <p:cNvPr id="55" name="Straight Arrow Connector 54"/>
+            <p:cNvCxnSpPr/>
+            <p:nvPr/>
+          </p:nvCxnSpPr>
+          <p:spPr>
+            <a:xfrm flipH="1" flipV="1">
+              <a:off x="10775795" y="4062760"/>
+              <a:ext cx="662812" cy="553030"/>
+            </a:xfrm>
+            <a:prstGeom prst="straightConnector1">
+              <a:avLst/>
+            </a:prstGeom>
+            <a:ln w="63500">
+              <a:tailEnd type="triangle"/>
+            </a:ln>
+          </p:spPr>
+          <p:style>
+            <a:lnRef idx="1">
+              <a:schemeClr val="accent1"/>
+            </a:lnRef>
+            <a:fillRef idx="0">
+              <a:schemeClr val="accent1"/>
+            </a:fillRef>
+            <a:effectRef idx="0">
+              <a:schemeClr val="accent1"/>
+            </a:effectRef>
+            <a:fontRef idx="minor">
+              <a:schemeClr val="tx1"/>
+            </a:fontRef>
+          </p:style>
+        </p:cxnSp>
+        <p:cxnSp>
+          <p:nvCxnSpPr>
+            <p:cNvPr id="56" name="Straight Arrow Connector 55"/>
+            <p:cNvCxnSpPr/>
+            <p:nvPr/>
+          </p:nvCxnSpPr>
+          <p:spPr>
+            <a:xfrm flipH="1">
+              <a:off x="11438607" y="4052322"/>
+              <a:ext cx="779769" cy="563468"/>
+            </a:xfrm>
+            <a:prstGeom prst="straightConnector1">
+              <a:avLst/>
+            </a:prstGeom>
+            <a:ln w="63500">
+              <a:tailEnd type="triangle"/>
+            </a:ln>
+          </p:spPr>
+          <p:style>
+            <a:lnRef idx="1">
+              <a:schemeClr val="accent1"/>
+            </a:lnRef>
+            <a:fillRef idx="0">
+              <a:schemeClr val="accent1"/>
+            </a:fillRef>
+            <a:effectRef idx="0">
+              <a:schemeClr val="accent1"/>
+            </a:effectRef>
+            <a:fontRef idx="minor">
+              <a:schemeClr val="tx1"/>
+            </a:fontRef>
+          </p:style>
+        </p:cxnSp>
+      </p:grpSp>
+      <p:grpSp>
+        <p:nvGrpSpPr>
+          <p:cNvPr id="58" name="Group 57"/>
+          <p:cNvGrpSpPr/>
+          <p:nvPr/>
+        </p:nvGrpSpPr>
+        <p:grpSpPr>
+          <a:xfrm>
+            <a:off x="4353081" y="1681877"/>
+            <a:ext cx="3056021" cy="3031958"/>
+            <a:chOff x="9977016" y="2748677"/>
+            <a:chExt cx="3056021" cy="3031958"/>
+          </a:xfrm>
+        </p:grpSpPr>
+        <p:sp>
+          <p:nvSpPr>
+            <p:cNvPr id="59" name="Rounded Rectangle 58"/>
+            <p:cNvSpPr/>
+            <p:nvPr/>
+          </p:nvSpPr>
+          <p:spPr>
+            <a:xfrm>
+              <a:off x="10329746" y="3471746"/>
+              <a:ext cx="892098" cy="591014"/>
+            </a:xfrm>
+            <a:prstGeom prst="roundRect">
+              <a:avLst/>
+            </a:prstGeom>
+            <a:noFill/>
+            <a:ln w="63500">
+              <a:solidFill>
+                <a:srgbClr val="002060"/>
+              </a:solidFill>
+            </a:ln>
+          </p:spPr>
+          <p:style>
+            <a:lnRef idx="2">
+              <a:schemeClr val="accent1">
+                <a:shade val="50000"/>
+              </a:schemeClr>
+            </a:lnRef>
+            <a:fillRef idx="1">
+              <a:schemeClr val="accent1"/>
+            </a:fillRef>
+            <a:effectRef idx="0">
+              <a:schemeClr val="accent1"/>
+            </a:effectRef>
+            <a:fontRef idx="minor">
+              <a:schemeClr val="lt1"/>
+            </a:fontRef>
+          </p:style>
+          <p:txBody>
+            <a:bodyPr rtlCol="0" anchor="ctr"/>
+            <a:lstStyle/>
+            <a:p>
+              <a:pPr algn="ctr"/>
+              <a:endParaRPr lang="en-US"/>
+            </a:p>
+          </p:txBody>
+        </p:sp>
+        <p:sp>
+          <p:nvSpPr>
+            <p:cNvPr id="60" name="Rounded Rectangle 59"/>
+            <p:cNvSpPr/>
+            <p:nvPr/>
+          </p:nvSpPr>
+          <p:spPr>
+            <a:xfrm>
+              <a:off x="9977016" y="2748677"/>
+              <a:ext cx="3056021" cy="3031958"/>
+            </a:xfrm>
+            <a:prstGeom prst="roundRect">
+              <a:avLst/>
+            </a:prstGeom>
+            <a:noFill/>
+            <a:ln w="63500">
+              <a:solidFill>
+                <a:schemeClr val="tx1"/>
+              </a:solidFill>
+            </a:ln>
+          </p:spPr>
+          <p:style>
+            <a:lnRef idx="2">
+              <a:schemeClr val="accent1">
+                <a:shade val="50000"/>
+              </a:schemeClr>
+            </a:lnRef>
+            <a:fillRef idx="1">
+              <a:schemeClr val="accent1"/>
+            </a:fillRef>
+            <a:effectRef idx="0">
+              <a:schemeClr val="accent1"/>
+            </a:effectRef>
+            <a:fontRef idx="minor">
+              <a:schemeClr val="lt1"/>
+            </a:fontRef>
+          </p:style>
+          <p:txBody>
+            <a:bodyPr rtlCol="0" anchor="ctr"/>
+            <a:lstStyle/>
+            <a:p>
+              <a:pPr algn="ctr"/>
+              <a:endParaRPr lang="en-US"/>
+            </a:p>
+          </p:txBody>
+        </p:sp>
+        <p:sp>
+          <p:nvSpPr>
+            <p:cNvPr id="61" name="TextBox 60"/>
+            <p:cNvSpPr txBox="1"/>
+            <p:nvPr/>
+          </p:nvSpPr>
+          <p:spPr>
+            <a:xfrm>
+              <a:off x="10385504" y="3572106"/>
+              <a:ext cx="784189" cy="369332"/>
+            </a:xfrm>
+            <a:prstGeom prst="rect">
+              <a:avLst/>
+            </a:prstGeom>
+            <a:noFill/>
+          </p:spPr>
+          <p:txBody>
+            <a:bodyPr wrap="none" rtlCol="0">
+              <a:spAutoFit/>
+            </a:bodyPr>
+            <a:lstStyle/>
+            <a:p>
+              <a:r>
+                <a:rPr lang="en-US" dirty="0" smtClean="0"/>
+                <a:t>Match</a:t>
+              </a:r>
+              <a:endParaRPr lang="en-US" dirty="0"/>
+            </a:p>
+          </p:txBody>
+        </p:sp>
+        <p:sp>
+          <p:nvSpPr>
+            <p:cNvPr id="62" name="TextBox 61"/>
+            <p:cNvSpPr txBox="1"/>
+            <p:nvPr/>
+          </p:nvSpPr>
+          <p:spPr>
+            <a:xfrm>
+              <a:off x="11809143" y="3568389"/>
+              <a:ext cx="788999" cy="369332"/>
+            </a:xfrm>
+            <a:prstGeom prst="rect">
+              <a:avLst/>
+            </a:prstGeom>
+            <a:noFill/>
+          </p:spPr>
+          <p:txBody>
+            <a:bodyPr wrap="none" rtlCol="0">
+              <a:spAutoFit/>
+            </a:bodyPr>
+            <a:lstStyle/>
+            <a:p>
+              <a:r>
+                <a:rPr lang="en-US" dirty="0" smtClean="0"/>
+                <a:t>Action</a:t>
+              </a:r>
+              <a:endParaRPr lang="en-US" dirty="0"/>
+            </a:p>
+          </p:txBody>
+        </p:sp>
+        <p:cxnSp>
+          <p:nvCxnSpPr>
+            <p:cNvPr id="63" name="Straight Arrow Connector 62"/>
+            <p:cNvCxnSpPr/>
+            <p:nvPr/>
+          </p:nvCxnSpPr>
+          <p:spPr>
+            <a:xfrm>
+              <a:off x="11304027" y="3765802"/>
+              <a:ext cx="412596" cy="0"/>
+            </a:xfrm>
+            <a:prstGeom prst="straightConnector1">
+              <a:avLst/>
+            </a:prstGeom>
+            <a:ln w="63500">
+              <a:solidFill>
+                <a:schemeClr val="tx1"/>
+              </a:solidFill>
+              <a:tailEnd type="triangle"/>
+            </a:ln>
+          </p:spPr>
+          <p:style>
+            <a:lnRef idx="1">
+              <a:schemeClr val="accent1"/>
+            </a:lnRef>
+            <a:fillRef idx="0">
+              <a:schemeClr val="accent1"/>
+            </a:fillRef>
+            <a:effectRef idx="0">
+              <a:schemeClr val="accent1"/>
+            </a:effectRef>
+            <a:fontRef idx="minor">
+              <a:schemeClr val="tx1"/>
+            </a:fontRef>
+          </p:style>
+        </p:cxnSp>
+        <p:sp>
+          <p:nvSpPr>
+            <p:cNvPr id="64" name="TextBox 63"/>
+            <p:cNvSpPr txBox="1"/>
+            <p:nvPr/>
+          </p:nvSpPr>
+          <p:spPr>
+            <a:xfrm>
+              <a:off x="10762201" y="4708410"/>
+              <a:ext cx="1453019" cy="369332"/>
+            </a:xfrm>
+            <a:prstGeom prst="rect">
+              <a:avLst/>
+            </a:prstGeom>
+            <a:noFill/>
+          </p:spPr>
+          <p:txBody>
+            <a:bodyPr wrap="square" rtlCol="0">
+              <a:spAutoFit/>
+            </a:bodyPr>
+            <a:lstStyle/>
+            <a:p>
+              <a:r>
+                <a:rPr lang="en-US" smtClean="0"/>
+                <a:t>SRAM/ TCAM</a:t>
+              </a:r>
+              <a:endParaRPr lang="en-US" dirty="0"/>
+            </a:p>
+          </p:txBody>
+        </p:sp>
+        <p:sp>
+          <p:nvSpPr>
+            <p:cNvPr id="65" name="Rounded Rectangle 64"/>
+            <p:cNvSpPr/>
+            <p:nvPr/>
+          </p:nvSpPr>
+          <p:spPr>
+            <a:xfrm>
+              <a:off x="11772327" y="3461308"/>
+              <a:ext cx="892098" cy="591014"/>
+            </a:xfrm>
+            <a:prstGeom prst="roundRect">
+              <a:avLst/>
+            </a:prstGeom>
+            <a:noFill/>
+            <a:ln w="63500">
+              <a:solidFill>
+                <a:srgbClr val="00B050"/>
+              </a:solidFill>
+            </a:ln>
+          </p:spPr>
+          <p:style>
+            <a:lnRef idx="2">
+              <a:schemeClr val="accent1">
+                <a:shade val="50000"/>
+              </a:schemeClr>
+            </a:lnRef>
+            <a:fillRef idx="1">
+              <a:schemeClr val="accent1"/>
+            </a:fillRef>
+            <a:effectRef idx="0">
+              <a:schemeClr val="accent1"/>
+            </a:effectRef>
+            <a:fontRef idx="minor">
+              <a:schemeClr val="lt1"/>
+            </a:fontRef>
+          </p:style>
+          <p:txBody>
+            <a:bodyPr rtlCol="0" anchor="ctr"/>
+            <a:lstStyle/>
+            <a:p>
+              <a:pPr algn="ctr"/>
+              <a:endParaRPr lang="en-US"/>
+            </a:p>
+          </p:txBody>
+        </p:sp>
+        <p:sp>
+          <p:nvSpPr>
+            <p:cNvPr id="66" name="Rounded Rectangle 65"/>
+            <p:cNvSpPr/>
+            <p:nvPr/>
+          </p:nvSpPr>
+          <p:spPr>
+            <a:xfrm>
+              <a:off x="10649467" y="4615790"/>
+              <a:ext cx="1578280" cy="591014"/>
+            </a:xfrm>
+            <a:prstGeom prst="roundRect">
+              <a:avLst/>
+            </a:prstGeom>
+            <a:noFill/>
+            <a:ln w="63500">
+              <a:solidFill>
+                <a:srgbClr val="FF0000"/>
+              </a:solidFill>
+            </a:ln>
+          </p:spPr>
+          <p:style>
+            <a:lnRef idx="2">
+              <a:schemeClr val="accent1">
+                <a:shade val="50000"/>
+              </a:schemeClr>
+            </a:lnRef>
+            <a:fillRef idx="1">
+              <a:schemeClr val="accent1"/>
+            </a:fillRef>
+            <a:effectRef idx="0">
+              <a:schemeClr val="accent1"/>
+            </a:effectRef>
+            <a:fontRef idx="minor">
+              <a:schemeClr val="lt1"/>
+            </a:fontRef>
+          </p:style>
+          <p:txBody>
+            <a:bodyPr rtlCol="0" anchor="ctr"/>
+            <a:lstStyle/>
+            <a:p>
+              <a:pPr algn="ctr"/>
+              <a:endParaRPr lang="en-US"/>
+            </a:p>
+          </p:txBody>
+        </p:sp>
+        <p:cxnSp>
+          <p:nvCxnSpPr>
+            <p:cNvPr id="67" name="Straight Arrow Connector 66"/>
+            <p:cNvCxnSpPr/>
+            <p:nvPr/>
+          </p:nvCxnSpPr>
+          <p:spPr>
+            <a:xfrm flipH="1" flipV="1">
+              <a:off x="10775795" y="4062760"/>
+              <a:ext cx="662812" cy="553030"/>
+            </a:xfrm>
+            <a:prstGeom prst="straightConnector1">
+              <a:avLst/>
+            </a:prstGeom>
+            <a:ln w="63500">
+              <a:tailEnd type="triangle"/>
+            </a:ln>
+          </p:spPr>
+          <p:style>
+            <a:lnRef idx="1">
+              <a:schemeClr val="accent1"/>
+            </a:lnRef>
+            <a:fillRef idx="0">
+              <a:schemeClr val="accent1"/>
+            </a:fillRef>
+            <a:effectRef idx="0">
+              <a:schemeClr val="accent1"/>
+            </a:effectRef>
+            <a:fontRef idx="minor">
+              <a:schemeClr val="tx1"/>
+            </a:fontRef>
+          </p:style>
+        </p:cxnSp>
+        <p:cxnSp>
+          <p:nvCxnSpPr>
+            <p:cNvPr id="68" name="Straight Arrow Connector 67"/>
+            <p:cNvCxnSpPr/>
+            <p:nvPr/>
+          </p:nvCxnSpPr>
+          <p:spPr>
+            <a:xfrm flipH="1">
+              <a:off x="11438607" y="4052322"/>
+              <a:ext cx="779769" cy="563468"/>
+            </a:xfrm>
+            <a:prstGeom prst="straightConnector1">
+              <a:avLst/>
+            </a:prstGeom>
+            <a:ln w="63500">
+              <a:tailEnd type="triangle"/>
+            </a:ln>
+          </p:spPr>
+          <p:style>
+            <a:lnRef idx="1">
+              <a:schemeClr val="accent1"/>
+            </a:lnRef>
+            <a:fillRef idx="0">
+              <a:schemeClr val="accent1"/>
+            </a:fillRef>
+            <a:effectRef idx="0">
+              <a:schemeClr val="accent1"/>
+            </a:effectRef>
+            <a:fontRef idx="minor">
+              <a:schemeClr val="tx1"/>
+            </a:fontRef>
+          </p:style>
+        </p:cxnSp>
+      </p:grpSp>
+      <p:grpSp>
+        <p:nvGrpSpPr>
+          <p:cNvPr id="69" name="Group 68"/>
+          <p:cNvGrpSpPr/>
+          <p:nvPr/>
+        </p:nvGrpSpPr>
+        <p:grpSpPr>
+          <a:xfrm>
+            <a:off x="170868" y="1681877"/>
+            <a:ext cx="3056021" cy="3031958"/>
+            <a:chOff x="9977016" y="2748677"/>
+            <a:chExt cx="3056021" cy="3031958"/>
+          </a:xfrm>
+        </p:grpSpPr>
+        <p:sp>
+          <p:nvSpPr>
+            <p:cNvPr id="70" name="Rounded Rectangle 69"/>
+            <p:cNvSpPr/>
+            <p:nvPr/>
+          </p:nvSpPr>
+          <p:spPr>
+            <a:xfrm>
+              <a:off x="10329746" y="3471746"/>
+              <a:ext cx="892098" cy="591014"/>
+            </a:xfrm>
+            <a:prstGeom prst="roundRect">
+              <a:avLst/>
+            </a:prstGeom>
+            <a:noFill/>
+            <a:ln w="63500">
+              <a:solidFill>
+                <a:srgbClr val="002060"/>
+              </a:solidFill>
+            </a:ln>
+          </p:spPr>
+          <p:style>
+            <a:lnRef idx="2">
+              <a:schemeClr val="accent1">
+                <a:shade val="50000"/>
+              </a:schemeClr>
+            </a:lnRef>
+            <a:fillRef idx="1">
+              <a:schemeClr val="accent1"/>
+            </a:fillRef>
+            <a:effectRef idx="0">
+              <a:schemeClr val="accent1"/>
+            </a:effectRef>
+            <a:fontRef idx="minor">
+              <a:schemeClr val="lt1"/>
+            </a:fontRef>
+          </p:style>
+          <p:txBody>
+            <a:bodyPr rtlCol="0" anchor="ctr"/>
+            <a:lstStyle/>
+            <a:p>
+              <a:pPr algn="ctr"/>
+              <a:endParaRPr lang="en-US"/>
+            </a:p>
+          </p:txBody>
+        </p:sp>
+        <p:sp>
+          <p:nvSpPr>
+            <p:cNvPr id="71" name="Rounded Rectangle 70"/>
+            <p:cNvSpPr/>
+            <p:nvPr/>
+          </p:nvSpPr>
+          <p:spPr>
+            <a:xfrm>
+              <a:off x="9977016" y="2748677"/>
+              <a:ext cx="3056021" cy="3031958"/>
+            </a:xfrm>
+            <a:prstGeom prst="roundRect">
+              <a:avLst/>
+            </a:prstGeom>
+            <a:noFill/>
+            <a:ln w="63500">
+              <a:solidFill>
+                <a:schemeClr val="tx1"/>
+              </a:solidFill>
+            </a:ln>
+          </p:spPr>
+          <p:style>
+            <a:lnRef idx="2">
+              <a:schemeClr val="accent1">
+                <a:shade val="50000"/>
+              </a:schemeClr>
+            </a:lnRef>
+            <a:fillRef idx="1">
+              <a:schemeClr val="accent1"/>
+            </a:fillRef>
+            <a:effectRef idx="0">
+              <a:schemeClr val="accent1"/>
+            </a:effectRef>
+            <a:fontRef idx="minor">
+              <a:schemeClr val="lt1"/>
+            </a:fontRef>
+          </p:style>
+          <p:txBody>
+            <a:bodyPr rtlCol="0" anchor="ctr"/>
+            <a:lstStyle/>
+            <a:p>
+              <a:pPr algn="ctr"/>
+              <a:endParaRPr lang="en-US"/>
+            </a:p>
+          </p:txBody>
+        </p:sp>
+        <p:sp>
+          <p:nvSpPr>
+            <p:cNvPr id="72" name="TextBox 71"/>
+            <p:cNvSpPr txBox="1"/>
+            <p:nvPr/>
+          </p:nvSpPr>
+          <p:spPr>
+            <a:xfrm>
+              <a:off x="10385504" y="3572106"/>
+              <a:ext cx="784189" cy="369332"/>
+            </a:xfrm>
+            <a:prstGeom prst="rect">
+              <a:avLst/>
+            </a:prstGeom>
+            <a:noFill/>
+          </p:spPr>
+          <p:txBody>
+            <a:bodyPr wrap="none" rtlCol="0">
+              <a:spAutoFit/>
+            </a:bodyPr>
+            <a:lstStyle/>
+            <a:p>
+              <a:r>
+                <a:rPr lang="en-US" dirty="0" smtClean="0"/>
+                <a:t>Match</a:t>
+              </a:r>
+              <a:endParaRPr lang="en-US" dirty="0"/>
+            </a:p>
+          </p:txBody>
+        </p:sp>
+        <p:sp>
+          <p:nvSpPr>
+            <p:cNvPr id="73" name="TextBox 72"/>
+            <p:cNvSpPr txBox="1"/>
+            <p:nvPr/>
+          </p:nvSpPr>
+          <p:spPr>
+            <a:xfrm>
+              <a:off x="11809143" y="3568389"/>
+              <a:ext cx="788999" cy="369332"/>
+            </a:xfrm>
+            <a:prstGeom prst="rect">
+              <a:avLst/>
+            </a:prstGeom>
+            <a:noFill/>
+          </p:spPr>
+          <p:txBody>
+            <a:bodyPr wrap="none" rtlCol="0">
+              <a:spAutoFit/>
+            </a:bodyPr>
+            <a:lstStyle/>
+            <a:p>
+              <a:r>
+                <a:rPr lang="en-US" dirty="0" smtClean="0"/>
+                <a:t>Action</a:t>
+              </a:r>
+              <a:endParaRPr lang="en-US" dirty="0"/>
+            </a:p>
+          </p:txBody>
+        </p:sp>
+        <p:cxnSp>
+          <p:nvCxnSpPr>
+            <p:cNvPr id="74" name="Straight Arrow Connector 73"/>
+            <p:cNvCxnSpPr/>
+            <p:nvPr/>
+          </p:nvCxnSpPr>
+          <p:spPr>
+            <a:xfrm>
+              <a:off x="11304027" y="3765802"/>
+              <a:ext cx="412596" cy="0"/>
+            </a:xfrm>
+            <a:prstGeom prst="straightConnector1">
+              <a:avLst/>
+            </a:prstGeom>
+            <a:ln w="63500">
+              <a:solidFill>
+                <a:schemeClr val="tx1"/>
+              </a:solidFill>
+              <a:tailEnd type="triangle"/>
+            </a:ln>
+          </p:spPr>
+          <p:style>
+            <a:lnRef idx="1">
+              <a:schemeClr val="accent1"/>
+            </a:lnRef>
+            <a:fillRef idx="0">
+              <a:schemeClr val="accent1"/>
+            </a:fillRef>
+            <a:effectRef idx="0">
+              <a:schemeClr val="accent1"/>
+            </a:effectRef>
+            <a:fontRef idx="minor">
+              <a:schemeClr val="tx1"/>
+            </a:fontRef>
+          </p:style>
+        </p:cxnSp>
+        <p:sp>
+          <p:nvSpPr>
+            <p:cNvPr id="75" name="TextBox 74"/>
+            <p:cNvSpPr txBox="1"/>
+            <p:nvPr/>
+          </p:nvSpPr>
+          <p:spPr>
+            <a:xfrm>
+              <a:off x="10762201" y="4708410"/>
+              <a:ext cx="1453019" cy="369332"/>
+            </a:xfrm>
+            <a:prstGeom prst="rect">
+              <a:avLst/>
+            </a:prstGeom>
+            <a:noFill/>
+          </p:spPr>
+          <p:txBody>
+            <a:bodyPr wrap="square" rtlCol="0">
+              <a:spAutoFit/>
+            </a:bodyPr>
+            <a:lstStyle/>
+            <a:p>
+              <a:r>
+                <a:rPr lang="en-US" smtClean="0"/>
+                <a:t>SRAM/ TCAM</a:t>
+              </a:r>
+              <a:endParaRPr lang="en-US" dirty="0"/>
+            </a:p>
+          </p:txBody>
+        </p:sp>
+        <p:sp>
+          <p:nvSpPr>
+            <p:cNvPr id="76" name="Rounded Rectangle 75"/>
+            <p:cNvSpPr/>
+            <p:nvPr/>
+          </p:nvSpPr>
+          <p:spPr>
+            <a:xfrm>
+              <a:off x="11772327" y="3461308"/>
+              <a:ext cx="892098" cy="591014"/>
+            </a:xfrm>
+            <a:prstGeom prst="roundRect">
+              <a:avLst/>
+            </a:prstGeom>
+            <a:noFill/>
+            <a:ln w="63500">
+              <a:solidFill>
+                <a:srgbClr val="00B050"/>
+              </a:solidFill>
+            </a:ln>
+          </p:spPr>
+          <p:style>
+            <a:lnRef idx="2">
+              <a:schemeClr val="accent1">
+                <a:shade val="50000"/>
+              </a:schemeClr>
+            </a:lnRef>
+            <a:fillRef idx="1">
+              <a:schemeClr val="accent1"/>
+            </a:fillRef>
+            <a:effectRef idx="0">
+              <a:schemeClr val="accent1"/>
+            </a:effectRef>
+            <a:fontRef idx="minor">
+              <a:schemeClr val="lt1"/>
+            </a:fontRef>
+          </p:style>
+          <p:txBody>
+            <a:bodyPr rtlCol="0" anchor="ctr"/>
+            <a:lstStyle/>
+            <a:p>
+              <a:pPr algn="ctr"/>
+              <a:endParaRPr lang="en-US"/>
+            </a:p>
+          </p:txBody>
+        </p:sp>
+        <p:sp>
+          <p:nvSpPr>
+            <p:cNvPr id="77" name="Rounded Rectangle 76"/>
+            <p:cNvSpPr/>
+            <p:nvPr/>
+          </p:nvSpPr>
+          <p:spPr>
+            <a:xfrm>
+              <a:off x="10649467" y="4615790"/>
+              <a:ext cx="1578280" cy="591014"/>
+            </a:xfrm>
+            <a:prstGeom prst="roundRect">
+              <a:avLst/>
+            </a:prstGeom>
+            <a:noFill/>
+            <a:ln w="63500">
+              <a:solidFill>
+                <a:srgbClr val="FF0000"/>
+              </a:solidFill>
+            </a:ln>
+          </p:spPr>
+          <p:style>
+            <a:lnRef idx="2">
+              <a:schemeClr val="accent1">
+                <a:shade val="50000"/>
+              </a:schemeClr>
+            </a:lnRef>
+            <a:fillRef idx="1">
+              <a:schemeClr val="accent1"/>
+            </a:fillRef>
+            <a:effectRef idx="0">
+              <a:schemeClr val="accent1"/>
+            </a:effectRef>
+            <a:fontRef idx="minor">
+              <a:schemeClr val="lt1"/>
+            </a:fontRef>
+          </p:style>
+          <p:txBody>
+            <a:bodyPr rtlCol="0" anchor="ctr"/>
+            <a:lstStyle/>
+            <a:p>
+              <a:pPr algn="ctr"/>
+              <a:endParaRPr lang="en-US"/>
+            </a:p>
+          </p:txBody>
+        </p:sp>
+        <p:cxnSp>
+          <p:nvCxnSpPr>
+            <p:cNvPr id="78" name="Straight Arrow Connector 77"/>
+            <p:cNvCxnSpPr/>
+            <p:nvPr/>
+          </p:nvCxnSpPr>
+          <p:spPr>
+            <a:xfrm flipH="1" flipV="1">
+              <a:off x="10775795" y="4062760"/>
+              <a:ext cx="662812" cy="553030"/>
+            </a:xfrm>
+            <a:prstGeom prst="straightConnector1">
+              <a:avLst/>
+            </a:prstGeom>
+            <a:ln w="63500">
+              <a:tailEnd type="triangle"/>
+            </a:ln>
+          </p:spPr>
+          <p:style>
+            <a:lnRef idx="1">
+              <a:schemeClr val="accent1"/>
+            </a:lnRef>
+            <a:fillRef idx="0">
+              <a:schemeClr val="accent1"/>
+            </a:fillRef>
+            <a:effectRef idx="0">
+              <a:schemeClr val="accent1"/>
+            </a:effectRef>
+            <a:fontRef idx="minor">
+              <a:schemeClr val="tx1"/>
+            </a:fontRef>
+          </p:style>
+        </p:cxnSp>
+        <p:cxnSp>
+          <p:nvCxnSpPr>
+            <p:cNvPr id="79" name="Straight Arrow Connector 78"/>
+            <p:cNvCxnSpPr/>
+            <p:nvPr/>
+          </p:nvCxnSpPr>
+          <p:spPr>
+            <a:xfrm flipH="1">
+              <a:off x="11438607" y="4052322"/>
+              <a:ext cx="779769" cy="563468"/>
+            </a:xfrm>
+            <a:prstGeom prst="straightConnector1">
+              <a:avLst/>
+            </a:prstGeom>
+            <a:ln w="63500">
+              <a:tailEnd type="triangle"/>
+            </a:ln>
+          </p:spPr>
+          <p:style>
+            <a:lnRef idx="1">
+              <a:schemeClr val="accent1"/>
+            </a:lnRef>
+            <a:fillRef idx="0">
+              <a:schemeClr val="accent1"/>
+            </a:fillRef>
+            <a:effectRef idx="0">
+              <a:schemeClr val="accent1"/>
+            </a:effectRef>
+            <a:fontRef idx="minor">
+              <a:schemeClr val="tx1"/>
+            </a:fontRef>
+          </p:style>
+        </p:cxnSp>
+      </p:grpSp>
+      <p:sp>
+        <p:nvSpPr>
+          <p:cNvPr id="80" name="Oval 79"/>
+          <p:cNvSpPr/>
+          <p:nvPr/>
+        </p:nvSpPr>
+        <p:spPr>
+          <a:xfrm>
+            <a:off x="7986126" y="3750529"/>
+            <a:ext cx="245327" cy="267629"/>
+          </a:xfrm>
+          <a:prstGeom prst="ellipse">
+            <a:avLst/>
+          </a:prstGeom>
+          <a:solidFill>
+            <a:schemeClr val="tx1"/>
+          </a:solidFill>
+        </p:spPr>
+        <p:style>
+          <a:lnRef idx="2">
+            <a:schemeClr val="accent1">
+              <a:shade val="50000"/>
+            </a:schemeClr>
+          </a:lnRef>
+          <a:fillRef idx="1">
+            <a:schemeClr val="accent1"/>
+          </a:fillRef>
+          <a:effectRef idx="0">
+            <a:schemeClr val="accent1"/>
+          </a:effectRef>
+          <a:fontRef idx="minor">
+            <a:schemeClr val="lt1"/>
+          </a:fontRef>
+        </p:style>
+        <p:txBody>
+          <a:bodyPr rtlCol="0" anchor="ctr"/>
+          <a:lstStyle/>
+          <a:p>
+            <a:pPr algn="ctr"/>
+            <a:endParaRPr lang="en-US"/>
+          </a:p>
+        </p:txBody>
+      </p:sp>
+      <p:sp>
+        <p:nvSpPr>
+          <p:cNvPr id="81" name="Oval 80"/>
+          <p:cNvSpPr/>
+          <p:nvPr/>
+        </p:nvSpPr>
+        <p:spPr>
+          <a:xfrm>
+            <a:off x="7545654" y="3750529"/>
+            <a:ext cx="245327" cy="267629"/>
+          </a:xfrm>
+          <a:prstGeom prst="ellipse">
+            <a:avLst/>
+          </a:prstGeom>
+          <a:solidFill>
+            <a:schemeClr val="tx1"/>
+          </a:solidFill>
+        </p:spPr>
+        <p:style>
+          <a:lnRef idx="2">
+            <a:schemeClr val="accent1">
+              <a:shade val="50000"/>
+            </a:schemeClr>
+          </a:lnRef>
+          <a:fillRef idx="1">
+            <a:schemeClr val="accent1"/>
+          </a:fillRef>
+          <a:effectRef idx="0">
+            <a:schemeClr val="accent1"/>
+          </a:effectRef>
+          <a:fontRef idx="minor">
+            <a:schemeClr val="lt1"/>
+          </a:fontRef>
+        </p:style>
+        <p:txBody>
+          <a:bodyPr rtlCol="0" anchor="ctr"/>
+          <a:lstStyle/>
+          <a:p>
+            <a:pPr algn="ctr"/>
+            <a:endParaRPr lang="en-US"/>
+          </a:p>
+        </p:txBody>
+      </p:sp>
+      <p:sp>
+        <p:nvSpPr>
+          <p:cNvPr id="82" name="Oval 81"/>
+          <p:cNvSpPr/>
+          <p:nvPr/>
+        </p:nvSpPr>
+        <p:spPr>
+          <a:xfrm>
+            <a:off x="8426598" y="3750529"/>
+            <a:ext cx="245327" cy="267629"/>
+          </a:xfrm>
+          <a:prstGeom prst="ellipse">
+            <a:avLst/>
+          </a:prstGeom>
+          <a:solidFill>
+            <a:schemeClr val="tx1"/>
+          </a:solidFill>
+        </p:spPr>
+        <p:style>
+          <a:lnRef idx="2">
+            <a:schemeClr val="accent1">
+              <a:shade val="50000"/>
+            </a:schemeClr>
+          </a:lnRef>
+          <a:fillRef idx="1">
+            <a:schemeClr val="accent1"/>
+          </a:fillRef>
+          <a:effectRef idx="0">
+            <a:schemeClr val="accent1"/>
+          </a:effectRef>
+          <a:fontRef idx="minor">
+            <a:schemeClr val="lt1"/>
+          </a:fontRef>
+        </p:style>
+        <p:txBody>
+          <a:bodyPr rtlCol="0" anchor="ctr"/>
+          <a:lstStyle/>
+          <a:p>
+            <a:pPr algn="ctr"/>
+            <a:endParaRPr lang="en-US"/>
+          </a:p>
+        </p:txBody>
+      </p:sp>
+      <p:cxnSp>
+        <p:nvCxnSpPr>
+          <p:cNvPr id="83" name="Straight Arrow Connector 82"/>
+          <p:cNvCxnSpPr>
+            <a:stCxn id="71" idx="3"/>
+            <a:endCxn id="60" idx="1"/>
+          </p:cNvCxnSpPr>
+          <p:nvPr/>
+        </p:nvCxnSpPr>
+        <p:spPr>
+          <a:xfrm>
+            <a:off x="3226889" y="3197856"/>
+            <a:ext cx="1126192" cy="0"/>
+          </a:xfrm>
+          <a:prstGeom prst="straightConnector1">
+            <a:avLst/>
+          </a:prstGeom>
+          <a:ln w="127000">
+            <a:solidFill>
+              <a:schemeClr val="tx1"/>
+            </a:solidFill>
+            <a:tailEnd type="arrow"/>
+          </a:ln>
+        </p:spPr>
+        <p:style>
+          <a:lnRef idx="1">
+            <a:schemeClr val="accent1"/>
+          </a:lnRef>
+          <a:fillRef idx="0">
+            <a:schemeClr val="accent1"/>
+          </a:fillRef>
+          <a:effectRef idx="0">
+            <a:schemeClr val="accent1"/>
+          </a:effectRef>
+          <a:fontRef idx="minor">
+            <a:schemeClr val="tx1"/>
+          </a:fontRef>
+        </p:style>
+      </p:cxnSp>
+      <p:cxnSp>
+        <p:nvCxnSpPr>
+          <p:cNvPr id="84" name="Straight Arrow Connector 83"/>
+          <p:cNvCxnSpPr>
+            <a:stCxn id="60" idx="3"/>
+            <a:endCxn id="48" idx="1"/>
+          </p:cNvCxnSpPr>
+          <p:nvPr/>
+        </p:nvCxnSpPr>
+        <p:spPr>
+          <a:xfrm>
+            <a:off x="7409102" y="3197856"/>
+            <a:ext cx="1508544" cy="0"/>
+          </a:xfrm>
+          <a:prstGeom prst="straightConnector1">
+            <a:avLst/>
+          </a:prstGeom>
+          <a:ln w="127000">
+            <a:solidFill>
+              <a:schemeClr val="tx1"/>
+            </a:solidFill>
+            <a:tailEnd type="arrow"/>
+          </a:ln>
+        </p:spPr>
+        <p:style>
+          <a:lnRef idx="1">
+            <a:schemeClr val="accent1"/>
+          </a:lnRef>
+          <a:fillRef idx="0">
+            <a:schemeClr val="accent1"/>
+          </a:fillRef>
+          <a:effectRef idx="0">
+            <a:schemeClr val="accent1"/>
+          </a:effectRef>
+          <a:fontRef idx="minor">
+            <a:schemeClr val="tx1"/>
+          </a:fontRef>
+        </p:style>
+      </p:cxnSp>
+      <p:sp>
+        <p:nvSpPr>
+          <p:cNvPr id="96" name="TextBox 95"/>
+          <p:cNvSpPr txBox="1"/>
+          <p:nvPr/>
+        </p:nvSpPr>
+        <p:spPr>
+          <a:xfrm>
+            <a:off x="624468" y="5151863"/>
+            <a:ext cx="10694020" cy="923330"/>
+          </a:xfrm>
+          <a:prstGeom prst="rect">
+            <a:avLst/>
+          </a:prstGeom>
+          <a:noFill/>
+        </p:spPr>
+        <p:txBody>
+          <a:bodyPr wrap="square" rtlCol="0">
+            <a:spAutoFit/>
+          </a:bodyPr>
+          <a:lstStyle/>
+          <a:p>
+            <a:pPr marL="285750" indent="-285750">
+              <a:buFont typeface="Arial" charset="0"/>
+              <a:buChar char="•"/>
+            </a:pPr>
+            <a:r>
+              <a:rPr lang="en-US" dirty="0" smtClean="0">
+                <a:latin typeface="Gadugi" charset="0"/>
+                <a:ea typeface="Gadugi" charset="0"/>
+                <a:cs typeface="Gadugi" charset="0"/>
+              </a:rPr>
+              <a:t>Resources are aggregated</a:t>
+            </a:r>
+          </a:p>
+          <a:p>
+            <a:pPr marL="742950" lvl="1" indent="-285750">
+              <a:buFont typeface="Arial" charset="0"/>
+              <a:buChar char="•"/>
+            </a:pPr>
+            <a:r>
+              <a:rPr lang="en-US" dirty="0" smtClean="0">
+                <a:latin typeface="Gadugi" charset="0"/>
+                <a:ea typeface="Gadugi" charset="0"/>
+                <a:cs typeface="Gadugi" charset="0"/>
+              </a:rPr>
+              <a:t>Every action needs to paired with a match. Wasted match capacity can not be reclaimed.</a:t>
+            </a:r>
+          </a:p>
+          <a:p>
+            <a:pPr marL="742950" lvl="1" indent="-285750">
+              <a:buFont typeface="Arial" charset="0"/>
+              <a:buChar char="•"/>
+            </a:pPr>
+            <a:r>
+              <a:rPr lang="en-US" dirty="0" smtClean="0">
+                <a:latin typeface="Gadugi" charset="0"/>
+                <a:ea typeface="Gadugi" charset="0"/>
+                <a:cs typeface="Gadugi" charset="0"/>
+              </a:rPr>
+              <a:t>Unused </a:t>
+            </a:r>
+            <a:r>
+              <a:rPr lang="en-US" dirty="0">
+                <a:latin typeface="Gadugi" charset="0"/>
+                <a:ea typeface="Gadugi" charset="0"/>
+                <a:cs typeface="Gadugi" charset="0"/>
+              </a:rPr>
+              <a:t>m</a:t>
+            </a:r>
+            <a:r>
+              <a:rPr lang="en-US" dirty="0" smtClean="0">
+                <a:latin typeface="Gadugi" charset="0"/>
+                <a:ea typeface="Gadugi" charset="0"/>
+                <a:cs typeface="Gadugi" charset="0"/>
+              </a:rPr>
+              <a:t>emory in one stage can not be reclaimed by a later stage.</a:t>
+            </a:r>
+            <a:endParaRPr lang="en-US" dirty="0">
+              <a:latin typeface="Gadugi" charset="0"/>
+              <a:ea typeface="Gadugi" charset="0"/>
+              <a:cs typeface="Gadugi" charset="0"/>
+            </a:endParaRPr>
+          </a:p>
+        </p:txBody>
+      </p:sp>
+    </p:spTree>
+    <p:extLst>
+      <p:ext uri="{BB962C8B-B14F-4D97-AF65-F5344CB8AC3E}">
+        <p14:creationId xmlns:p14="http://schemas.microsoft.com/office/powerpoint/2010/main" val="1734486843"/>
+      </p:ext>
+    </p:extLst>
+  </p:cSld>
+  <p:clrMapOvr>
+    <a:masterClrMapping/>
+  </p:clrMapOvr>
+  <p:timing>
+    <p:tnLst>
+      <p:par>
+        <p:cTn id="1" dur="indefinite" restart="never" nodeType="tmRoot"/>
+      </p:par>
+    </p:tnLst>
+  </p:timing>
+</p:sld>
+</file>
+
+<file path=ppt/slides/slide3.xml><?xml version="1.0" encoding="utf-8"?>
+<p:sld xmlns:a="http://schemas.openxmlformats.org/drawingml/2006/main" xmlns:r="http://schemas.openxmlformats.org/officeDocument/2006/relationships" xmlns:p="http://schemas.openxmlformats.org/presentationml/2006/main">
+  <p:cSld>
+    <p:spTree>
+      <p:nvGrpSpPr>
+        <p:cNvPr id="1" name=""/>
+        <p:cNvGrpSpPr/>
+        <p:nvPr/>
+      </p:nvGrpSpPr>
+      <p:grpSpPr>
+        <a:xfrm>
+          <a:off x="0" y="0"/>
+          <a:ext cx="0" cy="0"/>
+          <a:chOff x="0" y="0"/>
+          <a:chExt cx="0" cy="0"/>
+        </a:xfrm>
+      </p:grpSpPr>
+      <p:sp>
+        <p:nvSpPr>
+          <p:cNvPr id="2" name="Title 1"/>
+          <p:cNvSpPr>
+            <a:spLocks noGrp="1"/>
+          </p:cNvSpPr>
+          <p:nvPr>
+            <p:ph type="title"/>
+          </p:nvPr>
+        </p:nvSpPr>
+        <p:spPr/>
+        <p:txBody>
+          <a:bodyPr/>
+          <a:lstStyle/>
+          <a:p>
+            <a:r>
+              <a:rPr lang="en-US" dirty="0" smtClean="0"/>
+              <a:t>Problems with aggregation</a:t>
+            </a:r>
+            <a:endParaRPr lang="en-US" dirty="0"/>
+          </a:p>
+        </p:txBody>
+      </p:sp>
+      <p:sp>
+        <p:nvSpPr>
+          <p:cNvPr id="3" name="Content Placeholder 2"/>
+          <p:cNvSpPr>
+            <a:spLocks noGrp="1"/>
+          </p:cNvSpPr>
+          <p:nvPr>
+            <p:ph idx="1"/>
+          </p:nvPr>
+        </p:nvSpPr>
+        <p:spPr/>
+        <p:txBody>
+          <a:bodyPr/>
+          <a:lstStyle/>
+          <a:p>
+            <a:r>
+              <a:rPr lang="en-US" dirty="0" smtClean="0"/>
+              <a:t>Large table that does not fit in a single stage’s memory</a:t>
+            </a:r>
+          </a:p>
+          <a:p>
+            <a:pPr lvl="1"/>
+            <a:r>
+              <a:rPr lang="en-US" dirty="0" smtClean="0"/>
+              <a:t>Needs to be spread out over multiple stages.</a:t>
+            </a:r>
+          </a:p>
+          <a:p>
+            <a:pPr lvl="1"/>
+            <a:r>
+              <a:rPr lang="en-US" dirty="0" smtClean="0"/>
+              <a:t>Action can’t run until the last stage, wasting preceding action units</a:t>
+            </a:r>
+          </a:p>
+          <a:p>
+            <a:pPr lvl="1"/>
+            <a:endParaRPr lang="en-US" dirty="0"/>
+          </a:p>
+          <a:p>
+            <a:r>
+              <a:rPr lang="en-US" dirty="0" smtClean="0"/>
+              <a:t>Performance cliffs:</a:t>
+            </a:r>
+          </a:p>
+          <a:p>
+            <a:pPr lvl="1"/>
+            <a:r>
+              <a:rPr lang="en-US" dirty="0" smtClean="0"/>
+              <a:t>Slight </a:t>
+            </a:r>
+            <a:r>
+              <a:rPr lang="en-US" dirty="0"/>
+              <a:t>increase in requirements suddenly degrades </a:t>
+            </a:r>
+            <a:r>
+              <a:rPr lang="en-US" dirty="0" smtClean="0"/>
+              <a:t>throughput</a:t>
+            </a:r>
+          </a:p>
+          <a:p>
+            <a:pPr lvl="1"/>
+            <a:r>
+              <a:rPr lang="en-US" dirty="0" smtClean="0"/>
+              <a:t>E.g., program needs 31 action units, only 30 available</a:t>
+            </a:r>
+          </a:p>
+          <a:p>
+            <a:pPr lvl="1"/>
+            <a:r>
+              <a:rPr lang="en-US" dirty="0" smtClean="0"/>
+              <a:t>Pipeline degrades program’s throughput to 1/2, instead of 30/31</a:t>
+            </a:r>
+          </a:p>
+        </p:txBody>
+      </p:sp>
+    </p:spTree>
+    <p:extLst>
+      <p:ext uri="{BB962C8B-B14F-4D97-AF65-F5344CB8AC3E}">
+        <p14:creationId xmlns:p14="http://schemas.microsoft.com/office/powerpoint/2010/main" val="1648283084"/>
       </p:ext>
     </p:extLst>
   </p:cSld>
@@ -3474,4 +5574,265 @@
     </a:ext>
   </a:extLst>
 </a:theme>
+</file>
+
+<file path=ppt/theme/theme2.xml><?xml version="1.0" encoding="utf-8"?>
+<a:theme xmlns:a="http://schemas.openxmlformats.org/drawingml/2006/main" name="Office Theme">
+  <a:themeElements>
+    <a:clrScheme name="Office">
+      <a:dk1>
+        <a:sysClr val="windowText" lastClr="000000"/>
+      </a:dk1>
+      <a:lt1>
+        <a:sysClr val="window" lastClr="FFFFFF"/>
+      </a:lt1>
+      <a:dk2>
+        <a:srgbClr val="44546A"/>
+      </a:dk2>
+      <a:lt2>
+        <a:srgbClr val="E7E6E6"/>
+      </a:lt2>
+      <a:accent1>
+        <a:srgbClr val="5B9BD5"/>
+      </a:accent1>
+      <a:accent2>
+        <a:srgbClr val="ED7D31"/>
+      </a:accent2>
+      <a:accent3>
+        <a:srgbClr val="A5A5A5"/>
+      </a:accent3>
+      <a:accent4>
+        <a:srgbClr val="FFC000"/>
+      </a:accent4>
+      <a:accent5>
+        <a:srgbClr val="4472C4"/>
+      </a:accent5>
+      <a:accent6>
+        <a:srgbClr val="70AD47"/>
+      </a:accent6>
+      <a:hlink>
+        <a:srgbClr val="0563C1"/>
+      </a:hlink>
+      <a:folHlink>
+        <a:srgbClr val="954F72"/>
+      </a:folHlink>
+    </a:clrScheme>
+    <a:fontScheme name="Office">
+      <a:majorFont>
+        <a:latin typeface="Calibri Light" panose="020F0302020204030204"/>
+        <a:ea typeface=""/>
+        <a:cs typeface=""/>
+        <a:font script="Jpan" typeface="Yu Gothic Light"/>
+        <a:font script="Hang" typeface="맑은 고딕"/>
+        <a:font script="Hans" typeface="DengXian Light"/>
+        <a:font script="Hant" typeface="新細明體"/>
+        <a:font script="Arab" typeface="Times New Roman"/>
+        <a:font script="Hebr" typeface="Times New Roman"/>
+        <a:font script="Thai" typeface="Angsana New"/>
+        <a:font script="Ethi" typeface="Nyala"/>
+        <a:font script="Beng" typeface="Vrinda"/>
+        <a:font script="Gujr" typeface="Shruti"/>
+        <a:font script="Khmr" typeface="MoolBoran"/>
+        <a:font script="Knda" typeface="Tunga"/>
+        <a:font script="Guru" typeface="Raavi"/>
+        <a:font script="Cans" typeface="Euphemia"/>
+        <a:font script="Cher" typeface="Plantagenet Cherokee"/>
+        <a:font script="Yiii" typeface="Microsoft Yi Baiti"/>
+        <a:font script="Tibt" typeface="Microsoft Himalaya"/>
+        <a:font script="Thaa" typeface="MV Boli"/>
+        <a:font script="Deva" typeface="Mangal"/>
+        <a:font script="Telu" typeface="Gautami"/>
+        <a:font script="Taml" typeface="Latha"/>
+        <a:font script="Syrc" typeface="Estrangelo Edessa"/>
+        <a:font script="Orya" typeface="Kalinga"/>
+        <a:font script="Mlym" typeface="Kartika"/>
+        <a:font script="Laoo" typeface="DokChampa"/>
+        <a:font script="Sinh" typeface="Iskoola Pota"/>
+        <a:font script="Mong" typeface="Mongolian Baiti"/>
+        <a:font script="Viet" typeface="Times New Roman"/>
+        <a:font script="Uigh" typeface="Microsoft Uighur"/>
+        <a:font script="Geor" typeface="Sylfaen"/>
+      </a:majorFont>
+      <a:minorFont>
+        <a:latin typeface="Calibri" panose="020F0502020204030204"/>
+        <a:ea typeface=""/>
+        <a:cs typeface=""/>
+        <a:font script="Jpan" typeface="Yu Gothic"/>
+        <a:font script="Hang" typeface="맑은 고딕"/>
+        <a:font script="Hans" typeface="DengXian"/>
+        <a:font script="Hant" typeface="新細明體"/>
+        <a:font script="Arab" typeface="Arial"/>
+        <a:font script="Hebr" typeface="Arial"/>
+        <a:font script="Thai" typeface="Cordia New"/>
+        <a:font script="Ethi" typeface="Nyala"/>
+        <a:font script="Beng" typeface="Vrinda"/>
+        <a:font script="Gujr" typeface="Shruti"/>
+        <a:font script="Khmr" typeface="DaunPenh"/>
+        <a:font script="Knda" typeface="Tunga"/>
+        <a:font script="Guru" typeface="Raavi"/>
+        <a:font script="Cans" typeface="Euphemia"/>
+        <a:font script="Cher" typeface="Plantagenet Cherokee"/>
+        <a:font script="Yiii" typeface="Microsoft Yi Baiti"/>
+        <a:font script="Tibt" typeface="Microsoft Himalaya"/>
+        <a:font script="Thaa" typeface="MV Boli"/>
+        <a:font script="Deva" typeface="Mangal"/>
+        <a:font script="Telu" typeface="Gautami"/>
+        <a:font script="Taml" typeface="Latha"/>
+        <a:font script="Syrc" typeface="Estrangelo Edessa"/>
+        <a:font script="Orya" typeface="Kalinga"/>
+        <a:font script="Mlym" typeface="Kartika"/>
+        <a:font script="Laoo" typeface="DokChampa"/>
+        <a:font script="Sinh" typeface="Iskoola Pota"/>
+        <a:font script="Mong" typeface="Mongolian Baiti"/>
+        <a:font script="Viet" typeface="Arial"/>
+        <a:font script="Uigh" typeface="Microsoft Uighur"/>
+        <a:font script="Geor" typeface="Sylfaen"/>
+      </a:minorFont>
+    </a:fontScheme>
+    <a:fmtScheme name="Office">
+      <a:fillStyleLst>
+        <a:solidFill>
+          <a:schemeClr val="phClr"/>
+        </a:solidFill>
+        <a:gradFill rotWithShape="1">
+          <a:gsLst>
+            <a:gs pos="0">
+              <a:schemeClr val="phClr">
+                <a:lumMod val="110000"/>
+                <a:satMod val="105000"/>
+                <a:tint val="67000"/>
+              </a:schemeClr>
+            </a:gs>
+            <a:gs pos="50000">
+              <a:schemeClr val="phClr">
+                <a:lumMod val="105000"/>
+                <a:satMod val="103000"/>
+                <a:tint val="73000"/>
+              </a:schemeClr>
+            </a:gs>
+            <a:gs pos="100000">
+              <a:schemeClr val="phClr">
+                <a:lumMod val="105000"/>
+                <a:satMod val="109000"/>
+                <a:tint val="81000"/>
+              </a:schemeClr>
+            </a:gs>
+          </a:gsLst>
+          <a:lin ang="5400000" scaled="0"/>
+        </a:gradFill>
+        <a:gradFill rotWithShape="1">
+          <a:gsLst>
+            <a:gs pos="0">
+              <a:schemeClr val="phClr">
+                <a:satMod val="103000"/>
+                <a:lumMod val="102000"/>
+                <a:tint val="94000"/>
+              </a:schemeClr>
+            </a:gs>
+            <a:gs pos="50000">
+              <a:schemeClr val="phClr">
+                <a:satMod val="110000"/>
+                <a:lumMod val="100000"/>
+                <a:shade val="100000"/>
+              </a:schemeClr>
+            </a:gs>
+            <a:gs pos="100000">
+              <a:schemeClr val="phClr">
+                <a:lumMod val="99000"/>
+                <a:satMod val="120000"/>
+                <a:shade val="78000"/>
+              </a:schemeClr>
+            </a:gs>
+          </a:gsLst>
+          <a:lin ang="5400000" scaled="0"/>
+        </a:gradFill>
+      </a:fillStyleLst>
+      <a:lnStyleLst>
+        <a:ln w="6350" cap="flat" cmpd="sng" algn="ctr">
+          <a:solidFill>
+            <a:schemeClr val="phClr"/>
+          </a:solidFill>
+          <a:prstDash val="solid"/>
+          <a:miter lim="800000"/>
+        </a:ln>
+        <a:ln w="12700" cap="flat" cmpd="sng" algn="ctr">
+          <a:solidFill>
+            <a:schemeClr val="phClr"/>
+          </a:solidFill>
+          <a:prstDash val="solid"/>
+          <a:miter lim="800000"/>
+        </a:ln>
+        <a:ln w="19050" cap="flat" cmpd="sng" algn="ctr">
+          <a:solidFill>
+            <a:schemeClr val="phClr"/>
+          </a:solidFill>
+          <a:prstDash val="solid"/>
+          <a:miter lim="800000"/>
+        </a:ln>
+      </a:lnStyleLst>
+      <a:effectStyleLst>
+        <a:effectStyle>
+          <a:effectLst/>
+        </a:effectStyle>
+        <a:effectStyle>
+          <a:effectLst/>
+        </a:effectStyle>
+        <a:effectStyle>
+          <a:effectLst>
+            <a:outerShdw blurRad="57150" dist="19050" dir="5400000" algn="ctr" rotWithShape="0">
+              <a:srgbClr val="000000">
+                <a:alpha val="63000"/>
+              </a:srgbClr>
+            </a:outerShdw>
+          </a:effectLst>
+        </a:effectStyle>
+      </a:effectStyleLst>
+      <a:bgFillStyleLst>
+        <a:solidFill>
+          <a:schemeClr val="phClr"/>
+        </a:solidFill>
+        <a:solidFill>
+          <a:schemeClr val="phClr">
+            <a:tint val="95000"/>
+            <a:satMod val="170000"/>
+          </a:schemeClr>
+        </a:solidFill>
+        <a:gradFill rotWithShape="1">
+          <a:gsLst>
+            <a:gs pos="0">
+              <a:schemeClr val="phClr">
+                <a:tint val="93000"/>
+                <a:satMod val="150000"/>
+                <a:shade val="98000"/>
+                <a:lumMod val="102000"/>
+              </a:schemeClr>
+            </a:gs>
+            <a:gs pos="50000">
+              <a:schemeClr val="phClr">
+                <a:tint val="98000"/>
+                <a:satMod val="130000"/>
+                <a:shade val="90000"/>
+                <a:lumMod val="103000"/>
+              </a:schemeClr>
+            </a:gs>
+            <a:gs pos="100000">
+              <a:schemeClr val="phClr">
+                <a:shade val="63000"/>
+                <a:satMod val="120000"/>
+              </a:schemeClr>
+            </a:gs>
+          </a:gsLst>
+          <a:lin ang="5400000" scaled="0"/>
+        </a:gradFill>
+      </a:bgFillStyleLst>
+    </a:fmtScheme>
+  </a:themeElements>
+  <a:objectDefaults/>
+  <a:extraClrSchemeLst/>
+  <a:extLst>
+    <a:ext uri="{05A4C25C-085E-4340-85A3-A5531E510DB2}">
+      <thm15:themeFamily xmlns:thm15="http://schemas.microsoft.com/office/thememl/2012/main" name="Office Theme" id="{62F939B6-93AF-4DB8-9C6B-D6C7DFDC589F}" vid="{4A3C46E8-61CC-4603-A589-7422A47A8E4A}"/>
+    </a:ext>
+  </a:extLst>
+</a:theme>
 </file>
</xml_diff>

<commit_message>
Outline rest of the talk
</commit_message>
<xml_diff>
--- a/drmt.pptx
+++ b/drmt.pptx
@@ -5,12 +5,17 @@
     <p:sldMasterId id="2147483648" r:id="rId1"/>
   </p:sldMasterIdLst>
   <p:notesMasterIdLst>
-    <p:notesMasterId r:id="rId5"/>
+    <p:notesMasterId r:id="rId10"/>
   </p:notesMasterIdLst>
   <p:sldIdLst>
     <p:sldId id="256" r:id="rId2"/>
     <p:sldId id="257" r:id="rId3"/>
     <p:sldId id="258" r:id="rId4"/>
+    <p:sldId id="259" r:id="rId5"/>
+    <p:sldId id="260" r:id="rId6"/>
+    <p:sldId id="261" r:id="rId7"/>
+    <p:sldId id="262" r:id="rId8"/>
+    <p:sldId id="263" r:id="rId9"/>
   </p:sldIdLst>
   <p:sldSz cx="12192000" cy="6858000"/>
   <p:notesSz cx="6858000" cy="9144000"/>
@@ -3695,7 +3700,11 @@
           <a:p>
             <a:r>
               <a:rPr lang="en-US" dirty="0" smtClean="0"/>
-              <a:t>Programmable Switches Today</a:t>
+              <a:t>Programmable </a:t>
+            </a:r>
+            <a:r>
+              <a:rPr lang="en-US" dirty="0" smtClean="0"/>
+              <a:t>Switches (e.g., RMT)</a:t>
             </a:r>
             <a:endParaRPr lang="en-US" dirty="0"/>
           </a:p>
@@ -5306,6 +5315,2721 @@
     <p:extLst>
       <p:ext uri="{BB962C8B-B14F-4D97-AF65-F5344CB8AC3E}">
         <p14:creationId xmlns:p14="http://schemas.microsoft.com/office/powerpoint/2010/main" val="1648283084"/>
+      </p:ext>
+    </p:extLst>
+  </p:cSld>
+  <p:clrMapOvr>
+    <a:masterClrMapping/>
+  </p:clrMapOvr>
+</p:sld>
+</file>
+
+<file path=ppt/slides/slide4.xml><?xml version="1.0" encoding="utf-8"?>
+<p:sld xmlns:a="http://schemas.openxmlformats.org/drawingml/2006/main" xmlns:r="http://schemas.openxmlformats.org/officeDocument/2006/relationships" xmlns:p="http://schemas.openxmlformats.org/presentationml/2006/main">
+  <p:cSld>
+    <p:spTree>
+      <p:nvGrpSpPr>
+        <p:cNvPr id="1" name=""/>
+        <p:cNvGrpSpPr/>
+        <p:nvPr/>
+      </p:nvGrpSpPr>
+      <p:grpSpPr>
+        <a:xfrm>
+          <a:off x="0" y="0"/>
+          <a:ext cx="0" cy="0"/>
+          <a:chOff x="0" y="0"/>
+          <a:chExt cx="0" cy="0"/>
+        </a:xfrm>
+      </p:grpSpPr>
+      <p:sp>
+        <p:nvSpPr>
+          <p:cNvPr id="2" name="Title 1"/>
+          <p:cNvSpPr>
+            <a:spLocks noGrp="1"/>
+          </p:cNvSpPr>
+          <p:nvPr>
+            <p:ph type="title"/>
+          </p:nvPr>
+        </p:nvSpPr>
+        <p:spPr/>
+        <p:txBody>
+          <a:bodyPr/>
+          <a:lstStyle/>
+          <a:p>
+            <a:r>
+              <a:rPr lang="en-US" dirty="0" err="1" smtClean="0"/>
+              <a:t>dRMT</a:t>
+            </a:r>
+            <a:r>
+              <a:rPr lang="en-US" dirty="0" smtClean="0"/>
+              <a:t>: Disaggregated RMT</a:t>
+            </a:r>
+            <a:endParaRPr lang="en-US" dirty="0"/>
+          </a:p>
+        </p:txBody>
+      </p:sp>
+      <p:grpSp>
+        <p:nvGrpSpPr>
+          <p:cNvPr id="4" name="Group 3"/>
+          <p:cNvGrpSpPr/>
+          <p:nvPr/>
+        </p:nvGrpSpPr>
+        <p:grpSpPr>
+          <a:xfrm>
+            <a:off x="8917646" y="1681877"/>
+            <a:ext cx="3056021" cy="3031958"/>
+            <a:chOff x="9977016" y="2748677"/>
+            <a:chExt cx="3056021" cy="3031958"/>
+          </a:xfrm>
+        </p:grpSpPr>
+        <p:sp>
+          <p:nvSpPr>
+            <p:cNvPr id="5" name="Rounded Rectangle 4"/>
+            <p:cNvSpPr/>
+            <p:nvPr/>
+          </p:nvSpPr>
+          <p:spPr>
+            <a:xfrm>
+              <a:off x="10329746" y="3471746"/>
+              <a:ext cx="892098" cy="591014"/>
+            </a:xfrm>
+            <a:prstGeom prst="roundRect">
+              <a:avLst/>
+            </a:prstGeom>
+            <a:noFill/>
+            <a:ln w="63500">
+              <a:solidFill>
+                <a:srgbClr val="002060"/>
+              </a:solidFill>
+            </a:ln>
+          </p:spPr>
+          <p:style>
+            <a:lnRef idx="2">
+              <a:schemeClr val="accent1">
+                <a:shade val="50000"/>
+              </a:schemeClr>
+            </a:lnRef>
+            <a:fillRef idx="1">
+              <a:schemeClr val="accent1"/>
+            </a:fillRef>
+            <a:effectRef idx="0">
+              <a:schemeClr val="accent1"/>
+            </a:effectRef>
+            <a:fontRef idx="minor">
+              <a:schemeClr val="lt1"/>
+            </a:fontRef>
+          </p:style>
+          <p:txBody>
+            <a:bodyPr rtlCol="0" anchor="ctr"/>
+            <a:lstStyle/>
+            <a:p>
+              <a:pPr algn="ctr"/>
+              <a:endParaRPr lang="en-US"/>
+            </a:p>
+          </p:txBody>
+        </p:sp>
+        <p:sp>
+          <p:nvSpPr>
+            <p:cNvPr id="6" name="Rounded Rectangle 5"/>
+            <p:cNvSpPr/>
+            <p:nvPr/>
+          </p:nvSpPr>
+          <p:spPr>
+            <a:xfrm>
+              <a:off x="9977016" y="2748677"/>
+              <a:ext cx="3056021" cy="3031958"/>
+            </a:xfrm>
+            <a:prstGeom prst="roundRect">
+              <a:avLst/>
+            </a:prstGeom>
+            <a:noFill/>
+            <a:ln w="63500">
+              <a:solidFill>
+                <a:schemeClr val="tx1"/>
+              </a:solidFill>
+            </a:ln>
+          </p:spPr>
+          <p:style>
+            <a:lnRef idx="2">
+              <a:schemeClr val="accent1">
+                <a:shade val="50000"/>
+              </a:schemeClr>
+            </a:lnRef>
+            <a:fillRef idx="1">
+              <a:schemeClr val="accent1"/>
+            </a:fillRef>
+            <a:effectRef idx="0">
+              <a:schemeClr val="accent1"/>
+            </a:effectRef>
+            <a:fontRef idx="minor">
+              <a:schemeClr val="lt1"/>
+            </a:fontRef>
+          </p:style>
+          <p:txBody>
+            <a:bodyPr rtlCol="0" anchor="ctr"/>
+            <a:lstStyle/>
+            <a:p>
+              <a:pPr algn="ctr"/>
+              <a:endParaRPr lang="en-US"/>
+            </a:p>
+          </p:txBody>
+        </p:sp>
+        <p:sp>
+          <p:nvSpPr>
+            <p:cNvPr id="7" name="TextBox 6"/>
+            <p:cNvSpPr txBox="1"/>
+            <p:nvPr/>
+          </p:nvSpPr>
+          <p:spPr>
+            <a:xfrm>
+              <a:off x="10385504" y="3572106"/>
+              <a:ext cx="784189" cy="369332"/>
+            </a:xfrm>
+            <a:prstGeom prst="rect">
+              <a:avLst/>
+            </a:prstGeom>
+            <a:noFill/>
+          </p:spPr>
+          <p:txBody>
+            <a:bodyPr wrap="none" rtlCol="0">
+              <a:spAutoFit/>
+            </a:bodyPr>
+            <a:lstStyle/>
+            <a:p>
+              <a:r>
+                <a:rPr lang="en-US" dirty="0" smtClean="0"/>
+                <a:t>Match</a:t>
+              </a:r>
+              <a:endParaRPr lang="en-US" dirty="0"/>
+            </a:p>
+          </p:txBody>
+        </p:sp>
+        <p:sp>
+          <p:nvSpPr>
+            <p:cNvPr id="8" name="TextBox 7"/>
+            <p:cNvSpPr txBox="1"/>
+            <p:nvPr/>
+          </p:nvSpPr>
+          <p:spPr>
+            <a:xfrm>
+              <a:off x="11809143" y="3568389"/>
+              <a:ext cx="788999" cy="369332"/>
+            </a:xfrm>
+            <a:prstGeom prst="rect">
+              <a:avLst/>
+            </a:prstGeom>
+            <a:noFill/>
+          </p:spPr>
+          <p:txBody>
+            <a:bodyPr wrap="none" rtlCol="0">
+              <a:spAutoFit/>
+            </a:bodyPr>
+            <a:lstStyle/>
+            <a:p>
+              <a:r>
+                <a:rPr lang="en-US" dirty="0" smtClean="0"/>
+                <a:t>Action</a:t>
+              </a:r>
+              <a:endParaRPr lang="en-US" dirty="0"/>
+            </a:p>
+          </p:txBody>
+        </p:sp>
+        <p:cxnSp>
+          <p:nvCxnSpPr>
+            <p:cNvPr id="9" name="Straight Arrow Connector 8"/>
+            <p:cNvCxnSpPr/>
+            <p:nvPr/>
+          </p:nvCxnSpPr>
+          <p:spPr>
+            <a:xfrm>
+              <a:off x="11304027" y="3765802"/>
+              <a:ext cx="412596" cy="0"/>
+            </a:xfrm>
+            <a:prstGeom prst="straightConnector1">
+              <a:avLst/>
+            </a:prstGeom>
+            <a:ln w="63500">
+              <a:solidFill>
+                <a:schemeClr val="tx1"/>
+              </a:solidFill>
+              <a:tailEnd type="triangle"/>
+            </a:ln>
+          </p:spPr>
+          <p:style>
+            <a:lnRef idx="1">
+              <a:schemeClr val="accent1"/>
+            </a:lnRef>
+            <a:fillRef idx="0">
+              <a:schemeClr val="accent1"/>
+            </a:fillRef>
+            <a:effectRef idx="0">
+              <a:schemeClr val="accent1"/>
+            </a:effectRef>
+            <a:fontRef idx="minor">
+              <a:schemeClr val="tx1"/>
+            </a:fontRef>
+          </p:style>
+        </p:cxnSp>
+        <p:sp>
+          <p:nvSpPr>
+            <p:cNvPr id="11" name="Rounded Rectangle 10"/>
+            <p:cNvSpPr/>
+            <p:nvPr/>
+          </p:nvSpPr>
+          <p:spPr>
+            <a:xfrm>
+              <a:off x="11772327" y="3461308"/>
+              <a:ext cx="892098" cy="591014"/>
+            </a:xfrm>
+            <a:prstGeom prst="roundRect">
+              <a:avLst/>
+            </a:prstGeom>
+            <a:noFill/>
+            <a:ln w="63500">
+              <a:solidFill>
+                <a:srgbClr val="00B050"/>
+              </a:solidFill>
+            </a:ln>
+          </p:spPr>
+          <p:style>
+            <a:lnRef idx="2">
+              <a:schemeClr val="accent1">
+                <a:shade val="50000"/>
+              </a:schemeClr>
+            </a:lnRef>
+            <a:fillRef idx="1">
+              <a:schemeClr val="accent1"/>
+            </a:fillRef>
+            <a:effectRef idx="0">
+              <a:schemeClr val="accent1"/>
+            </a:effectRef>
+            <a:fontRef idx="minor">
+              <a:schemeClr val="lt1"/>
+            </a:fontRef>
+          </p:style>
+          <p:txBody>
+            <a:bodyPr rtlCol="0" anchor="ctr"/>
+            <a:lstStyle/>
+            <a:p>
+              <a:pPr algn="ctr"/>
+              <a:endParaRPr lang="en-US"/>
+            </a:p>
+          </p:txBody>
+        </p:sp>
+      </p:grpSp>
+      <p:grpSp>
+        <p:nvGrpSpPr>
+          <p:cNvPr id="15" name="Group 14"/>
+          <p:cNvGrpSpPr/>
+          <p:nvPr/>
+        </p:nvGrpSpPr>
+        <p:grpSpPr>
+          <a:xfrm>
+            <a:off x="4353081" y="1681877"/>
+            <a:ext cx="3056021" cy="3031958"/>
+            <a:chOff x="9977016" y="2748677"/>
+            <a:chExt cx="3056021" cy="3031958"/>
+          </a:xfrm>
+        </p:grpSpPr>
+        <p:sp>
+          <p:nvSpPr>
+            <p:cNvPr id="16" name="Rounded Rectangle 15"/>
+            <p:cNvSpPr/>
+            <p:nvPr/>
+          </p:nvSpPr>
+          <p:spPr>
+            <a:xfrm>
+              <a:off x="10329746" y="3471746"/>
+              <a:ext cx="892098" cy="591014"/>
+            </a:xfrm>
+            <a:prstGeom prst="roundRect">
+              <a:avLst/>
+            </a:prstGeom>
+            <a:noFill/>
+            <a:ln w="63500">
+              <a:solidFill>
+                <a:srgbClr val="002060"/>
+              </a:solidFill>
+            </a:ln>
+          </p:spPr>
+          <p:style>
+            <a:lnRef idx="2">
+              <a:schemeClr val="accent1">
+                <a:shade val="50000"/>
+              </a:schemeClr>
+            </a:lnRef>
+            <a:fillRef idx="1">
+              <a:schemeClr val="accent1"/>
+            </a:fillRef>
+            <a:effectRef idx="0">
+              <a:schemeClr val="accent1"/>
+            </a:effectRef>
+            <a:fontRef idx="minor">
+              <a:schemeClr val="lt1"/>
+            </a:fontRef>
+          </p:style>
+          <p:txBody>
+            <a:bodyPr rtlCol="0" anchor="ctr"/>
+            <a:lstStyle/>
+            <a:p>
+              <a:pPr algn="ctr"/>
+              <a:endParaRPr lang="en-US"/>
+            </a:p>
+          </p:txBody>
+        </p:sp>
+        <p:sp>
+          <p:nvSpPr>
+            <p:cNvPr id="17" name="Rounded Rectangle 16"/>
+            <p:cNvSpPr/>
+            <p:nvPr/>
+          </p:nvSpPr>
+          <p:spPr>
+            <a:xfrm>
+              <a:off x="9977016" y="2748677"/>
+              <a:ext cx="3056021" cy="3031958"/>
+            </a:xfrm>
+            <a:prstGeom prst="roundRect">
+              <a:avLst/>
+            </a:prstGeom>
+            <a:noFill/>
+            <a:ln w="63500">
+              <a:solidFill>
+                <a:schemeClr val="tx1"/>
+              </a:solidFill>
+            </a:ln>
+          </p:spPr>
+          <p:style>
+            <a:lnRef idx="2">
+              <a:schemeClr val="accent1">
+                <a:shade val="50000"/>
+              </a:schemeClr>
+            </a:lnRef>
+            <a:fillRef idx="1">
+              <a:schemeClr val="accent1"/>
+            </a:fillRef>
+            <a:effectRef idx="0">
+              <a:schemeClr val="accent1"/>
+            </a:effectRef>
+            <a:fontRef idx="minor">
+              <a:schemeClr val="lt1"/>
+            </a:fontRef>
+          </p:style>
+          <p:txBody>
+            <a:bodyPr rtlCol="0" anchor="ctr"/>
+            <a:lstStyle/>
+            <a:p>
+              <a:pPr algn="ctr"/>
+              <a:endParaRPr lang="en-US"/>
+            </a:p>
+          </p:txBody>
+        </p:sp>
+        <p:sp>
+          <p:nvSpPr>
+            <p:cNvPr id="18" name="TextBox 17"/>
+            <p:cNvSpPr txBox="1"/>
+            <p:nvPr/>
+          </p:nvSpPr>
+          <p:spPr>
+            <a:xfrm>
+              <a:off x="10385504" y="3572106"/>
+              <a:ext cx="784189" cy="369332"/>
+            </a:xfrm>
+            <a:prstGeom prst="rect">
+              <a:avLst/>
+            </a:prstGeom>
+            <a:noFill/>
+          </p:spPr>
+          <p:txBody>
+            <a:bodyPr wrap="none" rtlCol="0">
+              <a:spAutoFit/>
+            </a:bodyPr>
+            <a:lstStyle/>
+            <a:p>
+              <a:r>
+                <a:rPr lang="en-US" dirty="0" smtClean="0"/>
+                <a:t>Match</a:t>
+              </a:r>
+              <a:endParaRPr lang="en-US" dirty="0"/>
+            </a:p>
+          </p:txBody>
+        </p:sp>
+        <p:sp>
+          <p:nvSpPr>
+            <p:cNvPr id="19" name="TextBox 18"/>
+            <p:cNvSpPr txBox="1"/>
+            <p:nvPr/>
+          </p:nvSpPr>
+          <p:spPr>
+            <a:xfrm>
+              <a:off x="11809143" y="3568389"/>
+              <a:ext cx="788999" cy="369332"/>
+            </a:xfrm>
+            <a:prstGeom prst="rect">
+              <a:avLst/>
+            </a:prstGeom>
+            <a:noFill/>
+          </p:spPr>
+          <p:txBody>
+            <a:bodyPr wrap="none" rtlCol="0">
+              <a:spAutoFit/>
+            </a:bodyPr>
+            <a:lstStyle/>
+            <a:p>
+              <a:r>
+                <a:rPr lang="en-US" dirty="0" smtClean="0"/>
+                <a:t>Action</a:t>
+              </a:r>
+              <a:endParaRPr lang="en-US" dirty="0"/>
+            </a:p>
+          </p:txBody>
+        </p:sp>
+        <p:cxnSp>
+          <p:nvCxnSpPr>
+            <p:cNvPr id="20" name="Straight Arrow Connector 19"/>
+            <p:cNvCxnSpPr/>
+            <p:nvPr/>
+          </p:nvCxnSpPr>
+          <p:spPr>
+            <a:xfrm>
+              <a:off x="11304027" y="3765802"/>
+              <a:ext cx="412596" cy="0"/>
+            </a:xfrm>
+            <a:prstGeom prst="straightConnector1">
+              <a:avLst/>
+            </a:prstGeom>
+            <a:ln w="63500">
+              <a:solidFill>
+                <a:schemeClr val="tx1"/>
+              </a:solidFill>
+              <a:tailEnd type="triangle"/>
+            </a:ln>
+          </p:spPr>
+          <p:style>
+            <a:lnRef idx="1">
+              <a:schemeClr val="accent1"/>
+            </a:lnRef>
+            <a:fillRef idx="0">
+              <a:schemeClr val="accent1"/>
+            </a:fillRef>
+            <a:effectRef idx="0">
+              <a:schemeClr val="accent1"/>
+            </a:effectRef>
+            <a:fontRef idx="minor">
+              <a:schemeClr val="tx1"/>
+            </a:fontRef>
+          </p:style>
+        </p:cxnSp>
+        <p:sp>
+          <p:nvSpPr>
+            <p:cNvPr id="22" name="Rounded Rectangle 21"/>
+            <p:cNvSpPr/>
+            <p:nvPr/>
+          </p:nvSpPr>
+          <p:spPr>
+            <a:xfrm>
+              <a:off x="11772327" y="3461308"/>
+              <a:ext cx="892098" cy="591014"/>
+            </a:xfrm>
+            <a:prstGeom prst="roundRect">
+              <a:avLst/>
+            </a:prstGeom>
+            <a:noFill/>
+            <a:ln w="63500">
+              <a:solidFill>
+                <a:srgbClr val="00B050"/>
+              </a:solidFill>
+            </a:ln>
+          </p:spPr>
+          <p:style>
+            <a:lnRef idx="2">
+              <a:schemeClr val="accent1">
+                <a:shade val="50000"/>
+              </a:schemeClr>
+            </a:lnRef>
+            <a:fillRef idx="1">
+              <a:schemeClr val="accent1"/>
+            </a:fillRef>
+            <a:effectRef idx="0">
+              <a:schemeClr val="accent1"/>
+            </a:effectRef>
+            <a:fontRef idx="minor">
+              <a:schemeClr val="lt1"/>
+            </a:fontRef>
+          </p:style>
+          <p:txBody>
+            <a:bodyPr rtlCol="0" anchor="ctr"/>
+            <a:lstStyle/>
+            <a:p>
+              <a:pPr algn="ctr"/>
+              <a:endParaRPr lang="en-US"/>
+            </a:p>
+          </p:txBody>
+        </p:sp>
+      </p:grpSp>
+      <p:sp>
+        <p:nvSpPr>
+          <p:cNvPr id="27" name="Rounded Rectangle 26"/>
+          <p:cNvSpPr/>
+          <p:nvPr/>
+        </p:nvSpPr>
+        <p:spPr>
+          <a:xfrm>
+            <a:off x="523598" y="2404946"/>
+            <a:ext cx="892098" cy="591014"/>
+          </a:xfrm>
+          <a:prstGeom prst="roundRect">
+            <a:avLst/>
+          </a:prstGeom>
+          <a:noFill/>
+          <a:ln w="63500">
+            <a:solidFill>
+              <a:srgbClr val="002060"/>
+            </a:solidFill>
+          </a:ln>
+        </p:spPr>
+        <p:style>
+          <a:lnRef idx="2">
+            <a:schemeClr val="accent1">
+              <a:shade val="50000"/>
+            </a:schemeClr>
+          </a:lnRef>
+          <a:fillRef idx="1">
+            <a:schemeClr val="accent1"/>
+          </a:fillRef>
+          <a:effectRef idx="0">
+            <a:schemeClr val="accent1"/>
+          </a:effectRef>
+          <a:fontRef idx="minor">
+            <a:schemeClr val="lt1"/>
+          </a:fontRef>
+        </p:style>
+        <p:txBody>
+          <a:bodyPr rtlCol="0" anchor="ctr"/>
+          <a:lstStyle/>
+          <a:p>
+            <a:pPr algn="ctr"/>
+            <a:endParaRPr lang="en-US"/>
+          </a:p>
+        </p:txBody>
+      </p:sp>
+      <p:sp>
+        <p:nvSpPr>
+          <p:cNvPr id="28" name="Rounded Rectangle 27"/>
+          <p:cNvSpPr/>
+          <p:nvPr/>
+        </p:nvSpPr>
+        <p:spPr>
+          <a:xfrm>
+            <a:off x="170868" y="1681877"/>
+            <a:ext cx="3056021" cy="3031958"/>
+          </a:xfrm>
+          <a:prstGeom prst="roundRect">
+            <a:avLst/>
+          </a:prstGeom>
+          <a:noFill/>
+          <a:ln w="63500">
+            <a:solidFill>
+              <a:schemeClr val="tx1"/>
+            </a:solidFill>
+          </a:ln>
+        </p:spPr>
+        <p:style>
+          <a:lnRef idx="2">
+            <a:schemeClr val="accent1">
+              <a:shade val="50000"/>
+            </a:schemeClr>
+          </a:lnRef>
+          <a:fillRef idx="1">
+            <a:schemeClr val="accent1"/>
+          </a:fillRef>
+          <a:effectRef idx="0">
+            <a:schemeClr val="accent1"/>
+          </a:effectRef>
+          <a:fontRef idx="minor">
+            <a:schemeClr val="lt1"/>
+          </a:fontRef>
+        </p:style>
+        <p:txBody>
+          <a:bodyPr rtlCol="0" anchor="ctr"/>
+          <a:lstStyle/>
+          <a:p>
+            <a:pPr algn="ctr"/>
+            <a:endParaRPr lang="en-US"/>
+          </a:p>
+        </p:txBody>
+      </p:sp>
+      <p:sp>
+        <p:nvSpPr>
+          <p:cNvPr id="29" name="TextBox 28"/>
+          <p:cNvSpPr txBox="1"/>
+          <p:nvPr/>
+        </p:nvSpPr>
+        <p:spPr>
+          <a:xfrm>
+            <a:off x="579356" y="2505306"/>
+            <a:ext cx="784189" cy="369332"/>
+          </a:xfrm>
+          <a:prstGeom prst="rect">
+            <a:avLst/>
+          </a:prstGeom>
+          <a:noFill/>
+        </p:spPr>
+        <p:txBody>
+          <a:bodyPr wrap="none" rtlCol="0">
+            <a:spAutoFit/>
+          </a:bodyPr>
+          <a:lstStyle/>
+          <a:p>
+            <a:r>
+              <a:rPr lang="en-US" dirty="0" smtClean="0"/>
+              <a:t>Match</a:t>
+            </a:r>
+            <a:endParaRPr lang="en-US" dirty="0"/>
+          </a:p>
+        </p:txBody>
+      </p:sp>
+      <p:sp>
+        <p:nvSpPr>
+          <p:cNvPr id="30" name="TextBox 29"/>
+          <p:cNvSpPr txBox="1"/>
+          <p:nvPr/>
+        </p:nvSpPr>
+        <p:spPr>
+          <a:xfrm>
+            <a:off x="2002995" y="2501589"/>
+            <a:ext cx="788999" cy="369332"/>
+          </a:xfrm>
+          <a:prstGeom prst="rect">
+            <a:avLst/>
+          </a:prstGeom>
+          <a:noFill/>
+        </p:spPr>
+        <p:txBody>
+          <a:bodyPr wrap="none" rtlCol="0">
+            <a:spAutoFit/>
+          </a:bodyPr>
+          <a:lstStyle/>
+          <a:p>
+            <a:r>
+              <a:rPr lang="en-US" dirty="0" smtClean="0"/>
+              <a:t>Action</a:t>
+            </a:r>
+            <a:endParaRPr lang="en-US" dirty="0"/>
+          </a:p>
+        </p:txBody>
+      </p:sp>
+      <p:cxnSp>
+        <p:nvCxnSpPr>
+          <p:cNvPr id="31" name="Straight Arrow Connector 30"/>
+          <p:cNvCxnSpPr/>
+          <p:nvPr/>
+        </p:nvCxnSpPr>
+        <p:spPr>
+          <a:xfrm>
+            <a:off x="1497879" y="2699002"/>
+            <a:ext cx="412596" cy="0"/>
+          </a:xfrm>
+          <a:prstGeom prst="straightConnector1">
+            <a:avLst/>
+          </a:prstGeom>
+          <a:ln w="63500">
+            <a:solidFill>
+              <a:schemeClr val="tx1"/>
+            </a:solidFill>
+            <a:tailEnd type="triangle"/>
+          </a:ln>
+        </p:spPr>
+        <p:style>
+          <a:lnRef idx="1">
+            <a:schemeClr val="accent1"/>
+          </a:lnRef>
+          <a:fillRef idx="0">
+            <a:schemeClr val="accent1"/>
+          </a:fillRef>
+          <a:effectRef idx="0">
+            <a:schemeClr val="accent1"/>
+          </a:effectRef>
+          <a:fontRef idx="minor">
+            <a:schemeClr val="tx1"/>
+          </a:fontRef>
+        </p:style>
+      </p:cxnSp>
+      <p:sp>
+        <p:nvSpPr>
+          <p:cNvPr id="32" name="TextBox 31"/>
+          <p:cNvSpPr txBox="1"/>
+          <p:nvPr/>
+        </p:nvSpPr>
+        <p:spPr>
+          <a:xfrm>
+            <a:off x="5048549" y="5949911"/>
+            <a:ext cx="1453019" cy="369332"/>
+          </a:xfrm>
+          <a:prstGeom prst="rect">
+            <a:avLst/>
+          </a:prstGeom>
+          <a:noFill/>
+        </p:spPr>
+        <p:txBody>
+          <a:bodyPr wrap="square" rtlCol="0">
+            <a:spAutoFit/>
+          </a:bodyPr>
+          <a:lstStyle/>
+          <a:p>
+            <a:r>
+              <a:rPr lang="en-US" smtClean="0"/>
+              <a:t>SRAM/ TCAM</a:t>
+            </a:r>
+            <a:endParaRPr lang="en-US" dirty="0"/>
+          </a:p>
+        </p:txBody>
+      </p:sp>
+      <p:sp>
+        <p:nvSpPr>
+          <p:cNvPr id="33" name="Rounded Rectangle 32"/>
+          <p:cNvSpPr/>
+          <p:nvPr/>
+        </p:nvSpPr>
+        <p:spPr>
+          <a:xfrm>
+            <a:off x="1966179" y="2394508"/>
+            <a:ext cx="892098" cy="591014"/>
+          </a:xfrm>
+          <a:prstGeom prst="roundRect">
+            <a:avLst/>
+          </a:prstGeom>
+          <a:noFill/>
+          <a:ln w="63500">
+            <a:solidFill>
+              <a:srgbClr val="00B050"/>
+            </a:solidFill>
+          </a:ln>
+        </p:spPr>
+        <p:style>
+          <a:lnRef idx="2">
+            <a:schemeClr val="accent1">
+              <a:shade val="50000"/>
+            </a:schemeClr>
+          </a:lnRef>
+          <a:fillRef idx="1">
+            <a:schemeClr val="accent1"/>
+          </a:fillRef>
+          <a:effectRef idx="0">
+            <a:schemeClr val="accent1"/>
+          </a:effectRef>
+          <a:fontRef idx="minor">
+            <a:schemeClr val="lt1"/>
+          </a:fontRef>
+        </p:style>
+        <p:txBody>
+          <a:bodyPr rtlCol="0" anchor="ctr"/>
+          <a:lstStyle/>
+          <a:p>
+            <a:pPr algn="ctr"/>
+            <a:endParaRPr lang="en-US"/>
+          </a:p>
+        </p:txBody>
+      </p:sp>
+      <p:sp>
+        <p:nvSpPr>
+          <p:cNvPr id="34" name="Rounded Rectangle 33"/>
+          <p:cNvSpPr/>
+          <p:nvPr/>
+        </p:nvSpPr>
+        <p:spPr>
+          <a:xfrm>
+            <a:off x="825190" y="5857291"/>
+            <a:ext cx="10593659" cy="591014"/>
+          </a:xfrm>
+          <a:prstGeom prst="roundRect">
+            <a:avLst/>
+          </a:prstGeom>
+          <a:noFill/>
+          <a:ln w="63500">
+            <a:solidFill>
+              <a:srgbClr val="FF0000"/>
+            </a:solidFill>
+          </a:ln>
+        </p:spPr>
+        <p:style>
+          <a:lnRef idx="2">
+            <a:schemeClr val="accent1">
+              <a:shade val="50000"/>
+            </a:schemeClr>
+          </a:lnRef>
+          <a:fillRef idx="1">
+            <a:schemeClr val="accent1"/>
+          </a:fillRef>
+          <a:effectRef idx="0">
+            <a:schemeClr val="accent1"/>
+          </a:effectRef>
+          <a:fontRef idx="minor">
+            <a:schemeClr val="lt1"/>
+          </a:fontRef>
+        </p:style>
+        <p:txBody>
+          <a:bodyPr rtlCol="0" anchor="ctr"/>
+          <a:lstStyle/>
+          <a:p>
+            <a:pPr algn="ctr"/>
+            <a:endParaRPr lang="en-US"/>
+          </a:p>
+        </p:txBody>
+      </p:sp>
+      <p:sp>
+        <p:nvSpPr>
+          <p:cNvPr id="37" name="Oval 36"/>
+          <p:cNvSpPr/>
+          <p:nvPr/>
+        </p:nvSpPr>
+        <p:spPr>
+          <a:xfrm>
+            <a:off x="7986126" y="3750529"/>
+            <a:ext cx="245327" cy="267629"/>
+          </a:xfrm>
+          <a:prstGeom prst="ellipse">
+            <a:avLst/>
+          </a:prstGeom>
+          <a:solidFill>
+            <a:schemeClr val="tx1"/>
+          </a:solidFill>
+        </p:spPr>
+        <p:style>
+          <a:lnRef idx="2">
+            <a:schemeClr val="accent1">
+              <a:shade val="50000"/>
+            </a:schemeClr>
+          </a:lnRef>
+          <a:fillRef idx="1">
+            <a:schemeClr val="accent1"/>
+          </a:fillRef>
+          <a:effectRef idx="0">
+            <a:schemeClr val="accent1"/>
+          </a:effectRef>
+          <a:fontRef idx="minor">
+            <a:schemeClr val="lt1"/>
+          </a:fontRef>
+        </p:style>
+        <p:txBody>
+          <a:bodyPr rtlCol="0" anchor="ctr"/>
+          <a:lstStyle/>
+          <a:p>
+            <a:pPr algn="ctr"/>
+            <a:endParaRPr lang="en-US"/>
+          </a:p>
+        </p:txBody>
+      </p:sp>
+      <p:sp>
+        <p:nvSpPr>
+          <p:cNvPr id="38" name="Oval 37"/>
+          <p:cNvSpPr/>
+          <p:nvPr/>
+        </p:nvSpPr>
+        <p:spPr>
+          <a:xfrm>
+            <a:off x="7545654" y="3750529"/>
+            <a:ext cx="245327" cy="267629"/>
+          </a:xfrm>
+          <a:prstGeom prst="ellipse">
+            <a:avLst/>
+          </a:prstGeom>
+          <a:solidFill>
+            <a:schemeClr val="tx1"/>
+          </a:solidFill>
+        </p:spPr>
+        <p:style>
+          <a:lnRef idx="2">
+            <a:schemeClr val="accent1">
+              <a:shade val="50000"/>
+            </a:schemeClr>
+          </a:lnRef>
+          <a:fillRef idx="1">
+            <a:schemeClr val="accent1"/>
+          </a:fillRef>
+          <a:effectRef idx="0">
+            <a:schemeClr val="accent1"/>
+          </a:effectRef>
+          <a:fontRef idx="minor">
+            <a:schemeClr val="lt1"/>
+          </a:fontRef>
+        </p:style>
+        <p:txBody>
+          <a:bodyPr rtlCol="0" anchor="ctr"/>
+          <a:lstStyle/>
+          <a:p>
+            <a:pPr algn="ctr"/>
+            <a:endParaRPr lang="en-US"/>
+          </a:p>
+        </p:txBody>
+      </p:sp>
+      <p:sp>
+        <p:nvSpPr>
+          <p:cNvPr id="39" name="Oval 38"/>
+          <p:cNvSpPr/>
+          <p:nvPr/>
+        </p:nvSpPr>
+        <p:spPr>
+          <a:xfrm>
+            <a:off x="8426598" y="3750529"/>
+            <a:ext cx="245327" cy="267629"/>
+          </a:xfrm>
+          <a:prstGeom prst="ellipse">
+            <a:avLst/>
+          </a:prstGeom>
+          <a:solidFill>
+            <a:schemeClr val="tx1"/>
+          </a:solidFill>
+        </p:spPr>
+        <p:style>
+          <a:lnRef idx="2">
+            <a:schemeClr val="accent1">
+              <a:shade val="50000"/>
+            </a:schemeClr>
+          </a:lnRef>
+          <a:fillRef idx="1">
+            <a:schemeClr val="accent1"/>
+          </a:fillRef>
+          <a:effectRef idx="0">
+            <a:schemeClr val="accent1"/>
+          </a:effectRef>
+          <a:fontRef idx="minor">
+            <a:schemeClr val="lt1"/>
+          </a:fontRef>
+        </p:style>
+        <p:txBody>
+          <a:bodyPr rtlCol="0" anchor="ctr"/>
+          <a:lstStyle/>
+          <a:p>
+            <a:pPr algn="ctr"/>
+            <a:endParaRPr lang="en-US"/>
+          </a:p>
+        </p:txBody>
+      </p:sp>
+      <p:cxnSp>
+        <p:nvCxnSpPr>
+          <p:cNvPr id="40" name="Straight Arrow Connector 39"/>
+          <p:cNvCxnSpPr/>
+          <p:nvPr/>
+        </p:nvCxnSpPr>
+        <p:spPr>
+          <a:xfrm>
+            <a:off x="3226889" y="3197856"/>
+            <a:ext cx="1126192" cy="0"/>
+          </a:xfrm>
+          <a:prstGeom prst="straightConnector1">
+            <a:avLst/>
+          </a:prstGeom>
+          <a:ln w="127000">
+            <a:solidFill>
+              <a:schemeClr val="tx1"/>
+            </a:solidFill>
+            <a:tailEnd type="arrow"/>
+          </a:ln>
+        </p:spPr>
+        <p:style>
+          <a:lnRef idx="1">
+            <a:schemeClr val="accent1"/>
+          </a:lnRef>
+          <a:fillRef idx="0">
+            <a:schemeClr val="accent1"/>
+          </a:fillRef>
+          <a:effectRef idx="0">
+            <a:schemeClr val="accent1"/>
+          </a:effectRef>
+          <a:fontRef idx="minor">
+            <a:schemeClr val="tx1"/>
+          </a:fontRef>
+        </p:style>
+      </p:cxnSp>
+      <p:cxnSp>
+        <p:nvCxnSpPr>
+          <p:cNvPr id="41" name="Straight Arrow Connector 40"/>
+          <p:cNvCxnSpPr/>
+          <p:nvPr/>
+        </p:nvCxnSpPr>
+        <p:spPr>
+          <a:xfrm>
+            <a:off x="7409102" y="3197856"/>
+            <a:ext cx="1508544" cy="0"/>
+          </a:xfrm>
+          <a:prstGeom prst="straightConnector1">
+            <a:avLst/>
+          </a:prstGeom>
+          <a:ln w="127000">
+            <a:solidFill>
+              <a:schemeClr val="tx1"/>
+            </a:solidFill>
+            <a:tailEnd type="arrow"/>
+          </a:ln>
+        </p:spPr>
+        <p:style>
+          <a:lnRef idx="1">
+            <a:schemeClr val="accent1"/>
+          </a:lnRef>
+          <a:fillRef idx="0">
+            <a:schemeClr val="accent1"/>
+          </a:fillRef>
+          <a:effectRef idx="0">
+            <a:schemeClr val="accent1"/>
+          </a:effectRef>
+          <a:fontRef idx="minor">
+            <a:schemeClr val="tx1"/>
+          </a:fontRef>
+        </p:style>
+      </p:cxnSp>
+      <p:cxnSp>
+        <p:nvCxnSpPr>
+          <p:cNvPr id="47" name="Straight Arrow Connector 46"/>
+          <p:cNvCxnSpPr/>
+          <p:nvPr/>
+        </p:nvCxnSpPr>
+        <p:spPr>
+          <a:xfrm flipH="1">
+            <a:off x="1672683" y="4733008"/>
+            <a:ext cx="470" cy="675333"/>
+          </a:xfrm>
+          <a:prstGeom prst="straightConnector1">
+            <a:avLst/>
+          </a:prstGeom>
+          <a:ln w="127000">
+            <a:solidFill>
+              <a:schemeClr val="tx1"/>
+            </a:solidFill>
+            <a:tailEnd type="arrow"/>
+          </a:ln>
+        </p:spPr>
+        <p:style>
+          <a:lnRef idx="1">
+            <a:schemeClr val="accent1"/>
+          </a:lnRef>
+          <a:fillRef idx="0">
+            <a:schemeClr val="accent1"/>
+          </a:fillRef>
+          <a:effectRef idx="0">
+            <a:schemeClr val="accent1"/>
+          </a:effectRef>
+          <a:fontRef idx="minor">
+            <a:schemeClr val="tx1"/>
+          </a:fontRef>
+        </p:style>
+      </p:cxnSp>
+      <p:cxnSp>
+        <p:nvCxnSpPr>
+          <p:cNvPr id="49" name="Straight Arrow Connector 48"/>
+          <p:cNvCxnSpPr/>
+          <p:nvPr/>
+        </p:nvCxnSpPr>
+        <p:spPr>
+          <a:xfrm flipH="1">
+            <a:off x="5973336" y="4740442"/>
+            <a:ext cx="470" cy="675333"/>
+          </a:xfrm>
+          <a:prstGeom prst="straightConnector1">
+            <a:avLst/>
+          </a:prstGeom>
+          <a:ln w="127000">
+            <a:solidFill>
+              <a:schemeClr val="tx1"/>
+            </a:solidFill>
+            <a:tailEnd type="arrow"/>
+          </a:ln>
+        </p:spPr>
+        <p:style>
+          <a:lnRef idx="1">
+            <a:schemeClr val="accent1"/>
+          </a:lnRef>
+          <a:fillRef idx="0">
+            <a:schemeClr val="accent1"/>
+          </a:fillRef>
+          <a:effectRef idx="0">
+            <a:schemeClr val="accent1"/>
+          </a:effectRef>
+          <a:fontRef idx="minor">
+            <a:schemeClr val="tx1"/>
+          </a:fontRef>
+        </p:style>
+      </p:cxnSp>
+      <p:cxnSp>
+        <p:nvCxnSpPr>
+          <p:cNvPr id="50" name="Straight Arrow Connector 49"/>
+          <p:cNvCxnSpPr/>
+          <p:nvPr/>
+        </p:nvCxnSpPr>
+        <p:spPr>
+          <a:xfrm flipH="1">
+            <a:off x="10575073" y="4714422"/>
+            <a:ext cx="470" cy="675333"/>
+          </a:xfrm>
+          <a:prstGeom prst="straightConnector1">
+            <a:avLst/>
+          </a:prstGeom>
+          <a:ln w="127000">
+            <a:solidFill>
+              <a:schemeClr val="tx1"/>
+            </a:solidFill>
+            <a:tailEnd type="arrow"/>
+          </a:ln>
+        </p:spPr>
+        <p:style>
+          <a:lnRef idx="1">
+            <a:schemeClr val="accent1"/>
+          </a:lnRef>
+          <a:fillRef idx="0">
+            <a:schemeClr val="accent1"/>
+          </a:fillRef>
+          <a:effectRef idx="0">
+            <a:schemeClr val="accent1"/>
+          </a:effectRef>
+          <a:fontRef idx="minor">
+            <a:schemeClr val="tx1"/>
+          </a:fontRef>
+        </p:style>
+      </p:cxnSp>
+      <p:cxnSp>
+        <p:nvCxnSpPr>
+          <p:cNvPr id="52" name="Straight Connector 51"/>
+          <p:cNvCxnSpPr/>
+          <p:nvPr/>
+        </p:nvCxnSpPr>
+        <p:spPr>
+          <a:xfrm>
+            <a:off x="914400" y="5285678"/>
+            <a:ext cx="9790771" cy="557561"/>
+          </a:xfrm>
+          <a:prstGeom prst="line">
+            <a:avLst/>
+          </a:prstGeom>
+          <a:ln w="63500"/>
+        </p:spPr>
+        <p:style>
+          <a:lnRef idx="1">
+            <a:schemeClr val="accent1"/>
+          </a:lnRef>
+          <a:fillRef idx="0">
+            <a:schemeClr val="accent1"/>
+          </a:fillRef>
+          <a:effectRef idx="0">
+            <a:schemeClr val="accent1"/>
+          </a:effectRef>
+          <a:fontRef idx="minor">
+            <a:schemeClr val="tx1"/>
+          </a:fontRef>
+        </p:style>
+      </p:cxnSp>
+      <p:cxnSp>
+        <p:nvCxnSpPr>
+          <p:cNvPr id="54" name="Straight Connector 53"/>
+          <p:cNvCxnSpPr/>
+          <p:nvPr/>
+        </p:nvCxnSpPr>
+        <p:spPr>
+          <a:xfrm flipV="1">
+            <a:off x="981307" y="5341434"/>
+            <a:ext cx="9712713" cy="479503"/>
+          </a:xfrm>
+          <a:prstGeom prst="line">
+            <a:avLst/>
+          </a:prstGeom>
+          <a:ln w="63500"/>
+        </p:spPr>
+        <p:style>
+          <a:lnRef idx="1">
+            <a:schemeClr val="accent1"/>
+          </a:lnRef>
+          <a:fillRef idx="0">
+            <a:schemeClr val="accent1"/>
+          </a:fillRef>
+          <a:effectRef idx="0">
+            <a:schemeClr val="accent1"/>
+          </a:effectRef>
+          <a:fontRef idx="minor">
+            <a:schemeClr val="tx1"/>
+          </a:fontRef>
+        </p:style>
+      </p:cxnSp>
+    </p:spTree>
+    <p:extLst>
+      <p:ext uri="{BB962C8B-B14F-4D97-AF65-F5344CB8AC3E}">
+        <p14:creationId xmlns:p14="http://schemas.microsoft.com/office/powerpoint/2010/main" val="405601730"/>
+      </p:ext>
+    </p:extLst>
+  </p:cSld>
+  <p:clrMapOvr>
+    <a:masterClrMapping/>
+  </p:clrMapOvr>
+</p:sld>
+</file>
+
+<file path=ppt/slides/slide5.xml><?xml version="1.0" encoding="utf-8"?>
+<p:sld xmlns:a="http://schemas.openxmlformats.org/drawingml/2006/main" xmlns:r="http://schemas.openxmlformats.org/officeDocument/2006/relationships" xmlns:p="http://schemas.openxmlformats.org/presentationml/2006/main">
+  <p:cSld>
+    <p:spTree>
+      <p:nvGrpSpPr>
+        <p:cNvPr id="1" name=""/>
+        <p:cNvGrpSpPr/>
+        <p:nvPr/>
+      </p:nvGrpSpPr>
+      <p:grpSpPr>
+        <a:xfrm>
+          <a:off x="0" y="0"/>
+          <a:ext cx="0" cy="0"/>
+          <a:chOff x="0" y="0"/>
+          <a:chExt cx="0" cy="0"/>
+        </a:xfrm>
+      </p:grpSpPr>
+      <p:sp>
+        <p:nvSpPr>
+          <p:cNvPr id="2" name="Title 1"/>
+          <p:cNvSpPr>
+            <a:spLocks noGrp="1"/>
+          </p:cNvSpPr>
+          <p:nvPr>
+            <p:ph type="title"/>
+          </p:nvPr>
+        </p:nvSpPr>
+        <p:spPr/>
+        <p:txBody>
+          <a:bodyPr/>
+          <a:lstStyle/>
+          <a:p>
+            <a:r>
+              <a:rPr lang="en-US" dirty="0" err="1" smtClean="0"/>
+              <a:t>dRMT</a:t>
+            </a:r>
+            <a:r>
+              <a:rPr lang="en-US" dirty="0" smtClean="0"/>
+              <a:t>: Disaggregated RMT</a:t>
+            </a:r>
+            <a:endParaRPr lang="en-US" dirty="0"/>
+          </a:p>
+        </p:txBody>
+      </p:sp>
+      <p:grpSp>
+        <p:nvGrpSpPr>
+          <p:cNvPr id="4" name="Group 3"/>
+          <p:cNvGrpSpPr/>
+          <p:nvPr/>
+        </p:nvGrpSpPr>
+        <p:grpSpPr>
+          <a:xfrm>
+            <a:off x="8917646" y="1681877"/>
+            <a:ext cx="3056021" cy="3031958"/>
+            <a:chOff x="9977016" y="2748677"/>
+            <a:chExt cx="3056021" cy="3031958"/>
+          </a:xfrm>
+        </p:grpSpPr>
+        <p:sp>
+          <p:nvSpPr>
+            <p:cNvPr id="5" name="Rounded Rectangle 4"/>
+            <p:cNvSpPr/>
+            <p:nvPr/>
+          </p:nvSpPr>
+          <p:spPr>
+            <a:xfrm>
+              <a:off x="10329746" y="3471746"/>
+              <a:ext cx="892098" cy="591014"/>
+            </a:xfrm>
+            <a:prstGeom prst="roundRect">
+              <a:avLst/>
+            </a:prstGeom>
+            <a:noFill/>
+            <a:ln w="63500">
+              <a:solidFill>
+                <a:srgbClr val="002060"/>
+              </a:solidFill>
+            </a:ln>
+          </p:spPr>
+          <p:style>
+            <a:lnRef idx="2">
+              <a:schemeClr val="accent1">
+                <a:shade val="50000"/>
+              </a:schemeClr>
+            </a:lnRef>
+            <a:fillRef idx="1">
+              <a:schemeClr val="accent1"/>
+            </a:fillRef>
+            <a:effectRef idx="0">
+              <a:schemeClr val="accent1"/>
+            </a:effectRef>
+            <a:fontRef idx="minor">
+              <a:schemeClr val="lt1"/>
+            </a:fontRef>
+          </p:style>
+          <p:txBody>
+            <a:bodyPr rtlCol="0" anchor="ctr"/>
+            <a:lstStyle/>
+            <a:p>
+              <a:pPr algn="ctr"/>
+              <a:endParaRPr lang="en-US"/>
+            </a:p>
+          </p:txBody>
+        </p:sp>
+        <p:sp>
+          <p:nvSpPr>
+            <p:cNvPr id="6" name="Rounded Rectangle 5"/>
+            <p:cNvSpPr/>
+            <p:nvPr/>
+          </p:nvSpPr>
+          <p:spPr>
+            <a:xfrm>
+              <a:off x="9977016" y="2748677"/>
+              <a:ext cx="3056021" cy="3031958"/>
+            </a:xfrm>
+            <a:prstGeom prst="roundRect">
+              <a:avLst/>
+            </a:prstGeom>
+            <a:noFill/>
+            <a:ln w="63500">
+              <a:solidFill>
+                <a:schemeClr val="tx1"/>
+              </a:solidFill>
+            </a:ln>
+          </p:spPr>
+          <p:style>
+            <a:lnRef idx="2">
+              <a:schemeClr val="accent1">
+                <a:shade val="50000"/>
+              </a:schemeClr>
+            </a:lnRef>
+            <a:fillRef idx="1">
+              <a:schemeClr val="accent1"/>
+            </a:fillRef>
+            <a:effectRef idx="0">
+              <a:schemeClr val="accent1"/>
+            </a:effectRef>
+            <a:fontRef idx="minor">
+              <a:schemeClr val="lt1"/>
+            </a:fontRef>
+          </p:style>
+          <p:txBody>
+            <a:bodyPr rtlCol="0" anchor="ctr"/>
+            <a:lstStyle/>
+            <a:p>
+              <a:pPr algn="ctr"/>
+              <a:endParaRPr lang="en-US"/>
+            </a:p>
+          </p:txBody>
+        </p:sp>
+        <p:sp>
+          <p:nvSpPr>
+            <p:cNvPr id="7" name="TextBox 6"/>
+            <p:cNvSpPr txBox="1"/>
+            <p:nvPr/>
+          </p:nvSpPr>
+          <p:spPr>
+            <a:xfrm>
+              <a:off x="10385504" y="3572106"/>
+              <a:ext cx="784189" cy="369332"/>
+            </a:xfrm>
+            <a:prstGeom prst="rect">
+              <a:avLst/>
+            </a:prstGeom>
+            <a:noFill/>
+          </p:spPr>
+          <p:txBody>
+            <a:bodyPr wrap="none" rtlCol="0">
+              <a:spAutoFit/>
+            </a:bodyPr>
+            <a:lstStyle/>
+            <a:p>
+              <a:r>
+                <a:rPr lang="en-US" dirty="0" smtClean="0"/>
+                <a:t>Match</a:t>
+              </a:r>
+              <a:endParaRPr lang="en-US" dirty="0"/>
+            </a:p>
+          </p:txBody>
+        </p:sp>
+        <p:sp>
+          <p:nvSpPr>
+            <p:cNvPr id="8" name="TextBox 7"/>
+            <p:cNvSpPr txBox="1"/>
+            <p:nvPr/>
+          </p:nvSpPr>
+          <p:spPr>
+            <a:xfrm>
+              <a:off x="11809143" y="3568389"/>
+              <a:ext cx="788999" cy="369332"/>
+            </a:xfrm>
+            <a:prstGeom prst="rect">
+              <a:avLst/>
+            </a:prstGeom>
+            <a:noFill/>
+          </p:spPr>
+          <p:txBody>
+            <a:bodyPr wrap="none" rtlCol="0">
+              <a:spAutoFit/>
+            </a:bodyPr>
+            <a:lstStyle/>
+            <a:p>
+              <a:r>
+                <a:rPr lang="en-US" dirty="0" smtClean="0"/>
+                <a:t>Action</a:t>
+              </a:r>
+              <a:endParaRPr lang="en-US" dirty="0"/>
+            </a:p>
+          </p:txBody>
+        </p:sp>
+        <p:cxnSp>
+          <p:nvCxnSpPr>
+            <p:cNvPr id="9" name="Straight Arrow Connector 8"/>
+            <p:cNvCxnSpPr/>
+            <p:nvPr/>
+          </p:nvCxnSpPr>
+          <p:spPr>
+            <a:xfrm>
+              <a:off x="11304027" y="3765802"/>
+              <a:ext cx="412596" cy="0"/>
+            </a:xfrm>
+            <a:prstGeom prst="straightConnector1">
+              <a:avLst/>
+            </a:prstGeom>
+            <a:ln w="63500">
+              <a:solidFill>
+                <a:schemeClr val="tx1"/>
+              </a:solidFill>
+              <a:tailEnd type="triangle"/>
+            </a:ln>
+          </p:spPr>
+          <p:style>
+            <a:lnRef idx="1">
+              <a:schemeClr val="accent1"/>
+            </a:lnRef>
+            <a:fillRef idx="0">
+              <a:schemeClr val="accent1"/>
+            </a:fillRef>
+            <a:effectRef idx="0">
+              <a:schemeClr val="accent1"/>
+            </a:effectRef>
+            <a:fontRef idx="minor">
+              <a:schemeClr val="tx1"/>
+            </a:fontRef>
+          </p:style>
+        </p:cxnSp>
+        <p:sp>
+          <p:nvSpPr>
+            <p:cNvPr id="11" name="Rounded Rectangle 10"/>
+            <p:cNvSpPr/>
+            <p:nvPr/>
+          </p:nvSpPr>
+          <p:spPr>
+            <a:xfrm>
+              <a:off x="11772327" y="3461308"/>
+              <a:ext cx="892098" cy="591014"/>
+            </a:xfrm>
+            <a:prstGeom prst="roundRect">
+              <a:avLst/>
+            </a:prstGeom>
+            <a:noFill/>
+            <a:ln w="63500">
+              <a:solidFill>
+                <a:srgbClr val="00B050"/>
+              </a:solidFill>
+            </a:ln>
+          </p:spPr>
+          <p:style>
+            <a:lnRef idx="2">
+              <a:schemeClr val="accent1">
+                <a:shade val="50000"/>
+              </a:schemeClr>
+            </a:lnRef>
+            <a:fillRef idx="1">
+              <a:schemeClr val="accent1"/>
+            </a:fillRef>
+            <a:effectRef idx="0">
+              <a:schemeClr val="accent1"/>
+            </a:effectRef>
+            <a:fontRef idx="minor">
+              <a:schemeClr val="lt1"/>
+            </a:fontRef>
+          </p:style>
+          <p:txBody>
+            <a:bodyPr rtlCol="0" anchor="ctr"/>
+            <a:lstStyle/>
+            <a:p>
+              <a:pPr algn="ctr"/>
+              <a:endParaRPr lang="en-US"/>
+            </a:p>
+          </p:txBody>
+        </p:sp>
+      </p:grpSp>
+      <p:grpSp>
+        <p:nvGrpSpPr>
+          <p:cNvPr id="15" name="Group 14"/>
+          <p:cNvGrpSpPr/>
+          <p:nvPr/>
+        </p:nvGrpSpPr>
+        <p:grpSpPr>
+          <a:xfrm>
+            <a:off x="4353081" y="1681877"/>
+            <a:ext cx="3056021" cy="3031958"/>
+            <a:chOff x="9977016" y="2748677"/>
+            <a:chExt cx="3056021" cy="3031958"/>
+          </a:xfrm>
+        </p:grpSpPr>
+        <p:sp>
+          <p:nvSpPr>
+            <p:cNvPr id="16" name="Rounded Rectangle 15"/>
+            <p:cNvSpPr/>
+            <p:nvPr/>
+          </p:nvSpPr>
+          <p:spPr>
+            <a:xfrm>
+              <a:off x="10329746" y="3471746"/>
+              <a:ext cx="892098" cy="591014"/>
+            </a:xfrm>
+            <a:prstGeom prst="roundRect">
+              <a:avLst/>
+            </a:prstGeom>
+            <a:noFill/>
+            <a:ln w="63500">
+              <a:solidFill>
+                <a:srgbClr val="002060"/>
+              </a:solidFill>
+            </a:ln>
+          </p:spPr>
+          <p:style>
+            <a:lnRef idx="2">
+              <a:schemeClr val="accent1">
+                <a:shade val="50000"/>
+              </a:schemeClr>
+            </a:lnRef>
+            <a:fillRef idx="1">
+              <a:schemeClr val="accent1"/>
+            </a:fillRef>
+            <a:effectRef idx="0">
+              <a:schemeClr val="accent1"/>
+            </a:effectRef>
+            <a:fontRef idx="minor">
+              <a:schemeClr val="lt1"/>
+            </a:fontRef>
+          </p:style>
+          <p:txBody>
+            <a:bodyPr rtlCol="0" anchor="ctr"/>
+            <a:lstStyle/>
+            <a:p>
+              <a:pPr algn="ctr"/>
+              <a:endParaRPr lang="en-US"/>
+            </a:p>
+          </p:txBody>
+        </p:sp>
+        <p:sp>
+          <p:nvSpPr>
+            <p:cNvPr id="17" name="Rounded Rectangle 16"/>
+            <p:cNvSpPr/>
+            <p:nvPr/>
+          </p:nvSpPr>
+          <p:spPr>
+            <a:xfrm>
+              <a:off x="9977016" y="2748677"/>
+              <a:ext cx="3056021" cy="3031958"/>
+            </a:xfrm>
+            <a:prstGeom prst="roundRect">
+              <a:avLst/>
+            </a:prstGeom>
+            <a:noFill/>
+            <a:ln w="63500">
+              <a:solidFill>
+                <a:schemeClr val="tx1"/>
+              </a:solidFill>
+            </a:ln>
+          </p:spPr>
+          <p:style>
+            <a:lnRef idx="2">
+              <a:schemeClr val="accent1">
+                <a:shade val="50000"/>
+              </a:schemeClr>
+            </a:lnRef>
+            <a:fillRef idx="1">
+              <a:schemeClr val="accent1"/>
+            </a:fillRef>
+            <a:effectRef idx="0">
+              <a:schemeClr val="accent1"/>
+            </a:effectRef>
+            <a:fontRef idx="minor">
+              <a:schemeClr val="lt1"/>
+            </a:fontRef>
+          </p:style>
+          <p:txBody>
+            <a:bodyPr rtlCol="0" anchor="ctr"/>
+            <a:lstStyle/>
+            <a:p>
+              <a:pPr algn="ctr"/>
+              <a:endParaRPr lang="en-US"/>
+            </a:p>
+          </p:txBody>
+        </p:sp>
+        <p:sp>
+          <p:nvSpPr>
+            <p:cNvPr id="18" name="TextBox 17"/>
+            <p:cNvSpPr txBox="1"/>
+            <p:nvPr/>
+          </p:nvSpPr>
+          <p:spPr>
+            <a:xfrm>
+              <a:off x="10385504" y="3572106"/>
+              <a:ext cx="784189" cy="369332"/>
+            </a:xfrm>
+            <a:prstGeom prst="rect">
+              <a:avLst/>
+            </a:prstGeom>
+            <a:noFill/>
+          </p:spPr>
+          <p:txBody>
+            <a:bodyPr wrap="none" rtlCol="0">
+              <a:spAutoFit/>
+            </a:bodyPr>
+            <a:lstStyle/>
+            <a:p>
+              <a:r>
+                <a:rPr lang="en-US" dirty="0" smtClean="0"/>
+                <a:t>Match</a:t>
+              </a:r>
+              <a:endParaRPr lang="en-US" dirty="0"/>
+            </a:p>
+          </p:txBody>
+        </p:sp>
+        <p:sp>
+          <p:nvSpPr>
+            <p:cNvPr id="19" name="TextBox 18"/>
+            <p:cNvSpPr txBox="1"/>
+            <p:nvPr/>
+          </p:nvSpPr>
+          <p:spPr>
+            <a:xfrm>
+              <a:off x="11809143" y="3568389"/>
+              <a:ext cx="788999" cy="369332"/>
+            </a:xfrm>
+            <a:prstGeom prst="rect">
+              <a:avLst/>
+            </a:prstGeom>
+            <a:noFill/>
+          </p:spPr>
+          <p:txBody>
+            <a:bodyPr wrap="none" rtlCol="0">
+              <a:spAutoFit/>
+            </a:bodyPr>
+            <a:lstStyle/>
+            <a:p>
+              <a:r>
+                <a:rPr lang="en-US" dirty="0" smtClean="0"/>
+                <a:t>Action</a:t>
+              </a:r>
+              <a:endParaRPr lang="en-US" dirty="0"/>
+            </a:p>
+          </p:txBody>
+        </p:sp>
+        <p:cxnSp>
+          <p:nvCxnSpPr>
+            <p:cNvPr id="20" name="Straight Arrow Connector 19"/>
+            <p:cNvCxnSpPr/>
+            <p:nvPr/>
+          </p:nvCxnSpPr>
+          <p:spPr>
+            <a:xfrm>
+              <a:off x="11304027" y="3765802"/>
+              <a:ext cx="412596" cy="0"/>
+            </a:xfrm>
+            <a:prstGeom prst="straightConnector1">
+              <a:avLst/>
+            </a:prstGeom>
+            <a:ln w="63500">
+              <a:solidFill>
+                <a:schemeClr val="tx1"/>
+              </a:solidFill>
+              <a:tailEnd type="triangle"/>
+            </a:ln>
+          </p:spPr>
+          <p:style>
+            <a:lnRef idx="1">
+              <a:schemeClr val="accent1"/>
+            </a:lnRef>
+            <a:fillRef idx="0">
+              <a:schemeClr val="accent1"/>
+            </a:fillRef>
+            <a:effectRef idx="0">
+              <a:schemeClr val="accent1"/>
+            </a:effectRef>
+            <a:fontRef idx="minor">
+              <a:schemeClr val="tx1"/>
+            </a:fontRef>
+          </p:style>
+        </p:cxnSp>
+        <p:sp>
+          <p:nvSpPr>
+            <p:cNvPr id="22" name="Rounded Rectangle 21"/>
+            <p:cNvSpPr/>
+            <p:nvPr/>
+          </p:nvSpPr>
+          <p:spPr>
+            <a:xfrm>
+              <a:off x="11772327" y="3461308"/>
+              <a:ext cx="892098" cy="591014"/>
+            </a:xfrm>
+            <a:prstGeom prst="roundRect">
+              <a:avLst/>
+            </a:prstGeom>
+            <a:noFill/>
+            <a:ln w="63500">
+              <a:solidFill>
+                <a:srgbClr val="00B050"/>
+              </a:solidFill>
+            </a:ln>
+          </p:spPr>
+          <p:style>
+            <a:lnRef idx="2">
+              <a:schemeClr val="accent1">
+                <a:shade val="50000"/>
+              </a:schemeClr>
+            </a:lnRef>
+            <a:fillRef idx="1">
+              <a:schemeClr val="accent1"/>
+            </a:fillRef>
+            <a:effectRef idx="0">
+              <a:schemeClr val="accent1"/>
+            </a:effectRef>
+            <a:fontRef idx="minor">
+              <a:schemeClr val="lt1"/>
+            </a:fontRef>
+          </p:style>
+          <p:txBody>
+            <a:bodyPr rtlCol="0" anchor="ctr"/>
+            <a:lstStyle/>
+            <a:p>
+              <a:pPr algn="ctr"/>
+              <a:endParaRPr lang="en-US"/>
+            </a:p>
+          </p:txBody>
+        </p:sp>
+      </p:grpSp>
+      <p:sp>
+        <p:nvSpPr>
+          <p:cNvPr id="27" name="Rounded Rectangle 26"/>
+          <p:cNvSpPr/>
+          <p:nvPr/>
+        </p:nvSpPr>
+        <p:spPr>
+          <a:xfrm>
+            <a:off x="523598" y="2404946"/>
+            <a:ext cx="892098" cy="591014"/>
+          </a:xfrm>
+          <a:prstGeom prst="roundRect">
+            <a:avLst/>
+          </a:prstGeom>
+          <a:noFill/>
+          <a:ln w="63500">
+            <a:solidFill>
+              <a:srgbClr val="002060"/>
+            </a:solidFill>
+          </a:ln>
+        </p:spPr>
+        <p:style>
+          <a:lnRef idx="2">
+            <a:schemeClr val="accent1">
+              <a:shade val="50000"/>
+            </a:schemeClr>
+          </a:lnRef>
+          <a:fillRef idx="1">
+            <a:schemeClr val="accent1"/>
+          </a:fillRef>
+          <a:effectRef idx="0">
+            <a:schemeClr val="accent1"/>
+          </a:effectRef>
+          <a:fontRef idx="minor">
+            <a:schemeClr val="lt1"/>
+          </a:fontRef>
+        </p:style>
+        <p:txBody>
+          <a:bodyPr rtlCol="0" anchor="ctr"/>
+          <a:lstStyle/>
+          <a:p>
+            <a:pPr algn="ctr"/>
+            <a:endParaRPr lang="en-US"/>
+          </a:p>
+        </p:txBody>
+      </p:sp>
+      <p:sp>
+        <p:nvSpPr>
+          <p:cNvPr id="28" name="Rounded Rectangle 27"/>
+          <p:cNvSpPr/>
+          <p:nvPr/>
+        </p:nvSpPr>
+        <p:spPr>
+          <a:xfrm>
+            <a:off x="170868" y="1681877"/>
+            <a:ext cx="3056021" cy="3031958"/>
+          </a:xfrm>
+          <a:prstGeom prst="roundRect">
+            <a:avLst/>
+          </a:prstGeom>
+          <a:noFill/>
+          <a:ln w="63500">
+            <a:solidFill>
+              <a:schemeClr val="tx1"/>
+            </a:solidFill>
+          </a:ln>
+        </p:spPr>
+        <p:style>
+          <a:lnRef idx="2">
+            <a:schemeClr val="accent1">
+              <a:shade val="50000"/>
+            </a:schemeClr>
+          </a:lnRef>
+          <a:fillRef idx="1">
+            <a:schemeClr val="accent1"/>
+          </a:fillRef>
+          <a:effectRef idx="0">
+            <a:schemeClr val="accent1"/>
+          </a:effectRef>
+          <a:fontRef idx="minor">
+            <a:schemeClr val="lt1"/>
+          </a:fontRef>
+        </p:style>
+        <p:txBody>
+          <a:bodyPr rtlCol="0" anchor="ctr"/>
+          <a:lstStyle/>
+          <a:p>
+            <a:pPr algn="ctr"/>
+            <a:endParaRPr lang="en-US"/>
+          </a:p>
+        </p:txBody>
+      </p:sp>
+      <p:sp>
+        <p:nvSpPr>
+          <p:cNvPr id="29" name="TextBox 28"/>
+          <p:cNvSpPr txBox="1"/>
+          <p:nvPr/>
+        </p:nvSpPr>
+        <p:spPr>
+          <a:xfrm>
+            <a:off x="579356" y="2505306"/>
+            <a:ext cx="784189" cy="369332"/>
+          </a:xfrm>
+          <a:prstGeom prst="rect">
+            <a:avLst/>
+          </a:prstGeom>
+          <a:noFill/>
+        </p:spPr>
+        <p:txBody>
+          <a:bodyPr wrap="none" rtlCol="0">
+            <a:spAutoFit/>
+          </a:bodyPr>
+          <a:lstStyle/>
+          <a:p>
+            <a:r>
+              <a:rPr lang="en-US" dirty="0" smtClean="0"/>
+              <a:t>Match</a:t>
+            </a:r>
+            <a:endParaRPr lang="en-US" dirty="0"/>
+          </a:p>
+        </p:txBody>
+      </p:sp>
+      <p:sp>
+        <p:nvSpPr>
+          <p:cNvPr id="30" name="TextBox 29"/>
+          <p:cNvSpPr txBox="1"/>
+          <p:nvPr/>
+        </p:nvSpPr>
+        <p:spPr>
+          <a:xfrm>
+            <a:off x="2002995" y="2501589"/>
+            <a:ext cx="788999" cy="369332"/>
+          </a:xfrm>
+          <a:prstGeom prst="rect">
+            <a:avLst/>
+          </a:prstGeom>
+          <a:noFill/>
+        </p:spPr>
+        <p:txBody>
+          <a:bodyPr wrap="none" rtlCol="0">
+            <a:spAutoFit/>
+          </a:bodyPr>
+          <a:lstStyle/>
+          <a:p>
+            <a:r>
+              <a:rPr lang="en-US" dirty="0" smtClean="0"/>
+              <a:t>Action</a:t>
+            </a:r>
+            <a:endParaRPr lang="en-US" dirty="0"/>
+          </a:p>
+        </p:txBody>
+      </p:sp>
+      <p:cxnSp>
+        <p:nvCxnSpPr>
+          <p:cNvPr id="31" name="Straight Arrow Connector 30"/>
+          <p:cNvCxnSpPr/>
+          <p:nvPr/>
+        </p:nvCxnSpPr>
+        <p:spPr>
+          <a:xfrm>
+            <a:off x="1497879" y="2699002"/>
+            <a:ext cx="412596" cy="0"/>
+          </a:xfrm>
+          <a:prstGeom prst="straightConnector1">
+            <a:avLst/>
+          </a:prstGeom>
+          <a:ln w="63500">
+            <a:solidFill>
+              <a:schemeClr val="tx1"/>
+            </a:solidFill>
+            <a:tailEnd type="triangle"/>
+          </a:ln>
+        </p:spPr>
+        <p:style>
+          <a:lnRef idx="1">
+            <a:schemeClr val="accent1"/>
+          </a:lnRef>
+          <a:fillRef idx="0">
+            <a:schemeClr val="accent1"/>
+          </a:fillRef>
+          <a:effectRef idx="0">
+            <a:schemeClr val="accent1"/>
+          </a:effectRef>
+          <a:fontRef idx="minor">
+            <a:schemeClr val="tx1"/>
+          </a:fontRef>
+        </p:style>
+      </p:cxnSp>
+      <p:sp>
+        <p:nvSpPr>
+          <p:cNvPr id="32" name="TextBox 31"/>
+          <p:cNvSpPr txBox="1"/>
+          <p:nvPr/>
+        </p:nvSpPr>
+        <p:spPr>
+          <a:xfrm>
+            <a:off x="5048549" y="5949911"/>
+            <a:ext cx="1453019" cy="369332"/>
+          </a:xfrm>
+          <a:prstGeom prst="rect">
+            <a:avLst/>
+          </a:prstGeom>
+          <a:noFill/>
+        </p:spPr>
+        <p:txBody>
+          <a:bodyPr wrap="square" rtlCol="0">
+            <a:spAutoFit/>
+          </a:bodyPr>
+          <a:lstStyle/>
+          <a:p>
+            <a:r>
+              <a:rPr lang="en-US" smtClean="0"/>
+              <a:t>SRAM/ TCAM</a:t>
+            </a:r>
+            <a:endParaRPr lang="en-US" dirty="0"/>
+          </a:p>
+        </p:txBody>
+      </p:sp>
+      <p:sp>
+        <p:nvSpPr>
+          <p:cNvPr id="33" name="Rounded Rectangle 32"/>
+          <p:cNvSpPr/>
+          <p:nvPr/>
+        </p:nvSpPr>
+        <p:spPr>
+          <a:xfrm>
+            <a:off x="1966179" y="2394508"/>
+            <a:ext cx="892098" cy="591014"/>
+          </a:xfrm>
+          <a:prstGeom prst="roundRect">
+            <a:avLst/>
+          </a:prstGeom>
+          <a:noFill/>
+          <a:ln w="63500">
+            <a:solidFill>
+              <a:srgbClr val="00B050"/>
+            </a:solidFill>
+          </a:ln>
+        </p:spPr>
+        <p:style>
+          <a:lnRef idx="2">
+            <a:schemeClr val="accent1">
+              <a:shade val="50000"/>
+            </a:schemeClr>
+          </a:lnRef>
+          <a:fillRef idx="1">
+            <a:schemeClr val="accent1"/>
+          </a:fillRef>
+          <a:effectRef idx="0">
+            <a:schemeClr val="accent1"/>
+          </a:effectRef>
+          <a:fontRef idx="minor">
+            <a:schemeClr val="lt1"/>
+          </a:fontRef>
+        </p:style>
+        <p:txBody>
+          <a:bodyPr rtlCol="0" anchor="ctr"/>
+          <a:lstStyle/>
+          <a:p>
+            <a:pPr algn="ctr"/>
+            <a:endParaRPr lang="en-US"/>
+          </a:p>
+        </p:txBody>
+      </p:sp>
+      <p:sp>
+        <p:nvSpPr>
+          <p:cNvPr id="34" name="Rounded Rectangle 33"/>
+          <p:cNvSpPr/>
+          <p:nvPr/>
+        </p:nvSpPr>
+        <p:spPr>
+          <a:xfrm>
+            <a:off x="825190" y="5857291"/>
+            <a:ext cx="10593659" cy="591014"/>
+          </a:xfrm>
+          <a:prstGeom prst="roundRect">
+            <a:avLst/>
+          </a:prstGeom>
+          <a:noFill/>
+          <a:ln w="63500">
+            <a:solidFill>
+              <a:srgbClr val="FF0000"/>
+            </a:solidFill>
+          </a:ln>
+        </p:spPr>
+        <p:style>
+          <a:lnRef idx="2">
+            <a:schemeClr val="accent1">
+              <a:shade val="50000"/>
+            </a:schemeClr>
+          </a:lnRef>
+          <a:fillRef idx="1">
+            <a:schemeClr val="accent1"/>
+          </a:fillRef>
+          <a:effectRef idx="0">
+            <a:schemeClr val="accent1"/>
+          </a:effectRef>
+          <a:fontRef idx="minor">
+            <a:schemeClr val="lt1"/>
+          </a:fontRef>
+        </p:style>
+        <p:txBody>
+          <a:bodyPr rtlCol="0" anchor="ctr"/>
+          <a:lstStyle/>
+          <a:p>
+            <a:pPr algn="ctr"/>
+            <a:endParaRPr lang="en-US"/>
+          </a:p>
+        </p:txBody>
+      </p:sp>
+      <p:sp>
+        <p:nvSpPr>
+          <p:cNvPr id="37" name="Oval 36"/>
+          <p:cNvSpPr/>
+          <p:nvPr/>
+        </p:nvSpPr>
+        <p:spPr>
+          <a:xfrm>
+            <a:off x="7986126" y="3750529"/>
+            <a:ext cx="245327" cy="267629"/>
+          </a:xfrm>
+          <a:prstGeom prst="ellipse">
+            <a:avLst/>
+          </a:prstGeom>
+          <a:solidFill>
+            <a:schemeClr val="tx1"/>
+          </a:solidFill>
+        </p:spPr>
+        <p:style>
+          <a:lnRef idx="2">
+            <a:schemeClr val="accent1">
+              <a:shade val="50000"/>
+            </a:schemeClr>
+          </a:lnRef>
+          <a:fillRef idx="1">
+            <a:schemeClr val="accent1"/>
+          </a:fillRef>
+          <a:effectRef idx="0">
+            <a:schemeClr val="accent1"/>
+          </a:effectRef>
+          <a:fontRef idx="minor">
+            <a:schemeClr val="lt1"/>
+          </a:fontRef>
+        </p:style>
+        <p:txBody>
+          <a:bodyPr rtlCol="0" anchor="ctr"/>
+          <a:lstStyle/>
+          <a:p>
+            <a:pPr algn="ctr"/>
+            <a:endParaRPr lang="en-US"/>
+          </a:p>
+        </p:txBody>
+      </p:sp>
+      <p:sp>
+        <p:nvSpPr>
+          <p:cNvPr id="38" name="Oval 37"/>
+          <p:cNvSpPr/>
+          <p:nvPr/>
+        </p:nvSpPr>
+        <p:spPr>
+          <a:xfrm>
+            <a:off x="7545654" y="3750529"/>
+            <a:ext cx="245327" cy="267629"/>
+          </a:xfrm>
+          <a:prstGeom prst="ellipse">
+            <a:avLst/>
+          </a:prstGeom>
+          <a:solidFill>
+            <a:schemeClr val="tx1"/>
+          </a:solidFill>
+        </p:spPr>
+        <p:style>
+          <a:lnRef idx="2">
+            <a:schemeClr val="accent1">
+              <a:shade val="50000"/>
+            </a:schemeClr>
+          </a:lnRef>
+          <a:fillRef idx="1">
+            <a:schemeClr val="accent1"/>
+          </a:fillRef>
+          <a:effectRef idx="0">
+            <a:schemeClr val="accent1"/>
+          </a:effectRef>
+          <a:fontRef idx="minor">
+            <a:schemeClr val="lt1"/>
+          </a:fontRef>
+        </p:style>
+        <p:txBody>
+          <a:bodyPr rtlCol="0" anchor="ctr"/>
+          <a:lstStyle/>
+          <a:p>
+            <a:pPr algn="ctr"/>
+            <a:endParaRPr lang="en-US"/>
+          </a:p>
+        </p:txBody>
+      </p:sp>
+      <p:sp>
+        <p:nvSpPr>
+          <p:cNvPr id="39" name="Oval 38"/>
+          <p:cNvSpPr/>
+          <p:nvPr/>
+        </p:nvSpPr>
+        <p:spPr>
+          <a:xfrm>
+            <a:off x="8426598" y="3750529"/>
+            <a:ext cx="245327" cy="267629"/>
+          </a:xfrm>
+          <a:prstGeom prst="ellipse">
+            <a:avLst/>
+          </a:prstGeom>
+          <a:solidFill>
+            <a:schemeClr val="tx1"/>
+          </a:solidFill>
+        </p:spPr>
+        <p:style>
+          <a:lnRef idx="2">
+            <a:schemeClr val="accent1">
+              <a:shade val="50000"/>
+            </a:schemeClr>
+          </a:lnRef>
+          <a:fillRef idx="1">
+            <a:schemeClr val="accent1"/>
+          </a:fillRef>
+          <a:effectRef idx="0">
+            <a:schemeClr val="accent1"/>
+          </a:effectRef>
+          <a:fontRef idx="minor">
+            <a:schemeClr val="lt1"/>
+          </a:fontRef>
+        </p:style>
+        <p:txBody>
+          <a:bodyPr rtlCol="0" anchor="ctr"/>
+          <a:lstStyle/>
+          <a:p>
+            <a:pPr algn="ctr"/>
+            <a:endParaRPr lang="en-US"/>
+          </a:p>
+        </p:txBody>
+      </p:sp>
+      <p:cxnSp>
+        <p:nvCxnSpPr>
+          <p:cNvPr id="40" name="Straight Arrow Connector 39"/>
+          <p:cNvCxnSpPr/>
+          <p:nvPr/>
+        </p:nvCxnSpPr>
+        <p:spPr>
+          <a:xfrm>
+            <a:off x="3226889" y="3197856"/>
+            <a:ext cx="1126192" cy="0"/>
+          </a:xfrm>
+          <a:prstGeom prst="straightConnector1">
+            <a:avLst/>
+          </a:prstGeom>
+          <a:ln w="127000">
+            <a:solidFill>
+              <a:schemeClr val="tx1"/>
+            </a:solidFill>
+            <a:tailEnd type="arrow"/>
+          </a:ln>
+        </p:spPr>
+        <p:style>
+          <a:lnRef idx="1">
+            <a:schemeClr val="accent1"/>
+          </a:lnRef>
+          <a:fillRef idx="0">
+            <a:schemeClr val="accent1"/>
+          </a:fillRef>
+          <a:effectRef idx="0">
+            <a:schemeClr val="accent1"/>
+          </a:effectRef>
+          <a:fontRef idx="minor">
+            <a:schemeClr val="tx1"/>
+          </a:fontRef>
+        </p:style>
+      </p:cxnSp>
+      <p:cxnSp>
+        <p:nvCxnSpPr>
+          <p:cNvPr id="41" name="Straight Arrow Connector 40"/>
+          <p:cNvCxnSpPr/>
+          <p:nvPr/>
+        </p:nvCxnSpPr>
+        <p:spPr>
+          <a:xfrm>
+            <a:off x="7409102" y="3197856"/>
+            <a:ext cx="1508544" cy="0"/>
+          </a:xfrm>
+          <a:prstGeom prst="straightConnector1">
+            <a:avLst/>
+          </a:prstGeom>
+          <a:ln w="127000">
+            <a:solidFill>
+              <a:schemeClr val="tx1"/>
+            </a:solidFill>
+            <a:tailEnd type="arrow"/>
+          </a:ln>
+        </p:spPr>
+        <p:style>
+          <a:lnRef idx="1">
+            <a:schemeClr val="accent1"/>
+          </a:lnRef>
+          <a:fillRef idx="0">
+            <a:schemeClr val="accent1"/>
+          </a:fillRef>
+          <a:effectRef idx="0">
+            <a:schemeClr val="accent1"/>
+          </a:effectRef>
+          <a:fontRef idx="minor">
+            <a:schemeClr val="tx1"/>
+          </a:fontRef>
+        </p:style>
+      </p:cxnSp>
+      <p:cxnSp>
+        <p:nvCxnSpPr>
+          <p:cNvPr id="47" name="Straight Arrow Connector 46"/>
+          <p:cNvCxnSpPr/>
+          <p:nvPr/>
+        </p:nvCxnSpPr>
+        <p:spPr>
+          <a:xfrm flipH="1">
+            <a:off x="1672683" y="4733008"/>
+            <a:ext cx="470" cy="675333"/>
+          </a:xfrm>
+          <a:prstGeom prst="straightConnector1">
+            <a:avLst/>
+          </a:prstGeom>
+          <a:ln w="127000">
+            <a:solidFill>
+              <a:schemeClr val="tx1"/>
+            </a:solidFill>
+            <a:tailEnd type="arrow"/>
+          </a:ln>
+        </p:spPr>
+        <p:style>
+          <a:lnRef idx="1">
+            <a:schemeClr val="accent1"/>
+          </a:lnRef>
+          <a:fillRef idx="0">
+            <a:schemeClr val="accent1"/>
+          </a:fillRef>
+          <a:effectRef idx="0">
+            <a:schemeClr val="accent1"/>
+          </a:effectRef>
+          <a:fontRef idx="minor">
+            <a:schemeClr val="tx1"/>
+          </a:fontRef>
+        </p:style>
+      </p:cxnSp>
+      <p:cxnSp>
+        <p:nvCxnSpPr>
+          <p:cNvPr id="49" name="Straight Arrow Connector 48"/>
+          <p:cNvCxnSpPr/>
+          <p:nvPr/>
+        </p:nvCxnSpPr>
+        <p:spPr>
+          <a:xfrm flipH="1">
+            <a:off x="5973336" y="4740442"/>
+            <a:ext cx="470" cy="675333"/>
+          </a:xfrm>
+          <a:prstGeom prst="straightConnector1">
+            <a:avLst/>
+          </a:prstGeom>
+          <a:ln w="127000">
+            <a:solidFill>
+              <a:schemeClr val="tx1"/>
+            </a:solidFill>
+            <a:tailEnd type="arrow"/>
+          </a:ln>
+        </p:spPr>
+        <p:style>
+          <a:lnRef idx="1">
+            <a:schemeClr val="accent1"/>
+          </a:lnRef>
+          <a:fillRef idx="0">
+            <a:schemeClr val="accent1"/>
+          </a:fillRef>
+          <a:effectRef idx="0">
+            <a:schemeClr val="accent1"/>
+          </a:effectRef>
+          <a:fontRef idx="minor">
+            <a:schemeClr val="tx1"/>
+          </a:fontRef>
+        </p:style>
+      </p:cxnSp>
+      <p:cxnSp>
+        <p:nvCxnSpPr>
+          <p:cNvPr id="50" name="Straight Arrow Connector 49"/>
+          <p:cNvCxnSpPr/>
+          <p:nvPr/>
+        </p:nvCxnSpPr>
+        <p:spPr>
+          <a:xfrm flipH="1">
+            <a:off x="10575073" y="4714422"/>
+            <a:ext cx="470" cy="675333"/>
+          </a:xfrm>
+          <a:prstGeom prst="straightConnector1">
+            <a:avLst/>
+          </a:prstGeom>
+          <a:ln w="127000">
+            <a:solidFill>
+              <a:schemeClr val="tx1"/>
+            </a:solidFill>
+            <a:tailEnd type="arrow"/>
+          </a:ln>
+        </p:spPr>
+        <p:style>
+          <a:lnRef idx="1">
+            <a:schemeClr val="accent1"/>
+          </a:lnRef>
+          <a:fillRef idx="0">
+            <a:schemeClr val="accent1"/>
+          </a:fillRef>
+          <a:effectRef idx="0">
+            <a:schemeClr val="accent1"/>
+          </a:effectRef>
+          <a:fontRef idx="minor">
+            <a:schemeClr val="tx1"/>
+          </a:fontRef>
+        </p:style>
+      </p:cxnSp>
+      <p:cxnSp>
+        <p:nvCxnSpPr>
+          <p:cNvPr id="52" name="Straight Connector 51"/>
+          <p:cNvCxnSpPr/>
+          <p:nvPr/>
+        </p:nvCxnSpPr>
+        <p:spPr>
+          <a:xfrm>
+            <a:off x="914400" y="5285678"/>
+            <a:ext cx="9790771" cy="557561"/>
+          </a:xfrm>
+          <a:prstGeom prst="line">
+            <a:avLst/>
+          </a:prstGeom>
+          <a:ln w="63500"/>
+        </p:spPr>
+        <p:style>
+          <a:lnRef idx="1">
+            <a:schemeClr val="accent1"/>
+          </a:lnRef>
+          <a:fillRef idx="0">
+            <a:schemeClr val="accent1"/>
+          </a:fillRef>
+          <a:effectRef idx="0">
+            <a:schemeClr val="accent1"/>
+          </a:effectRef>
+          <a:fontRef idx="minor">
+            <a:schemeClr val="tx1"/>
+          </a:fontRef>
+        </p:style>
+      </p:cxnSp>
+      <p:cxnSp>
+        <p:nvCxnSpPr>
+          <p:cNvPr id="54" name="Straight Connector 53"/>
+          <p:cNvCxnSpPr/>
+          <p:nvPr/>
+        </p:nvCxnSpPr>
+        <p:spPr>
+          <a:xfrm flipV="1">
+            <a:off x="981307" y="5341434"/>
+            <a:ext cx="9712713" cy="479503"/>
+          </a:xfrm>
+          <a:prstGeom prst="line">
+            <a:avLst/>
+          </a:prstGeom>
+          <a:ln w="63500"/>
+        </p:spPr>
+        <p:style>
+          <a:lnRef idx="1">
+            <a:schemeClr val="accent1"/>
+          </a:lnRef>
+          <a:fillRef idx="0">
+            <a:schemeClr val="accent1"/>
+          </a:fillRef>
+          <a:effectRef idx="0">
+            <a:schemeClr val="accent1"/>
+          </a:effectRef>
+          <a:fontRef idx="minor">
+            <a:schemeClr val="tx1"/>
+          </a:fontRef>
+        </p:style>
+      </p:cxnSp>
+      <p:cxnSp>
+        <p:nvCxnSpPr>
+          <p:cNvPr id="57" name="Straight Connector 56"/>
+          <p:cNvCxnSpPr/>
+          <p:nvPr/>
+        </p:nvCxnSpPr>
+        <p:spPr>
+          <a:xfrm>
+            <a:off x="1066800" y="5438078"/>
+            <a:ext cx="9790771" cy="557561"/>
+          </a:xfrm>
+          <a:prstGeom prst="line">
+            <a:avLst/>
+          </a:prstGeom>
+        </p:spPr>
+        <p:style>
+          <a:lnRef idx="1">
+            <a:schemeClr val="accent1"/>
+          </a:lnRef>
+          <a:fillRef idx="0">
+            <a:schemeClr val="accent1"/>
+          </a:fillRef>
+          <a:effectRef idx="0">
+            <a:schemeClr val="accent1"/>
+          </a:effectRef>
+          <a:fontRef idx="minor">
+            <a:schemeClr val="tx1"/>
+          </a:fontRef>
+        </p:style>
+      </p:cxnSp>
+    </p:spTree>
+    <p:extLst>
+      <p:ext uri="{BB962C8B-B14F-4D97-AF65-F5344CB8AC3E}">
+        <p14:creationId xmlns:p14="http://schemas.microsoft.com/office/powerpoint/2010/main" val="1797777588"/>
+      </p:ext>
+    </p:extLst>
+  </p:cSld>
+  <p:clrMapOvr>
+    <a:masterClrMapping/>
+  </p:clrMapOvr>
+</p:sld>
+</file>
+
+<file path=ppt/slides/slide6.xml><?xml version="1.0" encoding="utf-8"?>
+<p:sld xmlns:a="http://schemas.openxmlformats.org/drawingml/2006/main" xmlns:r="http://schemas.openxmlformats.org/officeDocument/2006/relationships" xmlns:p="http://schemas.openxmlformats.org/presentationml/2006/main">
+  <p:cSld>
+    <p:spTree>
+      <p:nvGrpSpPr>
+        <p:cNvPr id="1" name=""/>
+        <p:cNvGrpSpPr/>
+        <p:nvPr/>
+      </p:nvGrpSpPr>
+      <p:grpSpPr>
+        <a:xfrm>
+          <a:off x="0" y="0"/>
+          <a:ext cx="0" cy="0"/>
+          <a:chOff x="0" y="0"/>
+          <a:chExt cx="0" cy="0"/>
+        </a:xfrm>
+      </p:grpSpPr>
+      <p:sp>
+        <p:nvSpPr>
+          <p:cNvPr id="2" name="Title 1"/>
+          <p:cNvSpPr>
+            <a:spLocks noGrp="1"/>
+          </p:cNvSpPr>
+          <p:nvPr>
+            <p:ph type="title"/>
+          </p:nvPr>
+        </p:nvSpPr>
+        <p:spPr/>
+        <p:txBody>
+          <a:bodyPr/>
+          <a:lstStyle/>
+          <a:p>
+            <a:r>
+              <a:rPr lang="en-US" dirty="0" smtClean="0"/>
+              <a:t>Worked out example</a:t>
+            </a:r>
+            <a:endParaRPr lang="en-US" dirty="0"/>
+          </a:p>
+        </p:txBody>
+      </p:sp>
+    </p:spTree>
+    <p:extLst>
+      <p:ext uri="{BB962C8B-B14F-4D97-AF65-F5344CB8AC3E}">
+        <p14:creationId xmlns:p14="http://schemas.microsoft.com/office/powerpoint/2010/main" val="1862634637"/>
+      </p:ext>
+    </p:extLst>
+  </p:cSld>
+  <p:clrMapOvr>
+    <a:masterClrMapping/>
+  </p:clrMapOvr>
+</p:sld>
+</file>
+
+<file path=ppt/slides/slide7.xml><?xml version="1.0" encoding="utf-8"?>
+<p:sld xmlns:a="http://schemas.openxmlformats.org/drawingml/2006/main" xmlns:r="http://schemas.openxmlformats.org/officeDocument/2006/relationships" xmlns:p="http://schemas.openxmlformats.org/presentationml/2006/main">
+  <p:cSld>
+    <p:spTree>
+      <p:nvGrpSpPr>
+        <p:cNvPr id="1" name=""/>
+        <p:cNvGrpSpPr/>
+        <p:nvPr/>
+      </p:nvGrpSpPr>
+      <p:grpSpPr>
+        <a:xfrm>
+          <a:off x="0" y="0"/>
+          <a:ext cx="0" cy="0"/>
+          <a:chOff x="0" y="0"/>
+          <a:chExt cx="0" cy="0"/>
+        </a:xfrm>
+      </p:grpSpPr>
+      <p:sp>
+        <p:nvSpPr>
+          <p:cNvPr id="2" name="Title 1"/>
+          <p:cNvSpPr>
+            <a:spLocks noGrp="1"/>
+          </p:cNvSpPr>
+          <p:nvPr>
+            <p:ph type="title"/>
+          </p:nvPr>
+        </p:nvSpPr>
+        <p:spPr/>
+        <p:txBody>
+          <a:bodyPr/>
+          <a:lstStyle/>
+          <a:p>
+            <a:r>
+              <a:rPr lang="en-US" dirty="0" smtClean="0"/>
+              <a:t>Compiling to </a:t>
+            </a:r>
+            <a:r>
+              <a:rPr lang="en-US" dirty="0" err="1" smtClean="0"/>
+              <a:t>dRMT</a:t>
+            </a:r>
+            <a:endParaRPr lang="en-US" dirty="0"/>
+          </a:p>
+        </p:txBody>
+      </p:sp>
+      <p:sp>
+        <p:nvSpPr>
+          <p:cNvPr id="3" name="Content Placeholder 2"/>
+          <p:cNvSpPr>
+            <a:spLocks noGrp="1"/>
+          </p:cNvSpPr>
+          <p:nvPr>
+            <p:ph idx="1"/>
+          </p:nvPr>
+        </p:nvSpPr>
+        <p:spPr/>
+        <p:txBody>
+          <a:bodyPr/>
+          <a:lstStyle/>
+          <a:p>
+            <a:r>
+              <a:rPr lang="en-US" dirty="0" smtClean="0"/>
+              <a:t>Cyclic scheduling</a:t>
+            </a:r>
+            <a:endParaRPr lang="en-US" dirty="0"/>
+          </a:p>
+        </p:txBody>
+      </p:sp>
+    </p:spTree>
+    <p:extLst>
+      <p:ext uri="{BB962C8B-B14F-4D97-AF65-F5344CB8AC3E}">
+        <p14:creationId xmlns:p14="http://schemas.microsoft.com/office/powerpoint/2010/main" val="781832897"/>
+      </p:ext>
+    </p:extLst>
+  </p:cSld>
+  <p:clrMapOvr>
+    <a:masterClrMapping/>
+  </p:clrMapOvr>
+</p:sld>
+</file>
+
+<file path=ppt/slides/slide8.xml><?xml version="1.0" encoding="utf-8"?>
+<p:sld xmlns:a="http://schemas.openxmlformats.org/drawingml/2006/main" xmlns:r="http://schemas.openxmlformats.org/officeDocument/2006/relationships" xmlns:p="http://schemas.openxmlformats.org/presentationml/2006/main">
+  <p:cSld>
+    <p:spTree>
+      <p:nvGrpSpPr>
+        <p:cNvPr id="1" name=""/>
+        <p:cNvGrpSpPr/>
+        <p:nvPr/>
+      </p:nvGrpSpPr>
+      <p:grpSpPr>
+        <a:xfrm>
+          <a:off x="0" y="0"/>
+          <a:ext cx="0" cy="0"/>
+          <a:chOff x="0" y="0"/>
+          <a:chExt cx="0" cy="0"/>
+        </a:xfrm>
+      </p:grpSpPr>
+      <p:sp>
+        <p:nvSpPr>
+          <p:cNvPr id="2" name="Title 1"/>
+          <p:cNvSpPr>
+            <a:spLocks noGrp="1"/>
+          </p:cNvSpPr>
+          <p:nvPr>
+            <p:ph type="title"/>
+          </p:nvPr>
+        </p:nvSpPr>
+        <p:spPr/>
+        <p:txBody>
+          <a:bodyPr/>
+          <a:lstStyle/>
+          <a:p>
+            <a:r>
+              <a:rPr lang="en-US" dirty="0" smtClean="0"/>
+              <a:t>Results: </a:t>
+            </a:r>
+            <a:r>
+              <a:rPr lang="en-US" smtClean="0"/>
+              <a:t>performance cliffs</a:t>
+            </a:r>
+            <a:endParaRPr lang="en-US" dirty="0"/>
+          </a:p>
+        </p:txBody>
+      </p:sp>
+      <p:sp>
+        <p:nvSpPr>
+          <p:cNvPr id="3" name="Content Placeholder 2"/>
+          <p:cNvSpPr>
+            <a:spLocks noGrp="1"/>
+          </p:cNvSpPr>
+          <p:nvPr>
+            <p:ph idx="1"/>
+          </p:nvPr>
+        </p:nvSpPr>
+        <p:spPr/>
+        <p:txBody>
+          <a:bodyPr/>
+          <a:lstStyle/>
+          <a:p>
+            <a:r>
+              <a:rPr lang="en-US" smtClean="0"/>
+              <a:t>Cyclic scheduling</a:t>
+            </a:r>
+            <a:endParaRPr lang="en-US"/>
+          </a:p>
+        </p:txBody>
+      </p:sp>
+    </p:spTree>
+    <p:extLst>
+      <p:ext uri="{BB962C8B-B14F-4D97-AF65-F5344CB8AC3E}">
+        <p14:creationId xmlns:p14="http://schemas.microsoft.com/office/powerpoint/2010/main" val="1186650806"/>
       </p:ext>
     </p:extLst>
   </p:cSld>

</xml_diff>

<commit_message>
Add more slide skeletons
</commit_message>
<xml_diff>
--- a/drmt.pptx
+++ b/drmt.pptx
@@ -5,7 +5,7 @@
     <p:sldMasterId id="2147483648" r:id="rId1"/>
   </p:sldMasterIdLst>
   <p:notesMasterIdLst>
-    <p:notesMasterId r:id="rId10"/>
+    <p:notesMasterId r:id="rId12"/>
   </p:notesMasterIdLst>
   <p:sldIdLst>
     <p:sldId id="256" r:id="rId2"/>
@@ -15,7 +15,9 @@
     <p:sldId id="260" r:id="rId6"/>
     <p:sldId id="261" r:id="rId7"/>
     <p:sldId id="262" r:id="rId8"/>
-    <p:sldId id="263" r:id="rId9"/>
+    <p:sldId id="264" r:id="rId9"/>
+    <p:sldId id="265" r:id="rId10"/>
+    <p:sldId id="263" r:id="rId11"/>
   </p:sldIdLst>
   <p:sldSz cx="12192000" cy="6858000"/>
   <p:notesSz cx="6858000" cy="9144000"/>
@@ -3666,6 +3668,86 @@
 </p:sld>
 </file>
 
+<file path=ppt/slides/slide10.xml><?xml version="1.0" encoding="utf-8"?>
+<p:sld xmlns:a="http://schemas.openxmlformats.org/drawingml/2006/main" xmlns:r="http://schemas.openxmlformats.org/officeDocument/2006/relationships" xmlns:p="http://schemas.openxmlformats.org/presentationml/2006/main">
+  <p:cSld>
+    <p:spTree>
+      <p:nvGrpSpPr>
+        <p:cNvPr id="1" name=""/>
+        <p:cNvGrpSpPr/>
+        <p:nvPr/>
+      </p:nvGrpSpPr>
+      <p:grpSpPr>
+        <a:xfrm>
+          <a:off x="0" y="0"/>
+          <a:ext cx="0" cy="0"/>
+          <a:chOff x="0" y="0"/>
+          <a:chExt cx="0" cy="0"/>
+        </a:xfrm>
+      </p:grpSpPr>
+      <p:sp>
+        <p:nvSpPr>
+          <p:cNvPr id="2" name="Title 1"/>
+          <p:cNvSpPr>
+            <a:spLocks noGrp="1"/>
+          </p:cNvSpPr>
+          <p:nvPr>
+            <p:ph type="title"/>
+          </p:nvPr>
+        </p:nvSpPr>
+        <p:spPr/>
+        <p:txBody>
+          <a:bodyPr/>
+          <a:lstStyle/>
+          <a:p>
+            <a:r>
+              <a:rPr lang="en-US" dirty="0" smtClean="0"/>
+              <a:t>Results: </a:t>
+            </a:r>
+            <a:r>
+              <a:rPr lang="en-US" smtClean="0"/>
+              <a:t>performance cliffs</a:t>
+            </a:r>
+            <a:endParaRPr lang="en-US" dirty="0"/>
+          </a:p>
+        </p:txBody>
+      </p:sp>
+      <p:sp>
+        <p:nvSpPr>
+          <p:cNvPr id="3" name="Content Placeholder 2"/>
+          <p:cNvSpPr>
+            <a:spLocks noGrp="1"/>
+          </p:cNvSpPr>
+          <p:nvPr>
+            <p:ph idx="1"/>
+          </p:nvPr>
+        </p:nvSpPr>
+        <p:spPr/>
+        <p:txBody>
+          <a:bodyPr/>
+          <a:lstStyle/>
+          <a:p>
+            <a:r>
+              <a:rPr lang="en-US" smtClean="0"/>
+              <a:t>Cyclic scheduling</a:t>
+            </a:r>
+            <a:endParaRPr lang="en-US"/>
+          </a:p>
+        </p:txBody>
+      </p:sp>
+    </p:spTree>
+    <p:extLst>
+      <p:ext uri="{BB962C8B-B14F-4D97-AF65-F5344CB8AC3E}">
+        <p14:creationId xmlns:p14="http://schemas.microsoft.com/office/powerpoint/2010/main" val="1186650806"/>
+      </p:ext>
+    </p:extLst>
+  </p:cSld>
+  <p:clrMapOvr>
+    <a:masterClrMapping/>
+  </p:clrMapOvr>
+</p:sld>
+</file>
+
 <file path=ppt/slides/slide2.xml><?xml version="1.0" encoding="utf-8"?>
 <p:sld xmlns:a="http://schemas.openxmlformats.org/drawingml/2006/main" xmlns:r="http://schemas.openxmlformats.org/officeDocument/2006/relationships" xmlns:p="http://schemas.openxmlformats.org/presentationml/2006/main">
   <p:cSld>
@@ -3700,11 +3782,7 @@
           <a:p>
             <a:r>
               <a:rPr lang="en-US" dirty="0" smtClean="0"/>
-              <a:t>Programmable </a:t>
-            </a:r>
-            <a:r>
-              <a:rPr lang="en-US" dirty="0" smtClean="0"/>
-              <a:t>Switches (e.g., RMT)</a:t>
+              <a:t>Programmable Switches (e.g., RMT)</a:t>
             </a:r>
             <a:endParaRPr lang="en-US" dirty="0"/>
           </a:p>
@@ -7993,11 +8071,7 @@
           <a:p>
             <a:r>
               <a:rPr lang="en-US" dirty="0" smtClean="0"/>
-              <a:t>Results: </a:t>
-            </a:r>
-            <a:r>
-              <a:rPr lang="en-US" smtClean="0"/>
-              <a:t>performance cliffs</a:t>
+              <a:t>ILP formulation</a:t>
             </a:r>
             <a:endParaRPr lang="en-US" dirty="0"/>
           </a:p>
@@ -8018,10 +8092,6 @@
           <a:bodyPr/>
           <a:lstStyle/>
           <a:p>
-            <a:r>
-              <a:rPr lang="en-US" smtClean="0"/>
-              <a:t>Cyclic scheduling</a:t>
-            </a:r>
             <a:endParaRPr lang="en-US"/>
           </a:p>
         </p:txBody>
@@ -8029,7 +8099,79 @@
     </p:spTree>
     <p:extLst>
       <p:ext uri="{BB962C8B-B14F-4D97-AF65-F5344CB8AC3E}">
-        <p14:creationId xmlns:p14="http://schemas.microsoft.com/office/powerpoint/2010/main" val="1186650806"/>
+        <p14:creationId xmlns:p14="http://schemas.microsoft.com/office/powerpoint/2010/main" val="170795810"/>
+      </p:ext>
+    </p:extLst>
+  </p:cSld>
+  <p:clrMapOvr>
+    <a:masterClrMapping/>
+  </p:clrMapOvr>
+</p:sld>
+</file>
+
+<file path=ppt/slides/slide9.xml><?xml version="1.0" encoding="utf-8"?>
+<p:sld xmlns:a="http://schemas.openxmlformats.org/drawingml/2006/main" xmlns:r="http://schemas.openxmlformats.org/officeDocument/2006/relationships" xmlns:p="http://schemas.openxmlformats.org/presentationml/2006/main">
+  <p:cSld>
+    <p:spTree>
+      <p:nvGrpSpPr>
+        <p:cNvPr id="1" name=""/>
+        <p:cNvGrpSpPr/>
+        <p:nvPr/>
+      </p:nvGrpSpPr>
+      <p:grpSpPr>
+        <a:xfrm>
+          <a:off x="0" y="0"/>
+          <a:ext cx="0" cy="0"/>
+          <a:chOff x="0" y="0"/>
+          <a:chExt cx="0" cy="0"/>
+        </a:xfrm>
+      </p:grpSpPr>
+      <p:sp>
+        <p:nvSpPr>
+          <p:cNvPr id="2" name="Title 1"/>
+          <p:cNvSpPr>
+            <a:spLocks noGrp="1"/>
+          </p:cNvSpPr>
+          <p:nvPr>
+            <p:ph type="title"/>
+          </p:nvPr>
+        </p:nvSpPr>
+        <p:spPr/>
+        <p:txBody>
+          <a:bodyPr/>
+          <a:lstStyle/>
+          <a:p>
+            <a:r>
+              <a:rPr lang="en-US" smtClean="0"/>
+              <a:t>Result: table from papers</a:t>
+            </a:r>
+            <a:endParaRPr lang="en-US"/>
+          </a:p>
+        </p:txBody>
+      </p:sp>
+      <p:sp>
+        <p:nvSpPr>
+          <p:cNvPr id="3" name="Content Placeholder 2"/>
+          <p:cNvSpPr>
+            <a:spLocks noGrp="1"/>
+          </p:cNvSpPr>
+          <p:nvPr>
+            <p:ph idx="1"/>
+          </p:nvPr>
+        </p:nvSpPr>
+        <p:spPr/>
+        <p:txBody>
+          <a:bodyPr/>
+          <a:lstStyle/>
+          <a:p>
+            <a:endParaRPr lang="en-US"/>
+          </a:p>
+        </p:txBody>
+      </p:sp>
+    </p:spTree>
+    <p:extLst>
+      <p:ext uri="{BB962C8B-B14F-4D97-AF65-F5344CB8AC3E}">
+        <p14:creationId xmlns:p14="http://schemas.microsoft.com/office/powerpoint/2010/main" val="1469896076"/>
       </p:ext>
     </p:extLst>
   </p:cSld>

</xml_diff>

<commit_message>
Write out a few more slides including compilation slide
</commit_message>
<xml_diff>
--- a/drmt.pptx
+++ b/drmt.pptx
@@ -5,7 +5,7 @@
     <p:sldMasterId id="2147483648" r:id="rId1"/>
   </p:sldMasterIdLst>
   <p:notesMasterIdLst>
-    <p:notesMasterId r:id="rId13"/>
+    <p:notesMasterId r:id="rId16"/>
   </p:notesMasterIdLst>
   <p:sldIdLst>
     <p:sldId id="256" r:id="rId2"/>
@@ -16,9 +16,12 @@
     <p:sldId id="269" r:id="rId7"/>
     <p:sldId id="261" r:id="rId8"/>
     <p:sldId id="262" r:id="rId9"/>
-    <p:sldId id="264" r:id="rId10"/>
-    <p:sldId id="265" r:id="rId11"/>
-    <p:sldId id="263" r:id="rId12"/>
+    <p:sldId id="270" r:id="rId10"/>
+    <p:sldId id="271" r:id="rId11"/>
+    <p:sldId id="264" r:id="rId12"/>
+    <p:sldId id="272" r:id="rId13"/>
+    <p:sldId id="265" r:id="rId14"/>
+    <p:sldId id="263" r:id="rId15"/>
   </p:sldIdLst>
   <p:sldSz cx="12192000" cy="6858000"/>
   <p:notesSz cx="6858000" cy="9144000"/>
@@ -558,6 +561,98 @@
     <p:extLst>
       <p:ext uri="{BB962C8B-B14F-4D97-AF65-F5344CB8AC3E}">
         <p14:creationId xmlns:p14="http://schemas.microsoft.com/office/powerpoint/2010/main" val="349096691"/>
+      </p:ext>
+    </p:extLst>
+  </p:cSld>
+  <p:clrMapOvr>
+    <a:masterClrMapping/>
+  </p:clrMapOvr>
+</p:notes>
+</file>
+
+<file path=ppt/notesSlides/notesSlide2.xml><?xml version="1.0" encoding="utf-8"?>
+<p:notes xmlns:a="http://schemas.openxmlformats.org/drawingml/2006/main" xmlns:r="http://schemas.openxmlformats.org/officeDocument/2006/relationships" xmlns:p="http://schemas.openxmlformats.org/presentationml/2006/main">
+  <p:cSld>
+    <p:spTree>
+      <p:nvGrpSpPr>
+        <p:cNvPr id="1" name=""/>
+        <p:cNvGrpSpPr/>
+        <p:nvPr/>
+      </p:nvGrpSpPr>
+      <p:grpSpPr>
+        <a:xfrm>
+          <a:off x="0" y="0"/>
+          <a:ext cx="0" cy="0"/>
+          <a:chOff x="0" y="0"/>
+          <a:chExt cx="0" cy="0"/>
+        </a:xfrm>
+      </p:grpSpPr>
+      <p:sp>
+        <p:nvSpPr>
+          <p:cNvPr id="2" name="Slide Image Placeholder 1"/>
+          <p:cNvSpPr>
+            <a:spLocks noGrp="1" noRot="1" noChangeAspect="1"/>
+          </p:cNvSpPr>
+          <p:nvPr>
+            <p:ph type="sldImg"/>
+          </p:nvPr>
+        </p:nvSpPr>
+        <p:spPr/>
+      </p:sp>
+      <p:sp>
+        <p:nvSpPr>
+          <p:cNvPr id="3" name="Notes Placeholder 2"/>
+          <p:cNvSpPr>
+            <a:spLocks noGrp="1"/>
+          </p:cNvSpPr>
+          <p:nvPr>
+            <p:ph type="body" idx="1"/>
+          </p:nvPr>
+        </p:nvSpPr>
+        <p:spPr/>
+        <p:txBody>
+          <a:bodyPr/>
+          <a:lstStyle/>
+          <a:p>
+            <a:r>
+              <a:rPr lang="en-US" dirty="0" smtClean="0"/>
+              <a:t>We are going to assume one packet per clock cycle. It’s easy to extend it to more</a:t>
+            </a:r>
+            <a:r>
+              <a:rPr lang="en-US" baseline="0" dirty="0" smtClean="0"/>
+              <a:t> general throughputs.</a:t>
+            </a:r>
+            <a:endParaRPr lang="en-US" dirty="0"/>
+          </a:p>
+        </p:txBody>
+      </p:sp>
+      <p:sp>
+        <p:nvSpPr>
+          <p:cNvPr id="4" name="Slide Number Placeholder 3"/>
+          <p:cNvSpPr>
+            <a:spLocks noGrp="1"/>
+          </p:cNvSpPr>
+          <p:nvPr>
+            <p:ph type="sldNum" sz="quarter" idx="10"/>
+          </p:nvPr>
+        </p:nvSpPr>
+        <p:spPr/>
+        <p:txBody>
+          <a:bodyPr/>
+          <a:lstStyle/>
+          <a:p>
+            <a:fld id="{4B72050E-C83F-DC4E-B064-9A7B7E00D2A3}" type="slidenum">
+              <a:rPr lang="en-US" smtClean="0"/>
+              <a:t>11</a:t>
+            </a:fld>
+            <a:endParaRPr lang="en-US"/>
+          </a:p>
+        </p:txBody>
+      </p:sp>
+    </p:spTree>
+    <p:extLst>
+      <p:ext uri="{BB962C8B-B14F-4D97-AF65-F5344CB8AC3E}">
+        <p14:creationId xmlns:p14="http://schemas.microsoft.com/office/powerpoint/2010/main" val="1785872854"/>
       </p:ext>
     </p:extLst>
   </p:cSld>
@@ -3709,6 +3804,310 @@
           <a:lstStyle/>
           <a:p>
             <a:r>
+              <a:rPr lang="en-US" dirty="0" smtClean="0"/>
+              <a:t>Operation Dependency Graph</a:t>
+            </a:r>
+            <a:endParaRPr lang="en-US" dirty="0"/>
+          </a:p>
+        </p:txBody>
+      </p:sp>
+      <p:sp>
+        <p:nvSpPr>
+          <p:cNvPr id="3" name="Content Placeholder 2"/>
+          <p:cNvSpPr>
+            <a:spLocks noGrp="1"/>
+          </p:cNvSpPr>
+          <p:nvPr>
+            <p:ph idx="1"/>
+          </p:nvPr>
+        </p:nvSpPr>
+        <p:spPr/>
+        <p:txBody>
+          <a:bodyPr/>
+          <a:lstStyle/>
+          <a:p>
+            <a:r>
+              <a:rPr lang="en-US" dirty="0" smtClean="0"/>
+              <a:t>Straightforward to generate by extending p4-hlir</a:t>
+            </a:r>
+          </a:p>
+          <a:p>
+            <a:endParaRPr lang="en-US" dirty="0"/>
+          </a:p>
+          <a:p>
+            <a:r>
+              <a:rPr lang="en-US" dirty="0" smtClean="0"/>
+              <a:t>TODO: Insert figure from paper</a:t>
+            </a:r>
+            <a:endParaRPr lang="en-US" dirty="0"/>
+          </a:p>
+        </p:txBody>
+      </p:sp>
+    </p:spTree>
+    <p:extLst>
+      <p:ext uri="{BB962C8B-B14F-4D97-AF65-F5344CB8AC3E}">
+        <p14:creationId xmlns:p14="http://schemas.microsoft.com/office/powerpoint/2010/main" val="1266169706"/>
+      </p:ext>
+    </p:extLst>
+  </p:cSld>
+  <p:clrMapOvr>
+    <a:masterClrMapping/>
+  </p:clrMapOvr>
+</p:sld>
+</file>
+
+<file path=ppt/slides/slide11.xml><?xml version="1.0" encoding="utf-8"?>
+<p:sld xmlns:a="http://schemas.openxmlformats.org/drawingml/2006/main" xmlns:r="http://schemas.openxmlformats.org/officeDocument/2006/relationships" xmlns:p="http://schemas.openxmlformats.org/presentationml/2006/main">
+  <p:cSld>
+    <p:spTree>
+      <p:nvGrpSpPr>
+        <p:cNvPr id="1" name=""/>
+        <p:cNvGrpSpPr/>
+        <p:nvPr/>
+      </p:nvGrpSpPr>
+      <p:grpSpPr>
+        <a:xfrm>
+          <a:off x="0" y="0"/>
+          <a:ext cx="0" cy="0"/>
+          <a:chOff x="0" y="0"/>
+          <a:chExt cx="0" cy="0"/>
+        </a:xfrm>
+      </p:grpSpPr>
+      <p:sp>
+        <p:nvSpPr>
+          <p:cNvPr id="2" name="Title 1"/>
+          <p:cNvSpPr>
+            <a:spLocks noGrp="1"/>
+          </p:cNvSpPr>
+          <p:nvPr>
+            <p:ph type="title"/>
+          </p:nvPr>
+        </p:nvSpPr>
+        <p:spPr/>
+        <p:txBody>
+          <a:bodyPr/>
+          <a:lstStyle/>
+          <a:p>
+            <a:r>
+              <a:rPr lang="en-US" dirty="0" smtClean="0"/>
+              <a:t>The compilation problem</a:t>
+            </a:r>
+            <a:endParaRPr lang="en-US" dirty="0"/>
+          </a:p>
+        </p:txBody>
+      </p:sp>
+      <p:sp>
+        <p:nvSpPr>
+          <p:cNvPr id="3" name="Content Placeholder 2"/>
+          <p:cNvSpPr>
+            <a:spLocks noGrp="1"/>
+          </p:cNvSpPr>
+          <p:nvPr>
+            <p:ph idx="1"/>
+          </p:nvPr>
+        </p:nvSpPr>
+        <p:spPr/>
+        <p:txBody>
+          <a:bodyPr>
+            <a:normAutofit fontScale="92500" lnSpcReduction="10000"/>
+          </a:bodyPr>
+          <a:lstStyle/>
+          <a:p>
+            <a:r>
+              <a:rPr lang="en-US" dirty="0" smtClean="0"/>
+              <a:t>Each processor handles a new packet every N cycles (N procs)</a:t>
+            </a:r>
+          </a:p>
+          <a:p>
+            <a:endParaRPr lang="en-US" dirty="0"/>
+          </a:p>
+          <a:p>
+            <a:r>
+              <a:rPr lang="en-US" dirty="0" smtClean="0"/>
+              <a:t>Schedule each operation so that schedule can be repeated every N cycles</a:t>
+            </a:r>
+          </a:p>
+          <a:p>
+            <a:pPr lvl="1"/>
+            <a:r>
+              <a:rPr lang="en-US" dirty="0" smtClean="0"/>
+              <a:t>Assign each operation a start time relative to the first operation</a:t>
+            </a:r>
+          </a:p>
+          <a:p>
+            <a:pPr lvl="1"/>
+            <a:r>
+              <a:rPr lang="en-US" dirty="0" smtClean="0"/>
+              <a:t>Group operations into buckets based on the reminder when the operation start time is divided by N.</a:t>
+            </a:r>
+          </a:p>
+          <a:p>
+            <a:pPr lvl="1"/>
+            <a:r>
+              <a:rPr lang="en-US" dirty="0"/>
+              <a:t>T</a:t>
+            </a:r>
+            <a:r>
+              <a:rPr lang="en-US" dirty="0" smtClean="0"/>
+              <a:t>otal match/action requirements in a bucket &lt;= match/action capacity</a:t>
+            </a:r>
+          </a:p>
+          <a:p>
+            <a:pPr lvl="1"/>
+            <a:r>
+              <a:rPr lang="en-US" dirty="0" smtClean="0"/>
+              <a:t>Dependencies must be satisfied between operations</a:t>
+            </a:r>
+          </a:p>
+          <a:p>
+            <a:endParaRPr lang="en-US" dirty="0" smtClean="0"/>
+          </a:p>
+          <a:p>
+            <a:r>
+              <a:rPr lang="en-US" dirty="0" smtClean="0"/>
+              <a:t>Can be formulated as an ILP</a:t>
+            </a:r>
+            <a:endParaRPr lang="en-US" dirty="0"/>
+          </a:p>
+          <a:p>
+            <a:endParaRPr lang="en-US" dirty="0" smtClean="0"/>
+          </a:p>
+          <a:p>
+            <a:endParaRPr lang="en-US" dirty="0"/>
+          </a:p>
+          <a:p>
+            <a:endParaRPr lang="en-US" dirty="0" smtClean="0"/>
+          </a:p>
+          <a:p>
+            <a:endParaRPr lang="en-US" dirty="0"/>
+          </a:p>
+          <a:p>
+            <a:endParaRPr lang="en-US" dirty="0"/>
+          </a:p>
+        </p:txBody>
+      </p:sp>
+    </p:spTree>
+    <p:extLst>
+      <p:ext uri="{BB962C8B-B14F-4D97-AF65-F5344CB8AC3E}">
+        <p14:creationId xmlns:p14="http://schemas.microsoft.com/office/powerpoint/2010/main" val="170795810"/>
+      </p:ext>
+    </p:extLst>
+  </p:cSld>
+  <p:clrMapOvr>
+    <a:masterClrMapping/>
+  </p:clrMapOvr>
+</p:sld>
+</file>
+
+<file path=ppt/slides/slide12.xml><?xml version="1.0" encoding="utf-8"?>
+<p:sld xmlns:a="http://schemas.openxmlformats.org/drawingml/2006/main" xmlns:r="http://schemas.openxmlformats.org/officeDocument/2006/relationships" xmlns:p="http://schemas.openxmlformats.org/presentationml/2006/main">
+  <p:cSld>
+    <p:spTree>
+      <p:nvGrpSpPr>
+        <p:cNvPr id="1" name=""/>
+        <p:cNvGrpSpPr/>
+        <p:nvPr/>
+      </p:nvGrpSpPr>
+      <p:grpSpPr>
+        <a:xfrm>
+          <a:off x="0" y="0"/>
+          <a:ext cx="0" cy="0"/>
+          <a:chOff x="0" y="0"/>
+          <a:chExt cx="0" cy="0"/>
+        </a:xfrm>
+      </p:grpSpPr>
+      <p:sp>
+        <p:nvSpPr>
+          <p:cNvPr id="2" name="Title 1"/>
+          <p:cNvSpPr>
+            <a:spLocks noGrp="1"/>
+          </p:cNvSpPr>
+          <p:nvPr>
+            <p:ph type="title"/>
+          </p:nvPr>
+        </p:nvSpPr>
+        <p:spPr/>
+        <p:txBody>
+          <a:bodyPr/>
+          <a:lstStyle/>
+          <a:p>
+            <a:r>
+              <a:rPr lang="en-US" dirty="0" smtClean="0"/>
+              <a:t>Animation </a:t>
+            </a:r>
+            <a:r>
+              <a:rPr lang="en-US" smtClean="0"/>
+              <a:t>of compilation</a:t>
+            </a:r>
+            <a:endParaRPr lang="en-US"/>
+          </a:p>
+        </p:txBody>
+      </p:sp>
+      <p:sp>
+        <p:nvSpPr>
+          <p:cNvPr id="3" name="Content Placeholder 2"/>
+          <p:cNvSpPr>
+            <a:spLocks noGrp="1"/>
+          </p:cNvSpPr>
+          <p:nvPr>
+            <p:ph idx="1"/>
+          </p:nvPr>
+        </p:nvSpPr>
+        <p:spPr/>
+        <p:txBody>
+          <a:bodyPr/>
+          <a:lstStyle/>
+          <a:p>
+            <a:endParaRPr lang="en-US"/>
+          </a:p>
+        </p:txBody>
+      </p:sp>
+    </p:spTree>
+    <p:extLst>
+      <p:ext uri="{BB962C8B-B14F-4D97-AF65-F5344CB8AC3E}">
+        <p14:creationId xmlns:p14="http://schemas.microsoft.com/office/powerpoint/2010/main" val="431250624"/>
+      </p:ext>
+    </p:extLst>
+  </p:cSld>
+  <p:clrMapOvr>
+    <a:masterClrMapping/>
+  </p:clrMapOvr>
+</p:sld>
+</file>
+
+<file path=ppt/slides/slide13.xml><?xml version="1.0" encoding="utf-8"?>
+<p:sld xmlns:a="http://schemas.openxmlformats.org/drawingml/2006/main" xmlns:r="http://schemas.openxmlformats.org/officeDocument/2006/relationships" xmlns:p="http://schemas.openxmlformats.org/presentationml/2006/main">
+  <p:cSld>
+    <p:spTree>
+      <p:nvGrpSpPr>
+        <p:cNvPr id="1" name=""/>
+        <p:cNvGrpSpPr/>
+        <p:nvPr/>
+      </p:nvGrpSpPr>
+      <p:grpSpPr>
+        <a:xfrm>
+          <a:off x="0" y="0"/>
+          <a:ext cx="0" cy="0"/>
+          <a:chOff x="0" y="0"/>
+          <a:chExt cx="0" cy="0"/>
+        </a:xfrm>
+      </p:grpSpPr>
+      <p:sp>
+        <p:nvSpPr>
+          <p:cNvPr id="2" name="Title 1"/>
+          <p:cNvSpPr>
+            <a:spLocks noGrp="1"/>
+          </p:cNvSpPr>
+          <p:nvPr>
+            <p:ph type="title"/>
+          </p:nvPr>
+        </p:nvSpPr>
+        <p:spPr/>
+        <p:txBody>
+          <a:bodyPr/>
+          <a:lstStyle/>
+          <a:p>
+            <a:r>
               <a:rPr lang="en-US" smtClean="0"/>
               <a:t>Result: table from papers</a:t>
             </a:r>
@@ -3748,7 +4147,7 @@
 </p:sld>
 </file>
 
-<file path=ppt/slides/slide11.xml><?xml version="1.0" encoding="utf-8"?>
+<file path=ppt/slides/slide14.xml><?xml version="1.0" encoding="utf-8"?>
 <p:sld xmlns:a="http://schemas.openxmlformats.org/drawingml/2006/main" xmlns:r="http://schemas.openxmlformats.org/officeDocument/2006/relationships" xmlns:p="http://schemas.openxmlformats.org/presentationml/2006/main">
   <p:cSld>
     <p:spTree>
@@ -3862,11 +4261,7 @@
           <a:p>
             <a:r>
               <a:rPr lang="en-US" dirty="0" smtClean="0"/>
-              <a:t>Programmable </a:t>
-            </a:r>
-            <a:r>
-              <a:rPr lang="en-US" dirty="0" smtClean="0"/>
-              <a:t>Switches (e.g., RMT)</a:t>
+              <a:t>Programmable Switches (e.g., RMT)</a:t>
             </a:r>
             <a:endParaRPr lang="en-US" dirty="0"/>
           </a:p>
@@ -10578,8 +10973,16 @@
               <a:t>Compiling to </a:t>
             </a:r>
             <a:r>
+              <a:rPr lang="en-US" dirty="0" smtClean="0"/>
+              <a:t>the </a:t>
+            </a:r>
+            <a:r>
               <a:rPr lang="en-US" dirty="0" err="1" smtClean="0"/>
               <a:t>dRMT</a:t>
+            </a:r>
+            <a:r>
+              <a:rPr lang="en-US" dirty="0" smtClean="0"/>
+              <a:t> architecture</a:t>
             </a:r>
             <a:endParaRPr lang="en-US" dirty="0"/>
           </a:p>
@@ -10602,34 +11005,24 @@
           <a:p>
             <a:r>
               <a:rPr lang="en-US" dirty="0" smtClean="0"/>
-              <a:t>Given a throughput </a:t>
-            </a:r>
-            <a:r>
-              <a:rPr lang="en-US" dirty="0" err="1" smtClean="0"/>
-              <a:t>th</a:t>
+              <a:t>Given </a:t>
             </a:r>
             <a:r>
               <a:rPr lang="en-US" dirty="0" smtClean="0"/>
-              <a:t>,</a:t>
-            </a:r>
-            <a:r>
-              <a:rPr lang="en-US" dirty="0"/>
-              <a:t> </a:t>
-            </a:r>
+              <a:t>a P4 program.</a:t>
+            </a:r>
+          </a:p>
+          <a:p>
+            <a:endParaRPr lang="en-US" dirty="0"/>
+          </a:p>
+          <a:p>
             <a:r>
               <a:rPr lang="en-US" dirty="0" smtClean="0"/>
-              <a:t>find minimum latency</a:t>
+              <a:t>Generate a periodic schedule of operations across processors without violating resource constraints (match capacity, action capacity, and memory capacity)</a:t>
             </a:r>
           </a:p>
           <a:p>
             <a:endParaRPr lang="en-US" dirty="0"/>
-          </a:p>
-          <a:p>
-            <a:r>
-              <a:rPr lang="en-US" smtClean="0"/>
-              <a:t>May require inserting no-ops</a:t>
-            </a:r>
-            <a:endParaRPr lang="en-US" dirty="0" smtClean="0"/>
           </a:p>
         </p:txBody>
       </p:sp>
@@ -10687,7 +11080,7 @@
           <a:p>
             <a:r>
               <a:rPr lang="en-US" dirty="0" smtClean="0"/>
-              <a:t>ILP formulation</a:t>
+              <a:t>Compiling: fine-grained dependencies</a:t>
             </a:r>
             <a:endParaRPr lang="en-US" dirty="0"/>
           </a:p>
@@ -10705,17 +11098,79 @@
         </p:nvSpPr>
         <p:spPr/>
         <p:txBody>
-          <a:bodyPr/>
-          <a:lstStyle/>
-          <a:p>
-            <a:endParaRPr lang="en-US"/>
+          <a:bodyPr>
+            <a:normAutofit fontScale="92500" lnSpcReduction="20000"/>
+          </a:bodyPr>
+          <a:lstStyle/>
+          <a:p>
+            <a:r>
+              <a:rPr lang="en-US" dirty="0" smtClean="0"/>
+              <a:t>P4 captures coarse-grained dependencies between tables in its Table Dependency Graph; each node is a table</a:t>
+            </a:r>
+          </a:p>
+          <a:p>
+            <a:endParaRPr lang="en-US" dirty="0"/>
+          </a:p>
+          <a:p>
+            <a:r>
+              <a:rPr lang="en-US" dirty="0" smtClean="0"/>
+              <a:t>We use fine-grained dependencies in Operation Dependency Graph with one node for each match/action operation</a:t>
+            </a:r>
+          </a:p>
+          <a:p>
+            <a:endParaRPr lang="en-US" dirty="0"/>
+          </a:p>
+          <a:p>
+            <a:r>
+              <a:rPr lang="en-US" dirty="0" smtClean="0"/>
+              <a:t>Node attribute: Number of primitive actions or match key size</a:t>
+            </a:r>
+          </a:p>
+          <a:p>
+            <a:endParaRPr lang="en-US" dirty="0"/>
+          </a:p>
+          <a:p>
+            <a:r>
+              <a:rPr lang="en-US" dirty="0"/>
+              <a:t>Edge </a:t>
+            </a:r>
+            <a:r>
+              <a:rPr lang="en-US" dirty="0" smtClean="0"/>
+              <a:t>attribute: min. </a:t>
+            </a:r>
+            <a:r>
+              <a:rPr lang="en-US" dirty="0"/>
+              <a:t>latency between </a:t>
+            </a:r>
+            <a:r>
+              <a:rPr lang="en-US" dirty="0" smtClean="0"/>
+              <a:t>operations</a:t>
+            </a:r>
+            <a:endParaRPr lang="en-US" dirty="0"/>
+          </a:p>
+          <a:p>
+            <a:pPr lvl="1"/>
+            <a:r>
+              <a:rPr lang="en-US" dirty="0"/>
+              <a:t>Either the time required to complete a match</a:t>
+            </a:r>
+          </a:p>
+          <a:p>
+            <a:pPr lvl="1"/>
+            <a:r>
+              <a:rPr lang="en-US" dirty="0"/>
+              <a:t>Or the time required to complete an action</a:t>
+            </a:r>
+          </a:p>
+          <a:p>
+            <a:endParaRPr lang="en-US" dirty="0"/>
           </a:p>
         </p:txBody>
       </p:sp>
     </p:spTree>
     <p:extLst>
       <p:ext uri="{BB962C8B-B14F-4D97-AF65-F5344CB8AC3E}">
-        <p14:creationId xmlns:p14="http://schemas.microsoft.com/office/powerpoint/2010/main" val="170795810"/>
+        <p14:creationId xmlns:p14="http://schemas.microsoft.com/office/powerpoint/2010/main" val="1998601008"/>
       </p:ext>
     </p:extLst>
   </p:cSld>

</xml_diff>

<commit_message>
Slide on future work
</commit_message>
<xml_diff>
--- a/drmt.pptx
+++ b/drmt.pptx
@@ -5,7 +5,7 @@
     <p:sldMasterId id="2147483648" r:id="rId1"/>
   </p:sldMasterIdLst>
   <p:notesMasterIdLst>
-    <p:notesMasterId r:id="rId16"/>
+    <p:notesMasterId r:id="rId17"/>
   </p:notesMasterIdLst>
   <p:sldIdLst>
     <p:sldId id="256" r:id="rId2"/>
@@ -22,6 +22,7 @@
     <p:sldId id="272" r:id="rId13"/>
     <p:sldId id="265" r:id="rId14"/>
     <p:sldId id="263" r:id="rId15"/>
+    <p:sldId id="273" r:id="rId16"/>
   </p:sldIdLst>
   <p:sldSz cx="12192000" cy="6858000"/>
   <p:notesSz cx="6858000" cy="9144000"/>
@@ -4227,6 +4228,78 @@
 </p:sld>
 </file>
 
+<file path=ppt/slides/slide15.xml><?xml version="1.0" encoding="utf-8"?>
+<p:sld xmlns:a="http://schemas.openxmlformats.org/drawingml/2006/main" xmlns:r="http://schemas.openxmlformats.org/officeDocument/2006/relationships" xmlns:p="http://schemas.openxmlformats.org/presentationml/2006/main">
+  <p:cSld>
+    <p:spTree>
+      <p:nvGrpSpPr>
+        <p:cNvPr id="1" name=""/>
+        <p:cNvGrpSpPr/>
+        <p:nvPr/>
+      </p:nvGrpSpPr>
+      <p:grpSpPr>
+        <a:xfrm>
+          <a:off x="0" y="0"/>
+          <a:ext cx="0" cy="0"/>
+          <a:chOff x="0" y="0"/>
+          <a:chExt cx="0" cy="0"/>
+        </a:xfrm>
+      </p:grpSpPr>
+      <p:sp>
+        <p:nvSpPr>
+          <p:cNvPr id="2" name="Title 1"/>
+          <p:cNvSpPr>
+            <a:spLocks noGrp="1"/>
+          </p:cNvSpPr>
+          <p:nvPr>
+            <p:ph type="title"/>
+          </p:nvPr>
+        </p:nvSpPr>
+        <p:spPr/>
+        <p:txBody>
+          <a:bodyPr/>
+          <a:lstStyle/>
+          <a:p>
+            <a:r>
+              <a:rPr lang="en-US" dirty="0" smtClean="0"/>
+              <a:t>Future work</a:t>
+            </a:r>
+            <a:endParaRPr lang="en-US" dirty="0"/>
+          </a:p>
+        </p:txBody>
+      </p:sp>
+      <p:sp>
+        <p:nvSpPr>
+          <p:cNvPr id="3" name="Content Placeholder 2"/>
+          <p:cNvSpPr>
+            <a:spLocks noGrp="1"/>
+          </p:cNvSpPr>
+          <p:nvPr>
+            <p:ph idx="1"/>
+          </p:nvPr>
+        </p:nvSpPr>
+        <p:spPr/>
+        <p:txBody>
+          <a:bodyPr/>
+          <a:lstStyle/>
+          <a:p>
+            <a:endParaRPr lang="en-US" dirty="0"/>
+          </a:p>
+        </p:txBody>
+      </p:sp>
+    </p:spTree>
+    <p:extLst>
+      <p:ext uri="{BB962C8B-B14F-4D97-AF65-F5344CB8AC3E}">
+        <p14:creationId xmlns:p14="http://schemas.microsoft.com/office/powerpoint/2010/main" val="586871987"/>
+      </p:ext>
+    </p:extLst>
+  </p:cSld>
+  <p:clrMapOvr>
+    <a:masterClrMapping/>
+  </p:clrMapOvr>
+</p:sld>
+</file>
+
 <file path=ppt/slides/slide2.xml><?xml version="1.0" encoding="utf-8"?>
 <p:sld xmlns:a="http://schemas.openxmlformats.org/drawingml/2006/main" xmlns:r="http://schemas.openxmlformats.org/officeDocument/2006/relationships" xmlns:p="http://schemas.openxmlformats.org/presentationml/2006/main">
   <p:cSld>
@@ -10970,11 +11043,7 @@
           <a:p>
             <a:r>
               <a:rPr lang="en-US" dirty="0" smtClean="0"/>
-              <a:t>Compiling to </a:t>
-            </a:r>
-            <a:r>
-              <a:rPr lang="en-US" dirty="0" smtClean="0"/>
-              <a:t>the </a:t>
+              <a:t>Compiling to the </a:t>
             </a:r>
             <a:r>
               <a:rPr lang="en-US" dirty="0" err="1" smtClean="0"/>
@@ -11005,11 +11074,7 @@
           <a:p>
             <a:r>
               <a:rPr lang="en-US" dirty="0" smtClean="0"/>
-              <a:t>Given </a:t>
-            </a:r>
-            <a:r>
-              <a:rPr lang="en-US" dirty="0" smtClean="0"/>
-              <a:t>a P4 program.</a:t>
+              <a:t>Given a P4 program.</a:t>
             </a:r>
           </a:p>
           <a:p>

</xml_diff>

<commit_message>
Add a slide on hardware costs of dRMT
</commit_message>
<xml_diff>
--- a/drmt.pptx
+++ b/drmt.pptx
@@ -14,14 +14,14 @@
     <p:sldId id="267" r:id="rId5"/>
     <p:sldId id="268" r:id="rId6"/>
     <p:sldId id="269" r:id="rId7"/>
-    <p:sldId id="261" r:id="rId8"/>
-    <p:sldId id="262" r:id="rId9"/>
-    <p:sldId id="270" r:id="rId10"/>
-    <p:sldId id="271" r:id="rId11"/>
-    <p:sldId id="264" r:id="rId12"/>
-    <p:sldId id="272" r:id="rId13"/>
-    <p:sldId id="265" r:id="rId14"/>
-    <p:sldId id="263" r:id="rId15"/>
+    <p:sldId id="262" r:id="rId8"/>
+    <p:sldId id="270" r:id="rId9"/>
+    <p:sldId id="271" r:id="rId10"/>
+    <p:sldId id="264" r:id="rId11"/>
+    <p:sldId id="272" r:id="rId12"/>
+    <p:sldId id="265" r:id="rId13"/>
+    <p:sldId id="263" r:id="rId14"/>
+    <p:sldId id="274" r:id="rId15"/>
     <p:sldId id="273" r:id="rId16"/>
   </p:sldIdLst>
   <p:sldSz cx="12192000" cy="6858000"/>
@@ -644,7 +644,7 @@
           <a:p>
             <a:fld id="{4B72050E-C83F-DC4E-B064-9A7B7E00D2A3}" type="slidenum">
               <a:rPr lang="en-US" smtClean="0"/>
-              <a:t>11</a:t>
+              <a:t>10</a:t>
             </a:fld>
             <a:endParaRPr lang="en-US"/>
           </a:p>
@@ -3806,7 +3806,7 @@
           <a:p>
             <a:r>
               <a:rPr lang="en-US" dirty="0" smtClean="0"/>
-              <a:t>Operation Dependency Graph</a:t>
+              <a:t>The compilation problem</a:t>
             </a:r>
             <a:endParaRPr lang="en-US" dirty="0"/>
           </a:p>
@@ -3824,12 +3824,14 @@
         </p:nvSpPr>
         <p:spPr/>
         <p:txBody>
-          <a:bodyPr/>
+          <a:bodyPr>
+            <a:normAutofit fontScale="92500" lnSpcReduction="10000"/>
+          </a:bodyPr>
           <a:lstStyle/>
           <a:p>
             <a:r>
               <a:rPr lang="en-US" dirty="0" smtClean="0"/>
-              <a:t>Straightforward to generate by extending p4-hlir</a:t>
+              <a:t>Each processor handles a new packet every N cycles (N procs)</a:t>
             </a:r>
           </a:p>
           <a:p>
@@ -3838,8 +3840,64 @@
           <a:p>
             <a:r>
               <a:rPr lang="en-US" dirty="0" smtClean="0"/>
-              <a:t>TODO: Insert figure from paper</a:t>
-            </a:r>
+              <a:t>Schedule each operation so that schedule can be repeated every N cycles</a:t>
+            </a:r>
+          </a:p>
+          <a:p>
+            <a:pPr lvl="1"/>
+            <a:r>
+              <a:rPr lang="en-US" dirty="0" smtClean="0"/>
+              <a:t>Assign each operation a start time relative to the first operation</a:t>
+            </a:r>
+          </a:p>
+          <a:p>
+            <a:pPr lvl="1"/>
+            <a:r>
+              <a:rPr lang="en-US" dirty="0" smtClean="0"/>
+              <a:t>Group operations into buckets based on the reminder when the operation start time is divided by N.</a:t>
+            </a:r>
+          </a:p>
+          <a:p>
+            <a:pPr lvl="1"/>
+            <a:r>
+              <a:rPr lang="en-US" dirty="0"/>
+              <a:t>T</a:t>
+            </a:r>
+            <a:r>
+              <a:rPr lang="en-US" dirty="0" smtClean="0"/>
+              <a:t>otal match/action requirements in a bucket &lt;= match/action capacity</a:t>
+            </a:r>
+          </a:p>
+          <a:p>
+            <a:pPr lvl="1"/>
+            <a:r>
+              <a:rPr lang="en-US" dirty="0" smtClean="0"/>
+              <a:t>Dependencies must be satisfied between operations</a:t>
+            </a:r>
+          </a:p>
+          <a:p>
+            <a:endParaRPr lang="en-US" dirty="0" smtClean="0"/>
+          </a:p>
+          <a:p>
+            <a:r>
+              <a:rPr lang="en-US" dirty="0" smtClean="0"/>
+              <a:t>Can be formulated as an ILP</a:t>
+            </a:r>
+            <a:endParaRPr lang="en-US" dirty="0"/>
+          </a:p>
+          <a:p>
+            <a:endParaRPr lang="en-US" dirty="0" smtClean="0"/>
+          </a:p>
+          <a:p>
+            <a:endParaRPr lang="en-US" dirty="0"/>
+          </a:p>
+          <a:p>
+            <a:endParaRPr lang="en-US" dirty="0" smtClean="0"/>
+          </a:p>
+          <a:p>
+            <a:endParaRPr lang="en-US" dirty="0"/>
+          </a:p>
+          <a:p>
             <a:endParaRPr lang="en-US" dirty="0"/>
           </a:p>
         </p:txBody>
@@ -3847,7 +3905,7 @@
     </p:spTree>
     <p:extLst>
       <p:ext uri="{BB962C8B-B14F-4D97-AF65-F5344CB8AC3E}">
-        <p14:creationId xmlns:p14="http://schemas.microsoft.com/office/powerpoint/2010/main" val="1266169706"/>
+        <p14:creationId xmlns:p14="http://schemas.microsoft.com/office/powerpoint/2010/main" val="170795810"/>
       </p:ext>
     </p:extLst>
   </p:cSld>
@@ -3891,9 +3949,13 @@
           <a:p>
             <a:r>
               <a:rPr lang="en-US" dirty="0" smtClean="0"/>
-              <a:t>The compilation problem</a:t>
-            </a:r>
-            <a:endParaRPr lang="en-US" dirty="0"/>
+              <a:t>Animation </a:t>
+            </a:r>
+            <a:r>
+              <a:rPr lang="en-US" smtClean="0"/>
+              <a:t>of compilation</a:t>
+            </a:r>
+            <a:endParaRPr lang="en-US"/>
           </a:p>
         </p:txBody>
       </p:sp>
@@ -3909,88 +3971,17 @@
         </p:nvSpPr>
         <p:spPr/>
         <p:txBody>
-          <a:bodyPr>
-            <a:normAutofit fontScale="92500" lnSpcReduction="10000"/>
-          </a:bodyPr>
-          <a:lstStyle/>
-          <a:p>
-            <a:r>
-              <a:rPr lang="en-US" dirty="0" smtClean="0"/>
-              <a:t>Each processor handles a new packet every N cycles (N procs)</a:t>
-            </a:r>
-          </a:p>
-          <a:p>
-            <a:endParaRPr lang="en-US" dirty="0"/>
-          </a:p>
-          <a:p>
-            <a:r>
-              <a:rPr lang="en-US" dirty="0" smtClean="0"/>
-              <a:t>Schedule each operation so that schedule can be repeated every N cycles</a:t>
-            </a:r>
-          </a:p>
-          <a:p>
-            <a:pPr lvl="1"/>
-            <a:r>
-              <a:rPr lang="en-US" dirty="0" smtClean="0"/>
-              <a:t>Assign each operation a start time relative to the first operation</a:t>
-            </a:r>
-          </a:p>
-          <a:p>
-            <a:pPr lvl="1"/>
-            <a:r>
-              <a:rPr lang="en-US" dirty="0" smtClean="0"/>
-              <a:t>Group operations into buckets based on the reminder when the operation start time is divided by N.</a:t>
-            </a:r>
-          </a:p>
-          <a:p>
-            <a:pPr lvl="1"/>
-            <a:r>
-              <a:rPr lang="en-US" dirty="0"/>
-              <a:t>T</a:t>
-            </a:r>
-            <a:r>
-              <a:rPr lang="en-US" dirty="0" smtClean="0"/>
-              <a:t>otal match/action requirements in a bucket &lt;= match/action capacity</a:t>
-            </a:r>
-          </a:p>
-          <a:p>
-            <a:pPr lvl="1"/>
-            <a:r>
-              <a:rPr lang="en-US" dirty="0" smtClean="0"/>
-              <a:t>Dependencies must be satisfied between operations</a:t>
-            </a:r>
-          </a:p>
-          <a:p>
-            <a:endParaRPr lang="en-US" dirty="0" smtClean="0"/>
-          </a:p>
-          <a:p>
-            <a:r>
-              <a:rPr lang="en-US" dirty="0" smtClean="0"/>
-              <a:t>Can be formulated as an ILP</a:t>
-            </a:r>
-            <a:endParaRPr lang="en-US" dirty="0"/>
-          </a:p>
-          <a:p>
-            <a:endParaRPr lang="en-US" dirty="0" smtClean="0"/>
-          </a:p>
-          <a:p>
-            <a:endParaRPr lang="en-US" dirty="0"/>
-          </a:p>
-          <a:p>
-            <a:endParaRPr lang="en-US" dirty="0" smtClean="0"/>
-          </a:p>
-          <a:p>
-            <a:endParaRPr lang="en-US" dirty="0"/>
-          </a:p>
-          <a:p>
-            <a:endParaRPr lang="en-US" dirty="0"/>
+          <a:bodyPr/>
+          <a:lstStyle/>
+          <a:p>
+            <a:endParaRPr lang="en-US"/>
           </a:p>
         </p:txBody>
       </p:sp>
     </p:spTree>
     <p:extLst>
       <p:ext uri="{BB962C8B-B14F-4D97-AF65-F5344CB8AC3E}">
-        <p14:creationId xmlns:p14="http://schemas.microsoft.com/office/powerpoint/2010/main" val="170795810"/>
+        <p14:creationId xmlns:p14="http://schemas.microsoft.com/office/powerpoint/2010/main" val="431250624"/>
       </p:ext>
     </p:extLst>
   </p:cSld>
@@ -4033,12 +4024,8 @@
           <a:lstStyle/>
           <a:p>
             <a:r>
-              <a:rPr lang="en-US" dirty="0" smtClean="0"/>
-              <a:t>Animation </a:t>
-            </a:r>
-            <a:r>
               <a:rPr lang="en-US" smtClean="0"/>
-              <a:t>of compilation</a:t>
+              <a:t>Result: table from papers</a:t>
             </a:r>
             <a:endParaRPr lang="en-US"/>
           </a:p>
@@ -4066,7 +4053,7 @@
     </p:spTree>
     <p:extLst>
       <p:ext uri="{BB962C8B-B14F-4D97-AF65-F5344CB8AC3E}">
-        <p14:creationId xmlns:p14="http://schemas.microsoft.com/office/powerpoint/2010/main" val="431250624"/>
+        <p14:creationId xmlns:p14="http://schemas.microsoft.com/office/powerpoint/2010/main" val="1469896076"/>
       </p:ext>
     </p:extLst>
   </p:cSld>
@@ -4109,10 +4096,14 @@
           <a:lstStyle/>
           <a:p>
             <a:r>
+              <a:rPr lang="en-US" dirty="0" smtClean="0"/>
+              <a:t>Results: </a:t>
+            </a:r>
+            <a:r>
               <a:rPr lang="en-US" smtClean="0"/>
-              <a:t>Result: table from papers</a:t>
-            </a:r>
-            <a:endParaRPr lang="en-US"/>
+              <a:t>performance cliffs</a:t>
+            </a:r>
+            <a:endParaRPr lang="en-US" dirty="0"/>
           </a:p>
         </p:txBody>
       </p:sp>
@@ -4131,6 +4122,10 @@
           <a:bodyPr/>
           <a:lstStyle/>
           <a:p>
+            <a:r>
+              <a:rPr lang="en-US" smtClean="0"/>
+              <a:t>Cyclic scheduling</a:t>
+            </a:r>
             <a:endParaRPr lang="en-US"/>
           </a:p>
         </p:txBody>
@@ -4138,7 +4133,7 @@
     </p:spTree>
     <p:extLst>
       <p:ext uri="{BB962C8B-B14F-4D97-AF65-F5344CB8AC3E}">
-        <p14:creationId xmlns:p14="http://schemas.microsoft.com/office/powerpoint/2010/main" val="1469896076"/>
+        <p14:creationId xmlns:p14="http://schemas.microsoft.com/office/powerpoint/2010/main" val="1186650806"/>
       </p:ext>
     </p:extLst>
   </p:cSld>
@@ -4181,14 +4176,10 @@
           <a:lstStyle/>
           <a:p>
             <a:r>
-              <a:rPr lang="en-US" dirty="0" smtClean="0"/>
-              <a:t>Results: </a:t>
-            </a:r>
-            <a:r>
               <a:rPr lang="en-US" smtClean="0"/>
-              <a:t>performance cliffs</a:t>
-            </a:r>
-            <a:endParaRPr lang="en-US" dirty="0"/>
+              <a:t>Hardware costs of dRMT</a:t>
+            </a:r>
+            <a:endParaRPr lang="en-US"/>
           </a:p>
         </p:txBody>
       </p:sp>
@@ -4207,10 +4198,6 @@
           <a:bodyPr/>
           <a:lstStyle/>
           <a:p>
-            <a:r>
-              <a:rPr lang="en-US" smtClean="0"/>
-              <a:t>Cyclic scheduling</a:t>
-            </a:r>
             <a:endParaRPr lang="en-US"/>
           </a:p>
         </p:txBody>
@@ -4218,7 +4205,7 @@
     </p:spTree>
     <p:extLst>
       <p:ext uri="{BB962C8B-B14F-4D97-AF65-F5344CB8AC3E}">
-        <p14:creationId xmlns:p14="http://schemas.microsoft.com/office/powerpoint/2010/main" val="1186650806"/>
+        <p14:creationId xmlns:p14="http://schemas.microsoft.com/office/powerpoint/2010/main" val="1519742243"/>
       </p:ext>
     </p:extLst>
   </p:cSld>
@@ -10983,8 +10970,58 @@
           <a:p>
             <a:r>
               <a:rPr lang="en-US" dirty="0" smtClean="0"/>
-              <a:t>Worked out example</a:t>
-            </a:r>
+              <a:t>Compiling to the </a:t>
+            </a:r>
+            <a:r>
+              <a:rPr lang="en-US" dirty="0" err="1" smtClean="0"/>
+              <a:t>dRMT</a:t>
+            </a:r>
+            <a:r>
+              <a:rPr lang="en-US" dirty="0" smtClean="0"/>
+              <a:t> architecture</a:t>
+            </a:r>
+            <a:endParaRPr lang="en-US" dirty="0"/>
+          </a:p>
+        </p:txBody>
+      </p:sp>
+      <p:sp>
+        <p:nvSpPr>
+          <p:cNvPr id="3" name="Content Placeholder 2"/>
+          <p:cNvSpPr>
+            <a:spLocks noGrp="1"/>
+          </p:cNvSpPr>
+          <p:nvPr>
+            <p:ph idx="1"/>
+          </p:nvPr>
+        </p:nvSpPr>
+        <p:spPr/>
+        <p:txBody>
+          <a:bodyPr/>
+          <a:lstStyle/>
+          <a:p>
+            <a:r>
+              <a:rPr lang="en-US" dirty="0" smtClean="0"/>
+              <a:t>Given a P4 program.</a:t>
+            </a:r>
+          </a:p>
+          <a:p>
+            <a:endParaRPr lang="en-US" dirty="0"/>
+          </a:p>
+          <a:p>
+            <a:r>
+              <a:rPr lang="en-US" dirty="0" smtClean="0"/>
+              <a:t>Generate a periodic schedule of operations across processors without violating resource constraints </a:t>
+            </a:r>
+            <a:r>
+              <a:rPr lang="en-US" dirty="0" smtClean="0"/>
+              <a:t>(e.g., match </a:t>
+            </a:r>
+            <a:r>
+              <a:rPr lang="en-US" dirty="0" smtClean="0"/>
+              <a:t>capacity, action capacity, and memory capacity)</a:t>
+            </a:r>
+          </a:p>
+          <a:p>
             <a:endParaRPr lang="en-US" dirty="0"/>
           </a:p>
         </p:txBody>
@@ -10992,7 +11029,7 @@
     </p:spTree>
     <p:extLst>
       <p:ext uri="{BB962C8B-B14F-4D97-AF65-F5344CB8AC3E}">
-        <p14:creationId xmlns:p14="http://schemas.microsoft.com/office/powerpoint/2010/main" val="1862634637"/>
+        <p14:creationId xmlns:p14="http://schemas.microsoft.com/office/powerpoint/2010/main" val="781832897"/>
       </p:ext>
     </p:extLst>
   </p:cSld>
@@ -11043,15 +11080,7 @@
           <a:p>
             <a:r>
               <a:rPr lang="en-US" dirty="0" smtClean="0"/>
-              <a:t>Compiling to the </a:t>
-            </a:r>
-            <a:r>
-              <a:rPr lang="en-US" dirty="0" err="1" smtClean="0"/>
-              <a:t>dRMT</a:t>
-            </a:r>
-            <a:r>
-              <a:rPr lang="en-US" dirty="0" smtClean="0"/>
-              <a:t> architecture</a:t>
+              <a:t>Compiling: fine-grained dependencies</a:t>
             </a:r>
             <a:endParaRPr lang="en-US" dirty="0"/>
           </a:p>
@@ -11069,12 +11098,14 @@
         </p:nvSpPr>
         <p:spPr/>
         <p:txBody>
-          <a:bodyPr/>
+          <a:bodyPr>
+            <a:normAutofit fontScale="92500" lnSpcReduction="20000"/>
+          </a:bodyPr>
           <a:lstStyle/>
           <a:p>
             <a:r>
               <a:rPr lang="en-US" dirty="0" smtClean="0"/>
-              <a:t>Given a P4 program.</a:t>
+              <a:t>P4 captures coarse-grained dependencies between tables in its Table Dependency Graph; each node is a table</a:t>
             </a:r>
           </a:p>
           <a:p>
@@ -11083,7 +11114,52 @@
           <a:p>
             <a:r>
               <a:rPr lang="en-US" dirty="0" smtClean="0"/>
-              <a:t>Generate a periodic schedule of operations across processors without violating resource constraints (match capacity, action capacity, and memory capacity)</a:t>
+              <a:t>We use fine-grained dependencies in Operation Dependency Graph with one node for each match/action operation</a:t>
+            </a:r>
+          </a:p>
+          <a:p>
+            <a:endParaRPr lang="en-US" dirty="0"/>
+          </a:p>
+          <a:p>
+            <a:r>
+              <a:rPr lang="en-US" dirty="0" smtClean="0"/>
+              <a:t>Node attribute: Number of primitive actions or match key size</a:t>
+            </a:r>
+          </a:p>
+          <a:p>
+            <a:endParaRPr lang="en-US" dirty="0"/>
+          </a:p>
+          <a:p>
+            <a:r>
+              <a:rPr lang="en-US" dirty="0"/>
+              <a:t>Edge </a:t>
+            </a:r>
+            <a:r>
+              <a:rPr lang="en-US" dirty="0" smtClean="0"/>
+              <a:t>attribute: min. </a:t>
+            </a:r>
+            <a:r>
+              <a:rPr lang="en-US" dirty="0"/>
+              <a:t>latency between </a:t>
+            </a:r>
+            <a:r>
+              <a:rPr lang="en-US" dirty="0" smtClean="0"/>
+              <a:t>operations</a:t>
+            </a:r>
+            <a:endParaRPr lang="en-US" dirty="0"/>
+          </a:p>
+          <a:p>
+            <a:pPr lvl="1"/>
+            <a:r>
+              <a:rPr lang="en-US" dirty="0"/>
+              <a:t>Either the time required to complete a match</a:t>
+            </a:r>
+          </a:p>
+          <a:p>
+            <a:pPr lvl="1"/>
+            <a:r>
+              <a:rPr lang="en-US" dirty="0"/>
+              <a:t>Or the time required to complete an action</a:t>
             </a:r>
           </a:p>
           <a:p>
@@ -11094,20 +11170,13 @@
     </p:spTree>
     <p:extLst>
       <p:ext uri="{BB962C8B-B14F-4D97-AF65-F5344CB8AC3E}">
-        <p14:creationId xmlns:p14="http://schemas.microsoft.com/office/powerpoint/2010/main" val="781832897"/>
+        <p14:creationId xmlns:p14="http://schemas.microsoft.com/office/powerpoint/2010/main" val="1998601008"/>
       </p:ext>
     </p:extLst>
   </p:cSld>
   <p:clrMapOvr>
     <a:masterClrMapping/>
   </p:clrMapOvr>
-  <p:timing>
-    <p:tnLst>
-      <p:par>
-        <p:cTn id="1" dur="indefinite" restart="never" nodeType="tmRoot"/>
-      </p:par>
-    </p:tnLst>
-  </p:timing>
 </p:sld>
 </file>
 
@@ -11145,7 +11214,7 @@
           <a:p>
             <a:r>
               <a:rPr lang="en-US" dirty="0" smtClean="0"/>
-              <a:t>Compiling: fine-grained dependencies</a:t>
+              <a:t>Operation Dependency Graph</a:t>
             </a:r>
             <a:endParaRPr lang="en-US" dirty="0"/>
           </a:p>
@@ -11163,14 +11232,12 @@
         </p:nvSpPr>
         <p:spPr/>
         <p:txBody>
-          <a:bodyPr>
-            <a:normAutofit fontScale="92500" lnSpcReduction="20000"/>
-          </a:bodyPr>
+          <a:bodyPr/>
           <a:lstStyle/>
           <a:p>
             <a:r>
               <a:rPr lang="en-US" dirty="0" smtClean="0"/>
-              <a:t>P4 captures coarse-grained dependencies between tables in its Table Dependency Graph; each node is a table</a:t>
+              <a:t>Straightforward to generate by extending p4-hlir</a:t>
             </a:r>
           </a:p>
           <a:p>
@@ -11179,55 +11246,8 @@
           <a:p>
             <a:r>
               <a:rPr lang="en-US" dirty="0" smtClean="0"/>
-              <a:t>We use fine-grained dependencies in Operation Dependency Graph with one node for each match/action operation</a:t>
-            </a:r>
-          </a:p>
-          <a:p>
-            <a:endParaRPr lang="en-US" dirty="0"/>
-          </a:p>
-          <a:p>
-            <a:r>
-              <a:rPr lang="en-US" dirty="0" smtClean="0"/>
-              <a:t>Node attribute: Number of primitive actions or match key size</a:t>
-            </a:r>
-          </a:p>
-          <a:p>
-            <a:endParaRPr lang="en-US" dirty="0"/>
-          </a:p>
-          <a:p>
-            <a:r>
-              <a:rPr lang="en-US" dirty="0"/>
-              <a:t>Edge </a:t>
-            </a:r>
-            <a:r>
-              <a:rPr lang="en-US" dirty="0" smtClean="0"/>
-              <a:t>attribute: min. </a:t>
-            </a:r>
-            <a:r>
-              <a:rPr lang="en-US" dirty="0"/>
-              <a:t>latency between </a:t>
-            </a:r>
-            <a:r>
-              <a:rPr lang="en-US" dirty="0" smtClean="0"/>
-              <a:t>operations</a:t>
-            </a:r>
-            <a:endParaRPr lang="en-US" dirty="0"/>
-          </a:p>
-          <a:p>
-            <a:pPr lvl="1"/>
-            <a:r>
-              <a:rPr lang="en-US" dirty="0"/>
-              <a:t>Either the time required to complete a match</a:t>
-            </a:r>
-          </a:p>
-          <a:p>
-            <a:pPr lvl="1"/>
-            <a:r>
-              <a:rPr lang="en-US" dirty="0"/>
-              <a:t>Or the time required to complete an action</a:t>
-            </a:r>
-          </a:p>
-          <a:p>
+              <a:t>TODO: Insert figure from paper</a:t>
+            </a:r>
             <a:endParaRPr lang="en-US" dirty="0"/>
           </a:p>
         </p:txBody>
@@ -11235,7 +11255,7 @@
     </p:spTree>
     <p:extLst>
       <p:ext uri="{BB962C8B-B14F-4D97-AF65-F5344CB8AC3E}">
-        <p14:creationId xmlns:p14="http://schemas.microsoft.com/office/powerpoint/2010/main" val="1998601008"/>
+        <p14:creationId xmlns:p14="http://schemas.microsoft.com/office/powerpoint/2010/main" val="1266169706"/>
       </p:ext>
     </p:extLst>
   </p:cSld>

</xml_diff>

<commit_message>
Add scratchpad to hw design; add hw numbers
</commit_message>
<xml_diff>
--- a/drmt.pptx
+++ b/drmt.pptx
@@ -5,7 +5,7 @@
     <p:sldMasterId id="2147483648" r:id="rId1"/>
   </p:sldMasterIdLst>
   <p:notesMasterIdLst>
-    <p:notesMasterId r:id="rId26"/>
+    <p:notesMasterId r:id="rId27"/>
   </p:notesMasterIdLst>
   <p:sldIdLst>
     <p:sldId id="256" r:id="rId2"/>
@@ -30,8 +30,9 @@
     <p:sldId id="263" r:id="rId21"/>
     <p:sldId id="274" r:id="rId22"/>
     <p:sldId id="285" r:id="rId23"/>
-    <p:sldId id="286" r:id="rId24"/>
-    <p:sldId id="273" r:id="rId25"/>
+    <p:sldId id="288" r:id="rId24"/>
+    <p:sldId id="286" r:id="rId25"/>
+    <p:sldId id="273" r:id="rId26"/>
   </p:sldIdLst>
   <p:sldSz cx="12192000" cy="6858000"/>
   <p:notesSz cx="6858000" cy="9144000"/>
@@ -461,11 +462,11 @@
           <c:showBubbleSize val="0"/>
         </c:dLbls>
         <c:smooth val="0"/>
-        <c:axId val="884422560"/>
-        <c:axId val="885061712"/>
+        <c:axId val="409898928"/>
+        <c:axId val="409903568"/>
       </c:lineChart>
       <c:catAx>
-        <c:axId val="884422560"/>
+        <c:axId val="409898928"/>
         <c:scaling>
           <c:orientation val="minMax"/>
         </c:scaling>
@@ -508,7 +509,7 @@
             <a:endParaRPr lang="en-US"/>
           </a:p>
         </c:txPr>
-        <c:crossAx val="885061712"/>
+        <c:crossAx val="409903568"/>
         <c:crosses val="autoZero"/>
         <c:auto val="1"/>
         <c:lblAlgn val="ctr"/>
@@ -516,7 +517,7 @@
         <c:noMultiLvlLbl val="0"/>
       </c:catAx>
       <c:valAx>
-        <c:axId val="885061712"/>
+        <c:axId val="409903568"/>
         <c:scaling>
           <c:orientation val="minMax"/>
         </c:scaling>
@@ -566,7 +567,7 @@
             <a:endParaRPr lang="en-US"/>
           </a:p>
         </c:txPr>
-        <c:crossAx val="884422560"/>
+        <c:crossAx val="409898928"/>
         <c:crosses val="autoZero"/>
         <c:crossBetween val="between"/>
       </c:valAx>
@@ -4969,11 +4970,7 @@
           <a:p>
             <a:r>
               <a:rPr lang="en-US" dirty="0" smtClean="0"/>
-              <a:t>Animation of </a:t>
-            </a:r>
-            <a:r>
-              <a:rPr lang="en-US" dirty="0" smtClean="0"/>
-              <a:t>scheduling problem</a:t>
+              <a:t>Animation of scheduling problem</a:t>
             </a:r>
             <a:endParaRPr lang="en-US" dirty="0"/>
           </a:p>
@@ -5180,11 +5177,6 @@
               </a:rPr>
               <a:t>1</a:t>
             </a:r>
-            <a:endParaRPr lang="en-US" dirty="0">
-              <a:solidFill>
-                <a:schemeClr val="tx1"/>
-              </a:solidFill>
-            </a:endParaRPr>
           </a:p>
         </p:txBody>
       </p:sp>
@@ -5383,11 +5375,6 @@
               </a:rPr>
               <a:t>1</a:t>
             </a:r>
-            <a:endParaRPr lang="en-US" dirty="0">
-              <a:solidFill>
-                <a:schemeClr val="tx1"/>
-              </a:solidFill>
-            </a:endParaRPr>
           </a:p>
         </p:txBody>
       </p:sp>
@@ -5446,7 +5433,6 @@
               <a:rPr lang="en-US" dirty="0"/>
               <a:t>2</a:t>
             </a:r>
-            <a:endParaRPr lang="en-US" dirty="0"/>
           </a:p>
         </p:txBody>
       </p:sp>
@@ -5670,11 +5656,7 @@
           <a:p>
             <a:r>
               <a:rPr lang="en-US" dirty="0" smtClean="0"/>
-              <a:t>Animation of </a:t>
-            </a:r>
-            <a:r>
-              <a:rPr lang="en-US" dirty="0" smtClean="0"/>
-              <a:t>scheduling problem</a:t>
+              <a:t>Animation of scheduling problem</a:t>
             </a:r>
             <a:endParaRPr lang="en-US" dirty="0"/>
           </a:p>
@@ -6746,11 +6728,6 @@
               </a:rPr>
               <a:t>1</a:t>
             </a:r>
-            <a:endParaRPr lang="en-US" dirty="0">
-              <a:solidFill>
-                <a:schemeClr val="tx1"/>
-              </a:solidFill>
-            </a:endParaRPr>
           </a:p>
         </p:txBody>
       </p:sp>
@@ -6946,11 +6923,6 @@
               </a:rPr>
               <a:t>1</a:t>
             </a:r>
-            <a:endParaRPr lang="en-US" dirty="0">
-              <a:solidFill>
-                <a:schemeClr val="tx1"/>
-              </a:solidFill>
-            </a:endParaRPr>
           </a:p>
         </p:txBody>
       </p:sp>
@@ -7009,7 +6981,6 @@
               <a:rPr lang="en-US" dirty="0"/>
               <a:t>2</a:t>
             </a:r>
-            <a:endParaRPr lang="en-US" dirty="0"/>
           </a:p>
         </p:txBody>
       </p:sp>
@@ -7197,11 +7168,7 @@
           <a:p>
             <a:r>
               <a:rPr lang="en-US" dirty="0" smtClean="0"/>
-              <a:t>Animation of </a:t>
-            </a:r>
-            <a:r>
-              <a:rPr lang="en-US" dirty="0" smtClean="0"/>
-              <a:t>scheduling problem</a:t>
+              <a:t>Animation of scheduling problem</a:t>
             </a:r>
             <a:endParaRPr lang="en-US" dirty="0"/>
           </a:p>
@@ -8289,11 +8256,6 @@
               </a:rPr>
               <a:t>1</a:t>
             </a:r>
-            <a:endParaRPr lang="en-US" dirty="0">
-              <a:solidFill>
-                <a:schemeClr val="tx1"/>
-              </a:solidFill>
-            </a:endParaRPr>
           </a:p>
         </p:txBody>
       </p:sp>
@@ -8489,11 +8451,6 @@
               </a:rPr>
               <a:t>1</a:t>
             </a:r>
-            <a:endParaRPr lang="en-US" dirty="0">
-              <a:solidFill>
-                <a:schemeClr val="tx1"/>
-              </a:solidFill>
-            </a:endParaRPr>
           </a:p>
         </p:txBody>
       </p:sp>
@@ -8552,7 +8509,6 @@
               <a:rPr lang="en-US" dirty="0"/>
               <a:t>2</a:t>
             </a:r>
-            <a:endParaRPr lang="en-US" dirty="0"/>
           </a:p>
         </p:txBody>
       </p:sp>
@@ -8770,11 +8726,7 @@
           <a:p>
             <a:r>
               <a:rPr lang="en-US" dirty="0" smtClean="0"/>
-              <a:t>Animation of </a:t>
-            </a:r>
-            <a:r>
-              <a:rPr lang="en-US" dirty="0" smtClean="0"/>
-              <a:t>scheduling problem</a:t>
+              <a:t>Animation of scheduling problem</a:t>
             </a:r>
             <a:endParaRPr lang="en-US" dirty="0"/>
           </a:p>
@@ -9878,11 +9830,6 @@
               </a:rPr>
               <a:t>1</a:t>
             </a:r>
-            <a:endParaRPr lang="en-US" dirty="0">
-              <a:solidFill>
-                <a:schemeClr val="tx1"/>
-              </a:solidFill>
-            </a:endParaRPr>
           </a:p>
         </p:txBody>
       </p:sp>
@@ -10078,11 +10025,6 @@
               </a:rPr>
               <a:t>1</a:t>
             </a:r>
-            <a:endParaRPr lang="en-US" dirty="0">
-              <a:solidFill>
-                <a:schemeClr val="tx1"/>
-              </a:solidFill>
-            </a:endParaRPr>
           </a:p>
         </p:txBody>
       </p:sp>
@@ -10141,7 +10083,6 @@
               <a:rPr lang="en-US" dirty="0"/>
               <a:t>2</a:t>
             </a:r>
-            <a:endParaRPr lang="en-US" dirty="0"/>
           </a:p>
         </p:txBody>
       </p:sp>
@@ -10505,11 +10446,7 @@
           <a:p>
             <a:r>
               <a:rPr lang="en-US" dirty="0" smtClean="0"/>
-              <a:t>Animation of </a:t>
-            </a:r>
-            <a:r>
-              <a:rPr lang="en-US" dirty="0" smtClean="0"/>
-              <a:t>scheduling problem</a:t>
+              <a:t>Animation of scheduling problem</a:t>
             </a:r>
             <a:endParaRPr lang="en-US" dirty="0"/>
           </a:p>
@@ -11617,11 +11554,6 @@
               </a:rPr>
               <a:t>1</a:t>
             </a:r>
-            <a:endParaRPr lang="en-US" dirty="0">
-              <a:solidFill>
-                <a:schemeClr val="tx1"/>
-              </a:solidFill>
-            </a:endParaRPr>
           </a:p>
         </p:txBody>
       </p:sp>
@@ -11817,11 +11749,6 @@
               </a:rPr>
               <a:t>1</a:t>
             </a:r>
-            <a:endParaRPr lang="en-US" dirty="0">
-              <a:solidFill>
-                <a:schemeClr val="tx1"/>
-              </a:solidFill>
-            </a:endParaRPr>
           </a:p>
         </p:txBody>
       </p:sp>
@@ -11880,7 +11807,6 @@
               <a:rPr lang="en-US" dirty="0"/>
               <a:t>2</a:t>
             </a:r>
-            <a:endParaRPr lang="en-US" dirty="0"/>
           </a:p>
         </p:txBody>
       </p:sp>
@@ -12068,11 +11994,7 @@
           <a:p>
             <a:r>
               <a:rPr lang="en-US" dirty="0" smtClean="0"/>
-              <a:t>Animation of </a:t>
-            </a:r>
-            <a:r>
-              <a:rPr lang="en-US" dirty="0" smtClean="0"/>
-              <a:t>scheduling problem</a:t>
+              <a:t>Animation of scheduling problem</a:t>
             </a:r>
             <a:endParaRPr lang="en-US" dirty="0"/>
           </a:p>
@@ -13184,11 +13106,6 @@
               </a:rPr>
               <a:t>1</a:t>
             </a:r>
-            <a:endParaRPr lang="en-US" dirty="0">
-              <a:solidFill>
-                <a:schemeClr val="tx1"/>
-              </a:solidFill>
-            </a:endParaRPr>
           </a:p>
         </p:txBody>
       </p:sp>
@@ -13384,11 +13301,6 @@
               </a:rPr>
               <a:t>1</a:t>
             </a:r>
-            <a:endParaRPr lang="en-US" dirty="0">
-              <a:solidFill>
-                <a:schemeClr val="tx1"/>
-              </a:solidFill>
-            </a:endParaRPr>
           </a:p>
         </p:txBody>
       </p:sp>
@@ -13447,7 +13359,6 @@
               <a:rPr lang="en-US" dirty="0"/>
               <a:t>2</a:t>
             </a:r>
-            <a:endParaRPr lang="en-US" dirty="0"/>
           </a:p>
         </p:txBody>
       </p:sp>
@@ -13635,11 +13546,7 @@
           <a:p>
             <a:r>
               <a:rPr lang="en-US" dirty="0" smtClean="0"/>
-              <a:t>Animation of </a:t>
-            </a:r>
-            <a:r>
-              <a:rPr lang="en-US" dirty="0" smtClean="0"/>
-              <a:t>scheduling problem</a:t>
+              <a:t>Animation of scheduling problem</a:t>
             </a:r>
             <a:endParaRPr lang="en-US" dirty="0"/>
           </a:p>
@@ -14765,11 +14672,6 @@
               </a:rPr>
               <a:t>1</a:t>
             </a:r>
-            <a:endParaRPr lang="en-US" dirty="0">
-              <a:solidFill>
-                <a:schemeClr val="tx1"/>
-              </a:solidFill>
-            </a:endParaRPr>
           </a:p>
         </p:txBody>
       </p:sp>
@@ -14965,11 +14867,6 @@
               </a:rPr>
               <a:t>1</a:t>
             </a:r>
-            <a:endParaRPr lang="en-US" dirty="0">
-              <a:solidFill>
-                <a:schemeClr val="tx1"/>
-              </a:solidFill>
-            </a:endParaRPr>
           </a:p>
         </p:txBody>
       </p:sp>
@@ -15028,7 +14925,6 @@
               <a:rPr lang="en-US" dirty="0"/>
               <a:t>2</a:t>
             </a:r>
-            <a:endParaRPr lang="en-US" dirty="0"/>
           </a:p>
         </p:txBody>
       </p:sp>
@@ -15216,11 +15112,7 @@
           <a:p>
             <a:r>
               <a:rPr lang="en-US" dirty="0" smtClean="0"/>
-              <a:t>Animation of </a:t>
-            </a:r>
-            <a:r>
-              <a:rPr lang="en-US" dirty="0" smtClean="0"/>
-              <a:t>scheduling problem</a:t>
+              <a:t>Animation of scheduling problem</a:t>
             </a:r>
             <a:endParaRPr lang="en-US" dirty="0"/>
           </a:p>
@@ -16366,11 +16258,6 @@
               </a:rPr>
               <a:t>1</a:t>
             </a:r>
-            <a:endParaRPr lang="en-US" dirty="0">
-              <a:solidFill>
-                <a:schemeClr val="tx1"/>
-              </a:solidFill>
-            </a:endParaRPr>
           </a:p>
         </p:txBody>
       </p:sp>
@@ -16566,11 +16453,6 @@
               </a:rPr>
               <a:t>1</a:t>
             </a:r>
-            <a:endParaRPr lang="en-US" dirty="0">
-              <a:solidFill>
-                <a:schemeClr val="tx1"/>
-              </a:solidFill>
-            </a:endParaRPr>
           </a:p>
         </p:txBody>
       </p:sp>
@@ -16629,7 +16511,6 @@
               <a:rPr lang="en-US" dirty="0"/>
               <a:t>2</a:t>
             </a:r>
-            <a:endParaRPr lang="en-US" dirty="0"/>
           </a:p>
         </p:txBody>
       </p:sp>
@@ -16817,11 +16698,7 @@
           <a:p>
             <a:r>
               <a:rPr lang="en-US" dirty="0" smtClean="0"/>
-              <a:t>Animation of </a:t>
-            </a:r>
-            <a:r>
-              <a:rPr lang="en-US" dirty="0" smtClean="0"/>
-              <a:t>scheduling problem</a:t>
+              <a:t>Animation of scheduling problem</a:t>
             </a:r>
             <a:endParaRPr lang="en-US" dirty="0"/>
           </a:p>
@@ -18145,11 +18022,6 @@
               </a:rPr>
               <a:t>1</a:t>
             </a:r>
-            <a:endParaRPr lang="en-US" dirty="0">
-              <a:solidFill>
-                <a:schemeClr val="tx1"/>
-              </a:solidFill>
-            </a:endParaRPr>
           </a:p>
         </p:txBody>
       </p:sp>
@@ -18345,11 +18217,6 @@
               </a:rPr>
               <a:t>1</a:t>
             </a:r>
-            <a:endParaRPr lang="en-US" dirty="0">
-              <a:solidFill>
-                <a:schemeClr val="tx1"/>
-              </a:solidFill>
-            </a:endParaRPr>
           </a:p>
         </p:txBody>
       </p:sp>
@@ -18408,7 +18275,6 @@
               <a:rPr lang="en-US" dirty="0"/>
               <a:t>2</a:t>
             </a:r>
-            <a:endParaRPr lang="en-US" dirty="0"/>
           </a:p>
         </p:txBody>
       </p:sp>
@@ -18596,11 +18462,7 @@
           <a:p>
             <a:r>
               <a:rPr lang="en-US" dirty="0" smtClean="0"/>
-              <a:t>Result</a:t>
-            </a:r>
-            <a:r>
-              <a:rPr lang="en-US" dirty="0" smtClean="0"/>
-              <a:t>s: switch.p4 on RMT and </a:t>
+              <a:t>Results: switch.p4 on RMT and </a:t>
             </a:r>
             <a:r>
               <a:rPr lang="en-US" dirty="0" err="1" smtClean="0"/>
@@ -20375,15 +20237,7 @@
             </a:r>
             <a:r>
               <a:rPr lang="en-US" dirty="0" smtClean="0"/>
-              <a:t> eliminates </a:t>
-            </a:r>
-            <a:r>
-              <a:rPr lang="en-US" dirty="0" smtClean="0"/>
-              <a:t>performance </a:t>
-            </a:r>
-            <a:r>
-              <a:rPr lang="en-US" dirty="0" smtClean="0"/>
-              <a:t>cliffs</a:t>
+              <a:t> eliminates performance cliffs</a:t>
             </a:r>
             <a:endParaRPr lang="en-US" dirty="0"/>
           </a:p>
@@ -20467,10 +20321,22 @@
           <a:lstStyle/>
           <a:p>
             <a:r>
-              <a:rPr lang="en-US" smtClean="0"/>
-              <a:t>Hardware costs of dRMT</a:t>
-            </a:r>
-            <a:endParaRPr lang="en-US"/>
+              <a:rPr lang="en-US" dirty="0" smtClean="0"/>
+              <a:t>Hardware </a:t>
+            </a:r>
+            <a:r>
+              <a:rPr lang="en-US" dirty="0" smtClean="0"/>
+              <a:t>design for</a:t>
+            </a:r>
+            <a:r>
+              <a:rPr lang="en-US" dirty="0" smtClean="0"/>
+              <a:t> </a:t>
+            </a:r>
+            <a:r>
+              <a:rPr lang="en-US" dirty="0" err="1" smtClean="0"/>
+              <a:t>dRMT</a:t>
+            </a:r>
+            <a:endParaRPr lang="en-US" dirty="0"/>
           </a:p>
         </p:txBody>
       </p:sp>
@@ -20487,13 +20353,21 @@
         <p:spPr/>
         <p:txBody>
           <a:bodyPr>
-            <a:normAutofit/>
+            <a:normAutofit lnSpcReduction="10000"/>
           </a:bodyPr>
           <a:lstStyle/>
           <a:p>
             <a:r>
               <a:rPr lang="en-US" dirty="0" smtClean="0"/>
-              <a:t>Each </a:t>
+              <a:t>Unlike RMT, </a:t>
+            </a:r>
+            <a:r>
+              <a:rPr lang="en-US" dirty="0"/>
+              <a:t>e</a:t>
+            </a:r>
+            <a:r>
+              <a:rPr lang="en-US" dirty="0" smtClean="0"/>
+              <a:t>ach </a:t>
             </a:r>
             <a:r>
               <a:rPr lang="en-US" dirty="0" err="1" smtClean="0"/>
@@ -20501,7 +20375,25 @@
             </a:r>
             <a:r>
               <a:rPr lang="en-US" dirty="0" smtClean="0"/>
-              <a:t> processor needs to store full P4 program unlike RMT</a:t>
+              <a:t> processor needs to store full </a:t>
+            </a:r>
+            <a:r>
+              <a:rPr lang="en-US" dirty="0" smtClean="0"/>
+              <a:t>program</a:t>
+            </a:r>
+            <a:endParaRPr lang="en-US" dirty="0"/>
+          </a:p>
+          <a:p>
+            <a:endParaRPr lang="en-US" dirty="0" smtClean="0"/>
+          </a:p>
+          <a:p>
+            <a:r>
+              <a:rPr lang="en-US" dirty="0" smtClean="0"/>
+              <a:t>Unlike RMT, we need a s</a:t>
+            </a:r>
+            <a:r>
+              <a:rPr lang="en-US" dirty="0" smtClean="0"/>
+              <a:t>cratch pad to store action results for delayed execution</a:t>
             </a:r>
             <a:endParaRPr lang="en-US" dirty="0"/>
           </a:p>
@@ -20550,7 +20442,270 @@
   <p:timing>
     <p:tnLst>
       <p:par>
-        <p:cTn id="1" dur="indefinite" restart="never" nodeType="tmRoot"/>
+        <p:cTn id="1" dur="indefinite" restart="never" nodeType="tmRoot">
+          <p:childTnLst>
+            <p:seq concurrent="1" nextAc="seek">
+              <p:cTn id="2" dur="indefinite" nodeType="mainSeq">
+                <p:childTnLst>
+                  <p:par>
+                    <p:cTn id="3" fill="hold">
+                      <p:stCondLst>
+                        <p:cond delay="indefinite"/>
+                      </p:stCondLst>
+                      <p:childTnLst>
+                        <p:par>
+                          <p:cTn id="4" fill="hold">
+                            <p:stCondLst>
+                              <p:cond delay="0"/>
+                            </p:stCondLst>
+                            <p:childTnLst>
+                              <p:par>
+                                <p:cTn id="5" presetID="1" presetClass="entr" presetSubtype="0" fill="hold" nodeType="clickEffect">
+                                  <p:stCondLst>
+                                    <p:cond delay="0"/>
+                                  </p:stCondLst>
+                                  <p:childTnLst>
+                                    <p:set>
+                                      <p:cBhvr>
+                                        <p:cTn id="6" dur="1" fill="hold">
+                                          <p:stCondLst>
+                                            <p:cond delay="0"/>
+                                          </p:stCondLst>
+                                        </p:cTn>
+                                        <p:tgtEl>
+                                          <p:spTgt spid="3">
+                                            <p:txEl>
+                                              <p:pRg st="0" end="0"/>
+                                            </p:txEl>
+                                          </p:spTgt>
+                                        </p:tgtEl>
+                                        <p:attrNameLst>
+                                          <p:attrName>style.visibility</p:attrName>
+                                        </p:attrNameLst>
+                                      </p:cBhvr>
+                                      <p:to>
+                                        <p:strVal val="visible"/>
+                                      </p:to>
+                                    </p:set>
+                                  </p:childTnLst>
+                                </p:cTn>
+                              </p:par>
+                            </p:childTnLst>
+                          </p:cTn>
+                        </p:par>
+                      </p:childTnLst>
+                    </p:cTn>
+                  </p:par>
+                  <p:par>
+                    <p:cTn id="7" fill="hold">
+                      <p:stCondLst>
+                        <p:cond delay="indefinite"/>
+                      </p:stCondLst>
+                      <p:childTnLst>
+                        <p:par>
+                          <p:cTn id="8" fill="hold">
+                            <p:stCondLst>
+                              <p:cond delay="0"/>
+                            </p:stCondLst>
+                            <p:childTnLst>
+                              <p:par>
+                                <p:cTn id="9" presetID="1" presetClass="entr" presetSubtype="0" fill="hold" nodeType="clickEffect">
+                                  <p:stCondLst>
+                                    <p:cond delay="0"/>
+                                  </p:stCondLst>
+                                  <p:childTnLst>
+                                    <p:set>
+                                      <p:cBhvr>
+                                        <p:cTn id="10" dur="1" fill="hold">
+                                          <p:stCondLst>
+                                            <p:cond delay="0"/>
+                                          </p:stCondLst>
+                                        </p:cTn>
+                                        <p:tgtEl>
+                                          <p:spTgt spid="3">
+                                            <p:txEl>
+                                              <p:pRg st="2" end="2"/>
+                                            </p:txEl>
+                                          </p:spTgt>
+                                        </p:tgtEl>
+                                        <p:attrNameLst>
+                                          <p:attrName>style.visibility</p:attrName>
+                                        </p:attrNameLst>
+                                      </p:cBhvr>
+                                      <p:to>
+                                        <p:strVal val="visible"/>
+                                      </p:to>
+                                    </p:set>
+                                  </p:childTnLst>
+                                </p:cTn>
+                              </p:par>
+                            </p:childTnLst>
+                          </p:cTn>
+                        </p:par>
+                      </p:childTnLst>
+                    </p:cTn>
+                  </p:par>
+                  <p:par>
+                    <p:cTn id="11" fill="hold">
+                      <p:stCondLst>
+                        <p:cond delay="indefinite"/>
+                      </p:stCondLst>
+                      <p:childTnLst>
+                        <p:par>
+                          <p:cTn id="12" fill="hold">
+                            <p:stCondLst>
+                              <p:cond delay="0"/>
+                            </p:stCondLst>
+                            <p:childTnLst>
+                              <p:par>
+                                <p:cTn id="13" presetID="1" presetClass="entr" presetSubtype="0" fill="hold" nodeType="clickEffect">
+                                  <p:stCondLst>
+                                    <p:cond delay="0"/>
+                                  </p:stCondLst>
+                                  <p:childTnLst>
+                                    <p:set>
+                                      <p:cBhvr>
+                                        <p:cTn id="14" dur="1" fill="hold">
+                                          <p:stCondLst>
+                                            <p:cond delay="0"/>
+                                          </p:stCondLst>
+                                        </p:cTn>
+                                        <p:tgtEl>
+                                          <p:spTgt spid="3">
+                                            <p:txEl>
+                                              <p:pRg st="4" end="4"/>
+                                            </p:txEl>
+                                          </p:spTgt>
+                                        </p:tgtEl>
+                                        <p:attrNameLst>
+                                          <p:attrName>style.visibility</p:attrName>
+                                        </p:attrNameLst>
+                                      </p:cBhvr>
+                                      <p:to>
+                                        <p:strVal val="visible"/>
+                                      </p:to>
+                                    </p:set>
+                                  </p:childTnLst>
+                                </p:cTn>
+                              </p:par>
+                              <p:par>
+                                <p:cTn id="15" presetID="1" presetClass="entr" presetSubtype="0" fill="hold" nodeType="withEffect">
+                                  <p:stCondLst>
+                                    <p:cond delay="0"/>
+                                  </p:stCondLst>
+                                  <p:childTnLst>
+                                    <p:set>
+                                      <p:cBhvr>
+                                        <p:cTn id="16" dur="1" fill="hold">
+                                          <p:stCondLst>
+                                            <p:cond delay="0"/>
+                                          </p:stCondLst>
+                                        </p:cTn>
+                                        <p:tgtEl>
+                                          <p:spTgt spid="3">
+                                            <p:txEl>
+                                              <p:pRg st="5" end="5"/>
+                                            </p:txEl>
+                                          </p:spTgt>
+                                        </p:tgtEl>
+                                        <p:attrNameLst>
+                                          <p:attrName>style.visibility</p:attrName>
+                                        </p:attrNameLst>
+                                      </p:cBhvr>
+                                      <p:to>
+                                        <p:strVal val="visible"/>
+                                      </p:to>
+                                    </p:set>
+                                  </p:childTnLst>
+                                </p:cTn>
+                              </p:par>
+                              <p:par>
+                                <p:cTn id="17" presetID="1" presetClass="entr" presetSubtype="0" fill="hold" nodeType="withEffect">
+                                  <p:stCondLst>
+                                    <p:cond delay="0"/>
+                                  </p:stCondLst>
+                                  <p:childTnLst>
+                                    <p:set>
+                                      <p:cBhvr>
+                                        <p:cTn id="18" dur="1" fill="hold">
+                                          <p:stCondLst>
+                                            <p:cond delay="0"/>
+                                          </p:stCondLst>
+                                        </p:cTn>
+                                        <p:tgtEl>
+                                          <p:spTgt spid="3">
+                                            <p:txEl>
+                                              <p:pRg st="6" end="6"/>
+                                            </p:txEl>
+                                          </p:spTgt>
+                                        </p:tgtEl>
+                                        <p:attrNameLst>
+                                          <p:attrName>style.visibility</p:attrName>
+                                        </p:attrNameLst>
+                                      </p:cBhvr>
+                                      <p:to>
+                                        <p:strVal val="visible"/>
+                                      </p:to>
+                                    </p:set>
+                                  </p:childTnLst>
+                                </p:cTn>
+                              </p:par>
+                              <p:par>
+                                <p:cTn id="19" presetID="1" presetClass="entr" presetSubtype="0" fill="hold" nodeType="withEffect">
+                                  <p:stCondLst>
+                                    <p:cond delay="0"/>
+                                  </p:stCondLst>
+                                  <p:childTnLst>
+                                    <p:set>
+                                      <p:cBhvr>
+                                        <p:cTn id="20" dur="1" fill="hold">
+                                          <p:stCondLst>
+                                            <p:cond delay="0"/>
+                                          </p:stCondLst>
+                                        </p:cTn>
+                                        <p:tgtEl>
+                                          <p:spTgt spid="3">
+                                            <p:txEl>
+                                              <p:pRg st="7" end="7"/>
+                                            </p:txEl>
+                                          </p:spTgt>
+                                        </p:tgtEl>
+                                        <p:attrNameLst>
+                                          <p:attrName>style.visibility</p:attrName>
+                                        </p:attrNameLst>
+                                      </p:cBhvr>
+                                      <p:to>
+                                        <p:strVal val="visible"/>
+                                      </p:to>
+                                    </p:set>
+                                  </p:childTnLst>
+                                </p:cTn>
+                              </p:par>
+                            </p:childTnLst>
+                          </p:cTn>
+                        </p:par>
+                      </p:childTnLst>
+                    </p:cTn>
+                  </p:par>
+                </p:childTnLst>
+              </p:cTn>
+              <p:prevCondLst>
+                <p:cond evt="onPrev" delay="0">
+                  <p:tgtEl>
+                    <p:sldTgt/>
+                  </p:tgtEl>
+                </p:cond>
+              </p:prevCondLst>
+              <p:nextCondLst>
+                <p:cond evt="onNext" delay="0">
+                  <p:tgtEl>
+                    <p:sldTgt/>
+                  </p:tgtEl>
+                </p:cond>
+              </p:nextCondLst>
+            </p:seq>
+          </p:childTnLst>
+        </p:cTn>
       </p:par>
     </p:tnLst>
   </p:timing>
@@ -20701,7 +20856,422 @@
   <p:timing>
     <p:tnLst>
       <p:par>
-        <p:cTn id="1" dur="indefinite" restart="never" nodeType="tmRoot"/>
+        <p:cTn id="1" dur="indefinite" restart="never" nodeType="tmRoot">
+          <p:childTnLst>
+            <p:seq concurrent="1" nextAc="seek">
+              <p:cTn id="2" dur="indefinite" nodeType="mainSeq">
+                <p:childTnLst>
+                  <p:par>
+                    <p:cTn id="3" fill="hold">
+                      <p:stCondLst>
+                        <p:cond delay="indefinite"/>
+                      </p:stCondLst>
+                      <p:childTnLst>
+                        <p:par>
+                          <p:cTn id="4" fill="hold">
+                            <p:stCondLst>
+                              <p:cond delay="0"/>
+                            </p:stCondLst>
+                            <p:childTnLst>
+                              <p:par>
+                                <p:cTn id="5" presetID="1" presetClass="entr" presetSubtype="0" fill="hold" nodeType="clickEffect">
+                                  <p:stCondLst>
+                                    <p:cond delay="0"/>
+                                  </p:stCondLst>
+                                  <p:childTnLst>
+                                    <p:set>
+                                      <p:cBhvr>
+                                        <p:cTn id="6" dur="1" fill="hold">
+                                          <p:stCondLst>
+                                            <p:cond delay="0"/>
+                                          </p:stCondLst>
+                                        </p:cTn>
+                                        <p:tgtEl>
+                                          <p:spTgt spid="3">
+                                            <p:txEl>
+                                              <p:pRg st="0" end="0"/>
+                                            </p:txEl>
+                                          </p:spTgt>
+                                        </p:tgtEl>
+                                        <p:attrNameLst>
+                                          <p:attrName>style.visibility</p:attrName>
+                                        </p:attrNameLst>
+                                      </p:cBhvr>
+                                      <p:to>
+                                        <p:strVal val="visible"/>
+                                      </p:to>
+                                    </p:set>
+                                  </p:childTnLst>
+                                </p:cTn>
+                              </p:par>
+                            </p:childTnLst>
+                          </p:cTn>
+                        </p:par>
+                      </p:childTnLst>
+                    </p:cTn>
+                  </p:par>
+                  <p:par>
+                    <p:cTn id="7" fill="hold">
+                      <p:stCondLst>
+                        <p:cond delay="indefinite"/>
+                      </p:stCondLst>
+                      <p:childTnLst>
+                        <p:par>
+                          <p:cTn id="8" fill="hold">
+                            <p:stCondLst>
+                              <p:cond delay="0"/>
+                            </p:stCondLst>
+                            <p:childTnLst>
+                              <p:par>
+                                <p:cTn id="9" presetID="1" presetClass="entr" presetSubtype="0" fill="hold" nodeType="clickEffect">
+                                  <p:stCondLst>
+                                    <p:cond delay="0"/>
+                                  </p:stCondLst>
+                                  <p:childTnLst>
+                                    <p:set>
+                                      <p:cBhvr>
+                                        <p:cTn id="10" dur="1" fill="hold">
+                                          <p:stCondLst>
+                                            <p:cond delay="0"/>
+                                          </p:stCondLst>
+                                        </p:cTn>
+                                        <p:tgtEl>
+                                          <p:spTgt spid="3">
+                                            <p:txEl>
+                                              <p:pRg st="2" end="2"/>
+                                            </p:txEl>
+                                          </p:spTgt>
+                                        </p:tgtEl>
+                                        <p:attrNameLst>
+                                          <p:attrName>style.visibility</p:attrName>
+                                        </p:attrNameLst>
+                                      </p:cBhvr>
+                                      <p:to>
+                                        <p:strVal val="visible"/>
+                                      </p:to>
+                                    </p:set>
+                                  </p:childTnLst>
+                                </p:cTn>
+                              </p:par>
+                            </p:childTnLst>
+                          </p:cTn>
+                        </p:par>
+                      </p:childTnLst>
+                    </p:cTn>
+                  </p:par>
+                  <p:par>
+                    <p:cTn id="11" fill="hold">
+                      <p:stCondLst>
+                        <p:cond delay="indefinite"/>
+                      </p:stCondLst>
+                      <p:childTnLst>
+                        <p:par>
+                          <p:cTn id="12" fill="hold">
+                            <p:stCondLst>
+                              <p:cond delay="0"/>
+                            </p:stCondLst>
+                            <p:childTnLst>
+                              <p:par>
+                                <p:cTn id="13" presetID="1" presetClass="entr" presetSubtype="0" fill="hold" nodeType="clickEffect">
+                                  <p:stCondLst>
+                                    <p:cond delay="0"/>
+                                  </p:stCondLst>
+                                  <p:childTnLst>
+                                    <p:set>
+                                      <p:cBhvr>
+                                        <p:cTn id="14" dur="1" fill="hold">
+                                          <p:stCondLst>
+                                            <p:cond delay="0"/>
+                                          </p:stCondLst>
+                                        </p:cTn>
+                                        <p:tgtEl>
+                                          <p:spTgt spid="3">
+                                            <p:txEl>
+                                              <p:pRg st="4" end="4"/>
+                                            </p:txEl>
+                                          </p:spTgt>
+                                        </p:tgtEl>
+                                        <p:attrNameLst>
+                                          <p:attrName>style.visibility</p:attrName>
+                                        </p:attrNameLst>
+                                      </p:cBhvr>
+                                      <p:to>
+                                        <p:strVal val="visible"/>
+                                      </p:to>
+                                    </p:set>
+                                  </p:childTnLst>
+                                </p:cTn>
+                              </p:par>
+                            </p:childTnLst>
+                          </p:cTn>
+                        </p:par>
+                      </p:childTnLst>
+                    </p:cTn>
+                  </p:par>
+                  <p:par>
+                    <p:cTn id="15" fill="hold">
+                      <p:stCondLst>
+                        <p:cond delay="indefinite"/>
+                      </p:stCondLst>
+                      <p:childTnLst>
+                        <p:par>
+                          <p:cTn id="16" fill="hold">
+                            <p:stCondLst>
+                              <p:cond delay="0"/>
+                            </p:stCondLst>
+                            <p:childTnLst>
+                              <p:par>
+                                <p:cTn id="17" presetID="1" presetClass="entr" presetSubtype="0" fill="hold" nodeType="clickEffect">
+                                  <p:stCondLst>
+                                    <p:cond delay="0"/>
+                                  </p:stCondLst>
+                                  <p:childTnLst>
+                                    <p:set>
+                                      <p:cBhvr>
+                                        <p:cTn id="18" dur="1" fill="hold">
+                                          <p:stCondLst>
+                                            <p:cond delay="0"/>
+                                          </p:stCondLst>
+                                        </p:cTn>
+                                        <p:tgtEl>
+                                          <p:spTgt spid="3">
+                                            <p:txEl>
+                                              <p:pRg st="6" end="6"/>
+                                            </p:txEl>
+                                          </p:spTgt>
+                                        </p:tgtEl>
+                                        <p:attrNameLst>
+                                          <p:attrName>style.visibility</p:attrName>
+                                        </p:attrNameLst>
+                                      </p:cBhvr>
+                                      <p:to>
+                                        <p:strVal val="visible"/>
+                                      </p:to>
+                                    </p:set>
+                                  </p:childTnLst>
+                                </p:cTn>
+                              </p:par>
+                            </p:childTnLst>
+                          </p:cTn>
+                        </p:par>
+                      </p:childTnLst>
+                    </p:cTn>
+                  </p:par>
+                  <p:par>
+                    <p:cTn id="19" fill="hold">
+                      <p:stCondLst>
+                        <p:cond delay="indefinite"/>
+                      </p:stCondLst>
+                      <p:childTnLst>
+                        <p:par>
+                          <p:cTn id="20" fill="hold">
+                            <p:stCondLst>
+                              <p:cond delay="0"/>
+                            </p:stCondLst>
+                            <p:childTnLst>
+                              <p:par>
+                                <p:cTn id="21" presetID="1" presetClass="entr" presetSubtype="0" fill="hold" nodeType="clickEffect">
+                                  <p:stCondLst>
+                                    <p:cond delay="0"/>
+                                  </p:stCondLst>
+                                  <p:childTnLst>
+                                    <p:set>
+                                      <p:cBhvr>
+                                        <p:cTn id="22" dur="1" fill="hold">
+                                          <p:stCondLst>
+                                            <p:cond delay="0"/>
+                                          </p:stCondLst>
+                                        </p:cTn>
+                                        <p:tgtEl>
+                                          <p:spTgt spid="3">
+                                            <p:txEl>
+                                              <p:pRg st="8" end="8"/>
+                                            </p:txEl>
+                                          </p:spTgt>
+                                        </p:tgtEl>
+                                        <p:attrNameLst>
+                                          <p:attrName>style.visibility</p:attrName>
+                                        </p:attrNameLst>
+                                      </p:cBhvr>
+                                      <p:to>
+                                        <p:strVal val="visible"/>
+                                      </p:to>
+                                    </p:set>
+                                  </p:childTnLst>
+                                </p:cTn>
+                              </p:par>
+                            </p:childTnLst>
+                          </p:cTn>
+                        </p:par>
+                      </p:childTnLst>
+                    </p:cTn>
+                  </p:par>
+                  <p:par>
+                    <p:cTn id="23" fill="hold">
+                      <p:stCondLst>
+                        <p:cond delay="indefinite"/>
+                      </p:stCondLst>
+                      <p:childTnLst>
+                        <p:par>
+                          <p:cTn id="24" fill="hold">
+                            <p:stCondLst>
+                              <p:cond delay="0"/>
+                            </p:stCondLst>
+                            <p:childTnLst>
+                              <p:par>
+                                <p:cTn id="25" presetID="1" presetClass="entr" presetSubtype="0" fill="hold" nodeType="clickEffect">
+                                  <p:stCondLst>
+                                    <p:cond delay="0"/>
+                                  </p:stCondLst>
+                                  <p:childTnLst>
+                                    <p:set>
+                                      <p:cBhvr>
+                                        <p:cTn id="26" dur="1" fill="hold">
+                                          <p:stCondLst>
+                                            <p:cond delay="0"/>
+                                          </p:stCondLst>
+                                        </p:cTn>
+                                        <p:tgtEl>
+                                          <p:spTgt spid="3">
+                                            <p:txEl>
+                                              <p:pRg st="9" end="9"/>
+                                            </p:txEl>
+                                          </p:spTgt>
+                                        </p:tgtEl>
+                                        <p:attrNameLst>
+                                          <p:attrName>style.visibility</p:attrName>
+                                        </p:attrNameLst>
+                                      </p:cBhvr>
+                                      <p:to>
+                                        <p:strVal val="visible"/>
+                                      </p:to>
+                                    </p:set>
+                                  </p:childTnLst>
+                                </p:cTn>
+                              </p:par>
+                            </p:childTnLst>
+                          </p:cTn>
+                        </p:par>
+                      </p:childTnLst>
+                    </p:cTn>
+                  </p:par>
+                  <p:par>
+                    <p:cTn id="27" fill="hold">
+                      <p:stCondLst>
+                        <p:cond delay="indefinite"/>
+                      </p:stCondLst>
+                      <p:childTnLst>
+                        <p:par>
+                          <p:cTn id="28" fill="hold">
+                            <p:stCondLst>
+                              <p:cond delay="0"/>
+                            </p:stCondLst>
+                            <p:childTnLst>
+                              <p:par>
+                                <p:cTn id="29" presetID="1" presetClass="entr" presetSubtype="0" fill="hold" nodeType="clickEffect">
+                                  <p:stCondLst>
+                                    <p:cond delay="0"/>
+                                  </p:stCondLst>
+                                  <p:childTnLst>
+                                    <p:set>
+                                      <p:cBhvr>
+                                        <p:cTn id="30" dur="1" fill="hold">
+                                          <p:stCondLst>
+                                            <p:cond delay="0"/>
+                                          </p:stCondLst>
+                                        </p:cTn>
+                                        <p:tgtEl>
+                                          <p:spTgt spid="3">
+                                            <p:txEl>
+                                              <p:pRg st="10" end="10"/>
+                                            </p:txEl>
+                                          </p:spTgt>
+                                        </p:tgtEl>
+                                        <p:attrNameLst>
+                                          <p:attrName>style.visibility</p:attrName>
+                                        </p:attrNameLst>
+                                      </p:cBhvr>
+                                      <p:to>
+                                        <p:strVal val="visible"/>
+                                      </p:to>
+                                    </p:set>
+                                  </p:childTnLst>
+                                </p:cTn>
+                              </p:par>
+                            </p:childTnLst>
+                          </p:cTn>
+                        </p:par>
+                      </p:childTnLst>
+                    </p:cTn>
+                  </p:par>
+                  <p:par>
+                    <p:cTn id="31" fill="hold">
+                      <p:stCondLst>
+                        <p:cond delay="indefinite"/>
+                      </p:stCondLst>
+                      <p:childTnLst>
+                        <p:par>
+                          <p:cTn id="32" fill="hold">
+                            <p:stCondLst>
+                              <p:cond delay="0"/>
+                            </p:stCondLst>
+                            <p:childTnLst>
+                              <p:par>
+                                <p:cTn id="33" presetID="1" presetClass="entr" presetSubtype="0" fill="hold" nodeType="clickEffect">
+                                  <p:stCondLst>
+                                    <p:cond delay="0"/>
+                                  </p:stCondLst>
+                                  <p:childTnLst>
+                                    <p:set>
+                                      <p:cBhvr>
+                                        <p:cTn id="34" dur="1" fill="hold">
+                                          <p:stCondLst>
+                                            <p:cond delay="0"/>
+                                          </p:stCondLst>
+                                        </p:cTn>
+                                        <p:tgtEl>
+                                          <p:spTgt spid="3">
+                                            <p:txEl>
+                                              <p:pRg st="11" end="11"/>
+                                            </p:txEl>
+                                          </p:spTgt>
+                                        </p:tgtEl>
+                                        <p:attrNameLst>
+                                          <p:attrName>style.visibility</p:attrName>
+                                        </p:attrNameLst>
+                                      </p:cBhvr>
+                                      <p:to>
+                                        <p:strVal val="visible"/>
+                                      </p:to>
+                                    </p:set>
+                                  </p:childTnLst>
+                                </p:cTn>
+                              </p:par>
+                            </p:childTnLst>
+                          </p:cTn>
+                        </p:par>
+                      </p:childTnLst>
+                    </p:cTn>
+                  </p:par>
+                </p:childTnLst>
+              </p:cTn>
+              <p:prevCondLst>
+                <p:cond evt="onPrev" delay="0">
+                  <p:tgtEl>
+                    <p:sldTgt/>
+                  </p:tgtEl>
+                </p:cond>
+              </p:prevCondLst>
+              <p:nextCondLst>
+                <p:cond evt="onNext" delay="0">
+                  <p:tgtEl>
+                    <p:sldTgt/>
+                  </p:tgtEl>
+                </p:cond>
+              </p:nextCondLst>
+            </p:seq>
+          </p:childTnLst>
+        </p:cTn>
       </p:par>
     </p:tnLst>
   </p:timing>
@@ -20742,6 +21312,341 @@
           <a:p>
             <a:r>
               <a:rPr lang="en-US" dirty="0" smtClean="0"/>
+              <a:t>Hardware costs</a:t>
+            </a:r>
+            <a:endParaRPr lang="en-US" dirty="0"/>
+          </a:p>
+        </p:txBody>
+      </p:sp>
+      <p:sp>
+        <p:nvSpPr>
+          <p:cNvPr id="3" name="Content Placeholder 2"/>
+          <p:cNvSpPr>
+            <a:spLocks noGrp="1"/>
+          </p:cNvSpPr>
+          <p:nvPr>
+            <p:ph idx="1"/>
+          </p:nvPr>
+        </p:nvSpPr>
+        <p:spPr/>
+        <p:txBody>
+          <a:bodyPr/>
+          <a:lstStyle/>
+          <a:p>
+            <a:r>
+              <a:rPr lang="en-US" dirty="0" smtClean="0"/>
+              <a:t>Hardware area excluding wires and memory (common to both)</a:t>
+            </a:r>
+          </a:p>
+          <a:p>
+            <a:pPr lvl="1"/>
+            <a:r>
+              <a:rPr lang="en-US" dirty="0" smtClean="0"/>
+              <a:t>32-stage RMT: 39.8 square mm</a:t>
+            </a:r>
+          </a:p>
+          <a:p>
+            <a:pPr lvl="1"/>
+            <a:r>
+              <a:rPr lang="en-US" dirty="0" smtClean="0"/>
+              <a:t>32-processor </a:t>
+            </a:r>
+            <a:r>
+              <a:rPr lang="en-US" dirty="0" err="1" smtClean="0"/>
+              <a:t>dRMT</a:t>
+            </a:r>
+            <a:r>
+              <a:rPr lang="en-US" dirty="0" smtClean="0"/>
+              <a:t> (32-wide VLIW, segment crossbar): 45.5 square mm</a:t>
+            </a:r>
+          </a:p>
+          <a:p>
+            <a:pPr lvl="1"/>
+            <a:endParaRPr lang="en-US" dirty="0"/>
+          </a:p>
+          <a:p>
+            <a:r>
+              <a:rPr lang="en-US" dirty="0" smtClean="0"/>
+              <a:t>Overall, our tentative analysis is that hardware costs are comparable</a:t>
+            </a:r>
+          </a:p>
+          <a:p>
+            <a:pPr lvl="1"/>
+            <a:r>
+              <a:rPr lang="en-US" dirty="0" smtClean="0"/>
+              <a:t>Tentative because RMT’s numbers are based on 28 nm</a:t>
+            </a:r>
+          </a:p>
+        </p:txBody>
+      </p:sp>
+    </p:spTree>
+    <p:extLst>
+      <p:ext uri="{BB962C8B-B14F-4D97-AF65-F5344CB8AC3E}">
+        <p14:creationId xmlns:p14="http://schemas.microsoft.com/office/powerpoint/2010/main" val="821251361"/>
+      </p:ext>
+    </p:extLst>
+  </p:cSld>
+  <p:clrMapOvr>
+    <a:masterClrMapping/>
+  </p:clrMapOvr>
+  <p:timing>
+    <p:tnLst>
+      <p:par>
+        <p:cTn id="1" dur="indefinite" restart="never" nodeType="tmRoot">
+          <p:childTnLst>
+            <p:seq concurrent="1" nextAc="seek">
+              <p:cTn id="2" dur="indefinite" nodeType="mainSeq">
+                <p:childTnLst>
+                  <p:par>
+                    <p:cTn id="3" fill="hold">
+                      <p:stCondLst>
+                        <p:cond delay="indefinite"/>
+                      </p:stCondLst>
+                      <p:childTnLst>
+                        <p:par>
+                          <p:cTn id="4" fill="hold">
+                            <p:stCondLst>
+                              <p:cond delay="0"/>
+                            </p:stCondLst>
+                            <p:childTnLst>
+                              <p:par>
+                                <p:cTn id="5" presetID="1" presetClass="entr" presetSubtype="0" fill="hold" nodeType="clickEffect">
+                                  <p:stCondLst>
+                                    <p:cond delay="0"/>
+                                  </p:stCondLst>
+                                  <p:childTnLst>
+                                    <p:set>
+                                      <p:cBhvr>
+                                        <p:cTn id="6" dur="1" fill="hold">
+                                          <p:stCondLst>
+                                            <p:cond delay="0"/>
+                                          </p:stCondLst>
+                                        </p:cTn>
+                                        <p:tgtEl>
+                                          <p:spTgt spid="3">
+                                            <p:txEl>
+                                              <p:pRg st="0" end="0"/>
+                                            </p:txEl>
+                                          </p:spTgt>
+                                        </p:tgtEl>
+                                        <p:attrNameLst>
+                                          <p:attrName>style.visibility</p:attrName>
+                                        </p:attrNameLst>
+                                      </p:cBhvr>
+                                      <p:to>
+                                        <p:strVal val="visible"/>
+                                      </p:to>
+                                    </p:set>
+                                  </p:childTnLst>
+                                </p:cTn>
+                              </p:par>
+                              <p:par>
+                                <p:cTn id="7" presetID="1" presetClass="entr" presetSubtype="0" fill="hold" nodeType="withEffect">
+                                  <p:stCondLst>
+                                    <p:cond delay="0"/>
+                                  </p:stCondLst>
+                                  <p:childTnLst>
+                                    <p:set>
+                                      <p:cBhvr>
+                                        <p:cTn id="8" dur="1" fill="hold">
+                                          <p:stCondLst>
+                                            <p:cond delay="0"/>
+                                          </p:stCondLst>
+                                        </p:cTn>
+                                        <p:tgtEl>
+                                          <p:spTgt spid="3">
+                                            <p:txEl>
+                                              <p:pRg st="1" end="1"/>
+                                            </p:txEl>
+                                          </p:spTgt>
+                                        </p:tgtEl>
+                                        <p:attrNameLst>
+                                          <p:attrName>style.visibility</p:attrName>
+                                        </p:attrNameLst>
+                                      </p:cBhvr>
+                                      <p:to>
+                                        <p:strVal val="visible"/>
+                                      </p:to>
+                                    </p:set>
+                                  </p:childTnLst>
+                                </p:cTn>
+                              </p:par>
+                              <p:par>
+                                <p:cTn id="9" presetID="1" presetClass="entr" presetSubtype="0" fill="hold" nodeType="withEffect">
+                                  <p:stCondLst>
+                                    <p:cond delay="0"/>
+                                  </p:stCondLst>
+                                  <p:childTnLst>
+                                    <p:set>
+                                      <p:cBhvr>
+                                        <p:cTn id="10" dur="1" fill="hold">
+                                          <p:stCondLst>
+                                            <p:cond delay="0"/>
+                                          </p:stCondLst>
+                                        </p:cTn>
+                                        <p:tgtEl>
+                                          <p:spTgt spid="3">
+                                            <p:txEl>
+                                              <p:pRg st="2" end="2"/>
+                                            </p:txEl>
+                                          </p:spTgt>
+                                        </p:tgtEl>
+                                        <p:attrNameLst>
+                                          <p:attrName>style.visibility</p:attrName>
+                                        </p:attrNameLst>
+                                      </p:cBhvr>
+                                      <p:to>
+                                        <p:strVal val="visible"/>
+                                      </p:to>
+                                    </p:set>
+                                  </p:childTnLst>
+                                </p:cTn>
+                              </p:par>
+                            </p:childTnLst>
+                          </p:cTn>
+                        </p:par>
+                      </p:childTnLst>
+                    </p:cTn>
+                  </p:par>
+                  <p:par>
+                    <p:cTn id="11" fill="hold">
+                      <p:stCondLst>
+                        <p:cond delay="indefinite"/>
+                      </p:stCondLst>
+                      <p:childTnLst>
+                        <p:par>
+                          <p:cTn id="12" fill="hold">
+                            <p:stCondLst>
+                              <p:cond delay="0"/>
+                            </p:stCondLst>
+                            <p:childTnLst>
+                              <p:par>
+                                <p:cTn id="13" presetID="1" presetClass="entr" presetSubtype="0" fill="hold" nodeType="clickEffect">
+                                  <p:stCondLst>
+                                    <p:cond delay="0"/>
+                                  </p:stCondLst>
+                                  <p:childTnLst>
+                                    <p:set>
+                                      <p:cBhvr>
+                                        <p:cTn id="14" dur="1" fill="hold">
+                                          <p:stCondLst>
+                                            <p:cond delay="0"/>
+                                          </p:stCondLst>
+                                        </p:cTn>
+                                        <p:tgtEl>
+                                          <p:spTgt spid="3">
+                                            <p:txEl>
+                                              <p:pRg st="4" end="4"/>
+                                            </p:txEl>
+                                          </p:spTgt>
+                                        </p:tgtEl>
+                                        <p:attrNameLst>
+                                          <p:attrName>style.visibility</p:attrName>
+                                        </p:attrNameLst>
+                                      </p:cBhvr>
+                                      <p:to>
+                                        <p:strVal val="visible"/>
+                                      </p:to>
+                                    </p:set>
+                                  </p:childTnLst>
+                                </p:cTn>
+                              </p:par>
+                              <p:par>
+                                <p:cTn id="15" presetID="1" presetClass="entr" presetSubtype="0" fill="hold" nodeType="withEffect">
+                                  <p:stCondLst>
+                                    <p:cond delay="0"/>
+                                  </p:stCondLst>
+                                  <p:childTnLst>
+                                    <p:set>
+                                      <p:cBhvr>
+                                        <p:cTn id="16" dur="1" fill="hold">
+                                          <p:stCondLst>
+                                            <p:cond delay="0"/>
+                                          </p:stCondLst>
+                                        </p:cTn>
+                                        <p:tgtEl>
+                                          <p:spTgt spid="3">
+                                            <p:txEl>
+                                              <p:pRg st="5" end="5"/>
+                                            </p:txEl>
+                                          </p:spTgt>
+                                        </p:tgtEl>
+                                        <p:attrNameLst>
+                                          <p:attrName>style.visibility</p:attrName>
+                                        </p:attrNameLst>
+                                      </p:cBhvr>
+                                      <p:to>
+                                        <p:strVal val="visible"/>
+                                      </p:to>
+                                    </p:set>
+                                  </p:childTnLst>
+                                </p:cTn>
+                              </p:par>
+                            </p:childTnLst>
+                          </p:cTn>
+                        </p:par>
+                      </p:childTnLst>
+                    </p:cTn>
+                  </p:par>
+                </p:childTnLst>
+              </p:cTn>
+              <p:prevCondLst>
+                <p:cond evt="onPrev" delay="0">
+                  <p:tgtEl>
+                    <p:sldTgt/>
+                  </p:tgtEl>
+                </p:cond>
+              </p:prevCondLst>
+              <p:nextCondLst>
+                <p:cond evt="onNext" delay="0">
+                  <p:tgtEl>
+                    <p:sldTgt/>
+                  </p:tgtEl>
+                </p:cond>
+              </p:nextCondLst>
+            </p:seq>
+          </p:childTnLst>
+        </p:cTn>
+      </p:par>
+    </p:tnLst>
+  </p:timing>
+</p:sld>
+</file>
+
+<file path=ppt/slides/slide24.xml><?xml version="1.0" encoding="utf-8"?>
+<p:sld xmlns:a="http://schemas.openxmlformats.org/drawingml/2006/main" xmlns:r="http://schemas.openxmlformats.org/officeDocument/2006/relationships" xmlns:p="http://schemas.openxmlformats.org/presentationml/2006/main">
+  <p:cSld>
+    <p:spTree>
+      <p:nvGrpSpPr>
+        <p:cNvPr id="1" name=""/>
+        <p:cNvGrpSpPr/>
+        <p:nvPr/>
+      </p:nvGrpSpPr>
+      <p:grpSpPr>
+        <a:xfrm>
+          <a:off x="0" y="0"/>
+          <a:ext cx="0" cy="0"/>
+          <a:chOff x="0" y="0"/>
+          <a:chExt cx="0" cy="0"/>
+        </a:xfrm>
+      </p:grpSpPr>
+      <p:sp>
+        <p:nvSpPr>
+          <p:cNvPr id="2" name="Title 1"/>
+          <p:cNvSpPr>
+            <a:spLocks noGrp="1"/>
+          </p:cNvSpPr>
+          <p:nvPr>
+            <p:ph type="title"/>
+          </p:nvPr>
+        </p:nvSpPr>
+        <p:spPr/>
+        <p:txBody>
+          <a:bodyPr/>
+          <a:lstStyle/>
+          <a:p>
+            <a:r>
+              <a:rPr lang="en-US" dirty="0" smtClean="0"/>
               <a:t>Related Work</a:t>
             </a:r>
             <a:endParaRPr lang="en-US" dirty="0"/>
@@ -20969,14 +21874,543 @@
   <p:timing>
     <p:tnLst>
       <p:par>
-        <p:cTn id="1" dur="indefinite" restart="never" nodeType="tmRoot"/>
+        <p:cTn id="1" dur="indefinite" restart="never" nodeType="tmRoot">
+          <p:childTnLst>
+            <p:seq concurrent="1" nextAc="seek">
+              <p:cTn id="2" dur="indefinite" nodeType="mainSeq">
+                <p:childTnLst>
+                  <p:par>
+                    <p:cTn id="3" fill="hold">
+                      <p:stCondLst>
+                        <p:cond delay="indefinite"/>
+                      </p:stCondLst>
+                      <p:childTnLst>
+                        <p:par>
+                          <p:cTn id="4" fill="hold">
+                            <p:stCondLst>
+                              <p:cond delay="0"/>
+                            </p:stCondLst>
+                            <p:childTnLst>
+                              <p:par>
+                                <p:cTn id="5" presetID="1" presetClass="entr" presetSubtype="0" fill="hold" nodeType="clickEffect">
+                                  <p:stCondLst>
+                                    <p:cond delay="0"/>
+                                  </p:stCondLst>
+                                  <p:childTnLst>
+                                    <p:set>
+                                      <p:cBhvr>
+                                        <p:cTn id="6" dur="1" fill="hold">
+                                          <p:stCondLst>
+                                            <p:cond delay="0"/>
+                                          </p:stCondLst>
+                                        </p:cTn>
+                                        <p:tgtEl>
+                                          <p:spTgt spid="6">
+                                            <p:txEl>
+                                              <p:pRg st="0" end="0"/>
+                                            </p:txEl>
+                                          </p:spTgt>
+                                        </p:tgtEl>
+                                        <p:attrNameLst>
+                                          <p:attrName>style.visibility</p:attrName>
+                                        </p:attrNameLst>
+                                      </p:cBhvr>
+                                      <p:to>
+                                        <p:strVal val="visible"/>
+                                      </p:to>
+                                    </p:set>
+                                  </p:childTnLst>
+                                </p:cTn>
+                              </p:par>
+                              <p:par>
+                                <p:cTn id="7" presetID="1" presetClass="entr" presetSubtype="0" fill="hold" nodeType="withEffect">
+                                  <p:stCondLst>
+                                    <p:cond delay="0"/>
+                                  </p:stCondLst>
+                                  <p:childTnLst>
+                                    <p:set>
+                                      <p:cBhvr>
+                                        <p:cTn id="8" dur="1" fill="hold">
+                                          <p:stCondLst>
+                                            <p:cond delay="0"/>
+                                          </p:stCondLst>
+                                        </p:cTn>
+                                        <p:tgtEl>
+                                          <p:spTgt spid="3">
+                                            <p:txEl>
+                                              <p:pRg st="0" end="0"/>
+                                            </p:txEl>
+                                          </p:spTgt>
+                                        </p:tgtEl>
+                                        <p:attrNameLst>
+                                          <p:attrName>style.visibility</p:attrName>
+                                        </p:attrNameLst>
+                                      </p:cBhvr>
+                                      <p:to>
+                                        <p:strVal val="visible"/>
+                                      </p:to>
+                                    </p:set>
+                                  </p:childTnLst>
+                                </p:cTn>
+                              </p:par>
+                            </p:childTnLst>
+                          </p:cTn>
+                        </p:par>
+                      </p:childTnLst>
+                    </p:cTn>
+                  </p:par>
+                  <p:par>
+                    <p:cTn id="9" fill="hold">
+                      <p:stCondLst>
+                        <p:cond delay="indefinite"/>
+                      </p:stCondLst>
+                      <p:childTnLst>
+                        <p:par>
+                          <p:cTn id="10" fill="hold">
+                            <p:stCondLst>
+                              <p:cond delay="0"/>
+                            </p:stCondLst>
+                            <p:childTnLst>
+                              <p:par>
+                                <p:cTn id="11" presetID="1" presetClass="entr" presetSubtype="0" fill="hold" nodeType="clickEffect">
+                                  <p:stCondLst>
+                                    <p:cond delay="0"/>
+                                  </p:stCondLst>
+                                  <p:childTnLst>
+                                    <p:set>
+                                      <p:cBhvr>
+                                        <p:cTn id="12" dur="1" fill="hold">
+                                          <p:stCondLst>
+                                            <p:cond delay="0"/>
+                                          </p:stCondLst>
+                                        </p:cTn>
+                                        <p:tgtEl>
+                                          <p:spTgt spid="3">
+                                            <p:txEl>
+                                              <p:pRg st="1" end="1"/>
+                                            </p:txEl>
+                                          </p:spTgt>
+                                        </p:tgtEl>
+                                        <p:attrNameLst>
+                                          <p:attrName>style.visibility</p:attrName>
+                                        </p:attrNameLst>
+                                      </p:cBhvr>
+                                      <p:to>
+                                        <p:strVal val="visible"/>
+                                      </p:to>
+                                    </p:set>
+                                  </p:childTnLst>
+                                </p:cTn>
+                              </p:par>
+                              <p:par>
+                                <p:cTn id="13" presetID="1" presetClass="entr" presetSubtype="0" fill="hold" nodeType="withEffect">
+                                  <p:stCondLst>
+                                    <p:cond delay="0"/>
+                                  </p:stCondLst>
+                                  <p:childTnLst>
+                                    <p:set>
+                                      <p:cBhvr>
+                                        <p:cTn id="14" dur="1" fill="hold">
+                                          <p:stCondLst>
+                                            <p:cond delay="0"/>
+                                          </p:stCondLst>
+                                        </p:cTn>
+                                        <p:tgtEl>
+                                          <p:spTgt spid="6">
+                                            <p:txEl>
+                                              <p:pRg st="1" end="1"/>
+                                            </p:txEl>
+                                          </p:spTgt>
+                                        </p:tgtEl>
+                                        <p:attrNameLst>
+                                          <p:attrName>style.visibility</p:attrName>
+                                        </p:attrNameLst>
+                                      </p:cBhvr>
+                                      <p:to>
+                                        <p:strVal val="visible"/>
+                                      </p:to>
+                                    </p:set>
+                                  </p:childTnLst>
+                                </p:cTn>
+                              </p:par>
+                            </p:childTnLst>
+                          </p:cTn>
+                        </p:par>
+                      </p:childTnLst>
+                    </p:cTn>
+                  </p:par>
+                  <p:par>
+                    <p:cTn id="15" fill="hold">
+                      <p:stCondLst>
+                        <p:cond delay="indefinite"/>
+                      </p:stCondLst>
+                      <p:childTnLst>
+                        <p:par>
+                          <p:cTn id="16" fill="hold">
+                            <p:stCondLst>
+                              <p:cond delay="0"/>
+                            </p:stCondLst>
+                            <p:childTnLst>
+                              <p:par>
+                                <p:cTn id="17" presetID="1" presetClass="entr" presetSubtype="0" fill="hold" nodeType="clickEffect">
+                                  <p:stCondLst>
+                                    <p:cond delay="0"/>
+                                  </p:stCondLst>
+                                  <p:childTnLst>
+                                    <p:set>
+                                      <p:cBhvr>
+                                        <p:cTn id="18" dur="1" fill="hold">
+                                          <p:stCondLst>
+                                            <p:cond delay="0"/>
+                                          </p:stCondLst>
+                                        </p:cTn>
+                                        <p:tgtEl>
+                                          <p:spTgt spid="3">
+                                            <p:txEl>
+                                              <p:pRg st="2" end="2"/>
+                                            </p:txEl>
+                                          </p:spTgt>
+                                        </p:tgtEl>
+                                        <p:attrNameLst>
+                                          <p:attrName>style.visibility</p:attrName>
+                                        </p:attrNameLst>
+                                      </p:cBhvr>
+                                      <p:to>
+                                        <p:strVal val="visible"/>
+                                      </p:to>
+                                    </p:set>
+                                  </p:childTnLst>
+                                </p:cTn>
+                              </p:par>
+                              <p:par>
+                                <p:cTn id="19" presetID="1" presetClass="entr" presetSubtype="0" fill="hold" nodeType="withEffect">
+                                  <p:stCondLst>
+                                    <p:cond delay="0"/>
+                                  </p:stCondLst>
+                                  <p:childTnLst>
+                                    <p:set>
+                                      <p:cBhvr>
+                                        <p:cTn id="20" dur="1" fill="hold">
+                                          <p:stCondLst>
+                                            <p:cond delay="0"/>
+                                          </p:stCondLst>
+                                        </p:cTn>
+                                        <p:tgtEl>
+                                          <p:spTgt spid="3">
+                                            <p:txEl>
+                                              <p:pRg st="3" end="3"/>
+                                            </p:txEl>
+                                          </p:spTgt>
+                                        </p:tgtEl>
+                                        <p:attrNameLst>
+                                          <p:attrName>style.visibility</p:attrName>
+                                        </p:attrNameLst>
+                                      </p:cBhvr>
+                                      <p:to>
+                                        <p:strVal val="visible"/>
+                                      </p:to>
+                                    </p:set>
+                                  </p:childTnLst>
+                                </p:cTn>
+                              </p:par>
+                              <p:par>
+                                <p:cTn id="21" presetID="1" presetClass="entr" presetSubtype="0" fill="hold" nodeType="withEffect">
+                                  <p:stCondLst>
+                                    <p:cond delay="0"/>
+                                  </p:stCondLst>
+                                  <p:childTnLst>
+                                    <p:set>
+                                      <p:cBhvr>
+                                        <p:cTn id="22" dur="1" fill="hold">
+                                          <p:stCondLst>
+                                            <p:cond delay="0"/>
+                                          </p:stCondLst>
+                                        </p:cTn>
+                                        <p:tgtEl>
+                                          <p:spTgt spid="3">
+                                            <p:txEl>
+                                              <p:pRg st="4" end="4"/>
+                                            </p:txEl>
+                                          </p:spTgt>
+                                        </p:tgtEl>
+                                        <p:attrNameLst>
+                                          <p:attrName>style.visibility</p:attrName>
+                                        </p:attrNameLst>
+                                      </p:cBhvr>
+                                      <p:to>
+                                        <p:strVal val="visible"/>
+                                      </p:to>
+                                    </p:set>
+                                  </p:childTnLst>
+                                </p:cTn>
+                              </p:par>
+                              <p:par>
+                                <p:cTn id="23" presetID="1" presetClass="entr" presetSubtype="0" fill="hold" nodeType="withEffect">
+                                  <p:stCondLst>
+                                    <p:cond delay="0"/>
+                                  </p:stCondLst>
+                                  <p:childTnLst>
+                                    <p:set>
+                                      <p:cBhvr>
+                                        <p:cTn id="24" dur="1" fill="hold">
+                                          <p:stCondLst>
+                                            <p:cond delay="0"/>
+                                          </p:stCondLst>
+                                        </p:cTn>
+                                        <p:tgtEl>
+                                          <p:spTgt spid="3">
+                                            <p:txEl>
+                                              <p:pRg st="5" end="5"/>
+                                            </p:txEl>
+                                          </p:spTgt>
+                                        </p:tgtEl>
+                                        <p:attrNameLst>
+                                          <p:attrName>style.visibility</p:attrName>
+                                        </p:attrNameLst>
+                                      </p:cBhvr>
+                                      <p:to>
+                                        <p:strVal val="visible"/>
+                                      </p:to>
+                                    </p:set>
+                                  </p:childTnLst>
+                                </p:cTn>
+                              </p:par>
+                              <p:par>
+                                <p:cTn id="25" presetID="1" presetClass="entr" presetSubtype="0" fill="hold" nodeType="withEffect">
+                                  <p:stCondLst>
+                                    <p:cond delay="0"/>
+                                  </p:stCondLst>
+                                  <p:childTnLst>
+                                    <p:set>
+                                      <p:cBhvr>
+                                        <p:cTn id="26" dur="1" fill="hold">
+                                          <p:stCondLst>
+                                            <p:cond delay="0"/>
+                                          </p:stCondLst>
+                                        </p:cTn>
+                                        <p:tgtEl>
+                                          <p:spTgt spid="3">
+                                            <p:txEl>
+                                              <p:pRg st="6" end="6"/>
+                                            </p:txEl>
+                                          </p:spTgt>
+                                        </p:tgtEl>
+                                        <p:attrNameLst>
+                                          <p:attrName>style.visibility</p:attrName>
+                                        </p:attrNameLst>
+                                      </p:cBhvr>
+                                      <p:to>
+                                        <p:strVal val="visible"/>
+                                      </p:to>
+                                    </p:set>
+                                  </p:childTnLst>
+                                </p:cTn>
+                              </p:par>
+                            </p:childTnLst>
+                          </p:cTn>
+                        </p:par>
+                      </p:childTnLst>
+                    </p:cTn>
+                  </p:par>
+                  <p:par>
+                    <p:cTn id="27" fill="hold">
+                      <p:stCondLst>
+                        <p:cond delay="indefinite"/>
+                      </p:stCondLst>
+                      <p:childTnLst>
+                        <p:par>
+                          <p:cTn id="28" fill="hold">
+                            <p:stCondLst>
+                              <p:cond delay="0"/>
+                            </p:stCondLst>
+                            <p:childTnLst>
+                              <p:par>
+                                <p:cTn id="29" presetID="1" presetClass="entr" presetSubtype="0" fill="hold" nodeType="clickEffect">
+                                  <p:stCondLst>
+                                    <p:cond delay="0"/>
+                                  </p:stCondLst>
+                                  <p:childTnLst>
+                                    <p:set>
+                                      <p:cBhvr>
+                                        <p:cTn id="30" dur="1" fill="hold">
+                                          <p:stCondLst>
+                                            <p:cond delay="0"/>
+                                          </p:stCondLst>
+                                        </p:cTn>
+                                        <p:tgtEl>
+                                          <p:spTgt spid="6">
+                                            <p:txEl>
+                                              <p:pRg st="2" end="2"/>
+                                            </p:txEl>
+                                          </p:spTgt>
+                                        </p:tgtEl>
+                                        <p:attrNameLst>
+                                          <p:attrName>style.visibility</p:attrName>
+                                        </p:attrNameLst>
+                                      </p:cBhvr>
+                                      <p:to>
+                                        <p:strVal val="visible"/>
+                                      </p:to>
+                                    </p:set>
+                                  </p:childTnLst>
+                                </p:cTn>
+                              </p:par>
+                              <p:par>
+                                <p:cTn id="31" presetID="1" presetClass="entr" presetSubtype="0" fill="hold" nodeType="withEffect">
+                                  <p:stCondLst>
+                                    <p:cond delay="0"/>
+                                  </p:stCondLst>
+                                  <p:childTnLst>
+                                    <p:set>
+                                      <p:cBhvr>
+                                        <p:cTn id="32" dur="1" fill="hold">
+                                          <p:stCondLst>
+                                            <p:cond delay="0"/>
+                                          </p:stCondLst>
+                                        </p:cTn>
+                                        <p:tgtEl>
+                                          <p:spTgt spid="6">
+                                            <p:txEl>
+                                              <p:pRg st="3" end="3"/>
+                                            </p:txEl>
+                                          </p:spTgt>
+                                        </p:tgtEl>
+                                        <p:attrNameLst>
+                                          <p:attrName>style.visibility</p:attrName>
+                                        </p:attrNameLst>
+                                      </p:cBhvr>
+                                      <p:to>
+                                        <p:strVal val="visible"/>
+                                      </p:to>
+                                    </p:set>
+                                  </p:childTnLst>
+                                </p:cTn>
+                              </p:par>
+                              <p:par>
+                                <p:cTn id="33" presetID="1" presetClass="entr" presetSubtype="0" fill="hold" nodeType="withEffect">
+                                  <p:stCondLst>
+                                    <p:cond delay="0"/>
+                                  </p:stCondLst>
+                                  <p:childTnLst>
+                                    <p:set>
+                                      <p:cBhvr>
+                                        <p:cTn id="34" dur="1" fill="hold">
+                                          <p:stCondLst>
+                                            <p:cond delay="0"/>
+                                          </p:stCondLst>
+                                        </p:cTn>
+                                        <p:tgtEl>
+                                          <p:spTgt spid="6">
+                                            <p:txEl>
+                                              <p:pRg st="4" end="4"/>
+                                            </p:txEl>
+                                          </p:spTgt>
+                                        </p:tgtEl>
+                                        <p:attrNameLst>
+                                          <p:attrName>style.visibility</p:attrName>
+                                        </p:attrNameLst>
+                                      </p:cBhvr>
+                                      <p:to>
+                                        <p:strVal val="visible"/>
+                                      </p:to>
+                                    </p:set>
+                                  </p:childTnLst>
+                                </p:cTn>
+                              </p:par>
+                              <p:par>
+                                <p:cTn id="35" presetID="1" presetClass="entr" presetSubtype="0" fill="hold" nodeType="withEffect">
+                                  <p:stCondLst>
+                                    <p:cond delay="0"/>
+                                  </p:stCondLst>
+                                  <p:childTnLst>
+                                    <p:set>
+                                      <p:cBhvr>
+                                        <p:cTn id="36" dur="1" fill="hold">
+                                          <p:stCondLst>
+                                            <p:cond delay="0"/>
+                                          </p:stCondLst>
+                                        </p:cTn>
+                                        <p:tgtEl>
+                                          <p:spTgt spid="6">
+                                            <p:txEl>
+                                              <p:pRg st="5" end="5"/>
+                                            </p:txEl>
+                                          </p:spTgt>
+                                        </p:tgtEl>
+                                        <p:attrNameLst>
+                                          <p:attrName>style.visibility</p:attrName>
+                                        </p:attrNameLst>
+                                      </p:cBhvr>
+                                      <p:to>
+                                        <p:strVal val="visible"/>
+                                      </p:to>
+                                    </p:set>
+                                  </p:childTnLst>
+                                </p:cTn>
+                              </p:par>
+                              <p:par>
+                                <p:cTn id="37" presetID="1" presetClass="entr" presetSubtype="0" fill="hold" nodeType="withEffect">
+                                  <p:stCondLst>
+                                    <p:cond delay="0"/>
+                                  </p:stCondLst>
+                                  <p:childTnLst>
+                                    <p:set>
+                                      <p:cBhvr>
+                                        <p:cTn id="38" dur="1" fill="hold">
+                                          <p:stCondLst>
+                                            <p:cond delay="0"/>
+                                          </p:stCondLst>
+                                        </p:cTn>
+                                        <p:tgtEl>
+                                          <p:spTgt spid="6">
+                                            <p:txEl>
+                                              <p:pRg st="6" end="6"/>
+                                            </p:txEl>
+                                          </p:spTgt>
+                                        </p:tgtEl>
+                                        <p:attrNameLst>
+                                          <p:attrName>style.visibility</p:attrName>
+                                        </p:attrNameLst>
+                                      </p:cBhvr>
+                                      <p:to>
+                                        <p:strVal val="visible"/>
+                                      </p:to>
+                                    </p:set>
+                                  </p:childTnLst>
+                                </p:cTn>
+                              </p:par>
+                            </p:childTnLst>
+                          </p:cTn>
+                        </p:par>
+                      </p:childTnLst>
+                    </p:cTn>
+                  </p:par>
+                </p:childTnLst>
+              </p:cTn>
+              <p:prevCondLst>
+                <p:cond evt="onPrev" delay="0">
+                  <p:tgtEl>
+                    <p:sldTgt/>
+                  </p:tgtEl>
+                </p:cond>
+              </p:prevCondLst>
+              <p:nextCondLst>
+                <p:cond evt="onNext" delay="0">
+                  <p:tgtEl>
+                    <p:sldTgt/>
+                  </p:tgtEl>
+                </p:cond>
+              </p:nextCondLst>
+            </p:seq>
+          </p:childTnLst>
+        </p:cTn>
       </p:par>
     </p:tnLst>
   </p:timing>
 </p:sld>
 </file>
 
-<file path=ppt/slides/slide24.xml><?xml version="1.0" encoding="utf-8"?>
+<file path=ppt/slides/slide25.xml><?xml version="1.0" encoding="utf-8"?>
 <p:sld xmlns:a="http://schemas.openxmlformats.org/drawingml/2006/main" xmlns:r="http://schemas.openxmlformats.org/officeDocument/2006/relationships" xmlns:p="http://schemas.openxmlformats.org/presentationml/2006/main">
   <p:cSld>
     <p:spTree>
@@ -21193,7 +22627,239 @@
   <p:timing>
     <p:tnLst>
       <p:par>
-        <p:cTn id="1" dur="indefinite" restart="never" nodeType="tmRoot"/>
+        <p:cTn id="1" dur="indefinite" restart="never" nodeType="tmRoot">
+          <p:childTnLst>
+            <p:seq concurrent="1" nextAc="seek">
+              <p:cTn id="2" dur="indefinite" nodeType="mainSeq">
+                <p:childTnLst>
+                  <p:par>
+                    <p:cTn id="3" fill="hold">
+                      <p:stCondLst>
+                        <p:cond delay="indefinite"/>
+                      </p:stCondLst>
+                      <p:childTnLst>
+                        <p:par>
+                          <p:cTn id="4" fill="hold">
+                            <p:stCondLst>
+                              <p:cond delay="0"/>
+                            </p:stCondLst>
+                            <p:childTnLst>
+                              <p:par>
+                                <p:cTn id="5" presetID="1" presetClass="entr" presetSubtype="0" fill="hold" nodeType="clickEffect">
+                                  <p:stCondLst>
+                                    <p:cond delay="0"/>
+                                  </p:stCondLst>
+                                  <p:childTnLst>
+                                    <p:set>
+                                      <p:cBhvr>
+                                        <p:cTn id="6" dur="1" fill="hold">
+                                          <p:stCondLst>
+                                            <p:cond delay="0"/>
+                                          </p:stCondLst>
+                                        </p:cTn>
+                                        <p:tgtEl>
+                                          <p:spTgt spid="3">
+                                            <p:txEl>
+                                              <p:pRg st="0" end="0"/>
+                                            </p:txEl>
+                                          </p:spTgt>
+                                        </p:tgtEl>
+                                        <p:attrNameLst>
+                                          <p:attrName>style.visibility</p:attrName>
+                                        </p:attrNameLst>
+                                      </p:cBhvr>
+                                      <p:to>
+                                        <p:strVal val="visible"/>
+                                      </p:to>
+                                    </p:set>
+                                  </p:childTnLst>
+                                </p:cTn>
+                              </p:par>
+                            </p:childTnLst>
+                          </p:cTn>
+                        </p:par>
+                      </p:childTnLst>
+                    </p:cTn>
+                  </p:par>
+                  <p:par>
+                    <p:cTn id="7" fill="hold">
+                      <p:stCondLst>
+                        <p:cond delay="indefinite"/>
+                      </p:stCondLst>
+                      <p:childTnLst>
+                        <p:par>
+                          <p:cTn id="8" fill="hold">
+                            <p:stCondLst>
+                              <p:cond delay="0"/>
+                            </p:stCondLst>
+                            <p:childTnLst>
+                              <p:par>
+                                <p:cTn id="9" presetID="1" presetClass="entr" presetSubtype="0" fill="hold" nodeType="clickEffect">
+                                  <p:stCondLst>
+                                    <p:cond delay="0"/>
+                                  </p:stCondLst>
+                                  <p:childTnLst>
+                                    <p:set>
+                                      <p:cBhvr>
+                                        <p:cTn id="10" dur="1" fill="hold">
+                                          <p:stCondLst>
+                                            <p:cond delay="0"/>
+                                          </p:stCondLst>
+                                        </p:cTn>
+                                        <p:tgtEl>
+                                          <p:spTgt spid="3">
+                                            <p:txEl>
+                                              <p:pRg st="2" end="2"/>
+                                            </p:txEl>
+                                          </p:spTgt>
+                                        </p:tgtEl>
+                                        <p:attrNameLst>
+                                          <p:attrName>style.visibility</p:attrName>
+                                        </p:attrNameLst>
+                                      </p:cBhvr>
+                                      <p:to>
+                                        <p:strVal val="visible"/>
+                                      </p:to>
+                                    </p:set>
+                                  </p:childTnLst>
+                                </p:cTn>
+                              </p:par>
+                              <p:par>
+                                <p:cTn id="11" presetID="1" presetClass="entr" presetSubtype="0" fill="hold" nodeType="withEffect">
+                                  <p:stCondLst>
+                                    <p:cond delay="0"/>
+                                  </p:stCondLst>
+                                  <p:childTnLst>
+                                    <p:set>
+                                      <p:cBhvr>
+                                        <p:cTn id="12" dur="1" fill="hold">
+                                          <p:stCondLst>
+                                            <p:cond delay="0"/>
+                                          </p:stCondLst>
+                                        </p:cTn>
+                                        <p:tgtEl>
+                                          <p:spTgt spid="3">
+                                            <p:txEl>
+                                              <p:pRg st="3" end="3"/>
+                                            </p:txEl>
+                                          </p:spTgt>
+                                        </p:tgtEl>
+                                        <p:attrNameLst>
+                                          <p:attrName>style.visibility</p:attrName>
+                                        </p:attrNameLst>
+                                      </p:cBhvr>
+                                      <p:to>
+                                        <p:strVal val="visible"/>
+                                      </p:to>
+                                    </p:set>
+                                  </p:childTnLst>
+                                </p:cTn>
+                              </p:par>
+                            </p:childTnLst>
+                          </p:cTn>
+                        </p:par>
+                      </p:childTnLst>
+                    </p:cTn>
+                  </p:par>
+                  <p:par>
+                    <p:cTn id="13" fill="hold">
+                      <p:stCondLst>
+                        <p:cond delay="indefinite"/>
+                      </p:stCondLst>
+                      <p:childTnLst>
+                        <p:par>
+                          <p:cTn id="14" fill="hold">
+                            <p:stCondLst>
+                              <p:cond delay="0"/>
+                            </p:stCondLst>
+                            <p:childTnLst>
+                              <p:par>
+                                <p:cTn id="15" presetID="1" presetClass="entr" presetSubtype="0" fill="hold" nodeType="clickEffect">
+                                  <p:stCondLst>
+                                    <p:cond delay="0"/>
+                                  </p:stCondLst>
+                                  <p:childTnLst>
+                                    <p:set>
+                                      <p:cBhvr>
+                                        <p:cTn id="16" dur="1" fill="hold">
+                                          <p:stCondLst>
+                                            <p:cond delay="0"/>
+                                          </p:stCondLst>
+                                        </p:cTn>
+                                        <p:tgtEl>
+                                          <p:spTgt spid="3">
+                                            <p:txEl>
+                                              <p:pRg st="5" end="5"/>
+                                            </p:txEl>
+                                          </p:spTgt>
+                                        </p:tgtEl>
+                                        <p:attrNameLst>
+                                          <p:attrName>style.visibility</p:attrName>
+                                        </p:attrNameLst>
+                                      </p:cBhvr>
+                                      <p:to>
+                                        <p:strVal val="visible"/>
+                                      </p:to>
+                                    </p:set>
+                                  </p:childTnLst>
+                                </p:cTn>
+                              </p:par>
+                              <p:par>
+                                <p:cTn id="17" presetID="1" presetClass="entr" presetSubtype="0" fill="hold" nodeType="withEffect">
+                                  <p:stCondLst>
+                                    <p:cond delay="0"/>
+                                  </p:stCondLst>
+                                  <p:childTnLst>
+                                    <p:set>
+                                      <p:cBhvr>
+                                        <p:cTn id="18" dur="1" fill="hold">
+                                          <p:stCondLst>
+                                            <p:cond delay="0"/>
+                                          </p:stCondLst>
+                                        </p:cTn>
+                                        <p:tgtEl>
+                                          <p:spTgt spid="3">
+                                            <p:txEl>
+                                              <p:pRg st="6" end="6"/>
+                                            </p:txEl>
+                                          </p:spTgt>
+                                        </p:tgtEl>
+                                        <p:attrNameLst>
+                                          <p:attrName>style.visibility</p:attrName>
+                                        </p:attrNameLst>
+                                      </p:cBhvr>
+                                      <p:to>
+                                        <p:strVal val="visible"/>
+                                      </p:to>
+                                    </p:set>
+                                  </p:childTnLst>
+                                </p:cTn>
+                              </p:par>
+                            </p:childTnLst>
+                          </p:cTn>
+                        </p:par>
+                      </p:childTnLst>
+                    </p:cTn>
+                  </p:par>
+                </p:childTnLst>
+              </p:cTn>
+              <p:prevCondLst>
+                <p:cond evt="onPrev" delay="0">
+                  <p:tgtEl>
+                    <p:sldTgt/>
+                  </p:tgtEl>
+                </p:cond>
+              </p:prevCondLst>
+              <p:nextCondLst>
+                <p:cond evt="onNext" delay="0">
+                  <p:tgtEl>
+                    <p:sldTgt/>
+                  </p:tgtEl>
+                </p:cond>
+              </p:nextCondLst>
+            </p:seq>
+          </p:childTnLst>
+        </p:cTn>
       </p:par>
     </p:tnLst>
   </p:timing>
@@ -26405,8 +28071,58 @@
           <a:p>
             <a:r>
               <a:rPr lang="en-US" dirty="0" smtClean="0"/>
-              <a:t>Generate a periodic schedule of operations across processors without violating resource constraints (e.g., match capacity, action capacity, and memory capacity)</a:t>
-            </a:r>
+              <a:t>Generate a periodic schedule of </a:t>
+            </a:r>
+            <a:r>
+              <a:rPr lang="en-US" dirty="0" smtClean="0"/>
+              <a:t>match, action operations </a:t>
+            </a:r>
+            <a:r>
+              <a:rPr lang="en-US" dirty="0" smtClean="0"/>
+              <a:t>across processors without violating resource constraints (e.g., </a:t>
+            </a:r>
+            <a:r>
+              <a:rPr lang="en-US" dirty="0" smtClean="0"/>
+              <a:t>match </a:t>
+            </a:r>
+            <a:r>
+              <a:rPr lang="en-US" dirty="0" smtClean="0"/>
+              <a:t>capacity, action capacity, and memory capacity</a:t>
+            </a:r>
+            <a:r>
+              <a:rPr lang="en-US" dirty="0" smtClean="0"/>
+              <a:t>)</a:t>
+            </a:r>
+          </a:p>
+          <a:p>
+            <a:endParaRPr lang="en-US" dirty="0"/>
+          </a:p>
+          <a:p>
+            <a:r>
+              <a:rPr lang="en-US" dirty="0"/>
+              <a:t>F</a:t>
+            </a:r>
+            <a:r>
+              <a:rPr lang="en-US" dirty="0" smtClean="0"/>
+              <a:t>ocus on compute constraints here (</a:t>
+            </a:r>
+            <a:r>
+              <a:rPr lang="en-US" dirty="0" err="1" smtClean="0"/>
+              <a:t>match+action</a:t>
+            </a:r>
+            <a:r>
+              <a:rPr lang="en-US" dirty="0" smtClean="0"/>
+              <a:t> capacity), because </a:t>
+            </a:r>
+            <a:r>
+              <a:rPr lang="en-US" dirty="0" err="1" smtClean="0"/>
+              <a:t>dRMT</a:t>
+            </a:r>
+            <a:r>
+              <a:rPr lang="en-US" dirty="0" smtClean="0"/>
+              <a:t> allows us to decouple memory allocation from scheduling</a:t>
+            </a:r>
+            <a:endParaRPr lang="en-US" dirty="0" smtClean="0"/>
           </a:p>
           <a:p>
             <a:endParaRPr lang="en-US" dirty="0"/>
@@ -26426,7 +28142,177 @@
   <p:timing>
     <p:tnLst>
       <p:par>
-        <p:cTn id="1" dur="indefinite" restart="never" nodeType="tmRoot"/>
+        <p:cTn id="1" dur="indefinite" restart="never" nodeType="tmRoot">
+          <p:childTnLst>
+            <p:seq concurrent="1" nextAc="seek">
+              <p:cTn id="2" dur="indefinite" nodeType="mainSeq">
+                <p:childTnLst>
+                  <p:par>
+                    <p:cTn id="3" fill="hold">
+                      <p:stCondLst>
+                        <p:cond delay="indefinite"/>
+                      </p:stCondLst>
+                      <p:childTnLst>
+                        <p:par>
+                          <p:cTn id="4" fill="hold">
+                            <p:stCondLst>
+                              <p:cond delay="0"/>
+                            </p:stCondLst>
+                            <p:childTnLst>
+                              <p:par>
+                                <p:cTn id="5" presetID="1" presetClass="entr" presetSubtype="0" fill="hold" nodeType="clickEffect">
+                                  <p:stCondLst>
+                                    <p:cond delay="0"/>
+                                  </p:stCondLst>
+                                  <p:childTnLst>
+                                    <p:set>
+                                      <p:cBhvr>
+                                        <p:cTn id="6" dur="1" fill="hold">
+                                          <p:stCondLst>
+                                            <p:cond delay="0"/>
+                                          </p:stCondLst>
+                                        </p:cTn>
+                                        <p:tgtEl>
+                                          <p:spTgt spid="3">
+                                            <p:txEl>
+                                              <p:pRg st="0" end="0"/>
+                                            </p:txEl>
+                                          </p:spTgt>
+                                        </p:tgtEl>
+                                        <p:attrNameLst>
+                                          <p:attrName>style.visibility</p:attrName>
+                                        </p:attrNameLst>
+                                      </p:cBhvr>
+                                      <p:to>
+                                        <p:strVal val="visible"/>
+                                      </p:to>
+                                    </p:set>
+                                  </p:childTnLst>
+                                </p:cTn>
+                              </p:par>
+                            </p:childTnLst>
+                          </p:cTn>
+                        </p:par>
+                      </p:childTnLst>
+                    </p:cTn>
+                  </p:par>
+                  <p:par>
+                    <p:cTn id="7" fill="hold">
+                      <p:stCondLst>
+                        <p:cond delay="indefinite"/>
+                      </p:stCondLst>
+                      <p:childTnLst>
+                        <p:par>
+                          <p:cTn id="8" fill="hold">
+                            <p:stCondLst>
+                              <p:cond delay="0"/>
+                            </p:stCondLst>
+                            <p:childTnLst>
+                              <p:par>
+                                <p:cTn id="9" presetID="1" presetClass="entr" presetSubtype="0" fill="hold" nodeType="clickEffect">
+                                  <p:stCondLst>
+                                    <p:cond delay="0"/>
+                                  </p:stCondLst>
+                                  <p:childTnLst>
+                                    <p:set>
+                                      <p:cBhvr>
+                                        <p:cTn id="10" dur="1" fill="hold">
+                                          <p:stCondLst>
+                                            <p:cond delay="0"/>
+                                          </p:stCondLst>
+                                        </p:cTn>
+                                        <p:tgtEl>
+                                          <p:spTgt spid="3">
+                                            <p:txEl>
+                                              <p:pRg st="2" end="2"/>
+                                            </p:txEl>
+                                          </p:spTgt>
+                                        </p:tgtEl>
+                                        <p:attrNameLst>
+                                          <p:attrName>style.visibility</p:attrName>
+                                        </p:attrNameLst>
+                                      </p:cBhvr>
+                                      <p:to>
+                                        <p:strVal val="visible"/>
+                                      </p:to>
+                                    </p:set>
+                                  </p:childTnLst>
+                                </p:cTn>
+                              </p:par>
+                            </p:childTnLst>
+                          </p:cTn>
+                        </p:par>
+                      </p:childTnLst>
+                    </p:cTn>
+                  </p:par>
+                  <p:par>
+                    <p:cTn id="11" fill="hold">
+                      <p:stCondLst>
+                        <p:cond delay="indefinite"/>
+                      </p:stCondLst>
+                      <p:childTnLst>
+                        <p:par>
+                          <p:cTn id="12" fill="hold">
+                            <p:stCondLst>
+                              <p:cond delay="0"/>
+                            </p:stCondLst>
+                            <p:childTnLst>
+                              <p:par>
+                                <p:cTn id="13" presetID="1" presetClass="entr" presetSubtype="0" fill="hold" nodeType="clickEffect">
+                                  <p:stCondLst>
+                                    <p:cond delay="0"/>
+                                  </p:stCondLst>
+                                  <p:childTnLst>
+                                    <p:set>
+                                      <p:cBhvr>
+                                        <p:cTn id="14" dur="1" fill="hold">
+                                          <p:stCondLst>
+                                            <p:cond delay="0"/>
+                                          </p:stCondLst>
+                                        </p:cTn>
+                                        <p:tgtEl>
+                                          <p:spTgt spid="3">
+                                            <p:txEl>
+                                              <p:pRg st="4" end="4"/>
+                                            </p:txEl>
+                                          </p:spTgt>
+                                        </p:tgtEl>
+                                        <p:attrNameLst>
+                                          <p:attrName>style.visibility</p:attrName>
+                                        </p:attrNameLst>
+                                      </p:cBhvr>
+                                      <p:to>
+                                        <p:strVal val="visible"/>
+                                      </p:to>
+                                    </p:set>
+                                  </p:childTnLst>
+                                </p:cTn>
+                              </p:par>
+                            </p:childTnLst>
+                          </p:cTn>
+                        </p:par>
+                      </p:childTnLst>
+                    </p:cTn>
+                  </p:par>
+                </p:childTnLst>
+              </p:cTn>
+              <p:prevCondLst>
+                <p:cond evt="onPrev" delay="0">
+                  <p:tgtEl>
+                    <p:sldTgt/>
+                  </p:tgtEl>
+                </p:cond>
+              </p:prevCondLst>
+              <p:nextCondLst>
+                <p:cond evt="onNext" delay="0">
+                  <p:tgtEl>
+                    <p:sldTgt/>
+                  </p:tgtEl>
+                </p:cond>
+              </p:nextCondLst>
+            </p:seq>
+          </p:childTnLst>
+        </p:cTn>
       </p:par>
     </p:tnLst>
   </p:timing>
@@ -26492,16 +28378,13 @@
           <a:p>
             <a:r>
               <a:rPr lang="en-US" dirty="0" smtClean="0"/>
-              <a:t>P4 captures coarse-grained dependencies between tables </a:t>
+              <a:t>P4 captures coarse-grained dependencies between tables in Table Dependency Graph; each node is a </a:t>
             </a:r>
             <a:r>
               <a:rPr lang="en-US" dirty="0" smtClean="0"/>
-              <a:t>in </a:t>
-            </a:r>
-            <a:r>
-              <a:rPr lang="en-US" dirty="0" smtClean="0"/>
-              <a:t>Table Dependency Graph; each node is a table</a:t>
-            </a:r>
+              <a:t>table, dependencies are conservative</a:t>
+            </a:r>
+            <a:endParaRPr lang="en-US" dirty="0" smtClean="0"/>
           </a:p>
           <a:p>
             <a:endParaRPr lang="en-US" dirty="0"/>
@@ -26599,7 +28482,337 @@
   <p:timing>
     <p:tnLst>
       <p:par>
-        <p:cTn id="1" dur="indefinite" restart="never" nodeType="tmRoot"/>
+        <p:cTn id="1" dur="indefinite" restart="never" nodeType="tmRoot">
+          <p:childTnLst>
+            <p:seq concurrent="1" nextAc="seek">
+              <p:cTn id="2" dur="indefinite" nodeType="mainSeq">
+                <p:childTnLst>
+                  <p:par>
+                    <p:cTn id="3" fill="hold">
+                      <p:stCondLst>
+                        <p:cond delay="indefinite"/>
+                      </p:stCondLst>
+                      <p:childTnLst>
+                        <p:par>
+                          <p:cTn id="4" fill="hold">
+                            <p:stCondLst>
+                              <p:cond delay="0"/>
+                            </p:stCondLst>
+                            <p:childTnLst>
+                              <p:par>
+                                <p:cTn id="5" presetID="1" presetClass="entr" presetSubtype="0" fill="hold" nodeType="clickEffect">
+                                  <p:stCondLst>
+                                    <p:cond delay="0"/>
+                                  </p:stCondLst>
+                                  <p:childTnLst>
+                                    <p:set>
+                                      <p:cBhvr>
+                                        <p:cTn id="6" dur="1" fill="hold">
+                                          <p:stCondLst>
+                                            <p:cond delay="0"/>
+                                          </p:stCondLst>
+                                        </p:cTn>
+                                        <p:tgtEl>
+                                          <p:spTgt spid="3">
+                                            <p:txEl>
+                                              <p:pRg st="0" end="0"/>
+                                            </p:txEl>
+                                          </p:spTgt>
+                                        </p:tgtEl>
+                                        <p:attrNameLst>
+                                          <p:attrName>style.visibility</p:attrName>
+                                        </p:attrNameLst>
+                                      </p:cBhvr>
+                                      <p:to>
+                                        <p:strVal val="visible"/>
+                                      </p:to>
+                                    </p:set>
+                                  </p:childTnLst>
+                                </p:cTn>
+                              </p:par>
+                            </p:childTnLst>
+                          </p:cTn>
+                        </p:par>
+                      </p:childTnLst>
+                    </p:cTn>
+                  </p:par>
+                  <p:par>
+                    <p:cTn id="7" fill="hold">
+                      <p:stCondLst>
+                        <p:cond delay="indefinite"/>
+                      </p:stCondLst>
+                      <p:childTnLst>
+                        <p:par>
+                          <p:cTn id="8" fill="hold">
+                            <p:stCondLst>
+                              <p:cond delay="0"/>
+                            </p:stCondLst>
+                            <p:childTnLst>
+                              <p:par>
+                                <p:cTn id="9" presetID="1" presetClass="entr" presetSubtype="0" fill="hold" nodeType="clickEffect">
+                                  <p:stCondLst>
+                                    <p:cond delay="0"/>
+                                  </p:stCondLst>
+                                  <p:childTnLst>
+                                    <p:set>
+                                      <p:cBhvr>
+                                        <p:cTn id="10" dur="1" fill="hold">
+                                          <p:stCondLst>
+                                            <p:cond delay="0"/>
+                                          </p:stCondLst>
+                                        </p:cTn>
+                                        <p:tgtEl>
+                                          <p:spTgt spid="3">
+                                            <p:txEl>
+                                              <p:pRg st="2" end="2"/>
+                                            </p:txEl>
+                                          </p:spTgt>
+                                        </p:tgtEl>
+                                        <p:attrNameLst>
+                                          <p:attrName>style.visibility</p:attrName>
+                                        </p:attrNameLst>
+                                      </p:cBhvr>
+                                      <p:to>
+                                        <p:strVal val="visible"/>
+                                      </p:to>
+                                    </p:set>
+                                  </p:childTnLst>
+                                </p:cTn>
+                              </p:par>
+                            </p:childTnLst>
+                          </p:cTn>
+                        </p:par>
+                      </p:childTnLst>
+                    </p:cTn>
+                  </p:par>
+                  <p:par>
+                    <p:cTn id="11" fill="hold">
+                      <p:stCondLst>
+                        <p:cond delay="indefinite"/>
+                      </p:stCondLst>
+                      <p:childTnLst>
+                        <p:par>
+                          <p:cTn id="12" fill="hold">
+                            <p:stCondLst>
+                              <p:cond delay="0"/>
+                            </p:stCondLst>
+                            <p:childTnLst>
+                              <p:par>
+                                <p:cTn id="13" presetID="1" presetClass="entr" presetSubtype="0" fill="hold" nodeType="clickEffect">
+                                  <p:stCondLst>
+                                    <p:cond delay="0"/>
+                                  </p:stCondLst>
+                                  <p:childTnLst>
+                                    <p:set>
+                                      <p:cBhvr>
+                                        <p:cTn id="14" dur="1" fill="hold">
+                                          <p:stCondLst>
+                                            <p:cond delay="0"/>
+                                          </p:stCondLst>
+                                        </p:cTn>
+                                        <p:tgtEl>
+                                          <p:spTgt spid="3">
+                                            <p:txEl>
+                                              <p:pRg st="4" end="4"/>
+                                            </p:txEl>
+                                          </p:spTgt>
+                                        </p:tgtEl>
+                                        <p:attrNameLst>
+                                          <p:attrName>style.visibility</p:attrName>
+                                        </p:attrNameLst>
+                                      </p:cBhvr>
+                                      <p:to>
+                                        <p:strVal val="visible"/>
+                                      </p:to>
+                                    </p:set>
+                                  </p:childTnLst>
+                                </p:cTn>
+                              </p:par>
+                            </p:childTnLst>
+                          </p:cTn>
+                        </p:par>
+                      </p:childTnLst>
+                    </p:cTn>
+                  </p:par>
+                  <p:par>
+                    <p:cTn id="15" fill="hold">
+                      <p:stCondLst>
+                        <p:cond delay="indefinite"/>
+                      </p:stCondLst>
+                      <p:childTnLst>
+                        <p:par>
+                          <p:cTn id="16" fill="hold">
+                            <p:stCondLst>
+                              <p:cond delay="0"/>
+                            </p:stCondLst>
+                            <p:childTnLst>
+                              <p:par>
+                                <p:cTn id="17" presetID="1" presetClass="entr" presetSubtype="0" fill="hold" nodeType="clickEffect">
+                                  <p:stCondLst>
+                                    <p:cond delay="0"/>
+                                  </p:stCondLst>
+                                  <p:childTnLst>
+                                    <p:set>
+                                      <p:cBhvr>
+                                        <p:cTn id="18" dur="1" fill="hold">
+                                          <p:stCondLst>
+                                            <p:cond delay="0"/>
+                                          </p:stCondLst>
+                                        </p:cTn>
+                                        <p:tgtEl>
+                                          <p:spTgt spid="3">
+                                            <p:txEl>
+                                              <p:pRg st="6" end="6"/>
+                                            </p:txEl>
+                                          </p:spTgt>
+                                        </p:tgtEl>
+                                        <p:attrNameLst>
+                                          <p:attrName>style.visibility</p:attrName>
+                                        </p:attrNameLst>
+                                      </p:cBhvr>
+                                      <p:to>
+                                        <p:strVal val="visible"/>
+                                      </p:to>
+                                    </p:set>
+                                  </p:childTnLst>
+                                </p:cTn>
+                              </p:par>
+                              <p:par>
+                                <p:cTn id="19" presetID="1" presetClass="entr" presetSubtype="0" fill="hold" nodeType="withEffect">
+                                  <p:stCondLst>
+                                    <p:cond delay="0"/>
+                                  </p:stCondLst>
+                                  <p:childTnLst>
+                                    <p:set>
+                                      <p:cBhvr>
+                                        <p:cTn id="20" dur="1" fill="hold">
+                                          <p:stCondLst>
+                                            <p:cond delay="0"/>
+                                          </p:stCondLst>
+                                        </p:cTn>
+                                        <p:tgtEl>
+                                          <p:spTgt spid="3">
+                                            <p:txEl>
+                                              <p:pRg st="7" end="7"/>
+                                            </p:txEl>
+                                          </p:spTgt>
+                                        </p:tgtEl>
+                                        <p:attrNameLst>
+                                          <p:attrName>style.visibility</p:attrName>
+                                        </p:attrNameLst>
+                                      </p:cBhvr>
+                                      <p:to>
+                                        <p:strVal val="visible"/>
+                                      </p:to>
+                                    </p:set>
+                                  </p:childTnLst>
+                                </p:cTn>
+                              </p:par>
+                              <p:par>
+                                <p:cTn id="21" presetID="1" presetClass="entr" presetSubtype="0" fill="hold" nodeType="withEffect">
+                                  <p:stCondLst>
+                                    <p:cond delay="0"/>
+                                  </p:stCondLst>
+                                  <p:childTnLst>
+                                    <p:set>
+                                      <p:cBhvr>
+                                        <p:cTn id="22" dur="1" fill="hold">
+                                          <p:stCondLst>
+                                            <p:cond delay="0"/>
+                                          </p:stCondLst>
+                                        </p:cTn>
+                                        <p:tgtEl>
+                                          <p:spTgt spid="3">
+                                            <p:txEl>
+                                              <p:pRg st="8" end="8"/>
+                                            </p:txEl>
+                                          </p:spTgt>
+                                        </p:tgtEl>
+                                        <p:attrNameLst>
+                                          <p:attrName>style.visibility</p:attrName>
+                                        </p:attrNameLst>
+                                      </p:cBhvr>
+                                      <p:to>
+                                        <p:strVal val="visible"/>
+                                      </p:to>
+                                    </p:set>
+                                  </p:childTnLst>
+                                </p:cTn>
+                              </p:par>
+                            </p:childTnLst>
+                          </p:cTn>
+                        </p:par>
+                      </p:childTnLst>
+                    </p:cTn>
+                  </p:par>
+                  <p:par>
+                    <p:cTn id="23" fill="hold">
+                      <p:stCondLst>
+                        <p:cond delay="indefinite"/>
+                      </p:stCondLst>
+                      <p:childTnLst>
+                        <p:par>
+                          <p:cTn id="24" fill="hold">
+                            <p:stCondLst>
+                              <p:cond delay="0"/>
+                            </p:stCondLst>
+                            <p:childTnLst>
+                              <p:par>
+                                <p:cTn id="25" presetID="1" presetClass="entr" presetSubtype="0" fill="hold" nodeType="clickEffect">
+                                  <p:stCondLst>
+                                    <p:cond delay="0"/>
+                                  </p:stCondLst>
+                                  <p:childTnLst>
+                                    <p:set>
+                                      <p:cBhvr>
+                                        <p:cTn id="26" dur="1" fill="hold">
+                                          <p:stCondLst>
+                                            <p:cond delay="0"/>
+                                          </p:stCondLst>
+                                        </p:cTn>
+                                        <p:tgtEl>
+                                          <p:spTgt spid="3">
+                                            <p:txEl>
+                                              <p:pRg st="10" end="10"/>
+                                            </p:txEl>
+                                          </p:spTgt>
+                                        </p:tgtEl>
+                                        <p:attrNameLst>
+                                          <p:attrName>style.visibility</p:attrName>
+                                        </p:attrNameLst>
+                                      </p:cBhvr>
+                                      <p:to>
+                                        <p:strVal val="visible"/>
+                                      </p:to>
+                                    </p:set>
+                                  </p:childTnLst>
+                                </p:cTn>
+                              </p:par>
+                            </p:childTnLst>
+                          </p:cTn>
+                        </p:par>
+                      </p:childTnLst>
+                    </p:cTn>
+                  </p:par>
+                </p:childTnLst>
+              </p:cTn>
+              <p:prevCondLst>
+                <p:cond evt="onPrev" delay="0">
+                  <p:tgtEl>
+                    <p:sldTgt/>
+                  </p:tgtEl>
+                </p:cond>
+              </p:prevCondLst>
+              <p:nextCondLst>
+                <p:cond evt="onNext" delay="0">
+                  <p:tgtEl>
+                    <p:sldTgt/>
+                  </p:tgtEl>
+                </p:cond>
+              </p:nextCondLst>
+            </p:seq>
+          </p:childTnLst>
+        </p:cTn>
       </p:par>
     </p:tnLst>
   </p:timing>
@@ -26749,7 +28962,301 @@
   <p:timing>
     <p:tnLst>
       <p:par>
-        <p:cTn id="1" dur="indefinite" restart="never" nodeType="tmRoot"/>
+        <p:cTn id="1" dur="indefinite" restart="never" nodeType="tmRoot">
+          <p:childTnLst>
+            <p:seq concurrent="1" nextAc="seek">
+              <p:cTn id="2" dur="indefinite" nodeType="mainSeq">
+                <p:childTnLst>
+                  <p:par>
+                    <p:cTn id="3" fill="hold">
+                      <p:stCondLst>
+                        <p:cond delay="indefinite"/>
+                      </p:stCondLst>
+                      <p:childTnLst>
+                        <p:par>
+                          <p:cTn id="4" fill="hold">
+                            <p:stCondLst>
+                              <p:cond delay="0"/>
+                            </p:stCondLst>
+                            <p:childTnLst>
+                              <p:par>
+                                <p:cTn id="5" presetID="1" presetClass="entr" presetSubtype="0" fill="hold" nodeType="clickEffect">
+                                  <p:stCondLst>
+                                    <p:cond delay="0"/>
+                                  </p:stCondLst>
+                                  <p:childTnLst>
+                                    <p:set>
+                                      <p:cBhvr>
+                                        <p:cTn id="6" dur="1" fill="hold">
+                                          <p:stCondLst>
+                                            <p:cond delay="0"/>
+                                          </p:stCondLst>
+                                        </p:cTn>
+                                        <p:tgtEl>
+                                          <p:spTgt spid="3">
+                                            <p:txEl>
+                                              <p:pRg st="0" end="0"/>
+                                            </p:txEl>
+                                          </p:spTgt>
+                                        </p:tgtEl>
+                                        <p:attrNameLst>
+                                          <p:attrName>style.visibility</p:attrName>
+                                        </p:attrNameLst>
+                                      </p:cBhvr>
+                                      <p:to>
+                                        <p:strVal val="visible"/>
+                                      </p:to>
+                                    </p:set>
+                                  </p:childTnLst>
+                                </p:cTn>
+                              </p:par>
+                            </p:childTnLst>
+                          </p:cTn>
+                        </p:par>
+                      </p:childTnLst>
+                    </p:cTn>
+                  </p:par>
+                  <p:par>
+                    <p:cTn id="7" fill="hold">
+                      <p:stCondLst>
+                        <p:cond delay="indefinite"/>
+                      </p:stCondLst>
+                      <p:childTnLst>
+                        <p:par>
+                          <p:cTn id="8" fill="hold">
+                            <p:stCondLst>
+                              <p:cond delay="0"/>
+                            </p:stCondLst>
+                            <p:childTnLst>
+                              <p:par>
+                                <p:cTn id="9" presetID="1" presetClass="entr" presetSubtype="0" fill="hold" nodeType="clickEffect">
+                                  <p:stCondLst>
+                                    <p:cond delay="0"/>
+                                  </p:stCondLst>
+                                  <p:childTnLst>
+                                    <p:set>
+                                      <p:cBhvr>
+                                        <p:cTn id="10" dur="1" fill="hold">
+                                          <p:stCondLst>
+                                            <p:cond delay="0"/>
+                                          </p:stCondLst>
+                                        </p:cTn>
+                                        <p:tgtEl>
+                                          <p:spTgt spid="3">
+                                            <p:txEl>
+                                              <p:pRg st="2" end="2"/>
+                                            </p:txEl>
+                                          </p:spTgt>
+                                        </p:tgtEl>
+                                        <p:attrNameLst>
+                                          <p:attrName>style.visibility</p:attrName>
+                                        </p:attrNameLst>
+                                      </p:cBhvr>
+                                      <p:to>
+                                        <p:strVal val="visible"/>
+                                      </p:to>
+                                    </p:set>
+                                  </p:childTnLst>
+                                </p:cTn>
+                              </p:par>
+                              <p:par>
+                                <p:cTn id="11" presetID="1" presetClass="entr" presetSubtype="0" fill="hold" nodeType="withEffect">
+                                  <p:stCondLst>
+                                    <p:cond delay="0"/>
+                                  </p:stCondLst>
+                                  <p:childTnLst>
+                                    <p:set>
+                                      <p:cBhvr>
+                                        <p:cTn id="12" dur="1" fill="hold">
+                                          <p:stCondLst>
+                                            <p:cond delay="0"/>
+                                          </p:stCondLst>
+                                        </p:cTn>
+                                        <p:tgtEl>
+                                          <p:spTgt spid="3">
+                                            <p:txEl>
+                                              <p:pRg st="3" end="3"/>
+                                            </p:txEl>
+                                          </p:spTgt>
+                                        </p:tgtEl>
+                                        <p:attrNameLst>
+                                          <p:attrName>style.visibility</p:attrName>
+                                        </p:attrNameLst>
+                                      </p:cBhvr>
+                                      <p:to>
+                                        <p:strVal val="visible"/>
+                                      </p:to>
+                                    </p:set>
+                                  </p:childTnLst>
+                                </p:cTn>
+                              </p:par>
+                              <p:par>
+                                <p:cTn id="13" presetID="1" presetClass="entr" presetSubtype="0" fill="hold" nodeType="withEffect">
+                                  <p:stCondLst>
+                                    <p:cond delay="0"/>
+                                  </p:stCondLst>
+                                  <p:childTnLst>
+                                    <p:set>
+                                      <p:cBhvr>
+                                        <p:cTn id="14" dur="1" fill="hold">
+                                          <p:stCondLst>
+                                            <p:cond delay="0"/>
+                                          </p:stCondLst>
+                                        </p:cTn>
+                                        <p:tgtEl>
+                                          <p:spTgt spid="3">
+                                            <p:txEl>
+                                              <p:pRg st="4" end="4"/>
+                                            </p:txEl>
+                                          </p:spTgt>
+                                        </p:tgtEl>
+                                        <p:attrNameLst>
+                                          <p:attrName>style.visibility</p:attrName>
+                                        </p:attrNameLst>
+                                      </p:cBhvr>
+                                      <p:to>
+                                        <p:strVal val="visible"/>
+                                      </p:to>
+                                    </p:set>
+                                  </p:childTnLst>
+                                </p:cTn>
+                              </p:par>
+                              <p:par>
+                                <p:cTn id="15" presetID="1" presetClass="entr" presetSubtype="0" fill="hold" nodeType="withEffect">
+                                  <p:stCondLst>
+                                    <p:cond delay="0"/>
+                                  </p:stCondLst>
+                                  <p:childTnLst>
+                                    <p:set>
+                                      <p:cBhvr>
+                                        <p:cTn id="16" dur="1" fill="hold">
+                                          <p:stCondLst>
+                                            <p:cond delay="0"/>
+                                          </p:stCondLst>
+                                        </p:cTn>
+                                        <p:tgtEl>
+                                          <p:spTgt spid="3">
+                                            <p:txEl>
+                                              <p:pRg st="5" end="5"/>
+                                            </p:txEl>
+                                          </p:spTgt>
+                                        </p:tgtEl>
+                                        <p:attrNameLst>
+                                          <p:attrName>style.visibility</p:attrName>
+                                        </p:attrNameLst>
+                                      </p:cBhvr>
+                                      <p:to>
+                                        <p:strVal val="visible"/>
+                                      </p:to>
+                                    </p:set>
+                                  </p:childTnLst>
+                                </p:cTn>
+                              </p:par>
+                              <p:par>
+                                <p:cTn id="17" presetID="1" presetClass="entr" presetSubtype="0" fill="hold" nodeType="withEffect">
+                                  <p:stCondLst>
+                                    <p:cond delay="0"/>
+                                  </p:stCondLst>
+                                  <p:childTnLst>
+                                    <p:set>
+                                      <p:cBhvr>
+                                        <p:cTn id="18" dur="1" fill="hold">
+                                          <p:stCondLst>
+                                            <p:cond delay="0"/>
+                                          </p:stCondLst>
+                                        </p:cTn>
+                                        <p:tgtEl>
+                                          <p:spTgt spid="3">
+                                            <p:txEl>
+                                              <p:pRg st="6" end="6"/>
+                                            </p:txEl>
+                                          </p:spTgt>
+                                        </p:tgtEl>
+                                        <p:attrNameLst>
+                                          <p:attrName>style.visibility</p:attrName>
+                                        </p:attrNameLst>
+                                      </p:cBhvr>
+                                      <p:to>
+                                        <p:strVal val="visible"/>
+                                      </p:to>
+                                    </p:set>
+                                  </p:childTnLst>
+                                </p:cTn>
+                              </p:par>
+                            </p:childTnLst>
+                          </p:cTn>
+                        </p:par>
+                      </p:childTnLst>
+                    </p:cTn>
+                  </p:par>
+                  <p:par>
+                    <p:cTn id="19" fill="hold">
+                      <p:stCondLst>
+                        <p:cond delay="indefinite"/>
+                      </p:stCondLst>
+                      <p:childTnLst>
+                        <p:par>
+                          <p:cTn id="20" fill="hold">
+                            <p:stCondLst>
+                              <p:cond delay="0"/>
+                            </p:stCondLst>
+                            <p:childTnLst>
+                              <p:par>
+                                <p:cTn id="21" presetID="1" presetClass="entr" presetSubtype="0" fill="hold" nodeType="clickEffect">
+                                  <p:stCondLst>
+                                    <p:cond delay="0"/>
+                                  </p:stCondLst>
+                                  <p:childTnLst>
+                                    <p:set>
+                                      <p:cBhvr>
+                                        <p:cTn id="22" dur="1" fill="hold">
+                                          <p:stCondLst>
+                                            <p:cond delay="0"/>
+                                          </p:stCondLst>
+                                        </p:cTn>
+                                        <p:tgtEl>
+                                          <p:spTgt spid="3">
+                                            <p:txEl>
+                                              <p:pRg st="8" end="8"/>
+                                            </p:txEl>
+                                          </p:spTgt>
+                                        </p:tgtEl>
+                                        <p:attrNameLst>
+                                          <p:attrName>style.visibility</p:attrName>
+                                        </p:attrNameLst>
+                                      </p:cBhvr>
+                                      <p:to>
+                                        <p:strVal val="visible"/>
+                                      </p:to>
+                                    </p:set>
+                                  </p:childTnLst>
+                                </p:cTn>
+                              </p:par>
+                            </p:childTnLst>
+                          </p:cTn>
+                        </p:par>
+                      </p:childTnLst>
+                    </p:cTn>
+                  </p:par>
+                </p:childTnLst>
+              </p:cTn>
+              <p:prevCondLst>
+                <p:cond evt="onPrev" delay="0">
+                  <p:tgtEl>
+                    <p:sldTgt/>
+                  </p:tgtEl>
+                </p:cond>
+              </p:prevCondLst>
+              <p:nextCondLst>
+                <p:cond evt="onNext" delay="0">
+                  <p:tgtEl>
+                    <p:sldTgt/>
+                  </p:tgtEl>
+                </p:cond>
+              </p:nextCondLst>
+            </p:seq>
+          </p:childTnLst>
+        </p:cTn>
       </p:par>
     </p:tnLst>
   </p:timing>

</xml_diff>

<commit_message>
More of Mohammad's changes
</commit_message>
<xml_diff>
--- a/drmt.pptx
+++ b/drmt.pptx
@@ -5,7 +5,7 @@
     <p:sldMasterId id="2147483648" r:id="rId1"/>
   </p:sldMasterIdLst>
   <p:notesMasterIdLst>
-    <p:notesMasterId r:id="rId28"/>
+    <p:notesMasterId r:id="rId29"/>
   </p:notesMasterIdLst>
   <p:sldIdLst>
     <p:sldId id="256" r:id="rId2"/>
@@ -14,26 +14,27 @@
     <p:sldId id="267" r:id="rId5"/>
     <p:sldId id="268" r:id="rId6"/>
     <p:sldId id="269" r:id="rId7"/>
-    <p:sldId id="270" r:id="rId8"/>
-    <p:sldId id="289" r:id="rId9"/>
-    <p:sldId id="272" r:id="rId10"/>
-    <p:sldId id="277" r:id="rId11"/>
-    <p:sldId id="278" r:id="rId12"/>
-    <p:sldId id="279" r:id="rId13"/>
-    <p:sldId id="280" r:id="rId14"/>
-    <p:sldId id="281" r:id="rId15"/>
-    <p:sldId id="282" r:id="rId16"/>
-    <p:sldId id="283" r:id="rId17"/>
-    <p:sldId id="284" r:id="rId18"/>
-    <p:sldId id="264" r:id="rId19"/>
-    <p:sldId id="290" r:id="rId20"/>
-    <p:sldId id="265" r:id="rId21"/>
-    <p:sldId id="263" r:id="rId22"/>
-    <p:sldId id="274" r:id="rId23"/>
-    <p:sldId id="285" r:id="rId24"/>
-    <p:sldId id="288" r:id="rId25"/>
-    <p:sldId id="286" r:id="rId26"/>
-    <p:sldId id="273" r:id="rId27"/>
+    <p:sldId id="291" r:id="rId8"/>
+    <p:sldId id="270" r:id="rId9"/>
+    <p:sldId id="289" r:id="rId10"/>
+    <p:sldId id="272" r:id="rId11"/>
+    <p:sldId id="277" r:id="rId12"/>
+    <p:sldId id="278" r:id="rId13"/>
+    <p:sldId id="279" r:id="rId14"/>
+    <p:sldId id="280" r:id="rId15"/>
+    <p:sldId id="281" r:id="rId16"/>
+    <p:sldId id="282" r:id="rId17"/>
+    <p:sldId id="283" r:id="rId18"/>
+    <p:sldId id="284" r:id="rId19"/>
+    <p:sldId id="264" r:id="rId20"/>
+    <p:sldId id="290" r:id="rId21"/>
+    <p:sldId id="265" r:id="rId22"/>
+    <p:sldId id="263" r:id="rId23"/>
+    <p:sldId id="274" r:id="rId24"/>
+    <p:sldId id="285" r:id="rId25"/>
+    <p:sldId id="288" r:id="rId26"/>
+    <p:sldId id="286" r:id="rId27"/>
+    <p:sldId id="273" r:id="rId28"/>
   </p:sldIdLst>
   <p:sldSz cx="12192000" cy="6858000"/>
   <p:notesSz cx="6858000" cy="9144000"/>
@@ -463,11 +464,11 @@
           <c:showBubbleSize val="0"/>
         </c:dLbls>
         <c:smooth val="0"/>
-        <c:axId val="866339440"/>
-        <c:axId val="848064176"/>
+        <c:axId val="1324549584"/>
+        <c:axId val="1323319152"/>
       </c:lineChart>
       <c:catAx>
-        <c:axId val="866339440"/>
+        <c:axId val="1324549584"/>
         <c:scaling>
           <c:orientation val="minMax"/>
         </c:scaling>
@@ -510,7 +511,7 @@
             <a:endParaRPr lang="en-US"/>
           </a:p>
         </c:txPr>
-        <c:crossAx val="848064176"/>
+        <c:crossAx val="1323319152"/>
         <c:crosses val="autoZero"/>
         <c:auto val="1"/>
         <c:lblAlgn val="ctr"/>
@@ -518,7 +519,7 @@
         <c:noMultiLvlLbl val="0"/>
       </c:catAx>
       <c:valAx>
-        <c:axId val="848064176"/>
+        <c:axId val="1323319152"/>
         <c:scaling>
           <c:orientation val="minMax"/>
         </c:scaling>
@@ -568,7 +569,7 @@
             <a:endParaRPr lang="en-US"/>
           </a:p>
         </c:txPr>
-        <c:crossAx val="866339440"/>
+        <c:crossAx val="1324549584"/>
         <c:crosses val="autoZero"/>
         <c:crossBetween val="between"/>
       </c:valAx>
@@ -1687,11 +1688,7 @@
             </a:r>
             <a:r>
               <a:rPr lang="en-US" baseline="0" dirty="0" smtClean="0"/>
-              <a:t> that when there’s no </a:t>
-            </a:r>
-            <a:r>
-              <a:rPr lang="en-US" baseline="0" dirty="0" smtClean="0"/>
-              <a:t>multicast</a:t>
+              <a:t> that when there’s no multicast</a:t>
             </a:r>
           </a:p>
           <a:p>
@@ -1741,7 +1738,7 @@
           <a:p>
             <a:fld id="{4B72050E-C83F-DC4E-B064-9A7B7E00D2A3}" type="slidenum">
               <a:rPr lang="en-US" smtClean="0"/>
-              <a:t>23</a:t>
+              <a:t>24</a:t>
             </a:fld>
             <a:endParaRPr lang="en-US"/>
           </a:p>
@@ -1810,11 +1807,7 @@
             </a:r>
             <a:r>
               <a:rPr lang="en-US" baseline="0" dirty="0" smtClean="0"/>
-              <a:t> really a result of aggregation</a:t>
-            </a:r>
-            <a:r>
-              <a:rPr lang="en-US" baseline="0" dirty="0" smtClean="0"/>
-              <a:t>?</a:t>
+              <a:t> really a result of aggregation?</a:t>
             </a:r>
           </a:p>
           <a:p>
@@ -2020,10 +2013,61 @@
               <a:t> latency. </a:t>
             </a:r>
             <a:r>
-              <a:rPr lang="en-US" baseline="0" smtClean="0"/>
-              <a:t>This leads into the compiler.</a:t>
-            </a:r>
-            <a:endParaRPr lang="en-US" smtClean="0"/>
+              <a:rPr lang="en-US" baseline="0" dirty="0" smtClean="0"/>
+              <a:t>How do we do that?</a:t>
+            </a:r>
+          </a:p>
+          <a:p>
+            <a:r>
+              <a:rPr lang="en-US" baseline="0" dirty="0" smtClean="0"/>
+              <a:t>Given a P4 program and the table sizes. The scheduling problem is to figure out (1) how to place the tables and (2) how to satisfy requirements on the processors.</a:t>
+            </a:r>
+          </a:p>
+          <a:p>
+            <a:r>
+              <a:rPr lang="en-US" baseline="0" dirty="0" smtClean="0"/>
+              <a:t>You could try and solve one joint scheduling problem.</a:t>
+            </a:r>
+          </a:p>
+          <a:p>
+            <a:r>
+              <a:rPr lang="en-US" baseline="0" dirty="0" smtClean="0"/>
+              <a:t>It turns out you can simplify this problem greatly. It turns out you can decouple these two. We can pack them into memory clusters in any way they want. The crossbar</a:t>
+            </a:r>
+          </a:p>
+          <a:p>
+            <a:r>
+              <a:rPr lang="en-US" baseline="0" dirty="0" smtClean="0"/>
+              <a:t>Allows me to stitch them together and make things work.</a:t>
+            </a:r>
+          </a:p>
+          <a:p>
+            <a:r>
+              <a:rPr lang="en-US" baseline="0" dirty="0" smtClean="0"/>
+              <a:t>You could have an </a:t>
+            </a:r>
+            <a:r>
+              <a:rPr lang="en-US" baseline="0" dirty="0" err="1" smtClean="0"/>
+              <a:t>interstital</a:t>
+            </a:r>
+            <a:r>
+              <a:rPr lang="en-US" baseline="0" dirty="0" smtClean="0"/>
+              <a:t> slide before this. </a:t>
+            </a:r>
+          </a:p>
+          <a:p>
+            <a:endParaRPr lang="en-US" baseline="0" dirty="0" smtClean="0"/>
+          </a:p>
+          <a:p>
+            <a:r>
+              <a:rPr lang="en-US" baseline="0" dirty="0" smtClean="0"/>
+              <a:t>This </a:t>
+            </a:r>
+            <a:r>
+              <a:rPr lang="en-US" baseline="0" dirty="0" smtClean="0"/>
+              <a:t>leads into the compiler.</a:t>
+            </a:r>
+            <a:endParaRPr lang="en-US" dirty="0" smtClean="0"/>
           </a:p>
           <a:p>
             <a:endParaRPr lang="en-US" dirty="0" smtClean="0"/>
@@ -2076,7 +2120,7 @@
           <a:p>
             <a:fld id="{4B72050E-C83F-DC4E-B064-9A7B7E00D2A3}" type="slidenum">
               <a:rPr lang="en-US" smtClean="0"/>
-              <a:t>7</a:t>
+              <a:t>8</a:t>
             </a:fld>
             <a:endParaRPr lang="en-US"/>
           </a:p>
@@ -2174,7 +2218,7 @@
           <a:p>
             <a:fld id="{4B72050E-C83F-DC4E-B064-9A7B7E00D2A3}" type="slidenum">
               <a:rPr lang="en-US" smtClean="0"/>
-              <a:t>9</a:t>
+              <a:t>10</a:t>
             </a:fld>
             <a:endParaRPr lang="en-US"/>
           </a:p>
@@ -2243,11 +2287,7 @@
             </a:r>
             <a:r>
               <a:rPr lang="en-US" baseline="0" dirty="0" smtClean="0"/>
-              <a:t> general throughputs</a:t>
-            </a:r>
-            <a:r>
-              <a:rPr lang="en-US" baseline="0" dirty="0" smtClean="0"/>
-              <a:t>.</a:t>
+              <a:t> general throughputs.</a:t>
             </a:r>
           </a:p>
           <a:p>
@@ -2276,7 +2316,7 @@
           <a:p>
             <a:fld id="{4B72050E-C83F-DC4E-B064-9A7B7E00D2A3}" type="slidenum">
               <a:rPr lang="en-US" smtClean="0"/>
-              <a:t>18</a:t>
+              <a:t>19</a:t>
             </a:fld>
             <a:endParaRPr lang="en-US"/>
           </a:p>
@@ -2391,7 +2431,7 @@
           <a:p>
             <a:fld id="{4B72050E-C83F-DC4E-B064-9A7B7E00D2A3}" type="slidenum">
               <a:rPr lang="en-US" smtClean="0"/>
-              <a:t>19</a:t>
+              <a:t>20</a:t>
             </a:fld>
             <a:endParaRPr lang="en-US"/>
           </a:p>
@@ -2489,7 +2529,7 @@
           <a:p>
             <a:fld id="{4B72050E-C83F-DC4E-B064-9A7B7E00D2A3}" type="slidenum">
               <a:rPr lang="en-US" smtClean="0"/>
-              <a:t>20</a:t>
+              <a:t>21</a:t>
             </a:fld>
             <a:endParaRPr lang="en-US"/>
           </a:p>
@@ -2610,7 +2650,7 @@
           <a:p>
             <a:fld id="{4B72050E-C83F-DC4E-B064-9A7B7E00D2A3}" type="slidenum">
               <a:rPr lang="en-US" smtClean="0"/>
-              <a:t>22</a:t>
+              <a:t>23</a:t>
             </a:fld>
             <a:endParaRPr lang="en-US"/>
           </a:p>
@@ -5785,6 +5825,692 @@
           </a:p>
         </p:txBody>
       </p:sp>
+      <p:sp>
+        <p:nvSpPr>
+          <p:cNvPr id="59" name="Oval 58"/>
+          <p:cNvSpPr/>
+          <p:nvPr/>
+        </p:nvSpPr>
+        <p:spPr>
+          <a:xfrm>
+            <a:off x="163970" y="2640172"/>
+            <a:ext cx="724320" cy="724320"/>
+          </a:xfrm>
+          <a:prstGeom prst="ellipse">
+            <a:avLst/>
+          </a:prstGeom>
+          <a:solidFill>
+            <a:schemeClr val="accent1">
+              <a:alpha val="32000"/>
+            </a:schemeClr>
+          </a:solidFill>
+          <a:ln>
+            <a:solidFill>
+              <a:schemeClr val="accent1">
+                <a:shade val="50000"/>
+              </a:schemeClr>
+            </a:solidFill>
+          </a:ln>
+        </p:spPr>
+        <p:style>
+          <a:lnRef idx="2">
+            <a:schemeClr val="accent1">
+              <a:shade val="50000"/>
+            </a:schemeClr>
+          </a:lnRef>
+          <a:fillRef idx="1">
+            <a:schemeClr val="accent1"/>
+          </a:fillRef>
+          <a:effectRef idx="0">
+            <a:schemeClr val="accent1"/>
+          </a:effectRef>
+          <a:fontRef idx="minor">
+            <a:schemeClr val="lt1"/>
+          </a:fontRef>
+        </p:style>
+        <p:txBody>
+          <a:bodyPr rot="0" spcFirstLastPara="0" vertOverflow="overflow" horzOverflow="overflow" vert="horz" wrap="square" lIns="91440" tIns="45720" rIns="91440" bIns="45720" numCol="1" spcCol="0" rtlCol="0" fromWordArt="0" anchor="ctr" anchorCtr="0" forceAA="0" compatLnSpc="1">
+            <a:prstTxWarp prst="textNoShape">
+              <a:avLst/>
+            </a:prstTxWarp>
+            <a:noAutofit/>
+          </a:bodyPr>
+          <a:lstStyle/>
+          <a:p>
+            <a:pPr algn="ctr"/>
+            <a:r>
+              <a:rPr lang="en-US">
+                <a:solidFill>
+                  <a:schemeClr val="tx1"/>
+                </a:solidFill>
+              </a:rPr>
+              <a:t>M</a:t>
+            </a:r>
+            <a:r>
+              <a:rPr lang="en-US" smtClean="0">
+                <a:solidFill>
+                  <a:schemeClr val="tx1"/>
+                </a:solidFill>
+              </a:rPr>
+              <a:t>0</a:t>
+            </a:r>
+            <a:endParaRPr lang="en-US" dirty="0">
+              <a:solidFill>
+                <a:schemeClr val="tx1"/>
+              </a:solidFill>
+            </a:endParaRPr>
+          </a:p>
+        </p:txBody>
+      </p:sp>
+      <p:sp>
+        <p:nvSpPr>
+          <p:cNvPr id="60" name="Oval 59"/>
+          <p:cNvSpPr/>
+          <p:nvPr/>
+        </p:nvSpPr>
+        <p:spPr>
+          <a:xfrm>
+            <a:off x="1527596" y="2643130"/>
+            <a:ext cx="705939" cy="705939"/>
+          </a:xfrm>
+          <a:prstGeom prst="ellipse">
+            <a:avLst/>
+          </a:prstGeom>
+          <a:solidFill>
+            <a:srgbClr val="00B050">
+              <a:alpha val="50000"/>
+            </a:srgbClr>
+          </a:solidFill>
+        </p:spPr>
+        <p:style>
+          <a:lnRef idx="2">
+            <a:schemeClr val="accent1">
+              <a:shade val="50000"/>
+            </a:schemeClr>
+          </a:lnRef>
+          <a:fillRef idx="1">
+            <a:schemeClr val="accent1"/>
+          </a:fillRef>
+          <a:effectRef idx="0">
+            <a:schemeClr val="accent1"/>
+          </a:effectRef>
+          <a:fontRef idx="minor">
+            <a:schemeClr val="lt1"/>
+          </a:fontRef>
+        </p:style>
+        <p:txBody>
+          <a:bodyPr rot="0" spcFirstLastPara="0" vertOverflow="overflow" horzOverflow="overflow" vert="horz" wrap="square" lIns="91440" tIns="45720" rIns="91440" bIns="45720" numCol="1" spcCol="0" rtlCol="0" fromWordArt="0" anchor="ctr" anchorCtr="0" forceAA="0" compatLnSpc="1">
+            <a:prstTxWarp prst="textNoShape">
+              <a:avLst/>
+            </a:prstTxWarp>
+            <a:noAutofit/>
+          </a:bodyPr>
+          <a:lstStyle/>
+          <a:p>
+            <a:pPr algn="ctr"/>
+            <a:r>
+              <a:rPr lang="en-US" dirty="0" smtClean="0">
+                <a:solidFill>
+                  <a:schemeClr val="tx1"/>
+                </a:solidFill>
+              </a:rPr>
+              <a:t>A0</a:t>
+            </a:r>
+            <a:endParaRPr lang="en-US" dirty="0">
+              <a:solidFill>
+                <a:schemeClr val="tx1"/>
+              </a:solidFill>
+            </a:endParaRPr>
+          </a:p>
+        </p:txBody>
+      </p:sp>
+      <p:sp>
+        <p:nvSpPr>
+          <p:cNvPr id="61" name="Oval 60"/>
+          <p:cNvSpPr/>
+          <p:nvPr/>
+        </p:nvSpPr>
+        <p:spPr>
+          <a:xfrm>
+            <a:off x="2841241" y="3636361"/>
+            <a:ext cx="705939" cy="705939"/>
+          </a:xfrm>
+          <a:prstGeom prst="ellipse">
+            <a:avLst/>
+          </a:prstGeom>
+          <a:solidFill>
+            <a:srgbClr val="00B050">
+              <a:alpha val="50000"/>
+            </a:srgbClr>
+          </a:solidFill>
+        </p:spPr>
+        <p:style>
+          <a:lnRef idx="2">
+            <a:schemeClr val="accent1">
+              <a:shade val="50000"/>
+            </a:schemeClr>
+          </a:lnRef>
+          <a:fillRef idx="1">
+            <a:schemeClr val="accent1"/>
+          </a:fillRef>
+          <a:effectRef idx="0">
+            <a:schemeClr val="accent1"/>
+          </a:effectRef>
+          <a:fontRef idx="minor">
+            <a:schemeClr val="lt1"/>
+          </a:fontRef>
+        </p:style>
+        <p:txBody>
+          <a:bodyPr rot="0" spcFirstLastPara="0" vertOverflow="overflow" horzOverflow="overflow" vert="horz" wrap="square" lIns="91440" tIns="45720" rIns="91440" bIns="45720" numCol="1" spcCol="0" rtlCol="0" fromWordArt="0" anchor="ctr" anchorCtr="0" forceAA="0" compatLnSpc="1">
+            <a:prstTxWarp prst="textNoShape">
+              <a:avLst/>
+            </a:prstTxWarp>
+            <a:noAutofit/>
+          </a:bodyPr>
+          <a:lstStyle/>
+          <a:p>
+            <a:pPr algn="ctr"/>
+            <a:r>
+              <a:rPr lang="en-US" dirty="0" smtClean="0">
+                <a:solidFill>
+                  <a:schemeClr val="tx1"/>
+                </a:solidFill>
+              </a:rPr>
+              <a:t>A</a:t>
+            </a:r>
+            <a:r>
+              <a:rPr lang="en-US" dirty="0">
+                <a:solidFill>
+                  <a:schemeClr val="tx1"/>
+                </a:solidFill>
+              </a:rPr>
+              <a:t>1</a:t>
+            </a:r>
+          </a:p>
+        </p:txBody>
+      </p:sp>
+      <p:cxnSp>
+        <p:nvCxnSpPr>
+          <p:cNvPr id="62" name="Straight Arrow Connector 61"/>
+          <p:cNvCxnSpPr>
+            <a:stCxn id="60" idx="6"/>
+            <a:endCxn id="67" idx="2"/>
+          </p:cNvCxnSpPr>
+          <p:nvPr/>
+        </p:nvCxnSpPr>
+        <p:spPr>
+          <a:xfrm>
+            <a:off x="2233535" y="2996100"/>
+            <a:ext cx="580629" cy="6921"/>
+          </a:xfrm>
+          <a:prstGeom prst="straightConnector1">
+            <a:avLst/>
+          </a:prstGeom>
+          <a:ln w="63500">
+            <a:solidFill>
+              <a:srgbClr val="FF0000"/>
+            </a:solidFill>
+            <a:tailEnd type="triangle"/>
+          </a:ln>
+        </p:spPr>
+        <p:style>
+          <a:lnRef idx="1">
+            <a:schemeClr val="accent1"/>
+          </a:lnRef>
+          <a:fillRef idx="0">
+            <a:schemeClr val="accent1"/>
+          </a:fillRef>
+          <a:effectRef idx="0">
+            <a:schemeClr val="accent1"/>
+          </a:effectRef>
+          <a:fontRef idx="minor">
+            <a:schemeClr val="tx1"/>
+          </a:fontRef>
+        </p:style>
+      </p:cxnSp>
+      <p:sp>
+        <p:nvSpPr>
+          <p:cNvPr id="64" name="TextBox 63"/>
+          <p:cNvSpPr txBox="1"/>
+          <p:nvPr/>
+        </p:nvSpPr>
+        <p:spPr>
+          <a:xfrm>
+            <a:off x="340339" y="2330926"/>
+            <a:ext cx="301686" cy="369204"/>
+          </a:xfrm>
+          <a:prstGeom prst="rect">
+            <a:avLst/>
+          </a:prstGeom>
+          <a:noFill/>
+        </p:spPr>
+        <p:txBody>
+          <a:bodyPr wrap="square" rtlCol="0">
+            <a:spAutoFit/>
+          </a:bodyPr>
+          <a:lstStyle/>
+          <a:p>
+            <a:r>
+              <a:rPr lang="en-US" dirty="0"/>
+              <a:t>1</a:t>
+            </a:r>
+          </a:p>
+        </p:txBody>
+      </p:sp>
+      <p:sp>
+        <p:nvSpPr>
+          <p:cNvPr id="65" name="TextBox 64"/>
+          <p:cNvSpPr txBox="1"/>
+          <p:nvPr/>
+        </p:nvSpPr>
+        <p:spPr>
+          <a:xfrm>
+            <a:off x="1734541" y="2330925"/>
+            <a:ext cx="301686" cy="369204"/>
+          </a:xfrm>
+          <a:prstGeom prst="rect">
+            <a:avLst/>
+          </a:prstGeom>
+          <a:noFill/>
+        </p:spPr>
+        <p:txBody>
+          <a:bodyPr wrap="square" rtlCol="0">
+            <a:spAutoFit/>
+          </a:bodyPr>
+          <a:lstStyle/>
+          <a:p>
+            <a:r>
+              <a:rPr lang="en-US" dirty="0"/>
+              <a:t>1</a:t>
+            </a:r>
+          </a:p>
+        </p:txBody>
+      </p:sp>
+      <p:sp>
+        <p:nvSpPr>
+          <p:cNvPr id="66" name="TextBox 65"/>
+          <p:cNvSpPr txBox="1"/>
+          <p:nvPr/>
+        </p:nvSpPr>
+        <p:spPr>
+          <a:xfrm>
+            <a:off x="3053631" y="3338501"/>
+            <a:ext cx="301686" cy="369204"/>
+          </a:xfrm>
+          <a:prstGeom prst="rect">
+            <a:avLst/>
+          </a:prstGeom>
+          <a:noFill/>
+        </p:spPr>
+        <p:txBody>
+          <a:bodyPr wrap="none" rtlCol="0">
+            <a:spAutoFit/>
+          </a:bodyPr>
+          <a:lstStyle/>
+          <a:p>
+            <a:r>
+              <a:rPr lang="en-US" dirty="0"/>
+              <a:t>1</a:t>
+            </a:r>
+          </a:p>
+        </p:txBody>
+      </p:sp>
+      <p:sp>
+        <p:nvSpPr>
+          <p:cNvPr id="67" name="Oval 66"/>
+          <p:cNvSpPr/>
+          <p:nvPr/>
+        </p:nvSpPr>
+        <p:spPr>
+          <a:xfrm>
+            <a:off x="2814164" y="2644681"/>
+            <a:ext cx="716679" cy="716679"/>
+          </a:xfrm>
+          <a:prstGeom prst="ellipse">
+            <a:avLst/>
+          </a:prstGeom>
+          <a:solidFill>
+            <a:schemeClr val="accent1">
+              <a:alpha val="32000"/>
+            </a:schemeClr>
+          </a:solidFill>
+          <a:ln>
+            <a:solidFill>
+              <a:schemeClr val="accent1">
+                <a:shade val="50000"/>
+              </a:schemeClr>
+            </a:solidFill>
+          </a:ln>
+        </p:spPr>
+        <p:style>
+          <a:lnRef idx="2">
+            <a:schemeClr val="accent1">
+              <a:shade val="50000"/>
+            </a:schemeClr>
+          </a:lnRef>
+          <a:fillRef idx="1">
+            <a:schemeClr val="accent1"/>
+          </a:fillRef>
+          <a:effectRef idx="0">
+            <a:schemeClr val="accent1"/>
+          </a:effectRef>
+          <a:fontRef idx="minor">
+            <a:schemeClr val="lt1"/>
+          </a:fontRef>
+        </p:style>
+        <p:txBody>
+          <a:bodyPr rot="0" spcFirstLastPara="0" vertOverflow="overflow" horzOverflow="overflow" vert="horz" wrap="square" lIns="91440" tIns="45720" rIns="91440" bIns="45720" numCol="1" spcCol="0" rtlCol="0" fromWordArt="0" anchor="ctr" anchorCtr="0" forceAA="0" compatLnSpc="1">
+            <a:prstTxWarp prst="textNoShape">
+              <a:avLst/>
+            </a:prstTxWarp>
+            <a:noAutofit/>
+          </a:bodyPr>
+          <a:lstStyle/>
+          <a:p>
+            <a:pPr algn="ctr"/>
+            <a:r>
+              <a:rPr lang="en-US" dirty="0" smtClean="0">
+                <a:solidFill>
+                  <a:schemeClr val="tx1"/>
+                </a:solidFill>
+              </a:rPr>
+              <a:t>M</a:t>
+            </a:r>
+            <a:r>
+              <a:rPr lang="en-US" dirty="0">
+                <a:solidFill>
+                  <a:schemeClr val="tx1"/>
+                </a:solidFill>
+              </a:rPr>
+              <a:t>1</a:t>
+            </a:r>
+          </a:p>
+        </p:txBody>
+      </p:sp>
+      <p:sp>
+        <p:nvSpPr>
+          <p:cNvPr id="68" name="TextBox 67"/>
+          <p:cNvSpPr txBox="1"/>
+          <p:nvPr/>
+        </p:nvSpPr>
+        <p:spPr>
+          <a:xfrm>
+            <a:off x="3056770" y="2326633"/>
+            <a:ext cx="301686" cy="369204"/>
+          </a:xfrm>
+          <a:prstGeom prst="rect">
+            <a:avLst/>
+          </a:prstGeom>
+          <a:noFill/>
+        </p:spPr>
+        <p:txBody>
+          <a:bodyPr wrap="square" rtlCol="0">
+            <a:spAutoFit/>
+          </a:bodyPr>
+          <a:lstStyle/>
+          <a:p>
+            <a:r>
+              <a:rPr lang="en-US" dirty="0"/>
+              <a:t>1</a:t>
+            </a:r>
+          </a:p>
+        </p:txBody>
+      </p:sp>
+      <p:sp>
+        <p:nvSpPr>
+          <p:cNvPr id="69" name="TextBox 68"/>
+          <p:cNvSpPr txBox="1"/>
+          <p:nvPr/>
+        </p:nvSpPr>
+        <p:spPr>
+          <a:xfrm>
+            <a:off x="991859" y="2631433"/>
+            <a:ext cx="301686" cy="369204"/>
+          </a:xfrm>
+          <a:prstGeom prst="rect">
+            <a:avLst/>
+          </a:prstGeom>
+          <a:noFill/>
+        </p:spPr>
+        <p:txBody>
+          <a:bodyPr wrap="square" rtlCol="0">
+            <a:spAutoFit/>
+          </a:bodyPr>
+          <a:lstStyle/>
+          <a:p>
+            <a:r>
+              <a:rPr lang="en-US" dirty="0"/>
+              <a:t>2</a:t>
+            </a:r>
+          </a:p>
+        </p:txBody>
+      </p:sp>
+      <p:cxnSp>
+        <p:nvCxnSpPr>
+          <p:cNvPr id="70" name="Straight Arrow Connector 69"/>
+          <p:cNvCxnSpPr>
+            <a:stCxn id="59" idx="6"/>
+            <a:endCxn id="60" idx="2"/>
+          </p:cNvCxnSpPr>
+          <p:nvPr/>
+        </p:nvCxnSpPr>
+        <p:spPr>
+          <a:xfrm flipV="1">
+            <a:off x="888290" y="2996100"/>
+            <a:ext cx="639306" cy="6232"/>
+          </a:xfrm>
+          <a:prstGeom prst="straightConnector1">
+            <a:avLst/>
+          </a:prstGeom>
+          <a:ln w="63500">
+            <a:solidFill>
+              <a:srgbClr val="FF0000"/>
+            </a:solidFill>
+            <a:tailEnd type="triangle"/>
+          </a:ln>
+        </p:spPr>
+        <p:style>
+          <a:lnRef idx="1">
+            <a:schemeClr val="accent1"/>
+          </a:lnRef>
+          <a:fillRef idx="0">
+            <a:schemeClr val="accent1"/>
+          </a:fillRef>
+          <a:effectRef idx="0">
+            <a:schemeClr val="accent1"/>
+          </a:effectRef>
+          <a:fontRef idx="minor">
+            <a:schemeClr val="tx1"/>
+          </a:fontRef>
+        </p:style>
+      </p:cxnSp>
+      <p:sp>
+        <p:nvSpPr>
+          <p:cNvPr id="235" name="TextBox 234"/>
+          <p:cNvSpPr txBox="1"/>
+          <p:nvPr/>
+        </p:nvSpPr>
+        <p:spPr>
+          <a:xfrm>
+            <a:off x="2316237" y="2642165"/>
+            <a:ext cx="301686" cy="369204"/>
+          </a:xfrm>
+          <a:prstGeom prst="rect">
+            <a:avLst/>
+          </a:prstGeom>
+          <a:noFill/>
+        </p:spPr>
+        <p:txBody>
+          <a:bodyPr wrap="square" rtlCol="0">
+            <a:spAutoFit/>
+          </a:bodyPr>
+          <a:lstStyle/>
+          <a:p>
+            <a:r>
+              <a:rPr lang="en-US" dirty="0"/>
+              <a:t>1</a:t>
+            </a:r>
+          </a:p>
+        </p:txBody>
+      </p:sp>
+      <p:cxnSp>
+        <p:nvCxnSpPr>
+          <p:cNvPr id="236" name="Straight Arrow Connector 235"/>
+          <p:cNvCxnSpPr>
+            <a:stCxn id="60" idx="5"/>
+            <a:endCxn id="61" idx="2"/>
+          </p:cNvCxnSpPr>
+          <p:nvPr/>
+        </p:nvCxnSpPr>
+        <p:spPr>
+          <a:xfrm>
+            <a:off x="2130153" y="3245687"/>
+            <a:ext cx="711088" cy="743644"/>
+          </a:xfrm>
+          <a:prstGeom prst="straightConnector1">
+            <a:avLst/>
+          </a:prstGeom>
+          <a:ln w="63500">
+            <a:solidFill>
+              <a:srgbClr val="FF0000"/>
+            </a:solidFill>
+            <a:tailEnd type="triangle"/>
+          </a:ln>
+        </p:spPr>
+        <p:style>
+          <a:lnRef idx="1">
+            <a:schemeClr val="accent1"/>
+          </a:lnRef>
+          <a:fillRef idx="0">
+            <a:schemeClr val="accent1"/>
+          </a:fillRef>
+          <a:effectRef idx="0">
+            <a:schemeClr val="accent1"/>
+          </a:effectRef>
+          <a:fontRef idx="minor">
+            <a:schemeClr val="tx1"/>
+          </a:fontRef>
+        </p:style>
+      </p:cxnSp>
+      <p:sp>
+        <p:nvSpPr>
+          <p:cNvPr id="240" name="TextBox 239"/>
+          <p:cNvSpPr txBox="1"/>
+          <p:nvPr/>
+        </p:nvSpPr>
+        <p:spPr>
+          <a:xfrm>
+            <a:off x="2326969" y="3206689"/>
+            <a:ext cx="301686" cy="369204"/>
+          </a:xfrm>
+          <a:prstGeom prst="rect">
+            <a:avLst/>
+          </a:prstGeom>
+          <a:noFill/>
+        </p:spPr>
+        <p:txBody>
+          <a:bodyPr wrap="square" rtlCol="0">
+            <a:spAutoFit/>
+          </a:bodyPr>
+          <a:lstStyle/>
+          <a:p>
+            <a:r>
+              <a:rPr lang="en-US" dirty="0"/>
+              <a:t>1</a:t>
+            </a:r>
+          </a:p>
+        </p:txBody>
+      </p:sp>
+      <p:sp>
+        <p:nvSpPr>
+          <p:cNvPr id="241" name="TextBox 240"/>
+          <p:cNvSpPr txBox="1"/>
+          <p:nvPr/>
+        </p:nvSpPr>
+        <p:spPr>
+          <a:xfrm>
+            <a:off x="7328079" y="2253803"/>
+            <a:ext cx="3864584" cy="369332"/>
+          </a:xfrm>
+          <a:prstGeom prst="rect">
+            <a:avLst/>
+          </a:prstGeom>
+          <a:noFill/>
+        </p:spPr>
+        <p:txBody>
+          <a:bodyPr wrap="none" rtlCol="0">
+            <a:spAutoFit/>
+          </a:bodyPr>
+          <a:lstStyle/>
+          <a:p>
+            <a:r>
+              <a:rPr lang="en-US" dirty="0" smtClean="0"/>
+              <a:t>Match/Action capacity: 1 per processor</a:t>
+            </a:r>
+            <a:endParaRPr lang="en-US" dirty="0"/>
+          </a:p>
+        </p:txBody>
+      </p:sp>
+    </p:spTree>
+    <p:extLst>
+      <p:ext uri="{BB962C8B-B14F-4D97-AF65-F5344CB8AC3E}">
+        <p14:creationId xmlns:p14="http://schemas.microsoft.com/office/powerpoint/2010/main" val="431250624"/>
+      </p:ext>
+    </p:extLst>
+  </p:cSld>
+  <p:clrMapOvr>
+    <a:masterClrMapping/>
+  </p:clrMapOvr>
+  <p:timing>
+    <p:tnLst>
+      <p:par>
+        <p:cTn id="1" dur="indefinite" restart="never" nodeType="tmRoot"/>
+      </p:par>
+    </p:tnLst>
+  </p:timing>
+</p:sld>
+</file>
+
+<file path=ppt/slides/slide11.xml><?xml version="1.0" encoding="utf-8"?>
+<p:sld xmlns:a="http://schemas.openxmlformats.org/drawingml/2006/main" xmlns:r="http://schemas.openxmlformats.org/officeDocument/2006/relationships" xmlns:p="http://schemas.openxmlformats.org/presentationml/2006/main">
+  <p:cSld>
+    <p:spTree>
+      <p:nvGrpSpPr>
+        <p:cNvPr id="1" name=""/>
+        <p:cNvGrpSpPr/>
+        <p:nvPr/>
+      </p:nvGrpSpPr>
+      <p:grpSpPr>
+        <a:xfrm>
+          <a:off x="0" y="0"/>
+          <a:ext cx="0" cy="0"/>
+          <a:chOff x="0" y="0"/>
+          <a:chExt cx="0" cy="0"/>
+        </a:xfrm>
+      </p:grpSpPr>
+      <p:sp>
+        <p:nvSpPr>
+          <p:cNvPr id="2" name="Title 1"/>
+          <p:cNvSpPr>
+            <a:spLocks noGrp="1"/>
+          </p:cNvSpPr>
+          <p:nvPr>
+            <p:ph type="title"/>
+          </p:nvPr>
+        </p:nvSpPr>
+        <p:spPr/>
+        <p:txBody>
+          <a:bodyPr/>
+          <a:lstStyle/>
+          <a:p>
+            <a:r>
+              <a:rPr lang="en-US" dirty="0" smtClean="0"/>
+              <a:t>Animation of scheduling problem</a:t>
+            </a:r>
+            <a:endParaRPr lang="en-US" dirty="0"/>
+          </a:p>
+        </p:txBody>
+      </p:sp>
       <p:graphicFrame>
         <p:nvGraphicFramePr>
           <p:cNvPr id="5" name="Table 4"/>
@@ -7257,7 +7983,7 @@
 </p:sld>
 </file>
 
-<file path=ppt/slides/slide11.xml><?xml version="1.0" encoding="utf-8"?>
+<file path=ppt/slides/slide12.xml><?xml version="1.0" encoding="utf-8"?>
 <p:sld xmlns:a="http://schemas.openxmlformats.org/drawingml/2006/main" xmlns:r="http://schemas.openxmlformats.org/officeDocument/2006/relationships" xmlns:p="http://schemas.openxmlformats.org/presentationml/2006/main">
   <p:cSld>
     <p:spTree>
@@ -8815,7 +9541,7 @@
 </p:sld>
 </file>
 
-<file path=ppt/slides/slide12.xml><?xml version="1.0" encoding="utf-8"?>
+<file path=ppt/slides/slide13.xml><?xml version="1.0" encoding="utf-8"?>
 <p:sld xmlns:a="http://schemas.openxmlformats.org/drawingml/2006/main" xmlns:r="http://schemas.openxmlformats.org/officeDocument/2006/relationships" xmlns:p="http://schemas.openxmlformats.org/presentationml/2006/main">
   <p:cSld>
     <p:spTree>
@@ -10535,7 +11261,7 @@
 </p:sld>
 </file>
 
-<file path=ppt/slides/slide13.xml><?xml version="1.0" encoding="utf-8"?>
+<file path=ppt/slides/slide14.xml><?xml version="1.0" encoding="utf-8"?>
 <p:sld xmlns:a="http://schemas.openxmlformats.org/drawingml/2006/main" xmlns:r="http://schemas.openxmlformats.org/officeDocument/2006/relationships" xmlns:p="http://schemas.openxmlformats.org/presentationml/2006/main">
   <p:cSld>
     <p:spTree>
@@ -12083,7 +12809,7 @@
 </p:sld>
 </file>
 
-<file path=ppt/slides/slide14.xml><?xml version="1.0" encoding="utf-8"?>
+<file path=ppt/slides/slide15.xml><?xml version="1.0" encoding="utf-8"?>
 <p:sld xmlns:a="http://schemas.openxmlformats.org/drawingml/2006/main" xmlns:r="http://schemas.openxmlformats.org/officeDocument/2006/relationships" xmlns:p="http://schemas.openxmlformats.org/presentationml/2006/main">
   <p:cSld>
     <p:spTree>
@@ -13635,7 +14361,7 @@
 </p:sld>
 </file>
 
-<file path=ppt/slides/slide15.xml><?xml version="1.0" encoding="utf-8"?>
+<file path=ppt/slides/slide16.xml><?xml version="1.0" encoding="utf-8"?>
 <p:sld xmlns:a="http://schemas.openxmlformats.org/drawingml/2006/main" xmlns:r="http://schemas.openxmlformats.org/officeDocument/2006/relationships" xmlns:p="http://schemas.openxmlformats.org/presentationml/2006/main">
   <p:cSld>
     <p:spTree>
@@ -15201,7 +15927,7 @@
 </p:sld>
 </file>
 
-<file path=ppt/slides/slide16.xml><?xml version="1.0" encoding="utf-8"?>
+<file path=ppt/slides/slide17.xml><?xml version="1.0" encoding="utf-8"?>
 <p:sld xmlns:a="http://schemas.openxmlformats.org/drawingml/2006/main" xmlns:r="http://schemas.openxmlformats.org/officeDocument/2006/relationships" xmlns:p="http://schemas.openxmlformats.org/presentationml/2006/main">
   <p:cSld>
     <p:spTree>
@@ -16787,7 +17513,7 @@
 </p:sld>
 </file>
 
-<file path=ppt/slides/slide17.xml><?xml version="1.0" encoding="utf-8"?>
+<file path=ppt/slides/slide18.xml><?xml version="1.0" encoding="utf-8"?>
 <p:sld xmlns:a="http://schemas.openxmlformats.org/drawingml/2006/main" xmlns:r="http://schemas.openxmlformats.org/officeDocument/2006/relationships" xmlns:p="http://schemas.openxmlformats.org/presentationml/2006/main">
   <p:cSld>
     <p:spTree>
@@ -18551,7 +19277,7 @@
 </p:sld>
 </file>
 
-<file path=ppt/slides/slide18.xml><?xml version="1.0" encoding="utf-8"?>
+<file path=ppt/slides/slide19.xml><?xml version="1.0" encoding="utf-8"?>
 <p:sld xmlns:a="http://schemas.openxmlformats.org/drawingml/2006/main" xmlns:r="http://schemas.openxmlformats.org/officeDocument/2006/relationships" xmlns:p="http://schemas.openxmlformats.org/presentationml/2006/main">
   <p:cSld>
     <p:spTree>
@@ -18585,15 +19311,7 @@
           <a:p>
             <a:r>
               <a:rPr lang="en-US" dirty="0" smtClean="0"/>
-              <a:t>The </a:t>
-            </a:r>
-            <a:r>
-              <a:rPr lang="en-US" dirty="0" smtClean="0"/>
-              <a:t>general compilation </a:t>
-            </a:r>
-            <a:r>
-              <a:rPr lang="en-US" dirty="0" smtClean="0"/>
-              <a:t>problem</a:t>
+              <a:t>The general compilation problem</a:t>
             </a:r>
             <a:endParaRPr lang="en-US" dirty="0"/>
           </a:p>
@@ -18847,102 +19565,6 @@
 </p:sld>
 </file>
 
-<file path=ppt/slides/slide19.xml><?xml version="1.0" encoding="utf-8"?>
-<p:sld xmlns:a="http://schemas.openxmlformats.org/drawingml/2006/main" xmlns:r="http://schemas.openxmlformats.org/officeDocument/2006/relationships" xmlns:p="http://schemas.openxmlformats.org/presentationml/2006/main">
-  <p:cSld>
-    <p:spTree>
-      <p:nvGrpSpPr>
-        <p:cNvPr id="1" name=""/>
-        <p:cNvGrpSpPr/>
-        <p:nvPr/>
-      </p:nvGrpSpPr>
-      <p:grpSpPr>
-        <a:xfrm>
-          <a:off x="0" y="0"/>
-          <a:ext cx="0" cy="0"/>
-          <a:chOff x="0" y="0"/>
-          <a:chExt cx="0" cy="0"/>
-        </a:xfrm>
-      </p:grpSpPr>
-      <p:sp>
-        <p:nvSpPr>
-          <p:cNvPr id="2" name="Title 1"/>
-          <p:cNvSpPr>
-            <a:spLocks noGrp="1"/>
-          </p:cNvSpPr>
-          <p:nvPr>
-            <p:ph type="title"/>
-          </p:nvPr>
-        </p:nvSpPr>
-        <p:spPr/>
-        <p:txBody>
-          <a:bodyPr/>
-          <a:lstStyle/>
-          <a:p>
-            <a:r>
-              <a:rPr lang="en-US" dirty="0" smtClean="0"/>
-              <a:t>ILP formulation</a:t>
-            </a:r>
-            <a:endParaRPr lang="en-US" dirty="0"/>
-          </a:p>
-        </p:txBody>
-      </p:sp>
-      <p:sp>
-        <p:nvSpPr>
-          <p:cNvPr id="3" name="Content Placeholder 2"/>
-          <p:cNvSpPr>
-            <a:spLocks noGrp="1"/>
-          </p:cNvSpPr>
-          <p:nvPr>
-            <p:ph idx="1"/>
-          </p:nvPr>
-        </p:nvSpPr>
-        <p:spPr/>
-        <p:txBody>
-          <a:bodyPr/>
-          <a:lstStyle/>
-          <a:p>
-            <a:r>
-              <a:rPr lang="en-US" dirty="0"/>
-              <a:t>Assign each operation a start time relative to the first operation</a:t>
-            </a:r>
-          </a:p>
-          <a:p>
-            <a:r>
-              <a:rPr lang="en-US" dirty="0"/>
-              <a:t>Group operations into buckets based on the reminder when the operation start time is divided by N.</a:t>
-            </a:r>
-          </a:p>
-          <a:p>
-            <a:r>
-              <a:rPr lang="en-US" dirty="0"/>
-              <a:t>Total match/action requirements in a bucket &lt;= match/action capacity</a:t>
-            </a:r>
-          </a:p>
-          <a:p>
-            <a:r>
-              <a:rPr lang="en-US" dirty="0"/>
-              <a:t>Dependencies must be satisfied between operations</a:t>
-            </a:r>
-          </a:p>
-          <a:p>
-            <a:endParaRPr lang="en-US" dirty="0"/>
-          </a:p>
-        </p:txBody>
-      </p:sp>
-    </p:spTree>
-    <p:extLst>
-      <p:ext uri="{BB962C8B-B14F-4D97-AF65-F5344CB8AC3E}">
-        <p14:creationId xmlns:p14="http://schemas.microsoft.com/office/powerpoint/2010/main" val="1677320154"/>
-      </p:ext>
-    </p:extLst>
-  </p:cSld>
-  <p:clrMapOvr>
-    <a:masterClrMapping/>
-  </p:clrMapOvr>
-</p:sld>
-</file>
-
 <file path=ppt/slides/slide2.xml><?xml version="1.0" encoding="utf-8"?>
 <p:sld xmlns:a="http://schemas.openxmlformats.org/drawingml/2006/main" xmlns:r="http://schemas.openxmlformats.org/officeDocument/2006/relationships" xmlns:p="http://schemas.openxmlformats.org/presentationml/2006/main">
   <p:cSld>
@@ -20375,6 +20997,102 @@
           <a:p>
             <a:r>
               <a:rPr lang="en-US" dirty="0" smtClean="0"/>
+              <a:t>ILP formulation</a:t>
+            </a:r>
+            <a:endParaRPr lang="en-US" dirty="0"/>
+          </a:p>
+        </p:txBody>
+      </p:sp>
+      <p:sp>
+        <p:nvSpPr>
+          <p:cNvPr id="3" name="Content Placeholder 2"/>
+          <p:cNvSpPr>
+            <a:spLocks noGrp="1"/>
+          </p:cNvSpPr>
+          <p:nvPr>
+            <p:ph idx="1"/>
+          </p:nvPr>
+        </p:nvSpPr>
+        <p:spPr/>
+        <p:txBody>
+          <a:bodyPr/>
+          <a:lstStyle/>
+          <a:p>
+            <a:r>
+              <a:rPr lang="en-US" dirty="0"/>
+              <a:t>Assign each operation a start time relative to the first operation</a:t>
+            </a:r>
+          </a:p>
+          <a:p>
+            <a:r>
+              <a:rPr lang="en-US" dirty="0"/>
+              <a:t>Group operations into buckets based on the reminder when the operation start time is divided by N.</a:t>
+            </a:r>
+          </a:p>
+          <a:p>
+            <a:r>
+              <a:rPr lang="en-US" dirty="0"/>
+              <a:t>Total match/action requirements in a bucket &lt;= match/action capacity</a:t>
+            </a:r>
+          </a:p>
+          <a:p>
+            <a:r>
+              <a:rPr lang="en-US" dirty="0"/>
+              <a:t>Dependencies must be satisfied between operations</a:t>
+            </a:r>
+          </a:p>
+          <a:p>
+            <a:endParaRPr lang="en-US" dirty="0"/>
+          </a:p>
+        </p:txBody>
+      </p:sp>
+    </p:spTree>
+    <p:extLst>
+      <p:ext uri="{BB962C8B-B14F-4D97-AF65-F5344CB8AC3E}">
+        <p14:creationId xmlns:p14="http://schemas.microsoft.com/office/powerpoint/2010/main" val="1677320154"/>
+      </p:ext>
+    </p:extLst>
+  </p:cSld>
+  <p:clrMapOvr>
+    <a:masterClrMapping/>
+  </p:clrMapOvr>
+</p:sld>
+</file>
+
+<file path=ppt/slides/slide21.xml><?xml version="1.0" encoding="utf-8"?>
+<p:sld xmlns:a="http://schemas.openxmlformats.org/drawingml/2006/main" xmlns:r="http://schemas.openxmlformats.org/officeDocument/2006/relationships" xmlns:p="http://schemas.openxmlformats.org/presentationml/2006/main">
+  <p:cSld>
+    <p:spTree>
+      <p:nvGrpSpPr>
+        <p:cNvPr id="1" name=""/>
+        <p:cNvGrpSpPr/>
+        <p:nvPr/>
+      </p:nvGrpSpPr>
+      <p:grpSpPr>
+        <a:xfrm>
+          <a:off x="0" y="0"/>
+          <a:ext cx="0" cy="0"/>
+          <a:chOff x="0" y="0"/>
+          <a:chExt cx="0" cy="0"/>
+        </a:xfrm>
+      </p:grpSpPr>
+      <p:sp>
+        <p:nvSpPr>
+          <p:cNvPr id="2" name="Title 1"/>
+          <p:cNvSpPr>
+            <a:spLocks noGrp="1"/>
+          </p:cNvSpPr>
+          <p:nvPr>
+            <p:ph type="title"/>
+          </p:nvPr>
+        </p:nvSpPr>
+        <p:spPr/>
+        <p:txBody>
+          <a:bodyPr/>
+          <a:lstStyle/>
+          <a:p>
+            <a:r>
+              <a:rPr lang="en-US" dirty="0" smtClean="0"/>
               <a:t>Results: switch.p4 on RMT and </a:t>
             </a:r>
             <a:r>
@@ -20714,7 +21432,7 @@
 </p:sld>
 </file>
 
-<file path=ppt/slides/slide21.xml><?xml version="1.0" encoding="utf-8"?>
+<file path=ppt/slides/slide22.xml><?xml version="1.0" encoding="utf-8"?>
 <p:sld xmlns:a="http://schemas.openxmlformats.org/drawingml/2006/main" xmlns:r="http://schemas.openxmlformats.org/officeDocument/2006/relationships" xmlns:p="http://schemas.openxmlformats.org/presentationml/2006/main">
   <p:cSld>
     <p:spTree>
@@ -20803,7 +21521,7 @@
 </p:sld>
 </file>
 
-<file path=ppt/slides/slide22.xml><?xml version="1.0" encoding="utf-8"?>
+<file path=ppt/slides/slide23.xml><?xml version="1.0" encoding="utf-8"?>
 <p:sld xmlns:a="http://schemas.openxmlformats.org/drawingml/2006/main" xmlns:r="http://schemas.openxmlformats.org/officeDocument/2006/relationships" xmlns:p="http://schemas.openxmlformats.org/presentationml/2006/main">
   <p:cSld>
     <p:spTree>
@@ -21211,7 +21929,7 @@
 </p:sld>
 </file>
 
-<file path=ppt/slides/slide23.xml><?xml version="1.0" encoding="utf-8"?>
+<file path=ppt/slides/slide24.xml><?xml version="1.0" encoding="utf-8"?>
 <p:sld xmlns:a="http://schemas.openxmlformats.org/drawingml/2006/main" xmlns:r="http://schemas.openxmlformats.org/officeDocument/2006/relationships" xmlns:p="http://schemas.openxmlformats.org/presentationml/2006/main">
   <p:cSld>
     <p:spTree>
@@ -21293,15 +22011,7 @@
           <a:p>
             <a:r>
               <a:rPr lang="en-US" dirty="0" smtClean="0"/>
-              <a:t>Each memory cluster can </a:t>
-            </a:r>
-            <a:r>
-              <a:rPr lang="en-US" dirty="0" smtClean="0"/>
-              <a:t>receive </a:t>
-            </a:r>
-            <a:r>
-              <a:rPr lang="en-US" dirty="0" smtClean="0"/>
-              <a:t>up to 8 match keys</a:t>
+              <a:t>Each memory cluster can receive up to 8 match keys</a:t>
             </a:r>
           </a:p>
           <a:p>
@@ -21785,7 +22495,7 @@
 </p:sld>
 </file>
 
-<file path=ppt/slides/slide24.xml><?xml version="1.0" encoding="utf-8"?>
+<file path=ppt/slides/slide25.xml><?xml version="1.0" encoding="utf-8"?>
 <p:sld xmlns:a="http://schemas.openxmlformats.org/drawingml/2006/main" xmlns:r="http://schemas.openxmlformats.org/officeDocument/2006/relationships" xmlns:p="http://schemas.openxmlformats.org/presentationml/2006/main">
   <p:cSld>
     <p:spTree>
@@ -21864,8 +22574,24 @@
             </a:r>
             <a:r>
               <a:rPr lang="en-US" dirty="0" smtClean="0"/>
-              <a:t> (32-wide VLIW, segment crossbar): 45.5 square mm</a:t>
-            </a:r>
+              <a:t> (32-wide VLIW, segment crossbar): 45.5 square </a:t>
+            </a:r>
+            <a:r>
+              <a:rPr lang="en-US" dirty="0" smtClean="0"/>
+              <a:t>mm</a:t>
+            </a:r>
+          </a:p>
+          <a:p>
+            <a:pPr lvl="1"/>
+            <a:r>
+              <a:rPr lang="en-US" dirty="0" smtClean="0"/>
+              <a:t>Break down 45.5 </a:t>
+            </a:r>
+            <a:r>
+              <a:rPr lang="en-US" smtClean="0"/>
+              <a:t>into crossbar and VLIW</a:t>
+            </a:r>
+            <a:endParaRPr lang="en-US" dirty="0" smtClean="0"/>
           </a:p>
           <a:p>
             <a:pPr lvl="1"/>
@@ -22009,6 +22735,37 @@
                                   </p:childTnLst>
                                 </p:cTn>
                               </p:par>
+                              <p:par>
+                                <p:cTn id="11" presetID="1" presetClass="entr" presetSubtype="0" fill="hold" nodeType="withEffect">
+                                  <p:stCondLst>
+                                    <p:cond delay="0"/>
+                                  </p:stCondLst>
+                                  <p:childTnLst>
+                                    <p:set>
+                                      <p:cBhvr>
+                                        <p:cTn id="12" dur="1" fill="hold">
+                                          <p:stCondLst>
+                                            <p:cond delay="0"/>
+                                          </p:stCondLst>
+                                        </p:cTn>
+                                        <p:tgtEl>
+                                          <p:spTgt spid="3">
+                                            <p:txEl>
+                                              <p:pRg st="3" end="3"/>
+                                            </p:txEl>
+                                          </p:spTgt>
+                                        </p:tgtEl>
+                                        <p:attrNameLst>
+                                          <p:attrName>style.visibility</p:attrName>
+                                        </p:attrNameLst>
+                                      </p:cBhvr>
+                                      <p:to>
+                                        <p:strVal val="visible"/>
+                                      </p:to>
+                                    </p:set>
+                                  </p:childTnLst>
+                                </p:cTn>
+                              </p:par>
                             </p:childTnLst>
                           </p:cTn>
                         </p:par>
@@ -22016,26 +22773,26 @@
                     </p:cTn>
                   </p:par>
                   <p:par>
-                    <p:cTn id="11" fill="hold">
+                    <p:cTn id="13" fill="hold">
                       <p:stCondLst>
                         <p:cond delay="indefinite"/>
                       </p:stCondLst>
                       <p:childTnLst>
                         <p:par>
-                          <p:cTn id="12" fill="hold">
+                          <p:cTn id="14" fill="hold">
                             <p:stCondLst>
                               <p:cond delay="0"/>
                             </p:stCondLst>
                             <p:childTnLst>
                               <p:par>
-                                <p:cTn id="13" presetID="1" presetClass="entr" presetSubtype="0" fill="hold" nodeType="clickEffect">
+                                <p:cTn id="15" presetID="1" presetClass="entr" presetSubtype="0" fill="hold" nodeType="clickEffect">
                                   <p:stCondLst>
                                     <p:cond delay="0"/>
                                   </p:stCondLst>
                                   <p:childTnLst>
                                     <p:set>
                                       <p:cBhvr>
-                                        <p:cTn id="14" dur="1" fill="hold">
+                                        <p:cTn id="16" dur="1" fill="hold">
                                           <p:stCondLst>
                                             <p:cond delay="0"/>
                                           </p:stCondLst>
@@ -22043,7 +22800,7 @@
                                         <p:tgtEl>
                                           <p:spTgt spid="3">
                                             <p:txEl>
-                                              <p:pRg st="4" end="4"/>
+                                              <p:pRg st="5" end="5"/>
                                             </p:txEl>
                                           </p:spTgt>
                                         </p:tgtEl>
@@ -22059,14 +22816,14 @@
                                 </p:cTn>
                               </p:par>
                               <p:par>
-                                <p:cTn id="15" presetID="1" presetClass="entr" presetSubtype="0" fill="hold" nodeType="withEffect">
+                                <p:cTn id="17" presetID="1" presetClass="entr" presetSubtype="0" fill="hold" nodeType="withEffect">
                                   <p:stCondLst>
                                     <p:cond delay="0"/>
                                   </p:stCondLst>
                                   <p:childTnLst>
                                     <p:set>
                                       <p:cBhvr>
-                                        <p:cTn id="16" dur="1" fill="hold">
+                                        <p:cTn id="18" dur="1" fill="hold">
                                           <p:stCondLst>
                                             <p:cond delay="0"/>
                                           </p:stCondLst>
@@ -22074,7 +22831,7 @@
                                         <p:tgtEl>
                                           <p:spTgt spid="3">
                                             <p:txEl>
-                                              <p:pRg st="5" end="5"/>
+                                              <p:pRg st="6" end="6"/>
                                             </p:txEl>
                                           </p:spTgt>
                                         </p:tgtEl>
@@ -22120,7 +22877,7 @@
 </p:sld>
 </file>
 
-<file path=ppt/slides/slide25.xml><?xml version="1.0" encoding="utf-8"?>
+<file path=ppt/slides/slide26.xml><?xml version="1.0" encoding="utf-8"?>
 <p:sld xmlns:a="http://schemas.openxmlformats.org/drawingml/2006/main" xmlns:r="http://schemas.openxmlformats.org/officeDocument/2006/relationships" xmlns:p="http://schemas.openxmlformats.org/presentationml/2006/main">
   <p:cSld>
     <p:spTree>
@@ -22917,7 +23674,7 @@
 </p:sld>
 </file>
 
-<file path=ppt/slides/slide26.xml><?xml version="1.0" encoding="utf-8"?>
+<file path=ppt/slides/slide27.xml><?xml version="1.0" encoding="utf-8"?>
 <p:sld xmlns:a="http://schemas.openxmlformats.org/drawingml/2006/main" xmlns:r="http://schemas.openxmlformats.org/officeDocument/2006/relationships" xmlns:p="http://schemas.openxmlformats.org/presentationml/2006/main">
   <p:cSld>
     <p:spTree>
@@ -23118,19 +23875,7 @@
             <a:pPr lvl="1"/>
             <a:r>
               <a:rPr lang="en-US" dirty="0" smtClean="0"/>
-              <a:t>Example </a:t>
-            </a:r>
-            <a:r>
-              <a:rPr lang="en-US" dirty="0" smtClean="0"/>
-              <a:t>2: default </a:t>
-            </a:r>
-            <a:r>
-              <a:rPr lang="en-US" dirty="0" smtClean="0"/>
-              <a:t>actions, match </a:t>
-            </a:r>
-            <a:r>
-              <a:rPr lang="en-US" dirty="0" smtClean="0"/>
-              <a:t>capacity is wasted</a:t>
+              <a:t>Example 2: default actions, match capacity is wasted</a:t>
             </a:r>
           </a:p>
           <a:p>
@@ -28592,6 +29337,104 @@
           <a:p>
             <a:r>
               <a:rPr lang="en-US" dirty="0" smtClean="0"/>
+              <a:t>Compiling to </a:t>
+            </a:r>
+            <a:r>
+              <a:rPr lang="en-US" dirty="0" err="1" smtClean="0"/>
+              <a:t>dRMT</a:t>
+            </a:r>
+            <a:endParaRPr lang="en-US" dirty="0"/>
+          </a:p>
+        </p:txBody>
+      </p:sp>
+      <p:sp>
+        <p:nvSpPr>
+          <p:cNvPr id="3" name="Content Placeholder 2"/>
+          <p:cNvSpPr>
+            <a:spLocks noGrp="1"/>
+          </p:cNvSpPr>
+          <p:nvPr>
+            <p:ph idx="1"/>
+          </p:nvPr>
+        </p:nvSpPr>
+        <p:spPr/>
+        <p:txBody>
+          <a:bodyPr/>
+          <a:lstStyle/>
+          <a:p>
+            <a:r>
+              <a:rPr lang="en-US" dirty="0" smtClean="0"/>
+              <a:t>Memory allocation</a:t>
+            </a:r>
+          </a:p>
+          <a:p>
+            <a:endParaRPr lang="en-US" dirty="0"/>
+          </a:p>
+          <a:p>
+            <a:r>
+              <a:rPr lang="en-US" dirty="0" smtClean="0"/>
+              <a:t>Compute scheduling</a:t>
+            </a:r>
+          </a:p>
+          <a:p>
+            <a:endParaRPr lang="en-US" dirty="0"/>
+          </a:p>
+          <a:p>
+            <a:r>
+              <a:rPr lang="en-US" dirty="0" smtClean="0"/>
+              <a:t>Can be decoupled for RR schedules</a:t>
+            </a:r>
+            <a:endParaRPr lang="en-US" dirty="0"/>
+          </a:p>
+        </p:txBody>
+      </p:sp>
+    </p:spTree>
+    <p:extLst>
+      <p:ext uri="{BB962C8B-B14F-4D97-AF65-F5344CB8AC3E}">
+        <p14:creationId xmlns:p14="http://schemas.microsoft.com/office/powerpoint/2010/main" val="1820669272"/>
+      </p:ext>
+    </p:extLst>
+  </p:cSld>
+  <p:clrMapOvr>
+    <a:masterClrMapping/>
+  </p:clrMapOvr>
+</p:sld>
+</file>
+
+<file path=ppt/slides/slide8.xml><?xml version="1.0" encoding="utf-8"?>
+<p:sld xmlns:a="http://schemas.openxmlformats.org/drawingml/2006/main" xmlns:r="http://schemas.openxmlformats.org/officeDocument/2006/relationships" xmlns:p="http://schemas.openxmlformats.org/presentationml/2006/main">
+  <p:cSld>
+    <p:spTree>
+      <p:nvGrpSpPr>
+        <p:cNvPr id="1" name=""/>
+        <p:cNvGrpSpPr/>
+        <p:nvPr/>
+      </p:nvGrpSpPr>
+      <p:grpSpPr>
+        <a:xfrm>
+          <a:off x="0" y="0"/>
+          <a:ext cx="0" cy="0"/>
+          <a:chOff x="0" y="0"/>
+          <a:chExt cx="0" cy="0"/>
+        </a:xfrm>
+      </p:grpSpPr>
+      <p:sp>
+        <p:nvSpPr>
+          <p:cNvPr id="2" name="Title 1"/>
+          <p:cNvSpPr>
+            <a:spLocks noGrp="1"/>
+          </p:cNvSpPr>
+          <p:nvPr>
+            <p:ph type="title"/>
+          </p:nvPr>
+        </p:nvSpPr>
+        <p:spPr/>
+        <p:txBody>
+          <a:bodyPr/>
+          <a:lstStyle/>
+          <a:p>
+            <a:r>
+              <a:rPr lang="en-US" dirty="0" smtClean="0"/>
               <a:t>Compiling: fine-grained dependencies</a:t>
             </a:r>
             <a:endParaRPr lang="en-US" dirty="0"/>
@@ -28713,11 +29556,11 @@
   <p:clrMapOvr>
     <a:masterClrMapping/>
   </p:clrMapOvr>
-  <mc:AlternateContent xmlns:mc="http://schemas.openxmlformats.org/markup-compatibility/2006">
-    <mc:Choice xmlns:p14="http://schemas.microsoft.com/office/powerpoint/2010/main" Requires="p14">
+  <mc:AlternateContent xmlns:mc="http://schemas.openxmlformats.org/markup-compatibility/2006" xmlns:p14="http://schemas.microsoft.com/office/powerpoint/2010/main">
+    <mc:Choice Requires="p14">
       <p:transition spd="slow" p14:dur="2000"/>
     </mc:Choice>
-    <mc:Fallback>
+    <mc:Fallback xmlns="">
       <p:transition spd="slow"/>
     </mc:Fallback>
   </mc:AlternateContent>
@@ -29061,100 +29904,6 @@
 </p:sld>
 </file>
 
-<file path=ppt/slides/slide8.xml><?xml version="1.0" encoding="utf-8"?>
-<p:sld xmlns:a="http://schemas.openxmlformats.org/drawingml/2006/main" xmlns:r="http://schemas.openxmlformats.org/officeDocument/2006/relationships" xmlns:p="http://schemas.openxmlformats.org/presentationml/2006/main">
-  <p:cSld>
-    <p:spTree>
-      <p:nvGrpSpPr>
-        <p:cNvPr id="1" name=""/>
-        <p:cNvGrpSpPr/>
-        <p:nvPr/>
-      </p:nvGrpSpPr>
-      <p:grpSpPr>
-        <a:xfrm>
-          <a:off x="0" y="0"/>
-          <a:ext cx="0" cy="0"/>
-          <a:chOff x="0" y="0"/>
-          <a:chExt cx="0" cy="0"/>
-        </a:xfrm>
-      </p:grpSpPr>
-      <p:sp>
-        <p:nvSpPr>
-          <p:cNvPr id="2" name="Title 1"/>
-          <p:cNvSpPr>
-            <a:spLocks noGrp="1"/>
-          </p:cNvSpPr>
-          <p:nvPr>
-            <p:ph type="title"/>
-          </p:nvPr>
-        </p:nvSpPr>
-        <p:spPr/>
-        <p:txBody>
-          <a:bodyPr/>
-          <a:lstStyle/>
-          <a:p>
-            <a:r>
-              <a:rPr lang="en-US" dirty="0" smtClean="0"/>
-              <a:t>Constraints on the problem</a:t>
-            </a:r>
-            <a:endParaRPr lang="en-US" dirty="0"/>
-          </a:p>
-        </p:txBody>
-      </p:sp>
-      <p:sp>
-        <p:nvSpPr>
-          <p:cNvPr id="3" name="Content Placeholder 2"/>
-          <p:cNvSpPr>
-            <a:spLocks noGrp="1"/>
-          </p:cNvSpPr>
-          <p:nvPr>
-            <p:ph idx="1"/>
-          </p:nvPr>
-        </p:nvSpPr>
-        <p:spPr/>
-        <p:txBody>
-          <a:bodyPr/>
-          <a:lstStyle/>
-          <a:p>
-            <a:r>
-              <a:rPr lang="en-US" dirty="0" smtClean="0"/>
-              <a:t>Match resources</a:t>
-            </a:r>
-          </a:p>
-          <a:p>
-            <a:endParaRPr lang="en-US" dirty="0"/>
-          </a:p>
-          <a:p>
-            <a:r>
-              <a:rPr lang="en-US" dirty="0" smtClean="0"/>
-              <a:t>Action resources</a:t>
-            </a:r>
-          </a:p>
-          <a:p>
-            <a:endParaRPr lang="en-US" dirty="0"/>
-          </a:p>
-          <a:p>
-            <a:r>
-              <a:rPr lang="en-US" dirty="0" smtClean="0"/>
-              <a:t>Bring back diagram of the processor to explain</a:t>
-            </a:r>
-            <a:endParaRPr lang="en-US" dirty="0"/>
-          </a:p>
-        </p:txBody>
-      </p:sp>
-    </p:spTree>
-    <p:extLst>
-      <p:ext uri="{BB962C8B-B14F-4D97-AF65-F5344CB8AC3E}">
-        <p14:creationId xmlns:p14="http://schemas.microsoft.com/office/powerpoint/2010/main" val="950479735"/>
-      </p:ext>
-    </p:extLst>
-  </p:cSld>
-  <p:clrMapOvr>
-    <a:masterClrMapping/>
-  </p:clrMapOvr>
-</p:sld>
-</file>
-
 <file path=ppt/slides/slide9.xml><?xml version="1.0" encoding="utf-8"?>
 <p:sld xmlns:a="http://schemas.openxmlformats.org/drawingml/2006/main" xmlns:r="http://schemas.openxmlformats.org/officeDocument/2006/relationships" xmlns:p="http://schemas.openxmlformats.org/presentationml/2006/main">
   <p:cSld>
@@ -29189,7 +29938,7 @@
           <a:p>
             <a:r>
               <a:rPr lang="en-US" dirty="0" smtClean="0"/>
-              <a:t>Animation of scheduling problem</a:t>
+              <a:t>Constraints on the problem</a:t>
             </a:r>
             <a:endParaRPr lang="en-US" dirty="0"/>
           </a:p>
@@ -29197,625 +29946,40 @@
       </p:sp>
       <p:sp>
         <p:nvSpPr>
-          <p:cNvPr id="59" name="Oval 58"/>
-          <p:cNvSpPr/>
-          <p:nvPr/>
-        </p:nvSpPr>
-        <p:spPr>
-          <a:xfrm>
-            <a:off x="163970" y="2640172"/>
-            <a:ext cx="724320" cy="724320"/>
-          </a:xfrm>
-          <a:prstGeom prst="ellipse">
-            <a:avLst/>
-          </a:prstGeom>
-          <a:solidFill>
-            <a:schemeClr val="accent1">
-              <a:alpha val="32000"/>
-            </a:schemeClr>
-          </a:solidFill>
-          <a:ln>
-            <a:solidFill>
-              <a:schemeClr val="accent1">
-                <a:shade val="50000"/>
-              </a:schemeClr>
-            </a:solidFill>
-          </a:ln>
-        </p:spPr>
-        <p:style>
-          <a:lnRef idx="2">
-            <a:schemeClr val="accent1">
-              <a:shade val="50000"/>
-            </a:schemeClr>
-          </a:lnRef>
-          <a:fillRef idx="1">
-            <a:schemeClr val="accent1"/>
-          </a:fillRef>
-          <a:effectRef idx="0">
-            <a:schemeClr val="accent1"/>
-          </a:effectRef>
-          <a:fontRef idx="minor">
-            <a:schemeClr val="lt1"/>
-          </a:fontRef>
-        </p:style>
-        <p:txBody>
-          <a:bodyPr rot="0" spcFirstLastPara="0" vertOverflow="overflow" horzOverflow="overflow" vert="horz" wrap="square" lIns="91440" tIns="45720" rIns="91440" bIns="45720" numCol="1" spcCol="0" rtlCol="0" fromWordArt="0" anchor="ctr" anchorCtr="0" forceAA="0" compatLnSpc="1">
-            <a:prstTxWarp prst="textNoShape">
-              <a:avLst/>
-            </a:prstTxWarp>
-            <a:noAutofit/>
-          </a:bodyPr>
-          <a:lstStyle/>
-          <a:p>
-            <a:pPr algn="ctr"/>
-            <a:r>
-              <a:rPr lang="en-US">
-                <a:solidFill>
-                  <a:schemeClr val="tx1"/>
-                </a:solidFill>
-              </a:rPr>
-              <a:t>M</a:t>
-            </a:r>
-            <a:r>
-              <a:rPr lang="en-US" smtClean="0">
-                <a:solidFill>
-                  <a:schemeClr val="tx1"/>
-                </a:solidFill>
-              </a:rPr>
-              <a:t>0</a:t>
-            </a:r>
-            <a:endParaRPr lang="en-US" dirty="0">
-              <a:solidFill>
-                <a:schemeClr val="tx1"/>
-              </a:solidFill>
-            </a:endParaRPr>
-          </a:p>
-        </p:txBody>
-      </p:sp>
-      <p:sp>
-        <p:nvSpPr>
-          <p:cNvPr id="60" name="Oval 59"/>
-          <p:cNvSpPr/>
-          <p:nvPr/>
-        </p:nvSpPr>
-        <p:spPr>
-          <a:xfrm>
-            <a:off x="1527596" y="2643130"/>
-            <a:ext cx="705939" cy="705939"/>
-          </a:xfrm>
-          <a:prstGeom prst="ellipse">
-            <a:avLst/>
-          </a:prstGeom>
-          <a:solidFill>
-            <a:srgbClr val="00B050">
-              <a:alpha val="50000"/>
-            </a:srgbClr>
-          </a:solidFill>
-        </p:spPr>
-        <p:style>
-          <a:lnRef idx="2">
-            <a:schemeClr val="accent1">
-              <a:shade val="50000"/>
-            </a:schemeClr>
-          </a:lnRef>
-          <a:fillRef idx="1">
-            <a:schemeClr val="accent1"/>
-          </a:fillRef>
-          <a:effectRef idx="0">
-            <a:schemeClr val="accent1"/>
-          </a:effectRef>
-          <a:fontRef idx="minor">
-            <a:schemeClr val="lt1"/>
-          </a:fontRef>
-        </p:style>
-        <p:txBody>
-          <a:bodyPr rot="0" spcFirstLastPara="0" vertOverflow="overflow" horzOverflow="overflow" vert="horz" wrap="square" lIns="91440" tIns="45720" rIns="91440" bIns="45720" numCol="1" spcCol="0" rtlCol="0" fromWordArt="0" anchor="ctr" anchorCtr="0" forceAA="0" compatLnSpc="1">
-            <a:prstTxWarp prst="textNoShape">
-              <a:avLst/>
-            </a:prstTxWarp>
-            <a:noAutofit/>
-          </a:bodyPr>
-          <a:lstStyle/>
-          <a:p>
-            <a:pPr algn="ctr"/>
-            <a:r>
-              <a:rPr lang="en-US" dirty="0" smtClean="0">
-                <a:solidFill>
-                  <a:schemeClr val="tx1"/>
-                </a:solidFill>
-              </a:rPr>
-              <a:t>A0</a:t>
-            </a:r>
-            <a:endParaRPr lang="en-US" dirty="0">
-              <a:solidFill>
-                <a:schemeClr val="tx1"/>
-              </a:solidFill>
-            </a:endParaRPr>
-          </a:p>
-        </p:txBody>
-      </p:sp>
-      <p:sp>
-        <p:nvSpPr>
-          <p:cNvPr id="61" name="Oval 60"/>
-          <p:cNvSpPr/>
-          <p:nvPr/>
-        </p:nvSpPr>
-        <p:spPr>
-          <a:xfrm>
-            <a:off x="2841241" y="3636361"/>
-            <a:ext cx="705939" cy="705939"/>
-          </a:xfrm>
-          <a:prstGeom prst="ellipse">
-            <a:avLst/>
-          </a:prstGeom>
-          <a:solidFill>
-            <a:srgbClr val="00B050">
-              <a:alpha val="50000"/>
-            </a:srgbClr>
-          </a:solidFill>
-        </p:spPr>
-        <p:style>
-          <a:lnRef idx="2">
-            <a:schemeClr val="accent1">
-              <a:shade val="50000"/>
-            </a:schemeClr>
-          </a:lnRef>
-          <a:fillRef idx="1">
-            <a:schemeClr val="accent1"/>
-          </a:fillRef>
-          <a:effectRef idx="0">
-            <a:schemeClr val="accent1"/>
-          </a:effectRef>
-          <a:fontRef idx="minor">
-            <a:schemeClr val="lt1"/>
-          </a:fontRef>
-        </p:style>
-        <p:txBody>
-          <a:bodyPr rot="0" spcFirstLastPara="0" vertOverflow="overflow" horzOverflow="overflow" vert="horz" wrap="square" lIns="91440" tIns="45720" rIns="91440" bIns="45720" numCol="1" spcCol="0" rtlCol="0" fromWordArt="0" anchor="ctr" anchorCtr="0" forceAA="0" compatLnSpc="1">
-            <a:prstTxWarp prst="textNoShape">
-              <a:avLst/>
-            </a:prstTxWarp>
-            <a:noAutofit/>
-          </a:bodyPr>
-          <a:lstStyle/>
-          <a:p>
-            <a:pPr algn="ctr"/>
-            <a:r>
-              <a:rPr lang="en-US" dirty="0" smtClean="0">
-                <a:solidFill>
-                  <a:schemeClr val="tx1"/>
-                </a:solidFill>
-              </a:rPr>
-              <a:t>A</a:t>
-            </a:r>
-            <a:r>
-              <a:rPr lang="en-US" dirty="0">
-                <a:solidFill>
-                  <a:schemeClr val="tx1"/>
-                </a:solidFill>
-              </a:rPr>
-              <a:t>1</a:t>
-            </a:r>
-          </a:p>
-        </p:txBody>
-      </p:sp>
-      <p:cxnSp>
-        <p:nvCxnSpPr>
-          <p:cNvPr id="62" name="Straight Arrow Connector 61"/>
-          <p:cNvCxnSpPr>
-            <a:stCxn id="60" idx="6"/>
-            <a:endCxn id="67" idx="2"/>
-          </p:cNvCxnSpPr>
-          <p:nvPr/>
-        </p:nvCxnSpPr>
-        <p:spPr>
-          <a:xfrm>
-            <a:off x="2233535" y="2996100"/>
-            <a:ext cx="580629" cy="6921"/>
-          </a:xfrm>
-          <a:prstGeom prst="straightConnector1">
-            <a:avLst/>
-          </a:prstGeom>
-          <a:ln w="63500">
-            <a:solidFill>
-              <a:srgbClr val="FF0000"/>
-            </a:solidFill>
-            <a:tailEnd type="triangle"/>
-          </a:ln>
-        </p:spPr>
-        <p:style>
-          <a:lnRef idx="1">
-            <a:schemeClr val="accent1"/>
-          </a:lnRef>
-          <a:fillRef idx="0">
-            <a:schemeClr val="accent1"/>
-          </a:fillRef>
-          <a:effectRef idx="0">
-            <a:schemeClr val="accent1"/>
-          </a:effectRef>
-          <a:fontRef idx="minor">
-            <a:schemeClr val="tx1"/>
-          </a:fontRef>
-        </p:style>
-      </p:cxnSp>
-      <p:sp>
-        <p:nvSpPr>
-          <p:cNvPr id="64" name="TextBox 63"/>
-          <p:cNvSpPr txBox="1"/>
-          <p:nvPr/>
-        </p:nvSpPr>
-        <p:spPr>
-          <a:xfrm>
-            <a:off x="340339" y="2330926"/>
-            <a:ext cx="301686" cy="369204"/>
-          </a:xfrm>
-          <a:prstGeom prst="rect">
-            <a:avLst/>
-          </a:prstGeom>
-          <a:noFill/>
-        </p:spPr>
-        <p:txBody>
-          <a:bodyPr wrap="square" rtlCol="0">
-            <a:spAutoFit/>
-          </a:bodyPr>
-          <a:lstStyle/>
-          <a:p>
-            <a:r>
-              <a:rPr lang="en-US" dirty="0"/>
-              <a:t>1</a:t>
-            </a:r>
-          </a:p>
-        </p:txBody>
-      </p:sp>
-      <p:sp>
-        <p:nvSpPr>
-          <p:cNvPr id="65" name="TextBox 64"/>
-          <p:cNvSpPr txBox="1"/>
-          <p:nvPr/>
-        </p:nvSpPr>
-        <p:spPr>
-          <a:xfrm>
-            <a:off x="1734541" y="2330925"/>
-            <a:ext cx="301686" cy="369204"/>
-          </a:xfrm>
-          <a:prstGeom prst="rect">
-            <a:avLst/>
-          </a:prstGeom>
-          <a:noFill/>
-        </p:spPr>
-        <p:txBody>
-          <a:bodyPr wrap="square" rtlCol="0">
-            <a:spAutoFit/>
-          </a:bodyPr>
-          <a:lstStyle/>
-          <a:p>
-            <a:r>
-              <a:rPr lang="en-US" dirty="0"/>
-              <a:t>1</a:t>
-            </a:r>
-          </a:p>
-        </p:txBody>
-      </p:sp>
-      <p:sp>
-        <p:nvSpPr>
-          <p:cNvPr id="66" name="TextBox 65"/>
-          <p:cNvSpPr txBox="1"/>
-          <p:nvPr/>
-        </p:nvSpPr>
-        <p:spPr>
-          <a:xfrm>
-            <a:off x="3053631" y="3338501"/>
-            <a:ext cx="301686" cy="369204"/>
-          </a:xfrm>
-          <a:prstGeom prst="rect">
-            <a:avLst/>
-          </a:prstGeom>
-          <a:noFill/>
-        </p:spPr>
-        <p:txBody>
-          <a:bodyPr wrap="none" rtlCol="0">
-            <a:spAutoFit/>
-          </a:bodyPr>
-          <a:lstStyle/>
-          <a:p>
-            <a:r>
-              <a:rPr lang="en-US" dirty="0"/>
-              <a:t>1</a:t>
-            </a:r>
-          </a:p>
-        </p:txBody>
-      </p:sp>
-      <p:sp>
-        <p:nvSpPr>
-          <p:cNvPr id="67" name="Oval 66"/>
-          <p:cNvSpPr/>
-          <p:nvPr/>
-        </p:nvSpPr>
-        <p:spPr>
-          <a:xfrm>
-            <a:off x="2814164" y="2644681"/>
-            <a:ext cx="716679" cy="716679"/>
-          </a:xfrm>
-          <a:prstGeom prst="ellipse">
-            <a:avLst/>
-          </a:prstGeom>
-          <a:solidFill>
-            <a:schemeClr val="accent1">
-              <a:alpha val="32000"/>
-            </a:schemeClr>
-          </a:solidFill>
-          <a:ln>
-            <a:solidFill>
-              <a:schemeClr val="accent1">
-                <a:shade val="50000"/>
-              </a:schemeClr>
-            </a:solidFill>
-          </a:ln>
-        </p:spPr>
-        <p:style>
-          <a:lnRef idx="2">
-            <a:schemeClr val="accent1">
-              <a:shade val="50000"/>
-            </a:schemeClr>
-          </a:lnRef>
-          <a:fillRef idx="1">
-            <a:schemeClr val="accent1"/>
-          </a:fillRef>
-          <a:effectRef idx="0">
-            <a:schemeClr val="accent1"/>
-          </a:effectRef>
-          <a:fontRef idx="minor">
-            <a:schemeClr val="lt1"/>
-          </a:fontRef>
-        </p:style>
-        <p:txBody>
-          <a:bodyPr rot="0" spcFirstLastPara="0" vertOverflow="overflow" horzOverflow="overflow" vert="horz" wrap="square" lIns="91440" tIns="45720" rIns="91440" bIns="45720" numCol="1" spcCol="0" rtlCol="0" fromWordArt="0" anchor="ctr" anchorCtr="0" forceAA="0" compatLnSpc="1">
-            <a:prstTxWarp prst="textNoShape">
-              <a:avLst/>
-            </a:prstTxWarp>
-            <a:noAutofit/>
-          </a:bodyPr>
-          <a:lstStyle/>
-          <a:p>
-            <a:pPr algn="ctr"/>
-            <a:r>
-              <a:rPr lang="en-US" dirty="0" smtClean="0">
-                <a:solidFill>
-                  <a:schemeClr val="tx1"/>
-                </a:solidFill>
-              </a:rPr>
-              <a:t>M</a:t>
-            </a:r>
-            <a:r>
-              <a:rPr lang="en-US" dirty="0">
-                <a:solidFill>
-                  <a:schemeClr val="tx1"/>
-                </a:solidFill>
-              </a:rPr>
-              <a:t>1</a:t>
-            </a:r>
-          </a:p>
-        </p:txBody>
-      </p:sp>
-      <p:sp>
-        <p:nvSpPr>
-          <p:cNvPr id="68" name="TextBox 67"/>
-          <p:cNvSpPr txBox="1"/>
-          <p:nvPr/>
-        </p:nvSpPr>
-        <p:spPr>
-          <a:xfrm>
-            <a:off x="3056770" y="2326633"/>
-            <a:ext cx="301686" cy="369204"/>
-          </a:xfrm>
-          <a:prstGeom prst="rect">
-            <a:avLst/>
-          </a:prstGeom>
-          <a:noFill/>
-        </p:spPr>
-        <p:txBody>
-          <a:bodyPr wrap="square" rtlCol="0">
-            <a:spAutoFit/>
-          </a:bodyPr>
-          <a:lstStyle/>
-          <a:p>
-            <a:r>
-              <a:rPr lang="en-US" dirty="0"/>
-              <a:t>1</a:t>
-            </a:r>
-          </a:p>
-        </p:txBody>
-      </p:sp>
-      <p:sp>
-        <p:nvSpPr>
-          <p:cNvPr id="69" name="TextBox 68"/>
-          <p:cNvSpPr txBox="1"/>
-          <p:nvPr/>
-        </p:nvSpPr>
-        <p:spPr>
-          <a:xfrm>
-            <a:off x="991859" y="2631433"/>
-            <a:ext cx="301686" cy="369204"/>
-          </a:xfrm>
-          <a:prstGeom prst="rect">
-            <a:avLst/>
-          </a:prstGeom>
-          <a:noFill/>
-        </p:spPr>
-        <p:txBody>
-          <a:bodyPr wrap="square" rtlCol="0">
-            <a:spAutoFit/>
-          </a:bodyPr>
-          <a:lstStyle/>
-          <a:p>
-            <a:r>
-              <a:rPr lang="en-US" dirty="0"/>
-              <a:t>2</a:t>
-            </a:r>
-          </a:p>
-        </p:txBody>
-      </p:sp>
-      <p:cxnSp>
-        <p:nvCxnSpPr>
-          <p:cNvPr id="70" name="Straight Arrow Connector 69"/>
-          <p:cNvCxnSpPr>
-            <a:stCxn id="59" idx="6"/>
-            <a:endCxn id="60" idx="2"/>
-          </p:cNvCxnSpPr>
-          <p:nvPr/>
-        </p:nvCxnSpPr>
-        <p:spPr>
-          <a:xfrm flipV="1">
-            <a:off x="888290" y="2996100"/>
-            <a:ext cx="639306" cy="6232"/>
-          </a:xfrm>
-          <a:prstGeom prst="straightConnector1">
-            <a:avLst/>
-          </a:prstGeom>
-          <a:ln w="63500">
-            <a:solidFill>
-              <a:srgbClr val="FF0000"/>
-            </a:solidFill>
-            <a:tailEnd type="triangle"/>
-          </a:ln>
-        </p:spPr>
-        <p:style>
-          <a:lnRef idx="1">
-            <a:schemeClr val="accent1"/>
-          </a:lnRef>
-          <a:fillRef idx="0">
-            <a:schemeClr val="accent1"/>
-          </a:fillRef>
-          <a:effectRef idx="0">
-            <a:schemeClr val="accent1"/>
-          </a:effectRef>
-          <a:fontRef idx="minor">
-            <a:schemeClr val="tx1"/>
-          </a:fontRef>
-        </p:style>
-      </p:cxnSp>
-      <p:sp>
-        <p:nvSpPr>
-          <p:cNvPr id="235" name="TextBox 234"/>
-          <p:cNvSpPr txBox="1"/>
-          <p:nvPr/>
-        </p:nvSpPr>
-        <p:spPr>
-          <a:xfrm>
-            <a:off x="2316237" y="2642165"/>
-            <a:ext cx="301686" cy="369204"/>
-          </a:xfrm>
-          <a:prstGeom prst="rect">
-            <a:avLst/>
-          </a:prstGeom>
-          <a:noFill/>
-        </p:spPr>
-        <p:txBody>
-          <a:bodyPr wrap="square" rtlCol="0">
-            <a:spAutoFit/>
-          </a:bodyPr>
-          <a:lstStyle/>
-          <a:p>
-            <a:r>
-              <a:rPr lang="en-US" dirty="0"/>
-              <a:t>1</a:t>
-            </a:r>
-          </a:p>
-        </p:txBody>
-      </p:sp>
-      <p:cxnSp>
-        <p:nvCxnSpPr>
-          <p:cNvPr id="236" name="Straight Arrow Connector 235"/>
-          <p:cNvCxnSpPr>
-            <a:stCxn id="60" idx="5"/>
-            <a:endCxn id="61" idx="2"/>
-          </p:cNvCxnSpPr>
-          <p:nvPr/>
-        </p:nvCxnSpPr>
-        <p:spPr>
-          <a:xfrm>
-            <a:off x="2130153" y="3245687"/>
-            <a:ext cx="711088" cy="743644"/>
-          </a:xfrm>
-          <a:prstGeom prst="straightConnector1">
-            <a:avLst/>
-          </a:prstGeom>
-          <a:ln w="63500">
-            <a:solidFill>
-              <a:srgbClr val="FF0000"/>
-            </a:solidFill>
-            <a:tailEnd type="triangle"/>
-          </a:ln>
-        </p:spPr>
-        <p:style>
-          <a:lnRef idx="1">
-            <a:schemeClr val="accent1"/>
-          </a:lnRef>
-          <a:fillRef idx="0">
-            <a:schemeClr val="accent1"/>
-          </a:fillRef>
-          <a:effectRef idx="0">
-            <a:schemeClr val="accent1"/>
-          </a:effectRef>
-          <a:fontRef idx="minor">
-            <a:schemeClr val="tx1"/>
-          </a:fontRef>
-        </p:style>
-      </p:cxnSp>
-      <p:sp>
-        <p:nvSpPr>
-          <p:cNvPr id="240" name="TextBox 239"/>
-          <p:cNvSpPr txBox="1"/>
-          <p:nvPr/>
-        </p:nvSpPr>
-        <p:spPr>
-          <a:xfrm>
-            <a:off x="2326969" y="3206689"/>
-            <a:ext cx="301686" cy="369204"/>
-          </a:xfrm>
-          <a:prstGeom prst="rect">
-            <a:avLst/>
-          </a:prstGeom>
-          <a:noFill/>
-        </p:spPr>
-        <p:txBody>
-          <a:bodyPr wrap="square" rtlCol="0">
-            <a:spAutoFit/>
-          </a:bodyPr>
-          <a:lstStyle/>
-          <a:p>
-            <a:r>
-              <a:rPr lang="en-US" dirty="0"/>
-              <a:t>1</a:t>
-            </a:r>
-          </a:p>
-        </p:txBody>
-      </p:sp>
-      <p:sp>
-        <p:nvSpPr>
-          <p:cNvPr id="241" name="TextBox 240"/>
-          <p:cNvSpPr txBox="1"/>
-          <p:nvPr/>
-        </p:nvSpPr>
-        <p:spPr>
-          <a:xfrm>
-            <a:off x="7328079" y="2253803"/>
-            <a:ext cx="3864584" cy="369332"/>
-          </a:xfrm>
-          <a:prstGeom prst="rect">
-            <a:avLst/>
-          </a:prstGeom>
-          <a:noFill/>
-        </p:spPr>
-        <p:txBody>
-          <a:bodyPr wrap="none" rtlCol="0">
-            <a:spAutoFit/>
-          </a:bodyPr>
+          <p:cNvPr id="3" name="Content Placeholder 2"/>
+          <p:cNvSpPr>
+            <a:spLocks noGrp="1"/>
+          </p:cNvSpPr>
+          <p:nvPr>
+            <p:ph idx="1"/>
+          </p:nvPr>
+        </p:nvSpPr>
+        <p:spPr/>
+        <p:txBody>
+          <a:bodyPr/>
           <a:lstStyle/>
           <a:p>
             <a:r>
               <a:rPr lang="en-US" dirty="0" smtClean="0"/>
-              <a:t>Match/Action capacity: 1 per processor</a:t>
+              <a:t>Match resources</a:t>
+            </a:r>
+          </a:p>
+          <a:p>
+            <a:endParaRPr lang="en-US" dirty="0"/>
+          </a:p>
+          <a:p>
+            <a:r>
+              <a:rPr lang="en-US" dirty="0" smtClean="0"/>
+              <a:t>Action resources</a:t>
+            </a:r>
+          </a:p>
+          <a:p>
+            <a:endParaRPr lang="en-US" dirty="0"/>
+          </a:p>
+          <a:p>
+            <a:r>
+              <a:rPr lang="en-US" dirty="0" smtClean="0"/>
+              <a:t>Bring back diagram of the processor to explain</a:t>
             </a:r>
             <a:endParaRPr lang="en-US" dirty="0"/>
           </a:p>
@@ -29824,20 +29988,13 @@
     </p:spTree>
     <p:extLst>
       <p:ext uri="{BB962C8B-B14F-4D97-AF65-F5344CB8AC3E}">
-        <p14:creationId xmlns:p14="http://schemas.microsoft.com/office/powerpoint/2010/main" val="431250624"/>
+        <p14:creationId xmlns:p14="http://schemas.microsoft.com/office/powerpoint/2010/main" val="950479735"/>
       </p:ext>
     </p:extLst>
   </p:cSld>
   <p:clrMapOvr>
     <a:masterClrMapping/>
   </p:clrMapOvr>
-  <p:timing>
-    <p:tnLst>
-      <p:par>
-        <p:cTn id="1" dur="indefinite" restart="never" nodeType="tmRoot"/>
-      </p:par>
-    </p:tnLst>
-  </p:timing>
 </p:sld>
 </file>
 

</xml_diff>

<commit_message>
Incorporate some of Mohammad's suggestions
</commit_message>
<xml_diff>
--- a/drmt.pptx
+++ b/drmt.pptx
@@ -192,6 +192,7 @@
           </a:p>
         </c:rich>
       </c:tx>
+      <c:layout/>
       <c:overlay val="0"/>
       <c:spPr>
         <a:noFill/>
@@ -469,11 +470,11 @@
           <c:showBubbleSize val="0"/>
         </c:dLbls>
         <c:smooth val="0"/>
-        <c:axId val="1795324448"/>
-        <c:axId val="1795327200"/>
+        <c:axId val="143466640"/>
+        <c:axId val="143471360"/>
       </c:lineChart>
       <c:catAx>
-        <c:axId val="1795324448"/>
+        <c:axId val="143466640"/>
         <c:scaling>
           <c:orientation val="minMax"/>
         </c:scaling>
@@ -516,7 +517,7 @@
             <a:endParaRPr lang="en-US"/>
           </a:p>
         </c:txPr>
-        <c:crossAx val="1795327200"/>
+        <c:crossAx val="143471360"/>
         <c:crosses val="autoZero"/>
         <c:auto val="1"/>
         <c:lblAlgn val="ctr"/>
@@ -524,7 +525,7 @@
         <c:noMultiLvlLbl val="0"/>
       </c:catAx>
       <c:valAx>
-        <c:axId val="1795327200"/>
+        <c:axId val="143471360"/>
         <c:scaling>
           <c:orientation val="minMax"/>
         </c:scaling>
@@ -574,7 +575,7 @@
             <a:endParaRPr lang="en-US"/>
           </a:p>
         </c:txPr>
-        <c:crossAx val="1795324448"/>
+        <c:crossAx val="143466640"/>
         <c:crosses val="autoZero"/>
         <c:crossBetween val="between"/>
       </c:valAx>
@@ -588,6 +589,7 @@
     </c:plotArea>
     <c:legend>
       <c:legendPos val="b"/>
+      <c:layout/>
       <c:overlay val="0"/>
       <c:spPr>
         <a:noFill/>
@@ -1959,20 +1961,33 @@
           <a:bodyPr/>
           <a:lstStyle/>
           <a:p>
+            <a:pPr marL="0" marR="0" indent="0" algn="l" defTabSz="914400" rtl="0" eaLnBrk="1" fontAlgn="auto" latinLnBrk="0" hangingPunct="1">
+              <a:lnSpc>
+                <a:spcPct val="100000"/>
+              </a:lnSpc>
+              <a:spcBef>
+                <a:spcPts val="0"/>
+              </a:spcBef>
+              <a:spcAft>
+                <a:spcPts val="0"/>
+              </a:spcAft>
+              <a:buClrTx/>
+              <a:buSzTx/>
+              <a:buFontTx/>
+              <a:buNone/>
+              <a:tabLst/>
+              <a:defRPr/>
+            </a:pPr>
             <a:r>
               <a:rPr lang="en-US" dirty="0" smtClean="0"/>
-              <a:t>At this point you have explained</a:t>
-            </a:r>
-            <a:r>
-              <a:rPr lang="en-US" baseline="0" dirty="0" smtClean="0"/>
-              <a:t> what the DAG is and what the match/action capacity is.</a:t>
-            </a:r>
-          </a:p>
-          <a:p>
-            <a:r>
-              <a:rPr lang="en-US" baseline="0" dirty="0" smtClean="0"/>
-              <a:t>TODO: Also say there are two processors.</a:t>
-            </a:r>
+              <a:t>TODO: </a:t>
+            </a:r>
+            <a:r>
+              <a:rPr lang="en-US" dirty="0" smtClean="0"/>
+              <a:t>Bring back diagram of the processor to explain</a:t>
+            </a:r>
+          </a:p>
+          <a:p>
             <a:endParaRPr lang="en-US" dirty="0"/>
           </a:p>
         </p:txBody>
@@ -1994,7 +2009,7 @@
           <a:p>
             <a:fld id="{4B72050E-C83F-DC4E-B064-9A7B7E00D2A3}" type="slidenum">
               <a:rPr lang="en-US" smtClean="0"/>
-              <a:t>16</a:t>
+              <a:t>15</a:t>
             </a:fld>
             <a:endParaRPr lang="en-US"/>
           </a:p>
@@ -2003,7 +2018,7 @@
     </p:spTree>
     <p:extLst>
       <p:ext uri="{BB962C8B-B14F-4D97-AF65-F5344CB8AC3E}">
-        <p14:creationId xmlns:p14="http://schemas.microsoft.com/office/powerpoint/2010/main" val="1127672194"/>
+        <p14:creationId xmlns:p14="http://schemas.microsoft.com/office/powerpoint/2010/main" val="1761997500"/>
       </p:ext>
     </p:extLst>
   </p:cSld>
@@ -2059,17 +2074,17 @@
           <a:p>
             <a:r>
               <a:rPr lang="en-US" dirty="0" smtClean="0"/>
-              <a:t>We are going to assume one packet per clock cycle. It’s easy to extend it to more</a:t>
+              <a:t>At this point you have explained</a:t>
             </a:r>
             <a:r>
               <a:rPr lang="en-US" baseline="0" dirty="0" smtClean="0"/>
-              <a:t> general throughputs.</a:t>
+              <a:t> what the DAG is and what the match/action capacity is.</a:t>
             </a:r>
           </a:p>
           <a:p>
             <a:r>
               <a:rPr lang="en-US" baseline="0" dirty="0" smtClean="0"/>
-              <a:t>TODO: Replace all the text with a figure.</a:t>
+              <a:t>TODO: Also say there are two processors.</a:t>
             </a:r>
             <a:endParaRPr lang="en-US" dirty="0"/>
           </a:p>
@@ -2092,7 +2107,7 @@
           <a:p>
             <a:fld id="{4B72050E-C83F-DC4E-B064-9A7B7E00D2A3}" type="slidenum">
               <a:rPr lang="en-US" smtClean="0"/>
-              <a:t>25</a:t>
+              <a:t>16</a:t>
             </a:fld>
             <a:endParaRPr lang="en-US"/>
           </a:p>
@@ -2101,7 +2116,7 @@
     </p:spTree>
     <p:extLst>
       <p:ext uri="{BB962C8B-B14F-4D97-AF65-F5344CB8AC3E}">
-        <p14:creationId xmlns:p14="http://schemas.microsoft.com/office/powerpoint/2010/main" val="1785872854"/>
+        <p14:creationId xmlns:p14="http://schemas.microsoft.com/office/powerpoint/2010/main" val="1127672194"/>
       </p:ext>
     </p:extLst>
   </p:cSld>
@@ -2157,36 +2172,19 @@
           <a:p>
             <a:r>
               <a:rPr lang="en-US" dirty="0" smtClean="0"/>
-              <a:t>TODO: Show this idea of scheduling on a circle of</a:t>
+              <a:t>We are going to assume one packet per clock cycle. It’s easy to extend it to more</a:t>
             </a:r>
             <a:r>
               <a:rPr lang="en-US" baseline="0" dirty="0" smtClean="0"/>
-              <a:t> length N.</a:t>
+              <a:t> general throughputs.</a:t>
             </a:r>
           </a:p>
           <a:p>
             <a:r>
               <a:rPr lang="en-US" baseline="0" dirty="0" smtClean="0"/>
-              <a:t>Periodic schedule is just the schedule on a circle, as opposed to a line.</a:t>
-            </a:r>
-          </a:p>
-          <a:p>
-            <a:r>
-              <a:rPr lang="en-US" baseline="0" dirty="0" smtClean="0"/>
-              <a:t>What does the periodic schedule even mean? Show the previous example on a circle.</a:t>
-            </a:r>
-          </a:p>
-          <a:p>
-            <a:r>
-              <a:rPr lang="en-US" baseline="0" dirty="0" smtClean="0"/>
-              <a:t>The reason you can do this as an ILP is you can take any time slot and write it as t*P + Q.</a:t>
-            </a:r>
-          </a:p>
-          <a:p>
-            <a:r>
-              <a:rPr lang="en-US" baseline="0" dirty="0" smtClean="0"/>
-              <a:t>This is how you can formulate as ILP.</a:t>
-            </a:r>
+              <a:t>TODO: Replace all the text with a figure.</a:t>
+            </a:r>
+            <a:endParaRPr lang="en-US" dirty="0"/>
           </a:p>
         </p:txBody>
       </p:sp>
@@ -2207,7 +2205,7 @@
           <a:p>
             <a:fld id="{4B72050E-C83F-DC4E-B064-9A7B7E00D2A3}" type="slidenum">
               <a:rPr lang="en-US" smtClean="0"/>
-              <a:t>26</a:t>
+              <a:t>25</a:t>
             </a:fld>
             <a:endParaRPr lang="en-US"/>
           </a:p>
@@ -2216,7 +2214,7 @@
     </p:spTree>
     <p:extLst>
       <p:ext uri="{BB962C8B-B14F-4D97-AF65-F5344CB8AC3E}">
-        <p14:creationId xmlns:p14="http://schemas.microsoft.com/office/powerpoint/2010/main" val="1416276009"/>
+        <p14:creationId xmlns:p14="http://schemas.microsoft.com/office/powerpoint/2010/main" val="1785872854"/>
       </p:ext>
     </p:extLst>
   </p:cSld>
@@ -2272,19 +2270,36 @@
           <a:p>
             <a:r>
               <a:rPr lang="en-US" dirty="0" smtClean="0"/>
-              <a:t>TODO: When you combine</a:t>
+              <a:t>TODO: Show this idea of scheduling on a circle of</a:t>
             </a:r>
             <a:r>
               <a:rPr lang="en-US" baseline="0" dirty="0" smtClean="0"/>
-              <a:t> because it’s a bit more balanced, that’s why RMT does better.</a:t>
+              <a:t> length N.</a:t>
             </a:r>
           </a:p>
           <a:p>
             <a:r>
               <a:rPr lang="en-US" baseline="0" dirty="0" smtClean="0"/>
-              <a:t>Switch.p4 is optimized for RMT.</a:t>
-            </a:r>
-            <a:endParaRPr lang="en-US" dirty="0"/>
+              <a:t>Periodic schedule is just the schedule on a circle, as opposed to a line.</a:t>
+            </a:r>
+          </a:p>
+          <a:p>
+            <a:r>
+              <a:rPr lang="en-US" baseline="0" dirty="0" smtClean="0"/>
+              <a:t>What does the periodic schedule even mean? Show the previous example on a circle.</a:t>
+            </a:r>
+          </a:p>
+          <a:p>
+            <a:r>
+              <a:rPr lang="en-US" baseline="0" dirty="0" smtClean="0"/>
+              <a:t>The reason you can do this as an ILP is you can take any time slot and write it as t*P + Q.</a:t>
+            </a:r>
+          </a:p>
+          <a:p>
+            <a:r>
+              <a:rPr lang="en-US" baseline="0" dirty="0" smtClean="0"/>
+              <a:t>This is how you can formulate as ILP.</a:t>
+            </a:r>
           </a:p>
         </p:txBody>
       </p:sp>
@@ -2305,7 +2320,7 @@
           <a:p>
             <a:fld id="{4B72050E-C83F-DC4E-B064-9A7B7E00D2A3}" type="slidenum">
               <a:rPr lang="en-US" smtClean="0"/>
-              <a:t>27</a:t>
+              <a:t>26</a:t>
             </a:fld>
             <a:endParaRPr lang="en-US"/>
           </a:p>
@@ -2314,7 +2329,7 @@
     </p:spTree>
     <p:extLst>
       <p:ext uri="{BB962C8B-B14F-4D97-AF65-F5344CB8AC3E}">
-        <p14:creationId xmlns:p14="http://schemas.microsoft.com/office/powerpoint/2010/main" val="92354159"/>
+        <p14:creationId xmlns:p14="http://schemas.microsoft.com/office/powerpoint/2010/main" val="1416276009"/>
       </p:ext>
     </p:extLst>
   </p:cSld>
@@ -2370,40 +2385,17 @@
           <a:p>
             <a:r>
               <a:rPr lang="en-US" dirty="0" smtClean="0"/>
-              <a:t>TODO:</a:t>
+              <a:t>TODO: When you combine</a:t>
             </a:r>
             <a:r>
               <a:rPr lang="en-US" baseline="0" dirty="0" smtClean="0"/>
-              <a:t> Add an architecture diagram</a:t>
+              <a:t> because it’s a bit more balanced, that’s why RMT does better.</a:t>
             </a:r>
           </a:p>
           <a:p>
             <a:r>
               <a:rPr lang="en-US" baseline="0" dirty="0" smtClean="0"/>
-              <a:t>Make the high-level point that these are the differences between </a:t>
-            </a:r>
-            <a:r>
-              <a:rPr lang="en-US" baseline="0" dirty="0" err="1" smtClean="0"/>
-              <a:t>dRMT</a:t>
-            </a:r>
-            <a:r>
-              <a:rPr lang="en-US" baseline="0" dirty="0" smtClean="0"/>
-              <a:t> and RMT.</a:t>
-            </a:r>
-          </a:p>
-          <a:p>
-            <a:r>
-              <a:rPr lang="en-US" baseline="0" dirty="0" smtClean="0"/>
-              <a:t>Slide needs a figure + few panes/bullets that emphasize the differences</a:t>
-            </a:r>
-          </a:p>
-          <a:p>
-            <a:endParaRPr lang="en-US" baseline="0" dirty="0" smtClean="0"/>
-          </a:p>
-          <a:p>
-            <a:r>
-              <a:rPr lang="en-US" baseline="0" dirty="0" smtClean="0"/>
-              <a:t>Hardware analysis takeaways: </a:t>
+              <a:t>Switch.p4 is optimized for RMT.</a:t>
             </a:r>
             <a:endParaRPr lang="en-US" dirty="0"/>
           </a:p>
@@ -2426,6 +2418,127 @@
           <a:p>
             <a:fld id="{4B72050E-C83F-DC4E-B064-9A7B7E00D2A3}" type="slidenum">
               <a:rPr lang="en-US" smtClean="0"/>
+              <a:t>27</a:t>
+            </a:fld>
+            <a:endParaRPr lang="en-US"/>
+          </a:p>
+        </p:txBody>
+      </p:sp>
+    </p:spTree>
+    <p:extLst>
+      <p:ext uri="{BB962C8B-B14F-4D97-AF65-F5344CB8AC3E}">
+        <p14:creationId xmlns:p14="http://schemas.microsoft.com/office/powerpoint/2010/main" val="92354159"/>
+      </p:ext>
+    </p:extLst>
+  </p:cSld>
+  <p:clrMapOvr>
+    <a:masterClrMapping/>
+  </p:clrMapOvr>
+</p:notes>
+</file>
+
+<file path=ppt/notesSlides/notesSlide17.xml><?xml version="1.0" encoding="utf-8"?>
+<p:notes xmlns:a="http://schemas.openxmlformats.org/drawingml/2006/main" xmlns:r="http://schemas.openxmlformats.org/officeDocument/2006/relationships" xmlns:p="http://schemas.openxmlformats.org/presentationml/2006/main">
+  <p:cSld>
+    <p:spTree>
+      <p:nvGrpSpPr>
+        <p:cNvPr id="1" name=""/>
+        <p:cNvGrpSpPr/>
+        <p:nvPr/>
+      </p:nvGrpSpPr>
+      <p:grpSpPr>
+        <a:xfrm>
+          <a:off x="0" y="0"/>
+          <a:ext cx="0" cy="0"/>
+          <a:chOff x="0" y="0"/>
+          <a:chExt cx="0" cy="0"/>
+        </a:xfrm>
+      </p:grpSpPr>
+      <p:sp>
+        <p:nvSpPr>
+          <p:cNvPr id="2" name="Slide Image Placeholder 1"/>
+          <p:cNvSpPr>
+            <a:spLocks noGrp="1" noRot="1" noChangeAspect="1"/>
+          </p:cNvSpPr>
+          <p:nvPr>
+            <p:ph type="sldImg"/>
+          </p:nvPr>
+        </p:nvSpPr>
+        <p:spPr/>
+      </p:sp>
+      <p:sp>
+        <p:nvSpPr>
+          <p:cNvPr id="3" name="Notes Placeholder 2"/>
+          <p:cNvSpPr>
+            <a:spLocks noGrp="1"/>
+          </p:cNvSpPr>
+          <p:nvPr>
+            <p:ph type="body" idx="1"/>
+          </p:nvPr>
+        </p:nvSpPr>
+        <p:spPr/>
+        <p:txBody>
+          <a:bodyPr/>
+          <a:lstStyle/>
+          <a:p>
+            <a:r>
+              <a:rPr lang="en-US" dirty="0" smtClean="0"/>
+              <a:t>TODO:</a:t>
+            </a:r>
+            <a:r>
+              <a:rPr lang="en-US" baseline="0" dirty="0" smtClean="0"/>
+              <a:t> Add an architecture diagram</a:t>
+            </a:r>
+          </a:p>
+          <a:p>
+            <a:r>
+              <a:rPr lang="en-US" baseline="0" dirty="0" smtClean="0"/>
+              <a:t>Make the high-level point that these are the differences between </a:t>
+            </a:r>
+            <a:r>
+              <a:rPr lang="en-US" baseline="0" dirty="0" err="1" smtClean="0"/>
+              <a:t>dRMT</a:t>
+            </a:r>
+            <a:r>
+              <a:rPr lang="en-US" baseline="0" dirty="0" smtClean="0"/>
+              <a:t> and RMT.</a:t>
+            </a:r>
+          </a:p>
+          <a:p>
+            <a:r>
+              <a:rPr lang="en-US" baseline="0" dirty="0" smtClean="0"/>
+              <a:t>Slide needs a figure + few panes/bullets that emphasize the differences</a:t>
+            </a:r>
+          </a:p>
+          <a:p>
+            <a:endParaRPr lang="en-US" baseline="0" dirty="0" smtClean="0"/>
+          </a:p>
+          <a:p>
+            <a:r>
+              <a:rPr lang="en-US" baseline="0" dirty="0" smtClean="0"/>
+              <a:t>Hardware analysis takeaways: </a:t>
+            </a:r>
+            <a:endParaRPr lang="en-US" dirty="0"/>
+          </a:p>
+        </p:txBody>
+      </p:sp>
+      <p:sp>
+        <p:nvSpPr>
+          <p:cNvPr id="4" name="Slide Number Placeholder 3"/>
+          <p:cNvSpPr>
+            <a:spLocks noGrp="1"/>
+          </p:cNvSpPr>
+          <p:nvPr>
+            <p:ph type="sldNum" sz="quarter" idx="10"/>
+          </p:nvPr>
+        </p:nvSpPr>
+        <p:spPr/>
+        <p:txBody>
+          <a:bodyPr/>
+          <a:lstStyle/>
+          <a:p>
+            <a:fld id="{4B72050E-C83F-DC4E-B064-9A7B7E00D2A3}" type="slidenum">
+              <a:rPr lang="en-US" smtClean="0"/>
               <a:t>29</a:t>
             </a:fld>
             <a:endParaRPr lang="en-US"/>
@@ -2445,7 +2558,7 @@
 </p:notes>
 </file>
 
-<file path=ppt/notesSlides/notesSlide17.xml><?xml version="1.0" encoding="utf-8"?>
+<file path=ppt/notesSlides/notesSlide18.xml><?xml version="1.0" encoding="utf-8"?>
 <p:notes xmlns:a="http://schemas.openxmlformats.org/drawingml/2006/main" xmlns:r="http://schemas.openxmlformats.org/officeDocument/2006/relationships" xmlns:p="http://schemas.openxmlformats.org/presentationml/2006/main">
   <p:cSld>
     <p:spTree>
@@ -11809,7 +11922,7 @@
           <a:p>
             <a:r>
               <a:rPr lang="en-US" dirty="0" smtClean="0"/>
-              <a:t>Compiling to </a:t>
+              <a:t>Compiling a P4 program to </a:t>
             </a:r>
             <a:r>
               <a:rPr lang="en-US" dirty="0" err="1" smtClean="0"/>
@@ -11831,12 +11944,14 @@
         </p:nvSpPr>
         <p:spPr/>
         <p:txBody>
-          <a:bodyPr/>
+          <a:bodyPr>
+            <a:normAutofit lnSpcReduction="10000"/>
+          </a:bodyPr>
           <a:lstStyle/>
           <a:p>
             <a:r>
               <a:rPr lang="en-US" dirty="0" smtClean="0"/>
-              <a:t>Memory allocation</a:t>
+              <a:t>Memory : Allocating tables to memory clusters</a:t>
             </a:r>
           </a:p>
           <a:p>
@@ -11845,7 +11960,15 @@
           <a:p>
             <a:r>
               <a:rPr lang="en-US" dirty="0" smtClean="0"/>
-              <a:t>Compute scheduling</a:t>
+              <a:t>Compute: Schedule </a:t>
+            </a:r>
+            <a:r>
+              <a:rPr lang="en-US" dirty="0" err="1" smtClean="0"/>
+              <a:t>matches+actions</a:t>
+            </a:r>
+            <a:r>
+              <a:rPr lang="en-US" dirty="0" smtClean="0"/>
+              <a:t>, respecting dependencies </a:t>
             </a:r>
           </a:p>
           <a:p>
@@ -11854,7 +11977,23 @@
           <a:p>
             <a:r>
               <a:rPr lang="en-US" dirty="0" smtClean="0"/>
-              <a:t>Can be decoupled for RR schedules</a:t>
+              <a:t>In general, this is a joint optimization problem.</a:t>
+            </a:r>
+          </a:p>
+          <a:p>
+            <a:pPr lvl="1"/>
+            <a:r>
+              <a:rPr lang="en-US" dirty="0" smtClean="0"/>
+              <a:t>But, allocation and scheduling can be done independently for round-robin schedules</a:t>
+            </a:r>
+          </a:p>
+          <a:p>
+            <a:endParaRPr lang="en-US" dirty="0"/>
+          </a:p>
+          <a:p>
+            <a:r>
+              <a:rPr lang="en-US" dirty="0" smtClean="0"/>
+              <a:t>Memory allocation is essentially bin packing; focus on compute scheduling</a:t>
             </a:r>
             <a:endParaRPr lang="en-US" dirty="0"/>
           </a:p>
@@ -11870,6 +12009,13 @@
   <p:clrMapOvr>
     <a:masterClrMapping/>
   </p:clrMapOvr>
+  <p:timing>
+    <p:tnLst>
+      <p:par>
+        <p:cTn id="1" dur="indefinite" restart="never" nodeType="tmRoot"/>
+      </p:par>
+    </p:tnLst>
+  </p:timing>
 </p:sld>
 </file>
 
@@ -11907,7 +12053,19 @@
           <a:p>
             <a:r>
               <a:rPr lang="en-US" dirty="0" smtClean="0"/>
-              <a:t>Compiling: fine-grained dependencies</a:t>
+              <a:t>Compiling: </a:t>
+            </a:r>
+            <a:r>
+              <a:rPr lang="en-US" dirty="0" smtClean="0"/>
+              <a:t>fine-grained dependencies </a:t>
+            </a:r>
+            <a:r>
+              <a:rPr lang="en-US" dirty="0" smtClean="0"/>
+              <a:t>in </a:t>
+            </a:r>
+            <a:r>
+              <a:rPr lang="en-US" dirty="0" err="1" smtClean="0"/>
+              <a:t>dRMT</a:t>
             </a:r>
             <a:endParaRPr lang="en-US" dirty="0"/>
           </a:p>
@@ -11926,85 +12084,26 @@
         <p:spPr/>
         <p:txBody>
           <a:bodyPr>
-            <a:normAutofit fontScale="77500" lnSpcReduction="20000"/>
+            <a:normAutofit/>
           </a:bodyPr>
           <a:lstStyle/>
           <a:p>
             <a:r>
+              <a:rPr lang="en-US" dirty="0"/>
+              <a:t>T</a:t>
+            </a:r>
+            <a:r>
               <a:rPr lang="en-US" dirty="0" smtClean="0"/>
-              <a:t>P4 captures coarse-grained dependencies between tables in Table Dependency Graph; each node is a table, dependencies are conservative</a:t>
-            </a:r>
+              <a:t>able dependency graph in </a:t>
+            </a:r>
+            <a:r>
+              <a:rPr lang="en-US" dirty="0" smtClean="0"/>
+              <a:t>RMT</a:t>
+            </a:r>
+            <a:endParaRPr lang="en-US" dirty="0" smtClean="0"/>
           </a:p>
           <a:p>
             <a:endParaRPr lang="en-US" dirty="0"/>
-          </a:p>
-          <a:p>
-            <a:r>
-              <a:rPr lang="en-US" dirty="0" smtClean="0"/>
-              <a:t>We use fine-grained dependencies in Operation Dependency Graph with one node for each match/action operation</a:t>
-            </a:r>
-          </a:p>
-          <a:p>
-            <a:endParaRPr lang="en-US" dirty="0"/>
-          </a:p>
-          <a:p>
-            <a:r>
-              <a:rPr lang="en-US" dirty="0" smtClean="0"/>
-              <a:t>Node attribute: Number of primitive actions or match key size</a:t>
-            </a:r>
-          </a:p>
-          <a:p>
-            <a:endParaRPr lang="en-US" dirty="0"/>
-          </a:p>
-          <a:p>
-            <a:r>
-              <a:rPr lang="en-US" dirty="0"/>
-              <a:t>Edge </a:t>
-            </a:r>
-            <a:r>
-              <a:rPr lang="en-US" dirty="0" smtClean="0"/>
-              <a:t>attribute: min. </a:t>
-            </a:r>
-            <a:r>
-              <a:rPr lang="en-US" dirty="0"/>
-              <a:t>latency between </a:t>
-            </a:r>
-            <a:r>
-              <a:rPr lang="en-US" dirty="0" smtClean="0"/>
-              <a:t>operations</a:t>
-            </a:r>
-            <a:endParaRPr lang="en-US" dirty="0"/>
-          </a:p>
-          <a:p>
-            <a:pPr lvl="1"/>
-            <a:r>
-              <a:rPr lang="en-US" dirty="0"/>
-              <a:t>Either the time required to complete a match</a:t>
-            </a:r>
-          </a:p>
-          <a:p>
-            <a:pPr lvl="1"/>
-            <a:r>
-              <a:rPr lang="en-US" dirty="0"/>
-              <a:t>Or the time required to complete an </a:t>
-            </a:r>
-            <a:r>
-              <a:rPr lang="en-US" dirty="0" smtClean="0"/>
-              <a:t>action</a:t>
-            </a:r>
-          </a:p>
-          <a:p>
-            <a:endParaRPr lang="en-US" dirty="0" smtClean="0"/>
-          </a:p>
-          <a:p>
-            <a:r>
-              <a:rPr lang="en-US" dirty="0" smtClean="0"/>
-              <a:t>Straightforward </a:t>
-            </a:r>
-            <a:r>
-              <a:rPr lang="en-US" dirty="0"/>
-              <a:t>to generate by extending p4-hlir</a:t>
-            </a:r>
           </a:p>
           <a:p>
             <a:endParaRPr lang="en-US" dirty="0"/>
@@ -12014,10 +12113,1082 @@
             <a:endParaRPr lang="en-US" dirty="0"/>
           </a:p>
           <a:p>
+            <a:endParaRPr lang="en-US" dirty="0" smtClean="0"/>
+          </a:p>
+          <a:p>
+            <a:r>
+              <a:rPr lang="en-US" dirty="0" smtClean="0"/>
+              <a:t>Operation dependency graph in </a:t>
+            </a:r>
+            <a:r>
+              <a:rPr lang="en-US" dirty="0" err="1" smtClean="0"/>
+              <a:t>dRMT</a:t>
+            </a:r>
+            <a:endParaRPr lang="en-US" dirty="0" smtClean="0"/>
+          </a:p>
+          <a:p>
             <a:endParaRPr lang="en-US" dirty="0"/>
           </a:p>
         </p:txBody>
       </p:sp>
+      <p:cxnSp>
+        <p:nvCxnSpPr>
+          <p:cNvPr id="30" name="Straight Arrow Connector 29"/>
+          <p:cNvCxnSpPr>
+            <a:stCxn id="32" idx="6"/>
+            <a:endCxn id="44" idx="2"/>
+          </p:cNvCxnSpPr>
+          <p:nvPr/>
+        </p:nvCxnSpPr>
+        <p:spPr>
+          <a:xfrm>
+            <a:off x="5617028" y="3417429"/>
+            <a:ext cx="788127" cy="520338"/>
+          </a:xfrm>
+          <a:prstGeom prst="straightConnector1">
+            <a:avLst/>
+          </a:prstGeom>
+          <a:ln w="63500">
+            <a:solidFill>
+              <a:srgbClr val="FF0000"/>
+            </a:solidFill>
+            <a:tailEnd type="triangle"/>
+          </a:ln>
+        </p:spPr>
+        <p:style>
+          <a:lnRef idx="1">
+            <a:schemeClr val="accent1"/>
+          </a:lnRef>
+          <a:fillRef idx="0">
+            <a:schemeClr val="accent1"/>
+          </a:fillRef>
+          <a:effectRef idx="0">
+            <a:schemeClr val="accent1"/>
+          </a:effectRef>
+          <a:fontRef idx="minor">
+            <a:schemeClr val="tx1"/>
+          </a:fontRef>
+        </p:style>
+      </p:cxnSp>
+      <p:sp>
+        <p:nvSpPr>
+          <p:cNvPr id="32" name="Oval 31"/>
+          <p:cNvSpPr/>
+          <p:nvPr/>
+        </p:nvSpPr>
+        <p:spPr>
+          <a:xfrm>
+            <a:off x="4019007" y="3108960"/>
+            <a:ext cx="1598021" cy="616938"/>
+          </a:xfrm>
+          <a:prstGeom prst="ellipse">
+            <a:avLst/>
+          </a:prstGeom>
+          <a:solidFill>
+            <a:schemeClr val="accent1">
+              <a:alpha val="32000"/>
+            </a:schemeClr>
+          </a:solidFill>
+          <a:ln>
+            <a:solidFill>
+              <a:schemeClr val="accent1">
+                <a:shade val="50000"/>
+              </a:schemeClr>
+            </a:solidFill>
+          </a:ln>
+        </p:spPr>
+        <p:style>
+          <a:lnRef idx="2">
+            <a:schemeClr val="accent1">
+              <a:shade val="50000"/>
+            </a:schemeClr>
+          </a:lnRef>
+          <a:fillRef idx="1">
+            <a:schemeClr val="accent1"/>
+          </a:fillRef>
+          <a:effectRef idx="0">
+            <a:schemeClr val="accent1"/>
+          </a:effectRef>
+          <a:fontRef idx="minor">
+            <a:schemeClr val="lt1"/>
+          </a:fontRef>
+        </p:style>
+        <p:txBody>
+          <a:bodyPr rot="0" spcFirstLastPara="0" vertOverflow="overflow" horzOverflow="overflow" vert="horz" wrap="square" lIns="91440" tIns="45720" rIns="91440" bIns="45720" numCol="1" spcCol="0" rtlCol="0" fromWordArt="0" anchor="ctr" anchorCtr="0" forceAA="0" compatLnSpc="1">
+            <a:prstTxWarp prst="textNoShape">
+              <a:avLst/>
+            </a:prstTxWarp>
+            <a:noAutofit/>
+          </a:bodyPr>
+          <a:lstStyle/>
+          <a:p>
+            <a:pPr algn="ctr"/>
+            <a:r>
+              <a:rPr lang="en-US" dirty="0" smtClean="0">
+                <a:solidFill>
+                  <a:schemeClr val="tx1"/>
+                </a:solidFill>
+              </a:rPr>
+              <a:t>Routable</a:t>
+            </a:r>
+            <a:endParaRPr lang="en-US" dirty="0">
+              <a:solidFill>
+                <a:schemeClr val="tx1"/>
+              </a:solidFill>
+            </a:endParaRPr>
+          </a:p>
+        </p:txBody>
+      </p:sp>
+      <p:sp>
+        <p:nvSpPr>
+          <p:cNvPr id="43" name="TextBox 42"/>
+          <p:cNvSpPr txBox="1"/>
+          <p:nvPr/>
+        </p:nvSpPr>
+        <p:spPr>
+          <a:xfrm>
+            <a:off x="-1097280" y="1502229"/>
+            <a:ext cx="184731" cy="369332"/>
+          </a:xfrm>
+          <a:prstGeom prst="rect">
+            <a:avLst/>
+          </a:prstGeom>
+          <a:noFill/>
+        </p:spPr>
+        <p:txBody>
+          <a:bodyPr wrap="none" rtlCol="0">
+            <a:spAutoFit/>
+          </a:bodyPr>
+          <a:lstStyle/>
+          <a:p>
+            <a:endParaRPr lang="en-US" dirty="0"/>
+          </a:p>
+        </p:txBody>
+      </p:sp>
+      <p:sp>
+        <p:nvSpPr>
+          <p:cNvPr id="44" name="Oval 43"/>
+          <p:cNvSpPr/>
+          <p:nvPr/>
+        </p:nvSpPr>
+        <p:spPr>
+          <a:xfrm>
+            <a:off x="6405155" y="3696789"/>
+            <a:ext cx="1598021" cy="481955"/>
+          </a:xfrm>
+          <a:prstGeom prst="ellipse">
+            <a:avLst/>
+          </a:prstGeom>
+          <a:solidFill>
+            <a:schemeClr val="accent1">
+              <a:alpha val="32000"/>
+            </a:schemeClr>
+          </a:solidFill>
+          <a:ln>
+            <a:solidFill>
+              <a:schemeClr val="accent1">
+                <a:shade val="50000"/>
+              </a:schemeClr>
+            </a:solidFill>
+          </a:ln>
+        </p:spPr>
+        <p:style>
+          <a:lnRef idx="2">
+            <a:schemeClr val="accent1">
+              <a:shade val="50000"/>
+            </a:schemeClr>
+          </a:lnRef>
+          <a:fillRef idx="1">
+            <a:schemeClr val="accent1"/>
+          </a:fillRef>
+          <a:effectRef idx="0">
+            <a:schemeClr val="accent1"/>
+          </a:effectRef>
+          <a:fontRef idx="minor">
+            <a:schemeClr val="lt1"/>
+          </a:fontRef>
+        </p:style>
+        <p:txBody>
+          <a:bodyPr rot="0" spcFirstLastPara="0" vertOverflow="overflow" horzOverflow="overflow" vert="horz" wrap="square" lIns="91440" tIns="45720" rIns="91440" bIns="45720" numCol="1" spcCol="0" rtlCol="0" fromWordArt="0" anchor="ctr" anchorCtr="0" forceAA="0" compatLnSpc="1">
+            <a:prstTxWarp prst="textNoShape">
+              <a:avLst/>
+            </a:prstTxWarp>
+            <a:noAutofit/>
+          </a:bodyPr>
+          <a:lstStyle/>
+          <a:p>
+            <a:pPr algn="ctr"/>
+            <a:r>
+              <a:rPr lang="en-US" dirty="0" smtClean="0">
+                <a:solidFill>
+                  <a:schemeClr val="tx1"/>
+                </a:solidFill>
+              </a:rPr>
+              <a:t>Multicast</a:t>
+            </a:r>
+            <a:endParaRPr lang="en-US" dirty="0">
+              <a:solidFill>
+                <a:schemeClr val="tx1"/>
+              </a:solidFill>
+            </a:endParaRPr>
+          </a:p>
+        </p:txBody>
+      </p:sp>
+      <p:sp>
+        <p:nvSpPr>
+          <p:cNvPr id="45" name="Oval 44"/>
+          <p:cNvSpPr/>
+          <p:nvPr/>
+        </p:nvSpPr>
+        <p:spPr>
+          <a:xfrm>
+            <a:off x="8765177" y="3644537"/>
+            <a:ext cx="1598021" cy="503727"/>
+          </a:xfrm>
+          <a:prstGeom prst="ellipse">
+            <a:avLst/>
+          </a:prstGeom>
+          <a:solidFill>
+            <a:schemeClr val="accent1">
+              <a:alpha val="32000"/>
+            </a:schemeClr>
+          </a:solidFill>
+          <a:ln>
+            <a:solidFill>
+              <a:schemeClr val="accent1">
+                <a:shade val="50000"/>
+              </a:schemeClr>
+            </a:solidFill>
+          </a:ln>
+        </p:spPr>
+        <p:style>
+          <a:lnRef idx="2">
+            <a:schemeClr val="accent1">
+              <a:shade val="50000"/>
+            </a:schemeClr>
+          </a:lnRef>
+          <a:fillRef idx="1">
+            <a:schemeClr val="accent1"/>
+          </a:fillRef>
+          <a:effectRef idx="0">
+            <a:schemeClr val="accent1"/>
+          </a:effectRef>
+          <a:fontRef idx="minor">
+            <a:schemeClr val="lt1"/>
+          </a:fontRef>
+        </p:style>
+        <p:txBody>
+          <a:bodyPr rot="0" spcFirstLastPara="0" vertOverflow="overflow" horzOverflow="overflow" vert="horz" wrap="square" lIns="91440" tIns="45720" rIns="91440" bIns="45720" numCol="1" spcCol="0" rtlCol="0" fromWordArt="0" anchor="ctr" anchorCtr="0" forceAA="0" compatLnSpc="1">
+            <a:prstTxWarp prst="textNoShape">
+              <a:avLst/>
+            </a:prstTxWarp>
+            <a:noAutofit/>
+          </a:bodyPr>
+          <a:lstStyle/>
+          <a:p>
+            <a:pPr algn="ctr"/>
+            <a:r>
+              <a:rPr lang="en-US" dirty="0" smtClean="0">
+                <a:solidFill>
+                  <a:schemeClr val="tx1"/>
+                </a:solidFill>
+              </a:rPr>
+              <a:t>IGMP</a:t>
+            </a:r>
+            <a:endParaRPr lang="en-US" dirty="0">
+              <a:solidFill>
+                <a:schemeClr val="tx1"/>
+              </a:solidFill>
+            </a:endParaRPr>
+          </a:p>
+        </p:txBody>
+      </p:sp>
+      <p:cxnSp>
+        <p:nvCxnSpPr>
+          <p:cNvPr id="48" name="Straight Arrow Connector 47"/>
+          <p:cNvCxnSpPr>
+            <a:stCxn id="44" idx="6"/>
+            <a:endCxn id="45" idx="2"/>
+          </p:cNvCxnSpPr>
+          <p:nvPr/>
+        </p:nvCxnSpPr>
+        <p:spPr>
+          <a:xfrm flipV="1">
+            <a:off x="8003176" y="3896401"/>
+            <a:ext cx="762001" cy="41366"/>
+          </a:xfrm>
+          <a:prstGeom prst="straightConnector1">
+            <a:avLst/>
+          </a:prstGeom>
+          <a:ln w="63500">
+            <a:solidFill>
+              <a:srgbClr val="FF0000"/>
+            </a:solidFill>
+            <a:tailEnd type="triangle"/>
+          </a:ln>
+        </p:spPr>
+        <p:style>
+          <a:lnRef idx="1">
+            <a:schemeClr val="accent1"/>
+          </a:lnRef>
+          <a:fillRef idx="0">
+            <a:schemeClr val="accent1"/>
+          </a:fillRef>
+          <a:effectRef idx="0">
+            <a:schemeClr val="accent1"/>
+          </a:effectRef>
+          <a:fontRef idx="minor">
+            <a:schemeClr val="tx1"/>
+          </a:fontRef>
+        </p:style>
+      </p:cxnSp>
+      <p:sp>
+        <p:nvSpPr>
+          <p:cNvPr id="4" name="TextBox 3"/>
+          <p:cNvSpPr txBox="1"/>
+          <p:nvPr/>
+        </p:nvSpPr>
+        <p:spPr>
+          <a:xfrm>
+            <a:off x="5590901" y="3579223"/>
+            <a:ext cx="784189" cy="646331"/>
+          </a:xfrm>
+          <a:prstGeom prst="rect">
+            <a:avLst/>
+          </a:prstGeom>
+          <a:noFill/>
+        </p:spPr>
+        <p:txBody>
+          <a:bodyPr wrap="none" rtlCol="0">
+            <a:spAutoFit/>
+          </a:bodyPr>
+          <a:lstStyle/>
+          <a:p>
+            <a:r>
+              <a:rPr lang="en-US" dirty="0" smtClean="0"/>
+              <a:t>Match</a:t>
+            </a:r>
+          </a:p>
+          <a:p>
+            <a:r>
+              <a:rPr lang="en-US" dirty="0" smtClean="0"/>
+              <a:t>Dep.</a:t>
+            </a:r>
+            <a:endParaRPr lang="en-US" dirty="0"/>
+          </a:p>
+        </p:txBody>
+      </p:sp>
+      <p:sp>
+        <p:nvSpPr>
+          <p:cNvPr id="11" name="TextBox 10"/>
+          <p:cNvSpPr txBox="1"/>
+          <p:nvPr/>
+        </p:nvSpPr>
+        <p:spPr>
+          <a:xfrm>
+            <a:off x="7937861" y="3535680"/>
+            <a:ext cx="788999" cy="646331"/>
+          </a:xfrm>
+          <a:prstGeom prst="rect">
+            <a:avLst/>
+          </a:prstGeom>
+          <a:noFill/>
+        </p:spPr>
+        <p:txBody>
+          <a:bodyPr wrap="none" rtlCol="0">
+            <a:spAutoFit/>
+          </a:bodyPr>
+          <a:lstStyle/>
+          <a:p>
+            <a:r>
+              <a:rPr lang="en-US" dirty="0" smtClean="0"/>
+              <a:t>Action</a:t>
+            </a:r>
+          </a:p>
+          <a:p>
+            <a:r>
+              <a:rPr lang="en-US" dirty="0" smtClean="0"/>
+              <a:t>Dep.</a:t>
+            </a:r>
+            <a:endParaRPr lang="en-US" dirty="0"/>
+          </a:p>
+        </p:txBody>
+      </p:sp>
+      <p:cxnSp>
+        <p:nvCxnSpPr>
+          <p:cNvPr id="25" name="Straight Arrow Connector 24"/>
+          <p:cNvCxnSpPr>
+            <a:stCxn id="27" idx="4"/>
+            <a:endCxn id="35" idx="0"/>
+          </p:cNvCxnSpPr>
+          <p:nvPr/>
+        </p:nvCxnSpPr>
+        <p:spPr>
+          <a:xfrm>
+            <a:off x="7186748" y="5415361"/>
+            <a:ext cx="60960" cy="401965"/>
+          </a:xfrm>
+          <a:prstGeom prst="straightConnector1">
+            <a:avLst/>
+          </a:prstGeom>
+          <a:ln w="63500">
+            <a:solidFill>
+              <a:srgbClr val="FF0000"/>
+            </a:solidFill>
+            <a:tailEnd type="triangle"/>
+          </a:ln>
+        </p:spPr>
+        <p:style>
+          <a:lnRef idx="1">
+            <a:schemeClr val="accent1"/>
+          </a:lnRef>
+          <a:fillRef idx="0">
+            <a:schemeClr val="accent1"/>
+          </a:fillRef>
+          <a:effectRef idx="0">
+            <a:schemeClr val="accent1"/>
+          </a:effectRef>
+          <a:fontRef idx="minor">
+            <a:schemeClr val="tx1"/>
+          </a:fontRef>
+        </p:style>
+      </p:cxnSp>
+      <p:sp>
+        <p:nvSpPr>
+          <p:cNvPr id="26" name="Oval 25"/>
+          <p:cNvSpPr/>
+          <p:nvPr/>
+        </p:nvSpPr>
+        <p:spPr>
+          <a:xfrm>
+            <a:off x="3988527" y="4907280"/>
+            <a:ext cx="1598021" cy="616938"/>
+          </a:xfrm>
+          <a:prstGeom prst="ellipse">
+            <a:avLst/>
+          </a:prstGeom>
+          <a:solidFill>
+            <a:schemeClr val="accent1">
+              <a:alpha val="32000"/>
+            </a:schemeClr>
+          </a:solidFill>
+          <a:ln>
+            <a:solidFill>
+              <a:schemeClr val="accent1">
+                <a:shade val="50000"/>
+              </a:schemeClr>
+            </a:solidFill>
+          </a:ln>
+        </p:spPr>
+        <p:style>
+          <a:lnRef idx="2">
+            <a:schemeClr val="accent1">
+              <a:shade val="50000"/>
+            </a:schemeClr>
+          </a:lnRef>
+          <a:fillRef idx="1">
+            <a:schemeClr val="accent1"/>
+          </a:fillRef>
+          <a:effectRef idx="0">
+            <a:schemeClr val="accent1"/>
+          </a:effectRef>
+          <a:fontRef idx="minor">
+            <a:schemeClr val="lt1"/>
+          </a:fontRef>
+        </p:style>
+        <p:txBody>
+          <a:bodyPr rot="0" spcFirstLastPara="0" vertOverflow="overflow" horzOverflow="overflow" vert="horz" wrap="square" lIns="91440" tIns="45720" rIns="91440" bIns="45720" numCol="1" spcCol="0" rtlCol="0" fromWordArt="0" anchor="ctr" anchorCtr="0" forceAA="0" compatLnSpc="1">
+            <a:prstTxWarp prst="textNoShape">
+              <a:avLst/>
+            </a:prstTxWarp>
+            <a:noAutofit/>
+          </a:bodyPr>
+          <a:lstStyle/>
+          <a:p>
+            <a:pPr algn="ctr"/>
+            <a:r>
+              <a:rPr lang="en-US" dirty="0" smtClean="0">
+                <a:solidFill>
+                  <a:schemeClr val="tx1"/>
+                </a:solidFill>
+              </a:rPr>
+              <a:t>Routable</a:t>
+            </a:r>
+          </a:p>
+          <a:p>
+            <a:pPr algn="ctr"/>
+            <a:r>
+              <a:rPr lang="en-US" dirty="0" smtClean="0">
+                <a:solidFill>
+                  <a:schemeClr val="tx1"/>
+                </a:solidFill>
+              </a:rPr>
+              <a:t>Match</a:t>
+            </a:r>
+            <a:endParaRPr lang="en-US" dirty="0">
+              <a:solidFill>
+                <a:schemeClr val="tx1"/>
+              </a:solidFill>
+            </a:endParaRPr>
+          </a:p>
+        </p:txBody>
+      </p:sp>
+      <p:sp>
+        <p:nvSpPr>
+          <p:cNvPr id="27" name="Oval 26"/>
+          <p:cNvSpPr/>
+          <p:nvPr/>
+        </p:nvSpPr>
+        <p:spPr>
+          <a:xfrm>
+            <a:off x="6387737" y="4933406"/>
+            <a:ext cx="1598021" cy="481955"/>
+          </a:xfrm>
+          <a:prstGeom prst="ellipse">
+            <a:avLst/>
+          </a:prstGeom>
+          <a:solidFill>
+            <a:schemeClr val="accent1">
+              <a:alpha val="32000"/>
+            </a:schemeClr>
+          </a:solidFill>
+          <a:ln>
+            <a:solidFill>
+              <a:schemeClr val="accent1">
+                <a:shade val="50000"/>
+              </a:schemeClr>
+            </a:solidFill>
+          </a:ln>
+        </p:spPr>
+        <p:style>
+          <a:lnRef idx="2">
+            <a:schemeClr val="accent1">
+              <a:shade val="50000"/>
+            </a:schemeClr>
+          </a:lnRef>
+          <a:fillRef idx="1">
+            <a:schemeClr val="accent1"/>
+          </a:fillRef>
+          <a:effectRef idx="0">
+            <a:schemeClr val="accent1"/>
+          </a:effectRef>
+          <a:fontRef idx="minor">
+            <a:schemeClr val="lt1"/>
+          </a:fontRef>
+        </p:style>
+        <p:txBody>
+          <a:bodyPr rot="0" spcFirstLastPara="0" vertOverflow="overflow" horzOverflow="overflow" vert="horz" wrap="square" lIns="91440" tIns="45720" rIns="91440" bIns="45720" numCol="1" spcCol="0" rtlCol="0" fromWordArt="0" anchor="ctr" anchorCtr="0" forceAA="0" compatLnSpc="1">
+            <a:prstTxWarp prst="textNoShape">
+              <a:avLst/>
+            </a:prstTxWarp>
+            <a:noAutofit/>
+          </a:bodyPr>
+          <a:lstStyle/>
+          <a:p>
+            <a:pPr algn="ctr"/>
+            <a:r>
+              <a:rPr lang="en-US" dirty="0" smtClean="0">
+                <a:solidFill>
+                  <a:schemeClr val="tx1"/>
+                </a:solidFill>
+              </a:rPr>
+              <a:t>Multicast</a:t>
+            </a:r>
+          </a:p>
+          <a:p>
+            <a:pPr algn="ctr"/>
+            <a:r>
+              <a:rPr lang="en-US" dirty="0" smtClean="0">
+                <a:solidFill>
+                  <a:schemeClr val="tx1"/>
+                </a:solidFill>
+              </a:rPr>
+              <a:t>Match</a:t>
+            </a:r>
+            <a:endParaRPr lang="en-US" dirty="0">
+              <a:solidFill>
+                <a:schemeClr val="tx1"/>
+              </a:solidFill>
+            </a:endParaRPr>
+          </a:p>
+        </p:txBody>
+      </p:sp>
+      <p:sp>
+        <p:nvSpPr>
+          <p:cNvPr id="28" name="Oval 27"/>
+          <p:cNvSpPr/>
+          <p:nvPr/>
+        </p:nvSpPr>
+        <p:spPr>
+          <a:xfrm>
+            <a:off x="8930640" y="4828902"/>
+            <a:ext cx="1598021" cy="503727"/>
+          </a:xfrm>
+          <a:prstGeom prst="ellipse">
+            <a:avLst/>
+          </a:prstGeom>
+          <a:solidFill>
+            <a:schemeClr val="accent1">
+              <a:alpha val="32000"/>
+            </a:schemeClr>
+          </a:solidFill>
+          <a:ln>
+            <a:solidFill>
+              <a:schemeClr val="accent1">
+                <a:shade val="50000"/>
+              </a:schemeClr>
+            </a:solidFill>
+          </a:ln>
+        </p:spPr>
+        <p:style>
+          <a:lnRef idx="2">
+            <a:schemeClr val="accent1">
+              <a:shade val="50000"/>
+            </a:schemeClr>
+          </a:lnRef>
+          <a:fillRef idx="1">
+            <a:schemeClr val="accent1"/>
+          </a:fillRef>
+          <a:effectRef idx="0">
+            <a:schemeClr val="accent1"/>
+          </a:effectRef>
+          <a:fontRef idx="minor">
+            <a:schemeClr val="lt1"/>
+          </a:fontRef>
+        </p:style>
+        <p:txBody>
+          <a:bodyPr rot="0" spcFirstLastPara="0" vertOverflow="overflow" horzOverflow="overflow" vert="horz" wrap="square" lIns="91440" tIns="45720" rIns="91440" bIns="45720" numCol="1" spcCol="0" rtlCol="0" fromWordArt="0" anchor="ctr" anchorCtr="0" forceAA="0" compatLnSpc="1">
+            <a:prstTxWarp prst="textNoShape">
+              <a:avLst/>
+            </a:prstTxWarp>
+            <a:noAutofit/>
+          </a:bodyPr>
+          <a:lstStyle/>
+          <a:p>
+            <a:pPr algn="ctr"/>
+            <a:r>
+              <a:rPr lang="en-US" dirty="0" smtClean="0">
+                <a:solidFill>
+                  <a:schemeClr val="tx1"/>
+                </a:solidFill>
+              </a:rPr>
+              <a:t>IGMP</a:t>
+            </a:r>
+          </a:p>
+          <a:p>
+            <a:pPr algn="ctr"/>
+            <a:r>
+              <a:rPr lang="en-US" dirty="0" smtClean="0">
+                <a:solidFill>
+                  <a:schemeClr val="tx1"/>
+                </a:solidFill>
+              </a:rPr>
+              <a:t>Match</a:t>
+            </a:r>
+            <a:endParaRPr lang="en-US" dirty="0">
+              <a:solidFill>
+                <a:schemeClr val="tx1"/>
+              </a:solidFill>
+            </a:endParaRPr>
+          </a:p>
+        </p:txBody>
+      </p:sp>
+      <p:cxnSp>
+        <p:nvCxnSpPr>
+          <p:cNvPr id="29" name="Straight Arrow Connector 28"/>
+          <p:cNvCxnSpPr>
+            <a:stCxn id="28" idx="4"/>
+            <a:endCxn id="36" idx="0"/>
+          </p:cNvCxnSpPr>
+          <p:nvPr/>
+        </p:nvCxnSpPr>
+        <p:spPr>
+          <a:xfrm>
+            <a:off x="9729651" y="5332629"/>
+            <a:ext cx="74023" cy="602261"/>
+          </a:xfrm>
+          <a:prstGeom prst="straightConnector1">
+            <a:avLst/>
+          </a:prstGeom>
+          <a:ln w="63500">
+            <a:solidFill>
+              <a:srgbClr val="FF0000"/>
+            </a:solidFill>
+            <a:tailEnd type="triangle"/>
+          </a:ln>
+        </p:spPr>
+        <p:style>
+          <a:lnRef idx="1">
+            <a:schemeClr val="accent1"/>
+          </a:lnRef>
+          <a:fillRef idx="0">
+            <a:schemeClr val="accent1"/>
+          </a:fillRef>
+          <a:effectRef idx="0">
+            <a:schemeClr val="accent1"/>
+          </a:effectRef>
+          <a:fontRef idx="minor">
+            <a:schemeClr val="tx1"/>
+          </a:fontRef>
+        </p:style>
+      </p:cxnSp>
+      <p:sp>
+        <p:nvSpPr>
+          <p:cNvPr id="34" name="Oval 33"/>
+          <p:cNvSpPr/>
+          <p:nvPr/>
+        </p:nvSpPr>
+        <p:spPr>
+          <a:xfrm>
+            <a:off x="3971110" y="5673635"/>
+            <a:ext cx="1598021" cy="616938"/>
+          </a:xfrm>
+          <a:prstGeom prst="ellipse">
+            <a:avLst/>
+          </a:prstGeom>
+          <a:solidFill>
+            <a:schemeClr val="accent1">
+              <a:alpha val="32000"/>
+            </a:schemeClr>
+          </a:solidFill>
+          <a:ln>
+            <a:solidFill>
+              <a:schemeClr val="accent1">
+                <a:shade val="50000"/>
+              </a:schemeClr>
+            </a:solidFill>
+          </a:ln>
+        </p:spPr>
+        <p:style>
+          <a:lnRef idx="2">
+            <a:schemeClr val="accent1">
+              <a:shade val="50000"/>
+            </a:schemeClr>
+          </a:lnRef>
+          <a:fillRef idx="1">
+            <a:schemeClr val="accent1"/>
+          </a:fillRef>
+          <a:effectRef idx="0">
+            <a:schemeClr val="accent1"/>
+          </a:effectRef>
+          <a:fontRef idx="minor">
+            <a:schemeClr val="lt1"/>
+          </a:fontRef>
+        </p:style>
+        <p:txBody>
+          <a:bodyPr rot="0" spcFirstLastPara="0" vertOverflow="overflow" horzOverflow="overflow" vert="horz" wrap="square" lIns="91440" tIns="45720" rIns="91440" bIns="45720" numCol="1" spcCol="0" rtlCol="0" fromWordArt="0" anchor="ctr" anchorCtr="0" forceAA="0" compatLnSpc="1">
+            <a:prstTxWarp prst="textNoShape">
+              <a:avLst/>
+            </a:prstTxWarp>
+            <a:noAutofit/>
+          </a:bodyPr>
+          <a:lstStyle/>
+          <a:p>
+            <a:pPr algn="ctr"/>
+            <a:r>
+              <a:rPr lang="en-US" dirty="0" smtClean="0">
+                <a:solidFill>
+                  <a:schemeClr val="tx1"/>
+                </a:solidFill>
+              </a:rPr>
+              <a:t>Routable</a:t>
+            </a:r>
+          </a:p>
+          <a:p>
+            <a:pPr algn="ctr"/>
+            <a:r>
+              <a:rPr lang="en-US" dirty="0" smtClean="0">
+                <a:solidFill>
+                  <a:schemeClr val="tx1"/>
+                </a:solidFill>
+              </a:rPr>
+              <a:t>Action</a:t>
+            </a:r>
+            <a:endParaRPr lang="en-US" dirty="0">
+              <a:solidFill>
+                <a:schemeClr val="tx1"/>
+              </a:solidFill>
+            </a:endParaRPr>
+          </a:p>
+        </p:txBody>
+      </p:sp>
+      <p:sp>
+        <p:nvSpPr>
+          <p:cNvPr id="35" name="Oval 34"/>
+          <p:cNvSpPr/>
+          <p:nvPr/>
+        </p:nvSpPr>
+        <p:spPr>
+          <a:xfrm>
+            <a:off x="6448697" y="5817326"/>
+            <a:ext cx="1598021" cy="481955"/>
+          </a:xfrm>
+          <a:prstGeom prst="ellipse">
+            <a:avLst/>
+          </a:prstGeom>
+          <a:solidFill>
+            <a:schemeClr val="accent1">
+              <a:alpha val="32000"/>
+            </a:schemeClr>
+          </a:solidFill>
+          <a:ln>
+            <a:solidFill>
+              <a:schemeClr val="accent1">
+                <a:shade val="50000"/>
+              </a:schemeClr>
+            </a:solidFill>
+          </a:ln>
+        </p:spPr>
+        <p:style>
+          <a:lnRef idx="2">
+            <a:schemeClr val="accent1">
+              <a:shade val="50000"/>
+            </a:schemeClr>
+          </a:lnRef>
+          <a:fillRef idx="1">
+            <a:schemeClr val="accent1"/>
+          </a:fillRef>
+          <a:effectRef idx="0">
+            <a:schemeClr val="accent1"/>
+          </a:effectRef>
+          <a:fontRef idx="minor">
+            <a:schemeClr val="lt1"/>
+          </a:fontRef>
+        </p:style>
+        <p:txBody>
+          <a:bodyPr rot="0" spcFirstLastPara="0" vertOverflow="overflow" horzOverflow="overflow" vert="horz" wrap="square" lIns="91440" tIns="45720" rIns="91440" bIns="45720" numCol="1" spcCol="0" rtlCol="0" fromWordArt="0" anchor="ctr" anchorCtr="0" forceAA="0" compatLnSpc="1">
+            <a:prstTxWarp prst="textNoShape">
+              <a:avLst/>
+            </a:prstTxWarp>
+            <a:noAutofit/>
+          </a:bodyPr>
+          <a:lstStyle/>
+          <a:p>
+            <a:pPr algn="ctr"/>
+            <a:r>
+              <a:rPr lang="en-US" dirty="0" smtClean="0">
+                <a:solidFill>
+                  <a:schemeClr val="tx1"/>
+                </a:solidFill>
+              </a:rPr>
+              <a:t>Multicast</a:t>
+            </a:r>
+          </a:p>
+          <a:p>
+            <a:pPr algn="ctr"/>
+            <a:r>
+              <a:rPr lang="en-US" dirty="0" smtClean="0">
+                <a:solidFill>
+                  <a:schemeClr val="tx1"/>
+                </a:solidFill>
+              </a:rPr>
+              <a:t>Action</a:t>
+            </a:r>
+            <a:endParaRPr lang="en-US" dirty="0">
+              <a:solidFill>
+                <a:schemeClr val="tx1"/>
+              </a:solidFill>
+            </a:endParaRPr>
+          </a:p>
+        </p:txBody>
+      </p:sp>
+      <p:sp>
+        <p:nvSpPr>
+          <p:cNvPr id="36" name="Oval 35"/>
+          <p:cNvSpPr/>
+          <p:nvPr/>
+        </p:nvSpPr>
+        <p:spPr>
+          <a:xfrm>
+            <a:off x="9004663" y="5934890"/>
+            <a:ext cx="1598021" cy="503727"/>
+          </a:xfrm>
+          <a:prstGeom prst="ellipse">
+            <a:avLst/>
+          </a:prstGeom>
+          <a:solidFill>
+            <a:schemeClr val="accent1">
+              <a:alpha val="32000"/>
+            </a:schemeClr>
+          </a:solidFill>
+          <a:ln>
+            <a:solidFill>
+              <a:schemeClr val="accent1">
+                <a:shade val="50000"/>
+              </a:schemeClr>
+            </a:solidFill>
+          </a:ln>
+        </p:spPr>
+        <p:style>
+          <a:lnRef idx="2">
+            <a:schemeClr val="accent1">
+              <a:shade val="50000"/>
+            </a:schemeClr>
+          </a:lnRef>
+          <a:fillRef idx="1">
+            <a:schemeClr val="accent1"/>
+          </a:fillRef>
+          <a:effectRef idx="0">
+            <a:schemeClr val="accent1"/>
+          </a:effectRef>
+          <a:fontRef idx="minor">
+            <a:schemeClr val="lt1"/>
+          </a:fontRef>
+        </p:style>
+        <p:txBody>
+          <a:bodyPr rot="0" spcFirstLastPara="0" vertOverflow="overflow" horzOverflow="overflow" vert="horz" wrap="square" lIns="91440" tIns="45720" rIns="91440" bIns="45720" numCol="1" spcCol="0" rtlCol="0" fromWordArt="0" anchor="ctr" anchorCtr="0" forceAA="0" compatLnSpc="1">
+            <a:prstTxWarp prst="textNoShape">
+              <a:avLst/>
+            </a:prstTxWarp>
+            <a:noAutofit/>
+          </a:bodyPr>
+          <a:lstStyle/>
+          <a:p>
+            <a:pPr algn="ctr"/>
+            <a:r>
+              <a:rPr lang="en-US" dirty="0" smtClean="0">
+                <a:solidFill>
+                  <a:schemeClr val="tx1"/>
+                </a:solidFill>
+              </a:rPr>
+              <a:t>IGMP</a:t>
+            </a:r>
+          </a:p>
+          <a:p>
+            <a:pPr algn="ctr"/>
+            <a:r>
+              <a:rPr lang="en-US" dirty="0" smtClean="0">
+                <a:solidFill>
+                  <a:schemeClr val="tx1"/>
+                </a:solidFill>
+              </a:rPr>
+              <a:t>Action</a:t>
+            </a:r>
+            <a:endParaRPr lang="en-US" dirty="0">
+              <a:solidFill>
+                <a:schemeClr val="tx1"/>
+              </a:solidFill>
+            </a:endParaRPr>
+          </a:p>
+        </p:txBody>
+      </p:sp>
+      <p:cxnSp>
+        <p:nvCxnSpPr>
+          <p:cNvPr id="39" name="Straight Arrow Connector 38"/>
+          <p:cNvCxnSpPr>
+            <a:stCxn id="35" idx="6"/>
+            <a:endCxn id="36" idx="2"/>
+          </p:cNvCxnSpPr>
+          <p:nvPr/>
+        </p:nvCxnSpPr>
+        <p:spPr>
+          <a:xfrm>
+            <a:off x="8046718" y="6058304"/>
+            <a:ext cx="957945" cy="128450"/>
+          </a:xfrm>
+          <a:prstGeom prst="straightConnector1">
+            <a:avLst/>
+          </a:prstGeom>
+          <a:ln w="63500">
+            <a:solidFill>
+              <a:srgbClr val="FF0000"/>
+            </a:solidFill>
+            <a:tailEnd type="triangle"/>
+          </a:ln>
+        </p:spPr>
+        <p:style>
+          <a:lnRef idx="1">
+            <a:schemeClr val="accent1"/>
+          </a:lnRef>
+          <a:fillRef idx="0">
+            <a:schemeClr val="accent1"/>
+          </a:fillRef>
+          <a:effectRef idx="0">
+            <a:schemeClr val="accent1"/>
+          </a:effectRef>
+          <a:fontRef idx="minor">
+            <a:schemeClr val="tx1"/>
+          </a:fontRef>
+        </p:style>
+      </p:cxnSp>
+      <p:cxnSp>
+        <p:nvCxnSpPr>
+          <p:cNvPr id="42" name="Straight Arrow Connector 41"/>
+          <p:cNvCxnSpPr>
+            <a:stCxn id="34" idx="6"/>
+            <a:endCxn id="27" idx="2"/>
+          </p:cNvCxnSpPr>
+          <p:nvPr/>
+        </p:nvCxnSpPr>
+        <p:spPr>
+          <a:xfrm flipV="1">
+            <a:off x="5569131" y="5174384"/>
+            <a:ext cx="818606" cy="807720"/>
+          </a:xfrm>
+          <a:prstGeom prst="straightConnector1">
+            <a:avLst/>
+          </a:prstGeom>
+          <a:ln w="63500">
+            <a:solidFill>
+              <a:srgbClr val="FF0000"/>
+            </a:solidFill>
+            <a:tailEnd type="triangle"/>
+          </a:ln>
+        </p:spPr>
+        <p:style>
+          <a:lnRef idx="1">
+            <a:schemeClr val="accent1"/>
+          </a:lnRef>
+          <a:fillRef idx="0">
+            <a:schemeClr val="accent1"/>
+          </a:fillRef>
+          <a:effectRef idx="0">
+            <a:schemeClr val="accent1"/>
+          </a:effectRef>
+          <a:fontRef idx="minor">
+            <a:schemeClr val="tx1"/>
+          </a:fontRef>
+        </p:style>
+      </p:cxnSp>
+      <p:cxnSp>
+        <p:nvCxnSpPr>
+          <p:cNvPr id="46" name="Straight Arrow Connector 45"/>
+          <p:cNvCxnSpPr>
+            <a:stCxn id="26" idx="4"/>
+            <a:endCxn id="34" idx="0"/>
+          </p:cNvCxnSpPr>
+          <p:nvPr/>
+        </p:nvCxnSpPr>
+        <p:spPr>
+          <a:xfrm flipH="1">
+            <a:off x="4770121" y="5524218"/>
+            <a:ext cx="17417" cy="149417"/>
+          </a:xfrm>
+          <a:prstGeom prst="straightConnector1">
+            <a:avLst/>
+          </a:prstGeom>
+          <a:ln w="63500">
+            <a:solidFill>
+              <a:srgbClr val="FF0000"/>
+            </a:solidFill>
+            <a:tailEnd type="triangle"/>
+          </a:ln>
+        </p:spPr>
+        <p:style>
+          <a:lnRef idx="1">
+            <a:schemeClr val="accent1"/>
+          </a:lnRef>
+          <a:fillRef idx="0">
+            <a:schemeClr val="accent1"/>
+          </a:fillRef>
+          <a:effectRef idx="0">
+            <a:schemeClr val="accent1"/>
+          </a:effectRef>
+          <a:fontRef idx="minor">
+            <a:schemeClr val="tx1"/>
+          </a:fontRef>
+        </p:style>
+      </p:cxnSp>
     </p:spTree>
     <p:extLst>
       <p:ext uri="{BB962C8B-B14F-4D97-AF65-F5344CB8AC3E}">
@@ -12121,216 +13292,7 @@
                                         <p:tgtEl>
                                           <p:spTgt spid="3">
                                             <p:txEl>
-                                              <p:pRg st="2" end="2"/>
-                                            </p:txEl>
-                                          </p:spTgt>
-                                        </p:tgtEl>
-                                        <p:attrNameLst>
-                                          <p:attrName>style.visibility</p:attrName>
-                                        </p:attrNameLst>
-                                      </p:cBhvr>
-                                      <p:to>
-                                        <p:strVal val="visible"/>
-                                      </p:to>
-                                    </p:set>
-                                  </p:childTnLst>
-                                </p:cTn>
-                              </p:par>
-                            </p:childTnLst>
-                          </p:cTn>
-                        </p:par>
-                      </p:childTnLst>
-                    </p:cTn>
-                  </p:par>
-                  <p:par>
-                    <p:cTn id="11" fill="hold">
-                      <p:stCondLst>
-                        <p:cond delay="indefinite"/>
-                      </p:stCondLst>
-                      <p:childTnLst>
-                        <p:par>
-                          <p:cTn id="12" fill="hold">
-                            <p:stCondLst>
-                              <p:cond delay="0"/>
-                            </p:stCondLst>
-                            <p:childTnLst>
-                              <p:par>
-                                <p:cTn id="13" presetID="1" presetClass="entr" presetSubtype="0" fill="hold" nodeType="clickEffect">
-                                  <p:stCondLst>
-                                    <p:cond delay="0"/>
-                                  </p:stCondLst>
-                                  <p:childTnLst>
-                                    <p:set>
-                                      <p:cBhvr>
-                                        <p:cTn id="14" dur="1" fill="hold">
-                                          <p:stCondLst>
-                                            <p:cond delay="0"/>
-                                          </p:stCondLst>
-                                        </p:cTn>
-                                        <p:tgtEl>
-                                          <p:spTgt spid="3">
-                                            <p:txEl>
-                                              <p:pRg st="4" end="4"/>
-                                            </p:txEl>
-                                          </p:spTgt>
-                                        </p:tgtEl>
-                                        <p:attrNameLst>
-                                          <p:attrName>style.visibility</p:attrName>
-                                        </p:attrNameLst>
-                                      </p:cBhvr>
-                                      <p:to>
-                                        <p:strVal val="visible"/>
-                                      </p:to>
-                                    </p:set>
-                                  </p:childTnLst>
-                                </p:cTn>
-                              </p:par>
-                            </p:childTnLst>
-                          </p:cTn>
-                        </p:par>
-                      </p:childTnLst>
-                    </p:cTn>
-                  </p:par>
-                  <p:par>
-                    <p:cTn id="15" fill="hold">
-                      <p:stCondLst>
-                        <p:cond delay="indefinite"/>
-                      </p:stCondLst>
-                      <p:childTnLst>
-                        <p:par>
-                          <p:cTn id="16" fill="hold">
-                            <p:stCondLst>
-                              <p:cond delay="0"/>
-                            </p:stCondLst>
-                            <p:childTnLst>
-                              <p:par>
-                                <p:cTn id="17" presetID="1" presetClass="entr" presetSubtype="0" fill="hold" nodeType="clickEffect">
-                                  <p:stCondLst>
-                                    <p:cond delay="0"/>
-                                  </p:stCondLst>
-                                  <p:childTnLst>
-                                    <p:set>
-                                      <p:cBhvr>
-                                        <p:cTn id="18" dur="1" fill="hold">
-                                          <p:stCondLst>
-                                            <p:cond delay="0"/>
-                                          </p:stCondLst>
-                                        </p:cTn>
-                                        <p:tgtEl>
-                                          <p:spTgt spid="3">
-                                            <p:txEl>
-                                              <p:pRg st="6" end="6"/>
-                                            </p:txEl>
-                                          </p:spTgt>
-                                        </p:tgtEl>
-                                        <p:attrNameLst>
-                                          <p:attrName>style.visibility</p:attrName>
-                                        </p:attrNameLst>
-                                      </p:cBhvr>
-                                      <p:to>
-                                        <p:strVal val="visible"/>
-                                      </p:to>
-                                    </p:set>
-                                  </p:childTnLst>
-                                </p:cTn>
-                              </p:par>
-                              <p:par>
-                                <p:cTn id="19" presetID="1" presetClass="entr" presetSubtype="0" fill="hold" nodeType="withEffect">
-                                  <p:stCondLst>
-                                    <p:cond delay="0"/>
-                                  </p:stCondLst>
-                                  <p:childTnLst>
-                                    <p:set>
-                                      <p:cBhvr>
-                                        <p:cTn id="20" dur="1" fill="hold">
-                                          <p:stCondLst>
-                                            <p:cond delay="0"/>
-                                          </p:stCondLst>
-                                        </p:cTn>
-                                        <p:tgtEl>
-                                          <p:spTgt spid="3">
-                                            <p:txEl>
-                                              <p:pRg st="7" end="7"/>
-                                            </p:txEl>
-                                          </p:spTgt>
-                                        </p:tgtEl>
-                                        <p:attrNameLst>
-                                          <p:attrName>style.visibility</p:attrName>
-                                        </p:attrNameLst>
-                                      </p:cBhvr>
-                                      <p:to>
-                                        <p:strVal val="visible"/>
-                                      </p:to>
-                                    </p:set>
-                                  </p:childTnLst>
-                                </p:cTn>
-                              </p:par>
-                              <p:par>
-                                <p:cTn id="21" presetID="1" presetClass="entr" presetSubtype="0" fill="hold" nodeType="withEffect">
-                                  <p:stCondLst>
-                                    <p:cond delay="0"/>
-                                  </p:stCondLst>
-                                  <p:childTnLst>
-                                    <p:set>
-                                      <p:cBhvr>
-                                        <p:cTn id="22" dur="1" fill="hold">
-                                          <p:stCondLst>
-                                            <p:cond delay="0"/>
-                                          </p:stCondLst>
-                                        </p:cTn>
-                                        <p:tgtEl>
-                                          <p:spTgt spid="3">
-                                            <p:txEl>
-                                              <p:pRg st="8" end="8"/>
-                                            </p:txEl>
-                                          </p:spTgt>
-                                        </p:tgtEl>
-                                        <p:attrNameLst>
-                                          <p:attrName>style.visibility</p:attrName>
-                                        </p:attrNameLst>
-                                      </p:cBhvr>
-                                      <p:to>
-                                        <p:strVal val="visible"/>
-                                      </p:to>
-                                    </p:set>
-                                  </p:childTnLst>
-                                </p:cTn>
-                              </p:par>
-                            </p:childTnLst>
-                          </p:cTn>
-                        </p:par>
-                      </p:childTnLst>
-                    </p:cTn>
-                  </p:par>
-                  <p:par>
-                    <p:cTn id="23" fill="hold">
-                      <p:stCondLst>
-                        <p:cond delay="indefinite"/>
-                      </p:stCondLst>
-                      <p:childTnLst>
-                        <p:par>
-                          <p:cTn id="24" fill="hold">
-                            <p:stCondLst>
-                              <p:cond delay="0"/>
-                            </p:stCondLst>
-                            <p:childTnLst>
-                              <p:par>
-                                <p:cTn id="25" presetID="1" presetClass="entr" presetSubtype="0" fill="hold" nodeType="clickEffect">
-                                  <p:stCondLst>
-                                    <p:cond delay="0"/>
-                                  </p:stCondLst>
-                                  <p:childTnLst>
-                                    <p:set>
-                                      <p:cBhvr>
-                                        <p:cTn id="26" dur="1" fill="hold">
-                                          <p:stCondLst>
-                                            <p:cond delay="0"/>
-                                          </p:stCondLst>
-                                        </p:cTn>
-                                        <p:tgtEl>
-                                          <p:spTgt spid="3">
-                                            <p:txEl>
-                                              <p:pRg st="10" end="10"/>
+                                              <p:pRg st="5" end="5"/>
                                             </p:txEl>
                                           </p:spTgt>
                                         </p:tgtEl>
@@ -12409,8 +13371,12 @@
           <a:lstStyle/>
           <a:p>
             <a:r>
+              <a:rPr lang="en-US" dirty="0" err="1" smtClean="0"/>
+              <a:t>dRMT</a:t>
+            </a:r>
+            <a:r>
               <a:rPr lang="en-US" dirty="0" smtClean="0"/>
-              <a:t>Constraints on the problem</a:t>
+              <a:t> constraints</a:t>
             </a:r>
             <a:endParaRPr lang="en-US" dirty="0"/>
           </a:p>
@@ -12433,16 +13399,75 @@
           <a:p>
             <a:r>
               <a:rPr lang="en-US" dirty="0" smtClean="0"/>
-              <a:t>Match resources</a:t>
-            </a:r>
-          </a:p>
-          <a:p>
+              <a:t>Match </a:t>
+            </a:r>
+            <a:r>
+              <a:rPr lang="en-US" dirty="0" smtClean="0"/>
+              <a:t>limits</a:t>
+            </a:r>
+            <a:r>
+              <a:rPr lang="en-US" dirty="0" smtClean="0"/>
+              <a:t>:</a:t>
+            </a:r>
+            <a:r>
+              <a:rPr lang="en-US" dirty="0"/>
+              <a:t> </a:t>
+            </a:r>
+            <a:r>
+              <a:rPr lang="en-US" dirty="0"/>
+              <a:t>E</a:t>
+            </a:r>
+            <a:r>
+              <a:rPr lang="en-US" dirty="0" smtClean="0"/>
+              <a:t>ach </a:t>
+            </a:r>
+            <a:r>
+              <a:rPr lang="en-US" dirty="0"/>
+              <a:t>processor can generate up </a:t>
+            </a:r>
+            <a:r>
+              <a:rPr lang="en-US" dirty="0" smtClean="0"/>
+              <a:t>to M b-bit-width </a:t>
+            </a:r>
+            <a:r>
+              <a:rPr lang="en-US" dirty="0"/>
+              <a:t>keys to </a:t>
+            </a:r>
+            <a:r>
+              <a:rPr lang="en-US" dirty="0" smtClean="0"/>
+              <a:t>match against tables stored in memory.</a:t>
+            </a:r>
             <a:endParaRPr lang="en-US" dirty="0"/>
           </a:p>
           <a:p>
+            <a:endParaRPr lang="en-US" dirty="0"/>
+          </a:p>
+          <a:p>
             <a:r>
               <a:rPr lang="en-US" dirty="0" smtClean="0"/>
-              <a:t>Action resources</a:t>
+              <a:t>Action </a:t>
+            </a:r>
+            <a:r>
+              <a:rPr lang="en-US" dirty="0" smtClean="0"/>
+              <a:t>limits: Each processor can modify up to A packet fields in parallel.</a:t>
+            </a:r>
+            <a:endParaRPr lang="en-US" dirty="0" smtClean="0"/>
+          </a:p>
+          <a:p>
+            <a:endParaRPr lang="en-US" dirty="0" smtClean="0"/>
+          </a:p>
+          <a:p>
+            <a:r>
+              <a:rPr lang="en-US" dirty="0" smtClean="0"/>
+              <a:t>Each table match takes up to </a:t>
+            </a:r>
+            <a:r>
+              <a:rPr lang="en-US" dirty="0" err="1" smtClean="0"/>
+              <a:t>dM</a:t>
+            </a:r>
+            <a:r>
+              <a:rPr lang="en-US" dirty="0" smtClean="0"/>
+              <a:t> clock cycles</a:t>
             </a:r>
           </a:p>
           <a:p>
@@ -12451,7 +13476,15 @@
           <a:p>
             <a:r>
               <a:rPr lang="en-US" dirty="0" smtClean="0"/>
-              <a:t>Bring back diagram of the processor to explain</a:t>
+              <a:t>Each action takes up to </a:t>
+            </a:r>
+            <a:r>
+              <a:rPr lang="en-US" dirty="0" err="1" smtClean="0"/>
+              <a:t>dA</a:t>
+            </a:r>
+            <a:r>
+              <a:rPr lang="en-US" dirty="0" smtClean="0"/>
+              <a:t> clock cycles</a:t>
             </a:r>
             <a:endParaRPr lang="en-US" dirty="0"/>
           </a:p>
@@ -13115,7 +14148,7 @@
         <p:spPr>
           <a:xfrm>
             <a:off x="7328079" y="2253803"/>
-            <a:ext cx="3864584" cy="369332"/>
+            <a:ext cx="1855444" cy="1477328"/>
           </a:xfrm>
           <a:prstGeom prst="rect">
             <a:avLst/>
@@ -13130,9 +14163,32 @@
           <a:p>
             <a:r>
               <a:rPr lang="en-US" dirty="0" smtClean="0"/>
-              <a:t>Match/Action capacity: 1 per processor</a:t>
-            </a:r>
-            <a:endParaRPr lang="en-US" dirty="0"/>
+              <a:t>N = 2 processors</a:t>
+            </a:r>
+          </a:p>
+          <a:p>
+            <a:r>
+              <a:rPr lang="en-US" dirty="0" smtClean="0"/>
+              <a:t>M = 1</a:t>
+            </a:r>
+          </a:p>
+          <a:p>
+            <a:r>
+              <a:rPr lang="en-US" dirty="0" smtClean="0"/>
+              <a:t>A = 1</a:t>
+            </a:r>
+          </a:p>
+          <a:p>
+            <a:r>
+              <a:rPr lang="en-US" dirty="0" smtClean="0"/>
+              <a:t>Match latency = 2</a:t>
+            </a:r>
+          </a:p>
+          <a:p>
+            <a:r>
+              <a:rPr lang="en-US" dirty="0" smtClean="0"/>
+              <a:t>Action latency = 1</a:t>
+            </a:r>
           </a:p>
         </p:txBody>
       </p:sp>
@@ -44436,11 +45492,7 @@
               </a:pPr>
               <a:r>
                 <a:rPr lang="en-US" sz="2200" dirty="0" smtClean="0"/>
-                <a:t>Must extract </a:t>
-              </a:r>
-              <a:r>
-                <a:rPr lang="en-US" sz="2200" dirty="0" smtClean="0"/>
-                <a:t>key multiple times</a:t>
+                <a:t>Must extract key multiple times</a:t>
               </a:r>
             </a:p>
             <a:p>
@@ -44450,11 +45502,7 @@
               </a:pPr>
               <a:r>
                 <a:rPr lang="en-US" sz="2200" dirty="0" smtClean="0"/>
-                <a:t>Only last stage </a:t>
-              </a:r>
-              <a:r>
-                <a:rPr lang="en-US" sz="2200" dirty="0" smtClean="0"/>
-                <a:t>executes action</a:t>
+                <a:t>Only last stage executes action</a:t>
               </a:r>
             </a:p>
             <a:p>
@@ -44464,11 +45512,7 @@
               </a:pPr>
               <a:r>
                 <a:rPr lang="en-US" sz="2200" dirty="0" smtClean="0"/>
-                <a:t>Wastes match/action </a:t>
-              </a:r>
-              <a:r>
-                <a:rPr lang="en-US" sz="2200" dirty="0" smtClean="0"/>
-                <a:t>capacity</a:t>
+                <a:t>Wastes match/action capacity</a:t>
               </a:r>
               <a:endParaRPr lang="en-US" sz="2200" dirty="0"/>
             </a:p>
@@ -47685,15 +48729,7 @@
               </a:pPr>
               <a:r>
                 <a:rPr lang="en-US" sz="2200" dirty="0" smtClean="0"/>
-                <a:t>Wastes </a:t>
-              </a:r>
-              <a:r>
-                <a:rPr lang="en-US" sz="2200" dirty="0" smtClean="0"/>
-                <a:t>memory </a:t>
-              </a:r>
-              <a:r>
-                <a:rPr lang="en-US" sz="2200" dirty="0" smtClean="0"/>
-                <a:t>capacity</a:t>
+                <a:t>Wastes memory capacity</a:t>
               </a:r>
               <a:endParaRPr lang="en-US" sz="2200" dirty="0"/>
             </a:p>

</xml_diff>

<commit_message>
Address more of Mohammad's comments
</commit_message>
<xml_diff>
--- a/drmt.pptx
+++ b/drmt.pptx
@@ -472,11 +472,11 @@
           <c:showBubbleSize val="0"/>
         </c:dLbls>
         <c:smooth val="0"/>
-        <c:axId val="145855680"/>
-        <c:axId val="142040800"/>
+        <c:axId val="274542192"/>
+        <c:axId val="274547008"/>
       </c:lineChart>
       <c:catAx>
-        <c:axId val="145855680"/>
+        <c:axId val="274542192"/>
         <c:scaling>
           <c:orientation val="minMax"/>
         </c:scaling>
@@ -519,7 +519,7 @@
             <a:endParaRPr lang="en-US"/>
           </a:p>
         </c:txPr>
-        <c:crossAx val="142040800"/>
+        <c:crossAx val="274547008"/>
         <c:crosses val="autoZero"/>
         <c:auto val="1"/>
         <c:lblAlgn val="ctr"/>
@@ -527,7 +527,7 @@
         <c:noMultiLvlLbl val="0"/>
       </c:catAx>
       <c:valAx>
-        <c:axId val="142040800"/>
+        <c:axId val="274547008"/>
         <c:scaling>
           <c:orientation val="minMax"/>
         </c:scaling>
@@ -577,7 +577,7 @@
             <a:endParaRPr lang="en-US"/>
           </a:p>
         </c:txPr>
-        <c:crossAx val="145855680"/>
+        <c:crossAx val="274542192"/>
         <c:crosses val="autoZero"/>
         <c:crossBetween val="between"/>
       </c:valAx>
@@ -1794,92 +1794,9 @@
           <a:p>
             <a:r>
               <a:rPr lang="en-US" dirty="0" smtClean="0"/>
-              <a:t>Looks like a multi-processor or network processor. What makes this interesting and different is that we can preschedule it for deterministic</a:t>
-            </a:r>
-            <a:r>
-              <a:rPr lang="en-US" baseline="0" dirty="0" smtClean="0"/>
-              <a:t> latency. How do we do that?</a:t>
-            </a:r>
-          </a:p>
-          <a:p>
-            <a:r>
-              <a:rPr lang="en-US" baseline="0" dirty="0" smtClean="0"/>
-              <a:t>Given a P4 program and the table sizes. The scheduling problem is to figure out (1) how to place the tables and (2) how to satisfy requirements on the processors.</a:t>
-            </a:r>
-          </a:p>
-          <a:p>
-            <a:r>
-              <a:rPr lang="en-US" baseline="0" dirty="0" smtClean="0"/>
-              <a:t>You could try and solve one joint scheduling problem.</a:t>
-            </a:r>
-          </a:p>
-          <a:p>
-            <a:r>
-              <a:rPr lang="en-US" baseline="0" dirty="0" smtClean="0"/>
-              <a:t>It turns out you can simplify this problem greatly. It turns out you can decouple these two. We can pack them into memory clusters in any way they want. The crossbar</a:t>
-            </a:r>
-          </a:p>
-          <a:p>
-            <a:r>
-              <a:rPr lang="en-US" baseline="0" dirty="0" smtClean="0"/>
-              <a:t>Allows me to stitch them together and make things work.</a:t>
-            </a:r>
-          </a:p>
-          <a:p>
-            <a:r>
-              <a:rPr lang="en-US" baseline="0" dirty="0" smtClean="0"/>
-              <a:t>You could have an </a:t>
-            </a:r>
-            <a:r>
-              <a:rPr lang="en-US" baseline="0" dirty="0" err="1" smtClean="0"/>
-              <a:t>interstital</a:t>
-            </a:r>
-            <a:r>
-              <a:rPr lang="en-US" baseline="0" dirty="0" smtClean="0"/>
-              <a:t> slide before this. </a:t>
-            </a:r>
-          </a:p>
-          <a:p>
-            <a:endParaRPr lang="en-US" baseline="0" dirty="0" smtClean="0"/>
-          </a:p>
-          <a:p>
-            <a:r>
-              <a:rPr lang="en-US" baseline="0" dirty="0" smtClean="0"/>
-              <a:t>This leads into the compiler.</a:t>
-            </a:r>
-            <a:endParaRPr lang="en-US" dirty="0" smtClean="0"/>
-          </a:p>
-          <a:p>
-            <a:endParaRPr lang="en-US" dirty="0" smtClean="0"/>
-          </a:p>
-          <a:p>
-            <a:r>
-              <a:rPr lang="en-US" dirty="0" smtClean="0"/>
-              <a:t>TODO: This slide is about how we represent P4 program for the purpose of the scheduler</a:t>
-            </a:r>
-          </a:p>
-          <a:p>
-            <a:r>
-              <a:rPr lang="en-US" dirty="0" smtClean="0"/>
-              <a:t>TODO: Add figures here.</a:t>
-            </a:r>
-          </a:p>
-          <a:p>
-            <a:r>
-              <a:rPr lang="en-US" dirty="0" smtClean="0"/>
-              <a:t>Start with table dependency graph in P4</a:t>
-            </a:r>
-          </a:p>
-          <a:p>
-            <a:r>
-              <a:rPr lang="en-US" dirty="0" smtClean="0"/>
-              <a:t>And</a:t>
-            </a:r>
-            <a:r>
-              <a:rPr lang="en-US" baseline="0" dirty="0" smtClean="0"/>
-              <a:t> show more fine-grained dependency graph in P4.</a:t>
-            </a:r>
-            <a:endParaRPr lang="en-US" dirty="0" smtClean="0"/>
+              <a:t>TODO: Maybe add a figure here.</a:t>
+            </a:r>
+            <a:endParaRPr lang="en-US" dirty="0"/>
           </a:p>
         </p:txBody>
       </p:sp>
@@ -1900,7 +1817,7 @@
           <a:p>
             <a:fld id="{4B72050E-C83F-DC4E-B064-9A7B7E00D2A3}" type="slidenum">
               <a:rPr lang="en-US" smtClean="0"/>
-              <a:t>14</a:t>
+              <a:t>13</a:t>
             </a:fld>
             <a:endParaRPr lang="en-US"/>
           </a:p>
@@ -1909,7 +1826,7 @@
     </p:spTree>
     <p:extLst>
       <p:ext uri="{BB962C8B-B14F-4D97-AF65-F5344CB8AC3E}">
-        <p14:creationId xmlns:p14="http://schemas.microsoft.com/office/powerpoint/2010/main" val="186672079"/>
+        <p14:creationId xmlns:p14="http://schemas.microsoft.com/office/powerpoint/2010/main" val="661883496"/>
       </p:ext>
     </p:extLst>
   </p:cSld>
@@ -1963,30 +1880,18 @@
           <a:bodyPr/>
           <a:lstStyle/>
           <a:p>
-            <a:pPr marL="0" marR="0" indent="0" algn="l" defTabSz="914400" rtl="0" eaLnBrk="1" fontAlgn="auto" latinLnBrk="0" hangingPunct="1">
-              <a:lnSpc>
-                <a:spcPct val="100000"/>
-              </a:lnSpc>
-              <a:spcBef>
-                <a:spcPts val="0"/>
-              </a:spcBef>
-              <a:spcAft>
-                <a:spcPts val="0"/>
-              </a:spcAft>
-              <a:buClrTx/>
-              <a:buSzTx/>
-              <a:buFontTx/>
-              <a:buNone/>
-              <a:tabLst/>
-              <a:defRPr/>
-            </a:pPr>
-            <a:r>
-              <a:rPr lang="en-US" dirty="0" smtClean="0"/>
-              <a:t>TODO: Bring back diagram of the processor to explain</a:t>
-            </a:r>
-          </a:p>
-          <a:p>
-            <a:endParaRPr lang="en-US" dirty="0"/>
+            <a:endParaRPr lang="en-US" baseline="0" dirty="0" smtClean="0"/>
+          </a:p>
+          <a:p>
+            <a:r>
+              <a:rPr lang="en-US" baseline="0" dirty="0" smtClean="0"/>
+              <a:t>This leads into the compiler</a:t>
+            </a:r>
+            <a:r>
+              <a:rPr lang="en-US" baseline="0" dirty="0" smtClean="0"/>
+              <a:t>.</a:t>
+            </a:r>
+            <a:endParaRPr lang="en-US" dirty="0" smtClean="0"/>
           </a:p>
         </p:txBody>
       </p:sp>
@@ -2007,7 +1912,7 @@
           <a:p>
             <a:fld id="{4B72050E-C83F-DC4E-B064-9A7B7E00D2A3}" type="slidenum">
               <a:rPr lang="en-US" smtClean="0"/>
-              <a:t>15</a:t>
+              <a:t>14</a:t>
             </a:fld>
             <a:endParaRPr lang="en-US"/>
           </a:p>
@@ -2016,7 +1921,7 @@
     </p:spTree>
     <p:extLst>
       <p:ext uri="{BB962C8B-B14F-4D97-AF65-F5344CB8AC3E}">
-        <p14:creationId xmlns:p14="http://schemas.microsoft.com/office/powerpoint/2010/main" val="1761997500"/>
+        <p14:creationId xmlns:p14="http://schemas.microsoft.com/office/powerpoint/2010/main" val="186672079"/>
       </p:ext>
     </p:extLst>
   </p:cSld>
@@ -2070,20 +1975,29 @@
           <a:bodyPr/>
           <a:lstStyle/>
           <a:p>
+            <a:pPr marL="0" marR="0" indent="0" algn="l" defTabSz="914400" rtl="0" eaLnBrk="1" fontAlgn="auto" latinLnBrk="0" hangingPunct="1">
+              <a:lnSpc>
+                <a:spcPct val="100000"/>
+              </a:lnSpc>
+              <a:spcBef>
+                <a:spcPts val="0"/>
+              </a:spcBef>
+              <a:spcAft>
+                <a:spcPts val="0"/>
+              </a:spcAft>
+              <a:buClrTx/>
+              <a:buSzTx/>
+              <a:buFontTx/>
+              <a:buNone/>
+              <a:tabLst/>
+              <a:defRPr/>
+            </a:pPr>
             <a:r>
               <a:rPr lang="en-US" dirty="0" smtClean="0"/>
-              <a:t>At this point you have explained</a:t>
-            </a:r>
-            <a:r>
-              <a:rPr lang="en-US" baseline="0" dirty="0" smtClean="0"/>
-              <a:t> what the DAG is and what the match/action capacity is.</a:t>
-            </a:r>
-          </a:p>
-          <a:p>
-            <a:r>
-              <a:rPr lang="en-US" baseline="0" dirty="0" smtClean="0"/>
-              <a:t>TODO: Also say there are two processors.</a:t>
-            </a:r>
+              <a:t>TODO: Bring back diagram of the processor to explain</a:t>
+            </a:r>
+          </a:p>
+          <a:p>
             <a:endParaRPr lang="en-US" dirty="0"/>
           </a:p>
         </p:txBody>
@@ -2105,7 +2019,7 @@
           <a:p>
             <a:fld id="{4B72050E-C83F-DC4E-B064-9A7B7E00D2A3}" type="slidenum">
               <a:rPr lang="en-US" smtClean="0"/>
-              <a:t>16</a:t>
+              <a:t>15</a:t>
             </a:fld>
             <a:endParaRPr lang="en-US"/>
           </a:p>
@@ -2114,7 +2028,7 @@
     </p:spTree>
     <p:extLst>
       <p:ext uri="{BB962C8B-B14F-4D97-AF65-F5344CB8AC3E}">
-        <p14:creationId xmlns:p14="http://schemas.microsoft.com/office/powerpoint/2010/main" val="1127672194"/>
+        <p14:creationId xmlns:p14="http://schemas.microsoft.com/office/powerpoint/2010/main" val="1761997500"/>
       </p:ext>
     </p:extLst>
   </p:cSld>
@@ -2168,20 +2082,6 @@
           <a:bodyPr/>
           <a:lstStyle/>
           <a:p>
-            <a:r>
-              <a:rPr lang="en-US" dirty="0" smtClean="0"/>
-              <a:t>We are going to assume one packet per clock cycle. It’s easy to extend it to more</a:t>
-            </a:r>
-            <a:r>
-              <a:rPr lang="en-US" baseline="0" dirty="0" smtClean="0"/>
-              <a:t> general throughputs.</a:t>
-            </a:r>
-          </a:p>
-          <a:p>
-            <a:r>
-              <a:rPr lang="en-US" baseline="0" dirty="0" smtClean="0"/>
-              <a:t>TODO: Replace all the text with a figure.</a:t>
-            </a:r>
             <a:endParaRPr lang="en-US" dirty="0"/>
           </a:p>
         </p:txBody>
@@ -2203,7 +2103,7 @@
           <a:p>
             <a:fld id="{4B72050E-C83F-DC4E-B064-9A7B7E00D2A3}" type="slidenum">
               <a:rPr lang="en-US" smtClean="0"/>
-              <a:t>25</a:t>
+              <a:t>16</a:t>
             </a:fld>
             <a:endParaRPr lang="en-US"/>
           </a:p>
@@ -2212,7 +2112,7 @@
     </p:spTree>
     <p:extLst>
       <p:ext uri="{BB962C8B-B14F-4D97-AF65-F5344CB8AC3E}">
-        <p14:creationId xmlns:p14="http://schemas.microsoft.com/office/powerpoint/2010/main" val="1785872854"/>
+        <p14:creationId xmlns:p14="http://schemas.microsoft.com/office/powerpoint/2010/main" val="1127672194"/>
       </p:ext>
     </p:extLst>
   </p:cSld>
@@ -2268,36 +2168,19 @@
           <a:p>
             <a:r>
               <a:rPr lang="en-US" dirty="0" smtClean="0"/>
-              <a:t>TODO: Show this idea of scheduling on a circle of</a:t>
+              <a:t>We are going to assume one packet per clock cycle. It’s easy to extend it to more</a:t>
             </a:r>
             <a:r>
               <a:rPr lang="en-US" baseline="0" dirty="0" smtClean="0"/>
-              <a:t> length N.</a:t>
+              <a:t> general throughputs.</a:t>
             </a:r>
           </a:p>
           <a:p>
             <a:r>
               <a:rPr lang="en-US" baseline="0" dirty="0" smtClean="0"/>
-              <a:t>Periodic schedule is just the schedule on a circle, as opposed to a line.</a:t>
-            </a:r>
-          </a:p>
-          <a:p>
-            <a:r>
-              <a:rPr lang="en-US" baseline="0" dirty="0" smtClean="0"/>
-              <a:t>What does the periodic schedule even mean? Show the previous example on a circle.</a:t>
-            </a:r>
-          </a:p>
-          <a:p>
-            <a:r>
-              <a:rPr lang="en-US" baseline="0" dirty="0" smtClean="0"/>
-              <a:t>The reason you can do this as an ILP is you can take any time slot and write it as t*P + Q.</a:t>
-            </a:r>
-          </a:p>
-          <a:p>
-            <a:r>
-              <a:rPr lang="en-US" baseline="0" dirty="0" smtClean="0"/>
-              <a:t>This is how you can formulate as ILP.</a:t>
-            </a:r>
+              <a:t>TODO: Replace all the text with a figure.</a:t>
+            </a:r>
+            <a:endParaRPr lang="en-US" dirty="0"/>
           </a:p>
         </p:txBody>
       </p:sp>
@@ -2318,7 +2201,7 @@
           <a:p>
             <a:fld id="{4B72050E-C83F-DC4E-B064-9A7B7E00D2A3}" type="slidenum">
               <a:rPr lang="en-US" smtClean="0"/>
-              <a:t>26</a:t>
+              <a:t>25</a:t>
             </a:fld>
             <a:endParaRPr lang="en-US"/>
           </a:p>
@@ -2327,7 +2210,7 @@
     </p:spTree>
     <p:extLst>
       <p:ext uri="{BB962C8B-B14F-4D97-AF65-F5344CB8AC3E}">
-        <p14:creationId xmlns:p14="http://schemas.microsoft.com/office/powerpoint/2010/main" val="1416276009"/>
+        <p14:creationId xmlns:p14="http://schemas.microsoft.com/office/powerpoint/2010/main" val="1785872854"/>
       </p:ext>
     </p:extLst>
   </p:cSld>
@@ -2381,15 +2264,7 @@
           <a:bodyPr/>
           <a:lstStyle/>
           <a:p>
-            <a:r>
-              <a:rPr lang="en-US" baseline="0" dirty="0" smtClean="0"/>
-              <a:t>Switch.p4 </a:t>
-            </a:r>
-            <a:r>
-              <a:rPr lang="en-US" baseline="0" dirty="0" smtClean="0"/>
-              <a:t>is optimized for RMT.</a:t>
-            </a:r>
-            <a:endParaRPr lang="en-US" dirty="0"/>
+            <a:endParaRPr lang="en-US" baseline="0" dirty="0" smtClean="0"/>
           </a:p>
         </p:txBody>
       </p:sp>
@@ -2410,7 +2285,7 @@
           <a:p>
             <a:fld id="{4B72050E-C83F-DC4E-B064-9A7B7E00D2A3}" type="slidenum">
               <a:rPr lang="en-US" smtClean="0"/>
-              <a:t>27</a:t>
+              <a:t>26</a:t>
             </a:fld>
             <a:endParaRPr lang="en-US"/>
           </a:p>
@@ -2419,7 +2294,7 @@
     </p:spTree>
     <p:extLst>
       <p:ext uri="{BB962C8B-B14F-4D97-AF65-F5344CB8AC3E}">
-        <p14:creationId xmlns:p14="http://schemas.microsoft.com/office/powerpoint/2010/main" val="92354159"/>
+        <p14:creationId xmlns:p14="http://schemas.microsoft.com/office/powerpoint/2010/main" val="1416276009"/>
       </p:ext>
     </p:extLst>
   </p:cSld>
@@ -2475,11 +2350,7 @@
           <a:p>
             <a:r>
               <a:rPr lang="en-US" baseline="0" dirty="0" smtClean="0"/>
-              <a:t>Hardware </a:t>
-            </a:r>
-            <a:r>
-              <a:rPr lang="en-US" baseline="0" dirty="0" smtClean="0"/>
-              <a:t>analysis takeaways: </a:t>
+              <a:t>Switch.p4 is optimized for RMT.</a:t>
             </a:r>
             <a:endParaRPr lang="en-US" dirty="0"/>
           </a:p>
@@ -2502,6 +2373,94 @@
           <a:p>
             <a:fld id="{4B72050E-C83F-DC4E-B064-9A7B7E00D2A3}" type="slidenum">
               <a:rPr lang="en-US" smtClean="0"/>
+              <a:t>27</a:t>
+            </a:fld>
+            <a:endParaRPr lang="en-US"/>
+          </a:p>
+        </p:txBody>
+      </p:sp>
+    </p:spTree>
+    <p:extLst>
+      <p:ext uri="{BB962C8B-B14F-4D97-AF65-F5344CB8AC3E}">
+        <p14:creationId xmlns:p14="http://schemas.microsoft.com/office/powerpoint/2010/main" val="92354159"/>
+      </p:ext>
+    </p:extLst>
+  </p:cSld>
+  <p:clrMapOvr>
+    <a:masterClrMapping/>
+  </p:clrMapOvr>
+</p:notes>
+</file>
+
+<file path=ppt/notesSlides/notesSlide18.xml><?xml version="1.0" encoding="utf-8"?>
+<p:notes xmlns:a="http://schemas.openxmlformats.org/drawingml/2006/main" xmlns:r="http://schemas.openxmlformats.org/officeDocument/2006/relationships" xmlns:p="http://schemas.openxmlformats.org/presentationml/2006/main">
+  <p:cSld>
+    <p:spTree>
+      <p:nvGrpSpPr>
+        <p:cNvPr id="1" name=""/>
+        <p:cNvGrpSpPr/>
+        <p:nvPr/>
+      </p:nvGrpSpPr>
+      <p:grpSpPr>
+        <a:xfrm>
+          <a:off x="0" y="0"/>
+          <a:ext cx="0" cy="0"/>
+          <a:chOff x="0" y="0"/>
+          <a:chExt cx="0" cy="0"/>
+        </a:xfrm>
+      </p:grpSpPr>
+      <p:sp>
+        <p:nvSpPr>
+          <p:cNvPr id="2" name="Slide Image Placeholder 1"/>
+          <p:cNvSpPr>
+            <a:spLocks noGrp="1" noRot="1" noChangeAspect="1"/>
+          </p:cNvSpPr>
+          <p:nvPr>
+            <p:ph type="sldImg"/>
+          </p:nvPr>
+        </p:nvSpPr>
+        <p:spPr/>
+      </p:sp>
+      <p:sp>
+        <p:nvSpPr>
+          <p:cNvPr id="3" name="Notes Placeholder 2"/>
+          <p:cNvSpPr>
+            <a:spLocks noGrp="1"/>
+          </p:cNvSpPr>
+          <p:nvPr>
+            <p:ph type="body" idx="1"/>
+          </p:nvPr>
+        </p:nvSpPr>
+        <p:spPr/>
+        <p:txBody>
+          <a:bodyPr/>
+          <a:lstStyle/>
+          <a:p>
+            <a:r>
+              <a:rPr lang="en-US" baseline="0" dirty="0" smtClean="0"/>
+              <a:t>Hardware analysis takeaways: </a:t>
+            </a:r>
+            <a:endParaRPr lang="en-US" dirty="0"/>
+          </a:p>
+        </p:txBody>
+      </p:sp>
+      <p:sp>
+        <p:nvSpPr>
+          <p:cNvPr id="4" name="Slide Number Placeholder 3"/>
+          <p:cNvSpPr>
+            <a:spLocks noGrp="1"/>
+          </p:cNvSpPr>
+          <p:nvPr>
+            <p:ph type="sldNum" sz="quarter" idx="10"/>
+          </p:nvPr>
+        </p:nvSpPr>
+        <p:spPr/>
+        <p:txBody>
+          <a:bodyPr/>
+          <a:lstStyle/>
+          <a:p>
+            <a:fld id="{4B72050E-C83F-DC4E-B064-9A7B7E00D2A3}" type="slidenum">
+              <a:rPr lang="en-US" smtClean="0"/>
               <a:t>30</a:t>
             </a:fld>
             <a:endParaRPr lang="en-US"/>
@@ -2521,7 +2480,7 @@
 </p:notes>
 </file>
 
-<file path=ppt/notesSlides/notesSlide18.xml><?xml version="1.0" encoding="utf-8"?>
+<file path=ppt/notesSlides/notesSlide19.xml><?xml version="1.0" encoding="utf-8"?>
 <p:notes xmlns:a="http://schemas.openxmlformats.org/drawingml/2006/main" xmlns:r="http://schemas.openxmlformats.org/officeDocument/2006/relationships" xmlns:p="http://schemas.openxmlformats.org/presentationml/2006/main">
   <p:cSld>
     <p:spTree>
@@ -11888,15 +11847,7 @@
           <a:p>
             <a:r>
               <a:rPr lang="en-US" dirty="0" smtClean="0"/>
-              <a:t>Compute: Schedule </a:t>
-            </a:r>
-            <a:r>
-              <a:rPr lang="en-US" dirty="0" smtClean="0"/>
-              <a:t>matches, actions</a:t>
-            </a:r>
-            <a:r>
-              <a:rPr lang="en-US" dirty="0" smtClean="0"/>
-              <a:t>, respecting dependencies </a:t>
+              <a:t>Compute: Schedule matches, actions, respecting dependencies </a:t>
             </a:r>
           </a:p>
           <a:p>
@@ -13166,7 +13117,6 @@
               <a:rPr lang="en-US" dirty="0" smtClean="0"/>
               <a:t>Action</a:t>
             </a:r>
-            <a:endParaRPr lang="en-US" dirty="0" smtClean="0"/>
           </a:p>
           <a:p>
             <a:r>
@@ -13275,7 +13225,6 @@
               <a:rPr lang="en-US" dirty="0" smtClean="0"/>
               <a:t>Action</a:t>
             </a:r>
-            <a:endParaRPr lang="en-US" dirty="0" smtClean="0"/>
           </a:p>
           <a:p>
             <a:r>
@@ -13473,11 +13422,7 @@
             </a:r>
             <a:r>
               <a:rPr lang="en-US" dirty="0" smtClean="0"/>
-              <a:t> </a:t>
-            </a:r>
-            <a:r>
-              <a:rPr lang="en-US" dirty="0" smtClean="0"/>
-              <a:t>resource constraints</a:t>
+              <a:t> resource constraints</a:t>
             </a:r>
             <a:endParaRPr lang="en-US" dirty="0"/>
           </a:p>
@@ -13551,11 +13496,7 @@
             </a:r>
             <a:r>
               <a:rPr lang="en-US" dirty="0" smtClean="0"/>
-              <a:t> </a:t>
-            </a:r>
-            <a:r>
-              <a:rPr lang="en-US" dirty="0" smtClean="0"/>
-              <a:t>clock cycles</a:t>
+              <a:t> clock cycles</a:t>
             </a:r>
           </a:p>
           <a:p>
@@ -13572,11 +13513,7 @@
             </a:r>
             <a:r>
               <a:rPr lang="en-US" dirty="0" smtClean="0"/>
-              <a:t> </a:t>
-            </a:r>
-            <a:r>
-              <a:rPr lang="en-US" dirty="0" smtClean="0"/>
-              <a:t>clock cycles</a:t>
+              <a:t> clock cycles</a:t>
             </a:r>
             <a:endParaRPr lang="en-US" dirty="0"/>
           </a:p>
@@ -14239,8 +14176,8 @@
         </p:nvSpPr>
         <p:spPr>
           <a:xfrm>
-            <a:off x="7328079" y="2253803"/>
-            <a:ext cx="3807453" cy="1477328"/>
+            <a:off x="6047919" y="2724066"/>
+            <a:ext cx="5993949" cy="1754326"/>
           </a:xfrm>
           <a:prstGeom prst="rect">
             <a:avLst/>
@@ -14259,25 +14196,25 @@
                 <a:ea typeface="Gadugi" charset="0"/>
                 <a:cs typeface="Gadugi" charset="0"/>
               </a:rPr>
-              <a:t>N = 2 processors</a:t>
-            </a:r>
-          </a:p>
-          <a:p>
+              <a:t>N = 2 </a:t>
+            </a:r>
             <a:r>
               <a:rPr lang="en-US" dirty="0" smtClean="0">
                 <a:latin typeface="Gadugi" charset="0"/>
                 <a:ea typeface="Gadugi" charset="0"/>
                 <a:cs typeface="Gadugi" charset="0"/>
               </a:rPr>
-              <a:t>M = </a:t>
-            </a:r>
+              <a:t>processors.</a:t>
+            </a:r>
+          </a:p>
+          <a:p>
             <a:r>
               <a:rPr lang="en-US" dirty="0" smtClean="0">
                 <a:latin typeface="Gadugi" charset="0"/>
                 <a:ea typeface="Gadugi" charset="0"/>
                 <a:cs typeface="Gadugi" charset="0"/>
               </a:rPr>
-              <a:t>1 (1 match key)</a:t>
+              <a:t>Each processor handles a new packet every 2 clock cycles</a:t>
             </a:r>
             <a:endParaRPr lang="en-US" dirty="0" smtClean="0">
               <a:latin typeface="Gadugi" charset="0"/>
@@ -14292,21 +14229,18 @@
                 <a:ea typeface="Gadugi" charset="0"/>
                 <a:cs typeface="Gadugi" charset="0"/>
               </a:rPr>
-              <a:t>A = </a:t>
-            </a:r>
+              <a:t>M = 1 (1 match key)</a:t>
+            </a:r>
+          </a:p>
+          <a:p>
             <a:r>
               <a:rPr lang="en-US" dirty="0" smtClean="0">
                 <a:latin typeface="Gadugi" charset="0"/>
                 <a:ea typeface="Gadugi" charset="0"/>
                 <a:cs typeface="Gadugi" charset="0"/>
               </a:rPr>
-              <a:t>1 (1 field)</a:t>
-            </a:r>
-            <a:endParaRPr lang="en-US" dirty="0" smtClean="0">
-              <a:latin typeface="Gadugi" charset="0"/>
-              <a:ea typeface="Gadugi" charset="0"/>
-              <a:cs typeface="Gadugi" charset="0"/>
-            </a:endParaRPr>
+              <a:t>A = 1 (1 field)</a:t>
+            </a:r>
           </a:p>
           <a:p>
             <a:r>
@@ -14323,29 +14257,8 @@
                 <a:ea typeface="Gadugi" charset="0"/>
                 <a:cs typeface="Gadugi" charset="0"/>
               </a:rPr>
-              <a:t> (Match latency) </a:t>
-            </a:r>
-            <a:r>
-              <a:rPr lang="en-US" dirty="0" smtClean="0">
-                <a:latin typeface="Gadugi" charset="0"/>
-                <a:ea typeface="Gadugi" charset="0"/>
-                <a:cs typeface="Gadugi" charset="0"/>
-              </a:rPr>
-              <a:t>= </a:t>
-            </a:r>
-            <a:r>
-              <a:rPr lang="en-US" dirty="0" smtClean="0">
-                <a:latin typeface="Gadugi" charset="0"/>
-                <a:ea typeface="Gadugi" charset="0"/>
-                <a:cs typeface="Gadugi" charset="0"/>
-              </a:rPr>
-              <a:t>2 clock cycles</a:t>
-            </a:r>
-            <a:endParaRPr lang="en-US" dirty="0" smtClean="0">
-              <a:latin typeface="Gadugi" charset="0"/>
-              <a:ea typeface="Gadugi" charset="0"/>
-              <a:cs typeface="Gadugi" charset="0"/>
-            </a:endParaRPr>
+              <a:t> (Match latency) = 2 clock cycles</a:t>
+            </a:r>
           </a:p>
           <a:p>
             <a:r>
@@ -14362,29 +14275,8 @@
                 <a:ea typeface="Gadugi" charset="0"/>
                 <a:cs typeface="Gadugi" charset="0"/>
               </a:rPr>
-              <a:t> (Action latency) </a:t>
-            </a:r>
-            <a:r>
-              <a:rPr lang="en-US" dirty="0" smtClean="0">
-                <a:latin typeface="Gadugi" charset="0"/>
-                <a:ea typeface="Gadugi" charset="0"/>
-                <a:cs typeface="Gadugi" charset="0"/>
-              </a:rPr>
-              <a:t>= </a:t>
-            </a:r>
-            <a:r>
-              <a:rPr lang="en-US" dirty="0" smtClean="0">
-                <a:latin typeface="Gadugi" charset="0"/>
-                <a:ea typeface="Gadugi" charset="0"/>
-                <a:cs typeface="Gadugi" charset="0"/>
-              </a:rPr>
-              <a:t>1 clock cycles</a:t>
-            </a:r>
-            <a:endParaRPr lang="en-US" dirty="0" smtClean="0">
-              <a:latin typeface="Gadugi" charset="0"/>
-              <a:ea typeface="Gadugi" charset="0"/>
-              <a:cs typeface="Gadugi" charset="0"/>
-            </a:endParaRPr>
+              <a:t> (Action latency) = 1 clock cycles</a:t>
+            </a:r>
           </a:p>
         </p:txBody>
       </p:sp>
@@ -28679,16 +28571,37 @@
           <a:p>
             <a:r>
               <a:rPr lang="en-US" dirty="0" smtClean="0"/>
-              <a:t>Dependency constraints between operations</a:t>
-            </a:r>
-          </a:p>
-          <a:p>
-            <a:endParaRPr lang="en-US" dirty="0" smtClean="0"/>
-          </a:p>
-          <a:p>
+              <a:t>Two main constraints:</a:t>
+            </a:r>
+          </a:p>
+          <a:p>
+            <a:pPr lvl="1"/>
             <a:r>
               <a:rPr lang="en-US" dirty="0" smtClean="0"/>
-              <a:t>With N processors, each </a:t>
+              <a:t>1. D</a:t>
+            </a:r>
+            <a:r>
+              <a:rPr lang="en-US" dirty="0" smtClean="0"/>
+              <a:t>ependency </a:t>
+            </a:r>
+            <a:r>
+              <a:rPr lang="en-US" dirty="0" smtClean="0"/>
+              <a:t>constraints between </a:t>
+            </a:r>
+            <a:r>
+              <a:rPr lang="en-US" dirty="0" smtClean="0"/>
+              <a:t>operations</a:t>
+            </a:r>
+          </a:p>
+          <a:p>
+            <a:pPr lvl="1"/>
+            <a:r>
+              <a:rPr lang="en-US" dirty="0" smtClean="0"/>
+              <a:t>2. Periodic resource constraints: E</a:t>
+            </a:r>
+            <a:r>
+              <a:rPr lang="en-US" dirty="0" smtClean="0"/>
+              <a:t>ach </a:t>
             </a:r>
             <a:r>
               <a:rPr lang="en-US" dirty="0" smtClean="0"/>
@@ -28696,34 +28609,12 @@
             </a:r>
             <a:r>
               <a:rPr lang="en-US" dirty="0" smtClean="0"/>
-              <a:t>cycles</a:t>
-            </a:r>
-          </a:p>
-          <a:p>
-            <a:endParaRPr lang="en-US" dirty="0"/>
-          </a:p>
-          <a:p>
+              <a:t>cycles. Ensure schedule </a:t>
+            </a:r>
             <a:r>
               <a:rPr lang="en-US" dirty="0" smtClean="0"/>
-              <a:t>Schedule </a:t>
-            </a:r>
-            <a:r>
-              <a:rPr lang="en-US" dirty="0" smtClean="0"/>
-              <a:t>matches and actions</a:t>
-            </a:r>
-            <a:r>
-              <a:rPr lang="en-US" dirty="0" smtClean="0"/>
-              <a:t> </a:t>
-            </a:r>
-            <a:r>
-              <a:rPr lang="en-US" dirty="0" smtClean="0"/>
-              <a:t>operation so that schedule can be repeated every N </a:t>
-            </a:r>
-            <a:r>
-              <a:rPr lang="en-US" dirty="0" smtClean="0"/>
-              <a:t>cycles without violating resource constraints</a:t>
-            </a:r>
-            <a:endParaRPr lang="en-US" dirty="0" smtClean="0"/>
+              <a:t>can be repeated every N cycles without violating resource constraints</a:t>
+            </a:r>
           </a:p>
           <a:p>
             <a:endParaRPr lang="en-US" dirty="0" smtClean="0"/>
@@ -28798,7 +28689,7 @@
                                         <p:tgtEl>
                                           <p:spTgt spid="3">
                                             <p:txEl>
-                                              <p:pRg st="2" end="2"/>
+                                              <p:pRg st="0" end="0"/>
                                             </p:txEl>
                                           </p:spTgt>
                                         </p:tgtEl>
@@ -28847,7 +28738,7 @@
                                         <p:tgtEl>
                                           <p:spTgt spid="3">
                                             <p:txEl>
-                                              <p:pRg st="0" end="0"/>
+                                              <p:pRg st="1" end="1"/>
                                             </p:txEl>
                                           </p:spTgt>
                                         </p:tgtEl>
@@ -28896,7 +28787,7 @@
                                         <p:tgtEl>
                                           <p:spTgt spid="3">
                                             <p:txEl>
-                                              <p:pRg st="4" end="4"/>
+                                              <p:pRg st="2" end="2"/>
                                             </p:txEl>
                                           </p:spTgt>
                                         </p:tgtEl>
@@ -28945,7 +28836,7 @@
                                         <p:tgtEl>
                                           <p:spTgt spid="3">
                                             <p:txEl>
-                                              <p:pRg st="6" end="6"/>
+                                              <p:pRg st="4" end="4"/>
                                             </p:txEl>
                                           </p:spTgt>
                                         </p:tgtEl>
@@ -29043,41 +28934,995 @@
         </p:nvSpPr>
         <p:spPr/>
         <p:txBody>
-          <a:bodyPr/>
+          <a:bodyPr>
+            <a:normAutofit lnSpcReduction="10000"/>
+          </a:bodyPr>
           <a:lstStyle/>
           <a:p>
             <a:r>
-              <a:rPr lang="en-US" dirty="0"/>
-              <a:t>Assign each </a:t>
-            </a:r>
-            <a:r>
               <a:rPr lang="en-US" dirty="0" smtClean="0"/>
-              <a:t>operation </a:t>
-            </a:r>
-            <a:r>
-              <a:rPr lang="en-US" dirty="0"/>
-              <a:t>a start time relative to the first operation</a:t>
-            </a:r>
-          </a:p>
-          <a:p>
-            <a:r>
-              <a:rPr lang="en-US" dirty="0"/>
-              <a:t>Group operations into buckets based on the reminder when the operation start time is divided by N.</a:t>
-            </a:r>
-          </a:p>
-          <a:p>
-            <a:r>
-              <a:rPr lang="en-US" dirty="0"/>
-              <a:t>Total match/action requirements in a bucket &lt;= match/action capacity</a:t>
-            </a:r>
-          </a:p>
-          <a:p>
-            <a:r>
-              <a:rPr lang="en-US" dirty="0"/>
-              <a:t>Dependencies must be satisfied between operations</a:t>
-            </a:r>
-          </a:p>
-          <a:p>
+              <a:t>Dependency constraints</a:t>
+            </a:r>
+          </a:p>
+          <a:p>
+            <a:endParaRPr lang="en-US" dirty="0" smtClean="0"/>
+          </a:p>
+          <a:p>
+            <a:endParaRPr lang="en-US" dirty="0" smtClean="0"/>
+          </a:p>
+          <a:p>
+            <a:r>
+              <a:rPr lang="en-US" dirty="0" smtClean="0"/>
+              <a:t>Periodic resource constraints:</a:t>
+            </a:r>
+          </a:p>
+          <a:p>
+            <a:pPr lvl="1"/>
+            <a:r>
+              <a:rPr lang="en-US" dirty="0" smtClean="0"/>
+              <a:t>Fold line into a circle with N equal sectors,</a:t>
+            </a:r>
+          </a:p>
+          <a:p>
+            <a:pPr lvl="1"/>
+            <a:r>
+              <a:rPr lang="en-US" dirty="0" smtClean="0"/>
+              <a:t>assign each </a:t>
+            </a:r>
+            <a:r>
+              <a:rPr lang="en-US" dirty="0" err="1" smtClean="0"/>
+              <a:t>ti</a:t>
+            </a:r>
+            <a:r>
+              <a:rPr lang="en-US" dirty="0" smtClean="0"/>
+              <a:t> to sector (</a:t>
+            </a:r>
+            <a:r>
+              <a:rPr lang="en-US" dirty="0" err="1" smtClean="0"/>
+              <a:t>ti</a:t>
+            </a:r>
+            <a:r>
+              <a:rPr lang="en-US" dirty="0" smtClean="0"/>
+              <a:t> mod N),</a:t>
+            </a:r>
+          </a:p>
+          <a:p>
+            <a:pPr lvl="1"/>
+            <a:r>
+              <a:rPr lang="en-US" dirty="0" smtClean="0"/>
+              <a:t>enforce resource limits on all operations within a sector</a:t>
+            </a:r>
+            <a:endParaRPr lang="en-US" dirty="0"/>
+          </a:p>
+          <a:p>
+            <a:r>
+              <a:rPr lang="en-US" dirty="0" smtClean="0"/>
+              <a:t> </a:t>
+            </a:r>
+            <a:r>
+              <a:rPr lang="en-US" dirty="0" err="1" smtClean="0"/>
+              <a:t>tn</a:t>
+            </a:r>
+            <a:r>
+              <a:rPr lang="en-US" dirty="0" smtClean="0"/>
+              <a:t> = Sum_(</a:t>
+            </a:r>
+            <a:r>
+              <a:rPr lang="en-US" dirty="0" err="1" smtClean="0"/>
+              <a:t>q,r</a:t>
+            </a:r>
+            <a:r>
+              <a:rPr lang="en-US" dirty="0" smtClean="0"/>
+              <a:t>)((q * N + r) * I[n, q, r]), I[n, q, r] are indicators</a:t>
+            </a:r>
+          </a:p>
+          <a:p>
+            <a:pPr lvl="1"/>
+            <a:r>
+              <a:rPr lang="en-US" dirty="0" err="1" smtClean="0"/>
+              <a:t>S.t.</a:t>
+            </a:r>
+            <a:r>
+              <a:rPr lang="en-US" dirty="0" smtClean="0"/>
+              <a:t>   Sum_(q, r) I[n, q, r] = 1 (q, r are unique)</a:t>
+            </a:r>
+          </a:p>
+          <a:p>
+            <a:pPr lvl="1"/>
+            <a:r>
+              <a:rPr lang="en-US" dirty="0" err="1" smtClean="0"/>
+              <a:t>S.t.</a:t>
+            </a:r>
+            <a:r>
+              <a:rPr lang="en-US" dirty="0" smtClean="0"/>
+              <a:t>   Sum_(</a:t>
+            </a:r>
+            <a:r>
+              <a:rPr lang="en-US" dirty="0" err="1" smtClean="0"/>
+              <a:t>n,q</a:t>
+            </a:r>
+            <a:r>
+              <a:rPr lang="en-US" dirty="0" smtClean="0"/>
+              <a:t>)a(n)*I[n, q, r]  &lt;= A (action limits are not violated)</a:t>
+            </a:r>
+          </a:p>
+        </p:txBody>
+      </p:sp>
+      <p:cxnSp>
+        <p:nvCxnSpPr>
+          <p:cNvPr id="5" name="Straight Connector 4"/>
+          <p:cNvCxnSpPr/>
+          <p:nvPr/>
+        </p:nvCxnSpPr>
+        <p:spPr>
+          <a:xfrm>
+            <a:off x="4963886" y="2390503"/>
+            <a:ext cx="7228114" cy="13063"/>
+          </a:xfrm>
+          <a:prstGeom prst="line">
+            <a:avLst/>
+          </a:prstGeom>
+          <a:ln w="63500"/>
+        </p:spPr>
+        <p:style>
+          <a:lnRef idx="1">
+            <a:schemeClr val="accent1"/>
+          </a:lnRef>
+          <a:fillRef idx="0">
+            <a:schemeClr val="accent1"/>
+          </a:fillRef>
+          <a:effectRef idx="0">
+            <a:schemeClr val="accent1"/>
+          </a:effectRef>
+          <a:fontRef idx="minor">
+            <a:schemeClr val="tx1"/>
+          </a:fontRef>
+        </p:style>
+      </p:cxnSp>
+      <p:cxnSp>
+        <p:nvCxnSpPr>
+          <p:cNvPr id="7" name="Straight Connector 6"/>
+          <p:cNvCxnSpPr/>
+          <p:nvPr/>
+        </p:nvCxnSpPr>
+        <p:spPr>
+          <a:xfrm>
+            <a:off x="5786846" y="2116183"/>
+            <a:ext cx="0" cy="574766"/>
+          </a:xfrm>
+          <a:prstGeom prst="line">
+            <a:avLst/>
+          </a:prstGeom>
+          <a:ln w="63500"/>
+        </p:spPr>
+        <p:style>
+          <a:lnRef idx="1">
+            <a:schemeClr val="accent1"/>
+          </a:lnRef>
+          <a:fillRef idx="0">
+            <a:schemeClr val="accent1"/>
+          </a:fillRef>
+          <a:effectRef idx="0">
+            <a:schemeClr val="accent1"/>
+          </a:effectRef>
+          <a:fontRef idx="minor">
+            <a:schemeClr val="tx1"/>
+          </a:fontRef>
+        </p:style>
+      </p:cxnSp>
+      <p:cxnSp>
+        <p:nvCxnSpPr>
+          <p:cNvPr id="8" name="Straight Connector 7"/>
+          <p:cNvCxnSpPr/>
+          <p:nvPr/>
+        </p:nvCxnSpPr>
+        <p:spPr>
+          <a:xfrm>
+            <a:off x="8316686" y="2116183"/>
+            <a:ext cx="0" cy="574766"/>
+          </a:xfrm>
+          <a:prstGeom prst="line">
+            <a:avLst/>
+          </a:prstGeom>
+          <a:ln w="63500"/>
+        </p:spPr>
+        <p:style>
+          <a:lnRef idx="1">
+            <a:schemeClr val="accent1"/>
+          </a:lnRef>
+          <a:fillRef idx="0">
+            <a:schemeClr val="accent1"/>
+          </a:fillRef>
+          <a:effectRef idx="0">
+            <a:schemeClr val="accent1"/>
+          </a:effectRef>
+          <a:fontRef idx="minor">
+            <a:schemeClr val="tx1"/>
+          </a:fontRef>
+        </p:style>
+      </p:cxnSp>
+      <p:cxnSp>
+        <p:nvCxnSpPr>
+          <p:cNvPr id="9" name="Straight Connector 8"/>
+          <p:cNvCxnSpPr/>
+          <p:nvPr/>
+        </p:nvCxnSpPr>
+        <p:spPr>
+          <a:xfrm>
+            <a:off x="8808721" y="2116183"/>
+            <a:ext cx="0" cy="574766"/>
+          </a:xfrm>
+          <a:prstGeom prst="line">
+            <a:avLst/>
+          </a:prstGeom>
+          <a:ln w="63500"/>
+        </p:spPr>
+        <p:style>
+          <a:lnRef idx="1">
+            <a:schemeClr val="accent1"/>
+          </a:lnRef>
+          <a:fillRef idx="0">
+            <a:schemeClr val="accent1"/>
+          </a:fillRef>
+          <a:effectRef idx="0">
+            <a:schemeClr val="accent1"/>
+          </a:effectRef>
+          <a:fontRef idx="minor">
+            <a:schemeClr val="tx1"/>
+          </a:fontRef>
+        </p:style>
+      </p:cxnSp>
+      <p:cxnSp>
+        <p:nvCxnSpPr>
+          <p:cNvPr id="10" name="Straight Connector 9"/>
+          <p:cNvCxnSpPr/>
+          <p:nvPr/>
+        </p:nvCxnSpPr>
+        <p:spPr>
+          <a:xfrm>
+            <a:off x="10763795" y="2116183"/>
+            <a:ext cx="0" cy="574766"/>
+          </a:xfrm>
+          <a:prstGeom prst="line">
+            <a:avLst/>
+          </a:prstGeom>
+          <a:ln w="63500"/>
+        </p:spPr>
+        <p:style>
+          <a:lnRef idx="1">
+            <a:schemeClr val="accent1"/>
+          </a:lnRef>
+          <a:fillRef idx="0">
+            <a:schemeClr val="accent1"/>
+          </a:fillRef>
+          <a:effectRef idx="0">
+            <a:schemeClr val="accent1"/>
+          </a:effectRef>
+          <a:fontRef idx="minor">
+            <a:schemeClr val="tx1"/>
+          </a:fontRef>
+        </p:style>
+      </p:cxnSp>
+      <p:sp>
+        <p:nvSpPr>
+          <p:cNvPr id="11" name="TextBox 10"/>
+          <p:cNvSpPr txBox="1"/>
+          <p:nvPr/>
+        </p:nvSpPr>
+        <p:spPr>
+          <a:xfrm>
+            <a:off x="5669280" y="1724298"/>
+            <a:ext cx="548640" cy="369332"/>
+          </a:xfrm>
+          <a:prstGeom prst="rect">
+            <a:avLst/>
+          </a:prstGeom>
+          <a:noFill/>
+        </p:spPr>
+        <p:txBody>
+          <a:bodyPr wrap="square" rtlCol="0">
+            <a:spAutoFit/>
+          </a:bodyPr>
+          <a:lstStyle/>
+          <a:p>
+            <a:r>
+              <a:rPr lang="en-US" dirty="0" smtClean="0"/>
+              <a:t>t1</a:t>
+            </a:r>
+            <a:endParaRPr lang="en-US" dirty="0"/>
+          </a:p>
+        </p:txBody>
+      </p:sp>
+      <p:cxnSp>
+        <p:nvCxnSpPr>
+          <p:cNvPr id="12" name="Straight Connector 11"/>
+          <p:cNvCxnSpPr/>
+          <p:nvPr/>
+        </p:nvCxnSpPr>
+        <p:spPr>
+          <a:xfrm>
+            <a:off x="4998720" y="2085703"/>
+            <a:ext cx="0" cy="574766"/>
+          </a:xfrm>
+          <a:prstGeom prst="line">
+            <a:avLst/>
+          </a:prstGeom>
+          <a:ln w="63500"/>
+        </p:spPr>
+        <p:style>
+          <a:lnRef idx="1">
+            <a:schemeClr val="accent1"/>
+          </a:lnRef>
+          <a:fillRef idx="0">
+            <a:schemeClr val="accent1"/>
+          </a:fillRef>
+          <a:effectRef idx="0">
+            <a:schemeClr val="accent1"/>
+          </a:effectRef>
+          <a:fontRef idx="minor">
+            <a:schemeClr val="tx1"/>
+          </a:fontRef>
+        </p:style>
+      </p:cxnSp>
+      <p:sp>
+        <p:nvSpPr>
+          <p:cNvPr id="16" name="TextBox 15"/>
+          <p:cNvSpPr txBox="1"/>
+          <p:nvPr/>
+        </p:nvSpPr>
+        <p:spPr>
+          <a:xfrm>
+            <a:off x="4855029" y="1719944"/>
+            <a:ext cx="548640" cy="369332"/>
+          </a:xfrm>
+          <a:prstGeom prst="rect">
+            <a:avLst/>
+          </a:prstGeom>
+          <a:noFill/>
+        </p:spPr>
+        <p:txBody>
+          <a:bodyPr wrap="square" rtlCol="0">
+            <a:spAutoFit/>
+          </a:bodyPr>
+          <a:lstStyle/>
+          <a:p>
+            <a:r>
+              <a:rPr lang="en-US" dirty="0" smtClean="0"/>
+              <a:t>t0</a:t>
+            </a:r>
+            <a:endParaRPr lang="en-US" dirty="0"/>
+          </a:p>
+        </p:txBody>
+      </p:sp>
+      <p:sp>
+        <p:nvSpPr>
+          <p:cNvPr id="17" name="TextBox 16"/>
+          <p:cNvSpPr txBox="1"/>
+          <p:nvPr/>
+        </p:nvSpPr>
+        <p:spPr>
+          <a:xfrm>
+            <a:off x="8116389" y="1702527"/>
+            <a:ext cx="548640" cy="369332"/>
+          </a:xfrm>
+          <a:prstGeom prst="rect">
+            <a:avLst/>
+          </a:prstGeom>
+          <a:noFill/>
+        </p:spPr>
+        <p:txBody>
+          <a:bodyPr wrap="square" rtlCol="0">
+            <a:spAutoFit/>
+          </a:bodyPr>
+          <a:lstStyle/>
+          <a:p>
+            <a:r>
+              <a:rPr lang="en-US" dirty="0" smtClean="0"/>
+              <a:t>t2</a:t>
+            </a:r>
+            <a:endParaRPr lang="en-US" dirty="0"/>
+          </a:p>
+        </p:txBody>
+      </p:sp>
+      <p:sp>
+        <p:nvSpPr>
+          <p:cNvPr id="18" name="TextBox 17"/>
+          <p:cNvSpPr txBox="1"/>
+          <p:nvPr/>
+        </p:nvSpPr>
+        <p:spPr>
+          <a:xfrm>
+            <a:off x="8634549" y="1698173"/>
+            <a:ext cx="548640" cy="369332"/>
+          </a:xfrm>
+          <a:prstGeom prst="rect">
+            <a:avLst/>
+          </a:prstGeom>
+          <a:noFill/>
+        </p:spPr>
+        <p:txBody>
+          <a:bodyPr wrap="square" rtlCol="0">
+            <a:spAutoFit/>
+          </a:bodyPr>
+          <a:lstStyle/>
+          <a:p>
+            <a:r>
+              <a:rPr lang="en-US" dirty="0" smtClean="0"/>
+              <a:t>t3</a:t>
+            </a:r>
+            <a:endParaRPr lang="en-US" dirty="0"/>
+          </a:p>
+        </p:txBody>
+      </p:sp>
+      <p:sp>
+        <p:nvSpPr>
+          <p:cNvPr id="19" name="TextBox 18"/>
+          <p:cNvSpPr txBox="1"/>
+          <p:nvPr/>
+        </p:nvSpPr>
+        <p:spPr>
+          <a:xfrm>
+            <a:off x="10563498" y="1719944"/>
+            <a:ext cx="548640" cy="369332"/>
+          </a:xfrm>
+          <a:prstGeom prst="rect">
+            <a:avLst/>
+          </a:prstGeom>
+          <a:noFill/>
+        </p:spPr>
+        <p:txBody>
+          <a:bodyPr wrap="square" rtlCol="0">
+            <a:spAutoFit/>
+          </a:bodyPr>
+          <a:lstStyle/>
+          <a:p>
+            <a:r>
+              <a:rPr lang="en-US" dirty="0" smtClean="0"/>
+              <a:t>t4</a:t>
+            </a:r>
+            <a:endParaRPr lang="en-US" dirty="0"/>
+          </a:p>
+        </p:txBody>
+      </p:sp>
+      <p:sp>
+        <p:nvSpPr>
+          <p:cNvPr id="20" name="Oval 19"/>
+          <p:cNvSpPr/>
+          <p:nvPr/>
+        </p:nvSpPr>
+        <p:spPr>
+          <a:xfrm>
+            <a:off x="11573693" y="1963781"/>
+            <a:ext cx="143691" cy="182880"/>
+          </a:xfrm>
+          <a:prstGeom prst="ellipse">
+            <a:avLst/>
+          </a:prstGeom>
+          <a:solidFill>
+            <a:schemeClr val="tx1"/>
+          </a:solidFill>
+          <a:ln>
+            <a:solidFill>
+              <a:schemeClr val="tx1"/>
+            </a:solidFill>
+          </a:ln>
+        </p:spPr>
+        <p:style>
+          <a:lnRef idx="2">
+            <a:schemeClr val="accent1">
+              <a:shade val="50000"/>
+            </a:schemeClr>
+          </a:lnRef>
+          <a:fillRef idx="1">
+            <a:schemeClr val="accent1"/>
+          </a:fillRef>
+          <a:effectRef idx="0">
+            <a:schemeClr val="accent1"/>
+          </a:effectRef>
+          <a:fontRef idx="minor">
+            <a:schemeClr val="lt1"/>
+          </a:fontRef>
+        </p:style>
+        <p:txBody>
+          <a:bodyPr rtlCol="0" anchor="ctr"/>
+          <a:lstStyle/>
+          <a:p>
+            <a:pPr algn="ctr"/>
+            <a:endParaRPr lang="en-US"/>
+          </a:p>
+        </p:txBody>
+      </p:sp>
+      <p:sp>
+        <p:nvSpPr>
+          <p:cNvPr id="21" name="Oval 20"/>
+          <p:cNvSpPr/>
+          <p:nvPr/>
+        </p:nvSpPr>
+        <p:spPr>
+          <a:xfrm>
+            <a:off x="11726093" y="1963781"/>
+            <a:ext cx="143691" cy="182880"/>
+          </a:xfrm>
+          <a:prstGeom prst="ellipse">
+            <a:avLst/>
+          </a:prstGeom>
+          <a:solidFill>
+            <a:schemeClr val="tx1"/>
+          </a:solidFill>
+          <a:ln>
+            <a:solidFill>
+              <a:schemeClr val="tx1"/>
+            </a:solidFill>
+          </a:ln>
+        </p:spPr>
+        <p:style>
+          <a:lnRef idx="2">
+            <a:schemeClr val="accent1">
+              <a:shade val="50000"/>
+            </a:schemeClr>
+          </a:lnRef>
+          <a:fillRef idx="1">
+            <a:schemeClr val="accent1"/>
+          </a:fillRef>
+          <a:effectRef idx="0">
+            <a:schemeClr val="accent1"/>
+          </a:effectRef>
+          <a:fontRef idx="minor">
+            <a:schemeClr val="lt1"/>
+          </a:fontRef>
+        </p:style>
+        <p:txBody>
+          <a:bodyPr rtlCol="0" anchor="ctr"/>
+          <a:lstStyle/>
+          <a:p>
+            <a:pPr algn="ctr"/>
+            <a:endParaRPr lang="en-US"/>
+          </a:p>
+        </p:txBody>
+      </p:sp>
+      <p:sp>
+        <p:nvSpPr>
+          <p:cNvPr id="22" name="Oval 21"/>
+          <p:cNvSpPr/>
+          <p:nvPr/>
+        </p:nvSpPr>
+        <p:spPr>
+          <a:xfrm>
+            <a:off x="11878493" y="1963781"/>
+            <a:ext cx="143691" cy="182880"/>
+          </a:xfrm>
+          <a:prstGeom prst="ellipse">
+            <a:avLst/>
+          </a:prstGeom>
+          <a:solidFill>
+            <a:schemeClr val="tx1"/>
+          </a:solidFill>
+          <a:ln>
+            <a:solidFill>
+              <a:schemeClr val="tx1"/>
+            </a:solidFill>
+          </a:ln>
+        </p:spPr>
+        <p:style>
+          <a:lnRef idx="2">
+            <a:schemeClr val="accent1">
+              <a:shade val="50000"/>
+            </a:schemeClr>
+          </a:lnRef>
+          <a:fillRef idx="1">
+            <a:schemeClr val="accent1"/>
+          </a:fillRef>
+          <a:effectRef idx="0">
+            <a:schemeClr val="accent1"/>
+          </a:effectRef>
+          <a:fontRef idx="minor">
+            <a:schemeClr val="lt1"/>
+          </a:fontRef>
+        </p:style>
+        <p:txBody>
+          <a:bodyPr rtlCol="0" anchor="ctr"/>
+          <a:lstStyle/>
+          <a:p>
+            <a:pPr algn="ctr"/>
+            <a:endParaRPr lang="en-US"/>
+          </a:p>
+        </p:txBody>
+      </p:sp>
+      <p:cxnSp>
+        <p:nvCxnSpPr>
+          <p:cNvPr id="24" name="Straight Arrow Connector 23"/>
+          <p:cNvCxnSpPr/>
+          <p:nvPr/>
+        </p:nvCxnSpPr>
+        <p:spPr>
+          <a:xfrm>
+            <a:off x="5878286" y="2782389"/>
+            <a:ext cx="2364377" cy="0"/>
+          </a:xfrm>
+          <a:prstGeom prst="straightConnector1">
+            <a:avLst/>
+          </a:prstGeom>
+          <a:ln w="63500">
+            <a:solidFill>
+              <a:schemeClr val="tx1"/>
+            </a:solidFill>
+            <a:headEnd type="arrow"/>
+            <a:tailEnd type="arrow"/>
+          </a:ln>
+        </p:spPr>
+        <p:style>
+          <a:lnRef idx="1">
+            <a:schemeClr val="accent1"/>
+          </a:lnRef>
+          <a:fillRef idx="0">
+            <a:schemeClr val="accent1"/>
+          </a:fillRef>
+          <a:effectRef idx="0">
+            <a:schemeClr val="accent1"/>
+          </a:effectRef>
+          <a:fontRef idx="minor">
+            <a:schemeClr val="tx1"/>
+          </a:fontRef>
+        </p:style>
+      </p:cxnSp>
+      <p:sp>
+        <p:nvSpPr>
+          <p:cNvPr id="25" name="TextBox 24"/>
+          <p:cNvSpPr txBox="1"/>
+          <p:nvPr/>
+        </p:nvSpPr>
+        <p:spPr>
+          <a:xfrm>
+            <a:off x="6296298" y="2873829"/>
+            <a:ext cx="1678665" cy="369332"/>
+          </a:xfrm>
+          <a:prstGeom prst="rect">
+            <a:avLst/>
+          </a:prstGeom>
+          <a:noFill/>
+        </p:spPr>
+        <p:txBody>
+          <a:bodyPr wrap="square" rtlCol="0">
+            <a:spAutoFit/>
+          </a:bodyPr>
+          <a:lstStyle/>
+          <a:p>
+            <a:r>
+              <a:rPr lang="en-US" smtClean="0"/>
+              <a:t>t2 – t1 &gt;= e(1,2)</a:t>
+            </a:r>
+            <a:endParaRPr lang="en-US"/>
+          </a:p>
+        </p:txBody>
+      </p:sp>
+      <p:sp>
+        <p:nvSpPr>
+          <p:cNvPr id="26" name="Oval 25"/>
+          <p:cNvSpPr/>
+          <p:nvPr/>
+        </p:nvSpPr>
+        <p:spPr>
+          <a:xfrm>
+            <a:off x="9731823" y="3540037"/>
+            <a:ext cx="1188720" cy="1332411"/>
+          </a:xfrm>
+          <a:prstGeom prst="ellipse">
+            <a:avLst/>
+          </a:prstGeom>
+          <a:noFill/>
+          <a:ln w="63500">
+            <a:solidFill>
+              <a:schemeClr val="accent1"/>
+            </a:solidFill>
+          </a:ln>
+        </p:spPr>
+        <p:style>
+          <a:lnRef idx="2">
+            <a:schemeClr val="accent1">
+              <a:shade val="50000"/>
+            </a:schemeClr>
+          </a:lnRef>
+          <a:fillRef idx="1">
+            <a:schemeClr val="accent1"/>
+          </a:fillRef>
+          <a:effectRef idx="0">
+            <a:schemeClr val="accent1"/>
+          </a:effectRef>
+          <a:fontRef idx="minor">
+            <a:schemeClr val="lt1"/>
+          </a:fontRef>
+        </p:style>
+        <p:txBody>
+          <a:bodyPr rtlCol="0" anchor="ctr"/>
+          <a:lstStyle/>
+          <a:p>
+            <a:pPr algn="ctr"/>
+            <a:endParaRPr lang="en-US"/>
+          </a:p>
+        </p:txBody>
+      </p:sp>
+      <p:cxnSp>
+        <p:nvCxnSpPr>
+          <p:cNvPr id="27" name="Straight Connector 26"/>
+          <p:cNvCxnSpPr>
+            <a:stCxn id="26" idx="0"/>
+            <a:endCxn id="26" idx="4"/>
+          </p:cNvCxnSpPr>
+          <p:nvPr/>
+        </p:nvCxnSpPr>
+        <p:spPr>
+          <a:xfrm>
+            <a:off x="10326183" y="3540037"/>
+            <a:ext cx="0" cy="1332411"/>
+          </a:xfrm>
+          <a:prstGeom prst="line">
+            <a:avLst/>
+          </a:prstGeom>
+          <a:ln w="63500"/>
+        </p:spPr>
+        <p:style>
+          <a:lnRef idx="1">
+            <a:schemeClr val="accent1"/>
+          </a:lnRef>
+          <a:fillRef idx="0">
+            <a:schemeClr val="accent1"/>
+          </a:fillRef>
+          <a:effectRef idx="0">
+            <a:schemeClr val="accent1"/>
+          </a:effectRef>
+          <a:fontRef idx="minor">
+            <a:schemeClr val="tx1"/>
+          </a:fontRef>
+        </p:style>
+      </p:cxnSp>
+      <p:cxnSp>
+        <p:nvCxnSpPr>
+          <p:cNvPr id="52" name="Straight Connector 51"/>
+          <p:cNvCxnSpPr>
+            <a:stCxn id="26" idx="1"/>
+            <a:endCxn id="26" idx="5"/>
+          </p:cNvCxnSpPr>
+          <p:nvPr/>
+        </p:nvCxnSpPr>
+        <p:spPr>
+          <a:xfrm>
+            <a:off x="9905907" y="3735164"/>
+            <a:ext cx="840552" cy="942157"/>
+          </a:xfrm>
+          <a:prstGeom prst="line">
+            <a:avLst/>
+          </a:prstGeom>
+          <a:ln w="63500"/>
+        </p:spPr>
+        <p:style>
+          <a:lnRef idx="1">
+            <a:schemeClr val="accent1"/>
+          </a:lnRef>
+          <a:fillRef idx="0">
+            <a:schemeClr val="accent1"/>
+          </a:fillRef>
+          <a:effectRef idx="0">
+            <a:schemeClr val="accent1"/>
+          </a:effectRef>
+          <a:fontRef idx="minor">
+            <a:schemeClr val="tx1"/>
+          </a:fontRef>
+        </p:style>
+      </p:cxnSp>
+      <p:cxnSp>
+        <p:nvCxnSpPr>
+          <p:cNvPr id="57" name="Straight Connector 56"/>
+          <p:cNvCxnSpPr>
+            <a:stCxn id="26" idx="7"/>
+            <a:endCxn id="26" idx="3"/>
+          </p:cNvCxnSpPr>
+          <p:nvPr/>
+        </p:nvCxnSpPr>
+        <p:spPr>
+          <a:xfrm flipH="1">
+            <a:off x="9905907" y="3735164"/>
+            <a:ext cx="840552" cy="942157"/>
+          </a:xfrm>
+          <a:prstGeom prst="line">
+            <a:avLst/>
+          </a:prstGeom>
+          <a:ln w="63500"/>
+        </p:spPr>
+        <p:style>
+          <a:lnRef idx="1">
+            <a:schemeClr val="accent1"/>
+          </a:lnRef>
+          <a:fillRef idx="0">
+            <a:schemeClr val="accent1"/>
+          </a:fillRef>
+          <a:effectRef idx="0">
+            <a:schemeClr val="accent1"/>
+          </a:effectRef>
+          <a:fontRef idx="minor">
+            <a:schemeClr val="tx1"/>
+          </a:fontRef>
+        </p:style>
+      </p:cxnSp>
+      <p:cxnSp>
+        <p:nvCxnSpPr>
+          <p:cNvPr id="60" name="Straight Connector 59"/>
+          <p:cNvCxnSpPr>
+            <a:stCxn id="26" idx="6"/>
+            <a:endCxn id="26" idx="2"/>
+          </p:cNvCxnSpPr>
+          <p:nvPr/>
+        </p:nvCxnSpPr>
+        <p:spPr>
+          <a:xfrm flipH="1">
+            <a:off x="9731823" y="4206243"/>
+            <a:ext cx="1188720" cy="0"/>
+          </a:xfrm>
+          <a:prstGeom prst="line">
+            <a:avLst/>
+          </a:prstGeom>
+          <a:ln w="63500"/>
+        </p:spPr>
+        <p:style>
+          <a:lnRef idx="1">
+            <a:schemeClr val="accent1"/>
+          </a:lnRef>
+          <a:fillRef idx="0">
+            <a:schemeClr val="accent1"/>
+          </a:fillRef>
+          <a:effectRef idx="0">
+            <a:schemeClr val="accent1"/>
+          </a:effectRef>
+          <a:fontRef idx="minor">
+            <a:schemeClr val="tx1"/>
+          </a:fontRef>
+        </p:style>
+      </p:cxnSp>
+      <p:sp>
+        <p:nvSpPr>
+          <p:cNvPr id="63" name="TextBox 62"/>
+          <p:cNvSpPr txBox="1"/>
+          <p:nvPr/>
+        </p:nvSpPr>
+        <p:spPr>
+          <a:xfrm>
+            <a:off x="9422669" y="3648894"/>
+            <a:ext cx="548640" cy="369332"/>
+          </a:xfrm>
+          <a:prstGeom prst="rect">
+            <a:avLst/>
+          </a:prstGeom>
+          <a:noFill/>
+        </p:spPr>
+        <p:txBody>
+          <a:bodyPr wrap="square" rtlCol="0">
+            <a:spAutoFit/>
+          </a:bodyPr>
+          <a:lstStyle/>
+          <a:p>
+            <a:r>
+              <a:rPr lang="en-US" dirty="0" smtClean="0"/>
+              <a:t>t0</a:t>
+            </a:r>
+            <a:endParaRPr lang="en-US" dirty="0"/>
+          </a:p>
+        </p:txBody>
+      </p:sp>
+      <p:sp>
+        <p:nvSpPr>
+          <p:cNvPr id="64" name="TextBox 63"/>
+          <p:cNvSpPr txBox="1"/>
+          <p:nvPr/>
+        </p:nvSpPr>
+        <p:spPr>
+          <a:xfrm>
+            <a:off x="10850874" y="3718560"/>
+            <a:ext cx="548640" cy="369332"/>
+          </a:xfrm>
+          <a:prstGeom prst="rect">
+            <a:avLst/>
+          </a:prstGeom>
+          <a:noFill/>
+        </p:spPr>
+        <p:txBody>
+          <a:bodyPr wrap="square" rtlCol="0">
+            <a:spAutoFit/>
+          </a:bodyPr>
+          <a:lstStyle/>
+          <a:p>
+            <a:r>
+              <a:rPr lang="en-US" dirty="0" smtClean="0"/>
+              <a:t>t1</a:t>
+            </a:r>
+            <a:endParaRPr lang="en-US" dirty="0"/>
+          </a:p>
+        </p:txBody>
+      </p:sp>
+      <p:sp>
+        <p:nvSpPr>
+          <p:cNvPr id="65" name="TextBox 64"/>
+          <p:cNvSpPr txBox="1"/>
+          <p:nvPr/>
+        </p:nvSpPr>
+        <p:spPr>
+          <a:xfrm>
+            <a:off x="9405253" y="4219306"/>
+            <a:ext cx="548640" cy="369332"/>
+          </a:xfrm>
+          <a:prstGeom prst="rect">
+            <a:avLst/>
+          </a:prstGeom>
+          <a:noFill/>
+        </p:spPr>
+        <p:txBody>
+          <a:bodyPr wrap="square" rtlCol="0">
+            <a:spAutoFit/>
+          </a:bodyPr>
+          <a:lstStyle/>
+          <a:p>
+            <a:r>
+              <a:rPr lang="en-US" smtClean="0"/>
+              <a:t>t2</a:t>
+            </a:r>
+            <a:endParaRPr lang="en-US" dirty="0"/>
+          </a:p>
+        </p:txBody>
+      </p:sp>
+      <p:sp>
+        <p:nvSpPr>
+          <p:cNvPr id="66" name="TextBox 65"/>
+          <p:cNvSpPr txBox="1"/>
+          <p:nvPr/>
+        </p:nvSpPr>
+        <p:spPr>
+          <a:xfrm>
+            <a:off x="9400898" y="4437802"/>
+            <a:ext cx="548640" cy="369332"/>
+          </a:xfrm>
+          <a:prstGeom prst="rect">
+            <a:avLst/>
+          </a:prstGeom>
+          <a:noFill/>
+        </p:spPr>
+        <p:txBody>
+          <a:bodyPr wrap="square" rtlCol="0">
+            <a:spAutoFit/>
+          </a:bodyPr>
+          <a:lstStyle/>
+          <a:p>
+            <a:r>
+              <a:rPr lang="en-US" dirty="0" smtClean="0"/>
+              <a:t>t3</a:t>
+            </a:r>
+            <a:endParaRPr lang="en-US" dirty="0"/>
+          </a:p>
+        </p:txBody>
+      </p:sp>
+      <p:sp>
+        <p:nvSpPr>
+          <p:cNvPr id="67" name="TextBox 66"/>
+          <p:cNvSpPr txBox="1"/>
+          <p:nvPr/>
+        </p:nvSpPr>
+        <p:spPr>
+          <a:xfrm>
+            <a:off x="10846520" y="4406540"/>
+            <a:ext cx="548640" cy="369332"/>
+          </a:xfrm>
+          <a:prstGeom prst="rect">
+            <a:avLst/>
+          </a:prstGeom>
+          <a:noFill/>
+        </p:spPr>
+        <p:txBody>
+          <a:bodyPr wrap="square" rtlCol="0">
+            <a:spAutoFit/>
+          </a:bodyPr>
+          <a:lstStyle/>
+          <a:p>
+            <a:r>
+              <a:rPr lang="en-US" smtClean="0"/>
+              <a:t>t4</a:t>
+            </a:r>
             <a:endParaRPr lang="en-US" dirty="0"/>
           </a:p>
         </p:txBody>
@@ -35457,13 +36302,8 @@
             </a:r>
             <a:r>
               <a:rPr lang="en-US" dirty="0" smtClean="0"/>
-              <a:t>eed multicasting for large tables spread out over multiple </a:t>
-            </a:r>
-            <a:r>
-              <a:rPr lang="en-US" dirty="0" smtClean="0"/>
-              <a:t>memories</a:t>
-            </a:r>
-            <a:endParaRPr lang="en-US" dirty="0" smtClean="0"/>
+              <a:t>eed multicasting for large tables spread out over multiple memories</a:t>
+            </a:r>
           </a:p>
         </p:txBody>
       </p:sp>
@@ -38584,7 +39424,6 @@
               <a:rPr lang="en-US" dirty="0" smtClean="0"/>
               <a:t> cores</a:t>
             </a:r>
-            <a:endParaRPr lang="en-US" dirty="0" smtClean="0"/>
           </a:p>
           <a:p>
             <a:pPr lvl="1"/>

</xml_diff>